<commit_message>
building core if projegting issues
</commit_message>
<xml_diff>
--- a/project-structure.pptx
+++ b/project-structure.pptx
@@ -1089,42 +1089,6 @@
         </a:p>
       </dgm:t>
     </dgm:pt>
-    <dgm:pt modelId="{D03A17CA-EFD1-4095-9A5F-38D5051CA30B}">
-      <dgm:prSet/>
-      <dgm:spPr/>
-      <dgm:t>
-        <a:bodyPr/>
-        <a:lstStyle/>
-        <a:p>
-          <a:r>
-            <a:rPr lang="en-US" dirty="0"/>
-            <a:t>users</a:t>
-          </a:r>
-        </a:p>
-      </dgm:t>
-    </dgm:pt>
-    <dgm:pt modelId="{8FA93D9C-16CA-46AA-9EB3-1ED4133613D0}" type="parTrans" cxnId="{B8667103-FC56-44F8-8A64-1177445DCB15}">
-      <dgm:prSet/>
-      <dgm:spPr/>
-      <dgm:t>
-        <a:bodyPr/>
-        <a:lstStyle/>
-        <a:p>
-          <a:endParaRPr lang="en-US"/>
-        </a:p>
-      </dgm:t>
-    </dgm:pt>
-    <dgm:pt modelId="{13C41425-A0AE-4864-B07F-D263FF0D1A0B}" type="sibTrans" cxnId="{B8667103-FC56-44F8-8A64-1177445DCB15}">
-      <dgm:prSet/>
-      <dgm:spPr/>
-      <dgm:t>
-        <a:bodyPr/>
-        <a:lstStyle/>
-        <a:p>
-          <a:endParaRPr lang="en-US"/>
-        </a:p>
-      </dgm:t>
-    </dgm:pt>
     <dgm:pt modelId="{71C607A5-4B2C-4F6E-8A20-9A8AA7D7F42F}">
       <dgm:prSet/>
       <dgm:spPr/>
@@ -1305,6 +1269,115 @@
         </a:p>
       </dgm:t>
     </dgm:pt>
+    <dgm:pt modelId="{5573F892-24D8-4E7E-ACD1-960EFC45736A}">
+      <dgm:prSet/>
+      <dgm:spPr/>
+      <dgm:t>
+        <a:bodyPr/>
+        <a:lstStyle/>
+        <a:p>
+          <a:r>
+            <a:rPr lang="en-US" dirty="0"/>
+            <a:t>Feedbacks</a:t>
+          </a:r>
+        </a:p>
+      </dgm:t>
+    </dgm:pt>
+    <dgm:pt modelId="{9E9C25D3-C424-4DC5-BF46-B70B0D0B57AB}" type="parTrans" cxnId="{E1F5F72C-861B-42A4-B635-0500C1C2F7A1}">
+      <dgm:prSet/>
+      <dgm:spPr/>
+      <dgm:t>
+        <a:bodyPr/>
+        <a:lstStyle/>
+        <a:p>
+          <a:endParaRPr lang="en-US"/>
+        </a:p>
+      </dgm:t>
+    </dgm:pt>
+    <dgm:pt modelId="{E9A8D38A-1581-4A03-8A49-8B50C44EB72F}" type="sibTrans" cxnId="{E1F5F72C-861B-42A4-B635-0500C1C2F7A1}">
+      <dgm:prSet/>
+      <dgm:spPr/>
+      <dgm:t>
+        <a:bodyPr/>
+        <a:lstStyle/>
+        <a:p>
+          <a:endParaRPr lang="en-US"/>
+        </a:p>
+      </dgm:t>
+    </dgm:pt>
+    <dgm:pt modelId="{977EF7FF-6E2A-4698-8929-D719BE62B02B}">
+      <dgm:prSet/>
+      <dgm:spPr/>
+      <dgm:t>
+        <a:bodyPr/>
+        <a:lstStyle/>
+        <a:p>
+          <a:r>
+            <a:rPr lang="en-US" dirty="0"/>
+            <a:t>Feedback table</a:t>
+          </a:r>
+        </a:p>
+      </dgm:t>
+    </dgm:pt>
+    <dgm:pt modelId="{54D557EB-1BC1-4BCA-B555-6DA43F36846A}" type="parTrans" cxnId="{ACD021DB-D9EC-4D39-ACDC-0013478A184A}">
+      <dgm:prSet/>
+      <dgm:spPr/>
+      <dgm:t>
+        <a:bodyPr/>
+        <a:lstStyle/>
+        <a:p>
+          <a:endParaRPr lang="en-US"/>
+        </a:p>
+      </dgm:t>
+    </dgm:pt>
+    <dgm:pt modelId="{058927BF-3EBE-469E-9FD6-CFCEF8C0AEF1}" type="sibTrans" cxnId="{ACD021DB-D9EC-4D39-ACDC-0013478A184A}">
+      <dgm:prSet/>
+      <dgm:spPr/>
+      <dgm:t>
+        <a:bodyPr/>
+        <a:lstStyle/>
+        <a:p>
+          <a:endParaRPr lang="en-US"/>
+        </a:p>
+      </dgm:t>
+    </dgm:pt>
+    <dgm:pt modelId="{4AFA2315-F472-4AB7-A58E-25207B18F4F0}">
+      <dgm:prSet/>
+      <dgm:spPr/>
+      <dgm:t>
+        <a:bodyPr/>
+        <a:lstStyle/>
+        <a:p>
+          <a:r>
+            <a:rPr lang="en-US"/>
+            <a:t>users</a:t>
+          </a:r>
+          <a:endParaRPr lang="en-US" dirty="0"/>
+        </a:p>
+      </dgm:t>
+    </dgm:pt>
+    <dgm:pt modelId="{4D615AB4-F184-4D79-AEFF-E14692063497}" type="parTrans" cxnId="{BCB855E5-E412-480D-BBFE-0D2E14D09A5D}">
+      <dgm:prSet/>
+      <dgm:spPr/>
+      <dgm:t>
+        <a:bodyPr/>
+        <a:lstStyle/>
+        <a:p>
+          <a:endParaRPr lang="en-US"/>
+        </a:p>
+      </dgm:t>
+    </dgm:pt>
+    <dgm:pt modelId="{C11A6AD2-B691-4580-9F7E-831561BC8E88}" type="sibTrans" cxnId="{BCB855E5-E412-480D-BBFE-0D2E14D09A5D}">
+      <dgm:prSet/>
+      <dgm:spPr/>
+      <dgm:t>
+        <a:bodyPr/>
+        <a:lstStyle/>
+        <a:p>
+          <a:endParaRPr lang="en-US"/>
+        </a:p>
+      </dgm:t>
+    </dgm:pt>
     <dgm:pt modelId="{8E1838F7-9884-4167-92C7-C70C925801C0}" type="pres">
       <dgm:prSet presAssocID="{E78328A7-4938-4CC9-A464-7899E68A5898}" presName="Name0" presStyleCnt="0">
         <dgm:presLayoutVars>
@@ -1382,7 +1455,7 @@
       <dgm:spPr/>
     </dgm:pt>
     <dgm:pt modelId="{ADC00EEF-F890-47C7-A55B-6CD73345D4E5}" type="pres">
-      <dgm:prSet presAssocID="{1E028449-BDFB-489E-BBBA-ABB3D943F322}" presName="txThree" presStyleLbl="node3" presStyleIdx="0" presStyleCnt="2">
+      <dgm:prSet presAssocID="{1E028449-BDFB-489E-BBBA-ABB3D943F322}" presName="txThree" presStyleLbl="node3" presStyleIdx="0" presStyleCnt="3">
         <dgm:presLayoutVars>
           <dgm:chPref val="3"/>
         </dgm:presLayoutVars>
@@ -1406,7 +1479,7 @@
       <dgm:spPr/>
     </dgm:pt>
     <dgm:pt modelId="{F677967E-DDE1-4E87-A0D8-1EDA580199D9}" type="pres">
-      <dgm:prSet presAssocID="{D0164772-56E0-41E8-B594-4705C6F69A2A}" presName="txFour" presStyleLbl="node4" presStyleIdx="0" presStyleCnt="6">
+      <dgm:prSet presAssocID="{D0164772-56E0-41E8-B594-4705C6F69A2A}" presName="txFour" presStyleLbl="node4" presStyleIdx="0" presStyleCnt="7">
         <dgm:presLayoutVars>
           <dgm:chPref val="3"/>
         </dgm:presLayoutVars>
@@ -1421,24 +1494,68 @@
       <dgm:prSet presAssocID="{BF047B91-F232-4834-966C-DFCBDA3106DB}" presName="sibSpaceThree" presStyleCnt="0"/>
       <dgm:spPr/>
     </dgm:pt>
-    <dgm:pt modelId="{42D8D49B-7A82-4EF4-B926-1B837CCB4A06}" type="pres">
-      <dgm:prSet presAssocID="{D03A17CA-EFD1-4095-9A5F-38D5051CA30B}" presName="vertThree" presStyleCnt="0"/>
-      <dgm:spPr/>
-    </dgm:pt>
-    <dgm:pt modelId="{8732BDAF-D958-4CD1-8D7C-F67DA86FB3EE}" type="pres">
-      <dgm:prSet presAssocID="{D03A17CA-EFD1-4095-9A5F-38D5051CA30B}" presName="txThree" presStyleLbl="node3" presStyleIdx="1" presStyleCnt="2">
+    <dgm:pt modelId="{538022D5-B845-422C-99DB-B6E6799B91C6}" type="pres">
+      <dgm:prSet presAssocID="{5573F892-24D8-4E7E-ACD1-960EFC45736A}" presName="vertThree" presStyleCnt="0"/>
+      <dgm:spPr/>
+    </dgm:pt>
+    <dgm:pt modelId="{CEF31959-EB1A-464F-AAED-77CE2FBBE3D4}" type="pres">
+      <dgm:prSet presAssocID="{5573F892-24D8-4E7E-ACD1-960EFC45736A}" presName="txThree" presStyleLbl="node3" presStyleIdx="1" presStyleCnt="3">
         <dgm:presLayoutVars>
           <dgm:chPref val="3"/>
         </dgm:presLayoutVars>
       </dgm:prSet>
       <dgm:spPr/>
     </dgm:pt>
-    <dgm:pt modelId="{C50EDF8A-3F7D-4972-B757-22E10BC977D2}" type="pres">
-      <dgm:prSet presAssocID="{D03A17CA-EFD1-4095-9A5F-38D5051CA30B}" presName="parTransThree" presStyleCnt="0"/>
-      <dgm:spPr/>
-    </dgm:pt>
-    <dgm:pt modelId="{CACDE823-82F9-486C-B7E3-E1F4DD8698AC}" type="pres">
-      <dgm:prSet presAssocID="{D03A17CA-EFD1-4095-9A5F-38D5051CA30B}" presName="horzThree" presStyleCnt="0"/>
+    <dgm:pt modelId="{4616722D-B6A1-40B9-BD70-B3D9CF315C05}" type="pres">
+      <dgm:prSet presAssocID="{5573F892-24D8-4E7E-ACD1-960EFC45736A}" presName="parTransThree" presStyleCnt="0"/>
+      <dgm:spPr/>
+    </dgm:pt>
+    <dgm:pt modelId="{80037ED7-25C2-47A6-85BC-E1AA7A0D91EF}" type="pres">
+      <dgm:prSet presAssocID="{5573F892-24D8-4E7E-ACD1-960EFC45736A}" presName="horzThree" presStyleCnt="0"/>
+      <dgm:spPr/>
+    </dgm:pt>
+    <dgm:pt modelId="{3C1B6A7B-8B08-4429-94EA-3FE815041A85}" type="pres">
+      <dgm:prSet presAssocID="{977EF7FF-6E2A-4698-8929-D719BE62B02B}" presName="vertFour" presStyleCnt="0">
+        <dgm:presLayoutVars>
+          <dgm:chPref val="3"/>
+        </dgm:presLayoutVars>
+      </dgm:prSet>
+      <dgm:spPr/>
+    </dgm:pt>
+    <dgm:pt modelId="{68C45A7D-D5BA-40DE-95A9-6C08AB6AD80A}" type="pres">
+      <dgm:prSet presAssocID="{977EF7FF-6E2A-4698-8929-D719BE62B02B}" presName="txFour" presStyleLbl="node4" presStyleIdx="1" presStyleCnt="7">
+        <dgm:presLayoutVars>
+          <dgm:chPref val="3"/>
+        </dgm:presLayoutVars>
+      </dgm:prSet>
+      <dgm:spPr/>
+    </dgm:pt>
+    <dgm:pt modelId="{71C093A3-055F-4B8D-8EE5-E5BD32EC7265}" type="pres">
+      <dgm:prSet presAssocID="{977EF7FF-6E2A-4698-8929-D719BE62B02B}" presName="horzFour" presStyleCnt="0"/>
+      <dgm:spPr/>
+    </dgm:pt>
+    <dgm:pt modelId="{59186C7A-F6EB-4273-AD41-6F00824818BE}" type="pres">
+      <dgm:prSet presAssocID="{E9A8D38A-1581-4A03-8A49-8B50C44EB72F}" presName="sibSpaceThree" presStyleCnt="0"/>
+      <dgm:spPr/>
+    </dgm:pt>
+    <dgm:pt modelId="{34850040-AF9E-4543-9036-D2B8896CA1AA}" type="pres">
+      <dgm:prSet presAssocID="{4AFA2315-F472-4AB7-A58E-25207B18F4F0}" presName="vertThree" presStyleCnt="0"/>
+      <dgm:spPr/>
+    </dgm:pt>
+    <dgm:pt modelId="{856B0D5E-2EA6-47A9-8486-67D8A1D64032}" type="pres">
+      <dgm:prSet presAssocID="{4AFA2315-F472-4AB7-A58E-25207B18F4F0}" presName="txThree" presStyleLbl="node3" presStyleIdx="2" presStyleCnt="3">
+        <dgm:presLayoutVars>
+          <dgm:chPref val="3"/>
+        </dgm:presLayoutVars>
+      </dgm:prSet>
+      <dgm:spPr/>
+    </dgm:pt>
+    <dgm:pt modelId="{CFCC4ED1-1FA0-4F99-BD6D-4BC1E00C53B4}" type="pres">
+      <dgm:prSet presAssocID="{4AFA2315-F472-4AB7-A58E-25207B18F4F0}" presName="parTransThree" presStyleCnt="0"/>
+      <dgm:spPr/>
+    </dgm:pt>
+    <dgm:pt modelId="{D6392B25-2417-49F0-835A-601143B2ABF0}" type="pres">
+      <dgm:prSet presAssocID="{4AFA2315-F472-4AB7-A58E-25207B18F4F0}" presName="horzThree" presStyleCnt="0"/>
       <dgm:spPr/>
     </dgm:pt>
     <dgm:pt modelId="{EC8B9CDC-2C1E-431D-8C11-E3BB81AB0413}" type="pres">
@@ -1450,7 +1567,7 @@
       <dgm:spPr/>
     </dgm:pt>
     <dgm:pt modelId="{F68458BD-150E-44E6-9067-79050103B8CB}" type="pres">
-      <dgm:prSet presAssocID="{71C607A5-4B2C-4F6E-8A20-9A8AA7D7F42F}" presName="txFour" presStyleLbl="node4" presStyleIdx="1" presStyleCnt="6">
+      <dgm:prSet presAssocID="{71C607A5-4B2C-4F6E-8A20-9A8AA7D7F42F}" presName="txFour" presStyleLbl="node4" presStyleIdx="2" presStyleCnt="7">
         <dgm:presLayoutVars>
           <dgm:chPref val="3"/>
         </dgm:presLayoutVars>
@@ -1474,7 +1591,7 @@
       <dgm:spPr/>
     </dgm:pt>
     <dgm:pt modelId="{9F55F352-269E-426D-B496-2585D3DC2701}" type="pres">
-      <dgm:prSet presAssocID="{4C04E527-9B99-4A38-9F7F-F9E5037E78AA}" presName="txFour" presStyleLbl="node4" presStyleIdx="2" presStyleCnt="6">
+      <dgm:prSet presAssocID="{4C04E527-9B99-4A38-9F7F-F9E5037E78AA}" presName="txFour" presStyleLbl="node4" presStyleIdx="3" presStyleCnt="7">
         <dgm:presLayoutVars>
           <dgm:chPref val="3"/>
         </dgm:presLayoutVars>
@@ -1498,7 +1615,7 @@
       <dgm:spPr/>
     </dgm:pt>
     <dgm:pt modelId="{93B9D165-45EE-49DE-B711-8C7728655F3F}" type="pres">
-      <dgm:prSet presAssocID="{340E59ED-A3BA-45C2-B71D-EE5D983B9FA8}" presName="txFour" presStyleLbl="node4" presStyleIdx="3" presStyleCnt="6">
+      <dgm:prSet presAssocID="{340E59ED-A3BA-45C2-B71D-EE5D983B9FA8}" presName="txFour" presStyleLbl="node4" presStyleIdx="4" presStyleCnt="7">
         <dgm:presLayoutVars>
           <dgm:chPref val="3"/>
         </dgm:presLayoutVars>
@@ -1522,7 +1639,7 @@
       <dgm:spPr/>
     </dgm:pt>
     <dgm:pt modelId="{64163F0C-6137-4F5F-8FBA-F49EB42C859C}" type="pres">
-      <dgm:prSet presAssocID="{C08DD0C6-E2A2-45D8-8041-8667DB6B7AA9}" presName="txFour" presStyleLbl="node4" presStyleIdx="4" presStyleCnt="6">
+      <dgm:prSet presAssocID="{C08DD0C6-E2A2-45D8-8041-8667DB6B7AA9}" presName="txFour" presStyleLbl="node4" presStyleIdx="5" presStyleCnt="7">
         <dgm:presLayoutVars>
           <dgm:chPref val="3"/>
         </dgm:presLayoutVars>
@@ -1546,7 +1663,7 @@
       <dgm:spPr/>
     </dgm:pt>
     <dgm:pt modelId="{A2AAC64F-2015-48FE-B293-A2723DB08E61}" type="pres">
-      <dgm:prSet presAssocID="{74F148A3-13DF-4375-B038-67A6D3E3DA3B}" presName="txFour" presStyleLbl="node4" presStyleIdx="5" presStyleCnt="6">
+      <dgm:prSet presAssocID="{74F148A3-13DF-4375-B038-67A6D3E3DA3B}" presName="txFour" presStyleLbl="node4" presStyleIdx="6" presStyleCnt="7">
         <dgm:presLayoutVars>
           <dgm:chPref val="3"/>
         </dgm:presLayoutVars>
@@ -1579,31 +1696,35 @@
     </dgm:pt>
   </dgm:ptLst>
   <dgm:cxnLst>
+    <dgm:cxn modelId="{FED8DC00-E55C-46BC-889C-95A55881DB6E}" type="presOf" srcId="{C08DD0C6-E2A2-45D8-8041-8667DB6B7AA9}" destId="{64163F0C-6137-4F5F-8FBA-F49EB42C859C}" srcOrd="0" destOrd="0" presId="urn:microsoft.com/office/officeart/2005/8/layout/hierarchy4"/>
     <dgm:cxn modelId="{BD75F300-EAF5-4299-8098-27DD9AAAC2BA}" type="presOf" srcId="{E78328A7-4938-4CC9-A464-7899E68A5898}" destId="{8E1838F7-9884-4167-92C7-C70C925801C0}" srcOrd="0" destOrd="0" presId="urn:microsoft.com/office/officeart/2005/8/layout/hierarchy4"/>
-    <dgm:cxn modelId="{0AF23602-BAB2-455D-8AE2-5E738E99BA66}" type="presOf" srcId="{D03A17CA-EFD1-4095-9A5F-38D5051CA30B}" destId="{8732BDAF-D958-4CD1-8D7C-F67DA86FB3EE}" srcOrd="0" destOrd="0" presId="urn:microsoft.com/office/officeart/2005/8/layout/hierarchy4"/>
     <dgm:cxn modelId="{52383703-9B16-48CD-94FA-67D50674C292}" type="presOf" srcId="{5C5A51BA-9AFA-48E5-930D-FE49595EBD43}" destId="{7FADA4DD-D2ED-4350-A003-15AE1F62DD4E}" srcOrd="0" destOrd="0" presId="urn:microsoft.com/office/officeart/2005/8/layout/hierarchy4"/>
-    <dgm:cxn modelId="{B8667103-FC56-44F8-8A64-1177445DCB15}" srcId="{A9FEA221-04AA-4F86-9B32-B5A166BCBE14}" destId="{D03A17CA-EFD1-4095-9A5F-38D5051CA30B}" srcOrd="1" destOrd="0" parTransId="{8FA93D9C-16CA-46AA-9EB3-1ED4133613D0}" sibTransId="{13C41425-A0AE-4864-B07F-D263FF0D1A0B}"/>
+    <dgm:cxn modelId="{A520450C-C41F-4279-90ED-1A6ACC71ABA1}" type="presOf" srcId="{71C607A5-4B2C-4F6E-8A20-9A8AA7D7F42F}" destId="{F68458BD-150E-44E6-9067-79050103B8CB}" srcOrd="0" destOrd="0" presId="urn:microsoft.com/office/officeart/2005/8/layout/hierarchy4"/>
     <dgm:cxn modelId="{B991C714-1E3A-45D1-809D-EB58F1CC175C}" srcId="{5C5A51BA-9AFA-48E5-930D-FE49595EBD43}" destId="{A9FEA221-04AA-4F86-9B32-B5A166BCBE14}" srcOrd="1" destOrd="0" parTransId="{84AAB8B5-0212-444C-927D-C74298C6E755}" sibTransId="{509156E0-4C91-4E39-8368-B3D50FA899C4}"/>
     <dgm:cxn modelId="{CA28E11D-8FC0-4CEE-A01D-C34744CE6D22}" type="presOf" srcId="{F79BFE92-1C09-4A0C-9592-B3EFED862B36}" destId="{840D6405-DD4E-42D2-B9DC-845ADB07767F}" srcOrd="0" destOrd="0" presId="urn:microsoft.com/office/officeart/2005/8/layout/hierarchy4"/>
     <dgm:cxn modelId="{285F7020-990B-49BE-BBDB-63CD50AB1837}" srcId="{5C5A51BA-9AFA-48E5-930D-FE49595EBD43}" destId="{F79BFE92-1C09-4A0C-9592-B3EFED862B36}" srcOrd="2" destOrd="0" parTransId="{2667D9F0-36FD-4A41-812F-3FFEB1A2B98C}" sibTransId="{65A6F9C7-A079-4020-9FBA-5EA1F423D28C}"/>
-    <dgm:cxn modelId="{296FBB3B-579A-4E31-8F71-031FF4246408}" type="presOf" srcId="{4C04E527-9B99-4A38-9F7F-F9E5037E78AA}" destId="{9F55F352-269E-426D-B496-2585D3DC2701}" srcOrd="0" destOrd="0" presId="urn:microsoft.com/office/officeart/2005/8/layout/hierarchy4"/>
-    <dgm:cxn modelId="{D1A4E642-996E-4711-8E58-FE4C9A693C82}" srcId="{D03A17CA-EFD1-4095-9A5F-38D5051CA30B}" destId="{340E59ED-A3BA-45C2-B71D-EE5D983B9FA8}" srcOrd="2" destOrd="0" parTransId="{CF651EE1-3824-408B-86E4-3A9952B8ED1E}" sibTransId="{B3D0CA9D-F22F-41DD-9866-71B718515FE5}"/>
-    <dgm:cxn modelId="{084E254E-3A16-4759-BAAB-07EB0B51A3EC}" type="presOf" srcId="{340E59ED-A3BA-45C2-B71D-EE5D983B9FA8}" destId="{93B9D165-45EE-49DE-B711-8C7728655F3F}" srcOrd="0" destOrd="0" presId="urn:microsoft.com/office/officeart/2005/8/layout/hierarchy4"/>
+    <dgm:cxn modelId="{E1F5F72C-861B-42A4-B635-0500C1C2F7A1}" srcId="{A9FEA221-04AA-4F86-9B32-B5A166BCBE14}" destId="{5573F892-24D8-4E7E-ACD1-960EFC45736A}" srcOrd="1" destOrd="0" parTransId="{9E9C25D3-C424-4DC5-BF46-B70B0D0B57AB}" sibTransId="{E9A8D38A-1581-4A03-8A49-8B50C44EB72F}"/>
+    <dgm:cxn modelId="{A2AF813E-65FF-492B-B0D3-D9B5CCBC1CD5}" type="presOf" srcId="{340E59ED-A3BA-45C2-B71D-EE5D983B9FA8}" destId="{93B9D165-45EE-49DE-B711-8C7728655F3F}" srcOrd="0" destOrd="0" presId="urn:microsoft.com/office/officeart/2005/8/layout/hierarchy4"/>
+    <dgm:cxn modelId="{D1A4E642-996E-4711-8E58-FE4C9A693C82}" srcId="{4AFA2315-F472-4AB7-A58E-25207B18F4F0}" destId="{340E59ED-A3BA-45C2-B71D-EE5D983B9FA8}" srcOrd="2" destOrd="0" parTransId="{CF651EE1-3824-408B-86E4-3A9952B8ED1E}" sibTransId="{B3D0CA9D-F22F-41DD-9866-71B718515FE5}"/>
     <dgm:cxn modelId="{76E90C7C-656A-465C-98A0-4AABB732FABF}" type="presOf" srcId="{A9FEA221-04AA-4F86-9B32-B5A166BCBE14}" destId="{301C9628-7A5F-4523-9C47-779B72BF189A}" srcOrd="0" destOrd="0" presId="urn:microsoft.com/office/officeart/2005/8/layout/hierarchy4"/>
+    <dgm:cxn modelId="{D580577E-6162-4C4B-BF8D-BD4D7529810D}" type="presOf" srcId="{5573F892-24D8-4E7E-ACD1-960EFC45736A}" destId="{CEF31959-EB1A-464F-AAED-77CE2FBBE3D4}" srcOrd="0" destOrd="0" presId="urn:microsoft.com/office/officeart/2005/8/layout/hierarchy4"/>
+    <dgm:cxn modelId="{7BEC5E86-000A-46C7-95C6-EB8ECE0BA442}" type="presOf" srcId="{977EF7FF-6E2A-4698-8929-D719BE62B02B}" destId="{68C45A7D-D5BA-40DE-95A9-6C08AB6AD80A}" srcOrd="0" destOrd="0" presId="urn:microsoft.com/office/officeart/2005/8/layout/hierarchy4"/>
     <dgm:cxn modelId="{55B65B8E-7FD1-4EED-B446-33E4EBD1FE4F}" srcId="{A9FEA221-04AA-4F86-9B32-B5A166BCBE14}" destId="{1E028449-BDFB-489E-BBBA-ABB3D943F322}" srcOrd="0" destOrd="0" parTransId="{C3E7E196-8ADF-4355-81FE-752AE3156556}" sibTransId="{BF047B91-F232-4834-966C-DFCBDA3106DB}"/>
-    <dgm:cxn modelId="{4CD05B99-D098-4CD0-9D2E-A901073E16D0}" type="presOf" srcId="{C08DD0C6-E2A2-45D8-8041-8667DB6B7AA9}" destId="{64163F0C-6137-4F5F-8FBA-F49EB42C859C}" srcOrd="0" destOrd="0" presId="urn:microsoft.com/office/officeart/2005/8/layout/hierarchy4"/>
-    <dgm:cxn modelId="{FB6B39A2-68E8-4139-81DF-4B0234D704D4}" type="presOf" srcId="{71C607A5-4B2C-4F6E-8A20-9A8AA7D7F42F}" destId="{F68458BD-150E-44E6-9067-79050103B8CB}" srcOrd="0" destOrd="0" presId="urn:microsoft.com/office/officeart/2005/8/layout/hierarchy4"/>
     <dgm:cxn modelId="{F896D8A3-9124-414D-9370-46E2AB316F2D}" type="presOf" srcId="{D0164772-56E0-41E8-B594-4705C6F69A2A}" destId="{F677967E-DDE1-4E87-A0D8-1EDA580199D9}" srcOrd="0" destOrd="0" presId="urn:microsoft.com/office/officeart/2005/8/layout/hierarchy4"/>
     <dgm:cxn modelId="{588924AA-8AC0-41F5-A9AB-86184BD395C7}" srcId="{340E59ED-A3BA-45C2-B71D-EE5D983B9FA8}" destId="{74F148A3-13DF-4375-B038-67A6D3E3DA3B}" srcOrd="1" destOrd="0" parTransId="{D0583F50-99EC-4C59-BA9E-6646CA545E64}" sibTransId="{8C1EADD6-86F3-4EE8-9519-65CB0BF7B589}"/>
     <dgm:cxn modelId="{6F4522B2-889E-4669-81ED-A34382B504D1}" srcId="{1E028449-BDFB-489E-BBBA-ABB3D943F322}" destId="{D0164772-56E0-41E8-B594-4705C6F69A2A}" srcOrd="0" destOrd="0" parTransId="{BBDE8130-DA2E-414F-8E70-DD07AB9C77A5}" sibTransId="{F604547E-5A09-4AA3-9005-E22A3FC05455}"/>
-    <dgm:cxn modelId="{32BA30B2-D3F6-4F9B-8665-17A99414EEEC}" srcId="{D03A17CA-EFD1-4095-9A5F-38D5051CA30B}" destId="{4C04E527-9B99-4A38-9F7F-F9E5037E78AA}" srcOrd="1" destOrd="0" parTransId="{223FD011-53E5-4097-BC8E-33146B5D5CBA}" sibTransId="{44F84587-A6CE-4530-94B2-C952E19957C4}"/>
+    <dgm:cxn modelId="{32BA30B2-D3F6-4F9B-8665-17A99414EEEC}" srcId="{4AFA2315-F472-4AB7-A58E-25207B18F4F0}" destId="{4C04E527-9B99-4A38-9F7F-F9E5037E78AA}" srcOrd="1" destOrd="0" parTransId="{223FD011-53E5-4097-BC8E-33146B5D5CBA}" sibTransId="{44F84587-A6CE-4530-94B2-C952E19957C4}"/>
     <dgm:cxn modelId="{213107B3-3116-44DB-A7D5-445BFA3B0A3E}" srcId="{5C5A51BA-9AFA-48E5-930D-FE49595EBD43}" destId="{17642F8E-DF10-4577-8362-8E38BCB4B1A0}" srcOrd="0" destOrd="0" parTransId="{9B9FF4FF-7B99-4344-A602-94300297B509}" sibTransId="{71B63D7B-6DA9-4527-B1C3-6987F16F726C}"/>
     <dgm:cxn modelId="{D60329BC-BAD7-4391-9889-565F5C1FE6CE}" type="presOf" srcId="{17642F8E-DF10-4577-8362-8E38BCB4B1A0}" destId="{CFEC70A1-9D1F-4C3E-AEDF-C9CEB5F259E2}" srcOrd="0" destOrd="0" presId="urn:microsoft.com/office/officeart/2005/8/layout/hierarchy4"/>
     <dgm:cxn modelId="{FBD6CABC-E91D-42A2-A881-CC762A7EC68D}" srcId="{E78328A7-4938-4CC9-A464-7899E68A5898}" destId="{5C5A51BA-9AFA-48E5-930D-FE49595EBD43}" srcOrd="0" destOrd="0" parTransId="{AF2D7D40-6F16-4486-BF90-89679E725549}" sibTransId="{FAC7EE12-725E-4073-AC8B-41000C4D6F18}"/>
+    <dgm:cxn modelId="{4C5016C1-C44E-4E84-9A24-82270DECC947}" type="presOf" srcId="{4C04E527-9B99-4A38-9F7F-F9E5037E78AA}" destId="{9F55F352-269E-426D-B496-2585D3DC2701}" srcOrd="0" destOrd="0" presId="urn:microsoft.com/office/officeart/2005/8/layout/hierarchy4"/>
     <dgm:cxn modelId="{EBC02CD4-88F5-496F-92F8-72E078692A21}" type="presOf" srcId="{1E028449-BDFB-489E-BBBA-ABB3D943F322}" destId="{ADC00EEF-F890-47C7-A55B-6CD73345D4E5}" srcOrd="0" destOrd="0" presId="urn:microsoft.com/office/officeart/2005/8/layout/hierarchy4"/>
+    <dgm:cxn modelId="{D03945D8-54A0-4A9F-AF68-D8A1DBB4F085}" type="presOf" srcId="{4AFA2315-F472-4AB7-A58E-25207B18F4F0}" destId="{856B0D5E-2EA6-47A9-8486-67D8A1D64032}" srcOrd="0" destOrd="0" presId="urn:microsoft.com/office/officeart/2005/8/layout/hierarchy4"/>
+    <dgm:cxn modelId="{ACD021DB-D9EC-4D39-ACDC-0013478A184A}" srcId="{5573F892-24D8-4E7E-ACD1-960EFC45736A}" destId="{977EF7FF-6E2A-4698-8929-D719BE62B02B}" srcOrd="0" destOrd="0" parTransId="{54D557EB-1BC1-4BCA-B555-6DA43F36846A}" sibTransId="{058927BF-3EBE-469E-9FD6-CFCEF8C0AEF1}"/>
     <dgm:cxn modelId="{E5D1E8DD-446C-4EA9-A4AB-7172E046EBDC}" srcId="{340E59ED-A3BA-45C2-B71D-EE5D983B9FA8}" destId="{C08DD0C6-E2A2-45D8-8041-8667DB6B7AA9}" srcOrd="0" destOrd="0" parTransId="{4DCC8483-FC52-4700-9084-6E119C625F91}" sibTransId="{49C975CF-1B2C-485B-B09C-2BAA7B9DC2F4}"/>
-    <dgm:cxn modelId="{0D8FC4E3-7DE5-4818-9AD6-95E03024BDA8}" type="presOf" srcId="{74F148A3-13DF-4375-B038-67A6D3E3DA3B}" destId="{A2AAC64F-2015-48FE-B293-A2723DB08E61}" srcOrd="0" destOrd="0" presId="urn:microsoft.com/office/officeart/2005/8/layout/hierarchy4"/>
-    <dgm:cxn modelId="{FB8BBFE7-D83F-412A-99E9-6923F557AA28}" srcId="{D03A17CA-EFD1-4095-9A5F-38D5051CA30B}" destId="{71C607A5-4B2C-4F6E-8A20-9A8AA7D7F42F}" srcOrd="0" destOrd="0" parTransId="{924567DA-8507-4E7F-B43A-1C153005A070}" sibTransId="{65B1C53E-4195-4E61-9FF8-57C611081680}"/>
+    <dgm:cxn modelId="{BCB855E5-E412-480D-BBFE-0D2E14D09A5D}" srcId="{A9FEA221-04AA-4F86-9B32-B5A166BCBE14}" destId="{4AFA2315-F472-4AB7-A58E-25207B18F4F0}" srcOrd="2" destOrd="0" parTransId="{4D615AB4-F184-4D79-AEFF-E14692063497}" sibTransId="{C11A6AD2-B691-4580-9F7E-831561BC8E88}"/>
+    <dgm:cxn modelId="{FB8BBFE7-D83F-412A-99E9-6923F557AA28}" srcId="{4AFA2315-F472-4AB7-A58E-25207B18F4F0}" destId="{71C607A5-4B2C-4F6E-8A20-9A8AA7D7F42F}" srcOrd="0" destOrd="0" parTransId="{924567DA-8507-4E7F-B43A-1C153005A070}" sibTransId="{65B1C53E-4195-4E61-9FF8-57C611081680}"/>
+    <dgm:cxn modelId="{E62F23F2-709F-47B0-891A-67EA05748323}" type="presOf" srcId="{74F148A3-13DF-4375-B038-67A6D3E3DA3B}" destId="{A2AAC64F-2015-48FE-B293-A2723DB08E61}" srcOrd="0" destOrd="0" presId="urn:microsoft.com/office/officeart/2005/8/layout/hierarchy4"/>
     <dgm:cxn modelId="{7E9D0AC0-DBAA-4609-A7D9-342A73FC85C7}" type="presParOf" srcId="{8E1838F7-9884-4167-92C7-C70C925801C0}" destId="{B0231DCB-0745-412D-AEC6-13180C6DDD11}" srcOrd="0" destOrd="0" presId="urn:microsoft.com/office/officeart/2005/8/layout/hierarchy4"/>
     <dgm:cxn modelId="{0CC00883-CCA8-451F-8CEC-DBB9532E9195}" type="presParOf" srcId="{B0231DCB-0745-412D-AEC6-13180C6DDD11}" destId="{7FADA4DD-D2ED-4350-A003-15AE1F62DD4E}" srcOrd="0" destOrd="0" presId="urn:microsoft.com/office/officeart/2005/8/layout/hierarchy4"/>
     <dgm:cxn modelId="{800CB253-EA0B-45D2-8829-1F5B018E9B80}" type="presParOf" srcId="{B0231DCB-0745-412D-AEC6-13180C6DDD11}" destId="{30C7DDFE-D268-48C2-8CD3-0EF83991ED4C}" srcOrd="1" destOrd="0" presId="urn:microsoft.com/office/officeart/2005/8/layout/hierarchy4"/>
@@ -1624,29 +1745,37 @@
     <dgm:cxn modelId="{199BB469-444A-4FD5-A7B4-3C606C5007C6}" type="presParOf" srcId="{B79D55BF-84BB-43F8-861A-DFB9572ECF9B}" destId="{F677967E-DDE1-4E87-A0D8-1EDA580199D9}" srcOrd="0" destOrd="0" presId="urn:microsoft.com/office/officeart/2005/8/layout/hierarchy4"/>
     <dgm:cxn modelId="{78B1FF7F-F468-4849-8AFB-A90AA56E1A73}" type="presParOf" srcId="{B79D55BF-84BB-43F8-861A-DFB9572ECF9B}" destId="{B3F51114-D9D4-481D-A6CE-142E27C4A98A}" srcOrd="1" destOrd="0" presId="urn:microsoft.com/office/officeart/2005/8/layout/hierarchy4"/>
     <dgm:cxn modelId="{EF0FAAEE-288F-4EE1-98E6-7D5B8AA5985C}" type="presParOf" srcId="{0DB95A50-BD0A-4078-A152-5DC94B0A227F}" destId="{12B465E4-FE0F-42F3-BFC5-3352E35D4429}" srcOrd="1" destOrd="0" presId="urn:microsoft.com/office/officeart/2005/8/layout/hierarchy4"/>
-    <dgm:cxn modelId="{881C5FA8-A6A9-4E59-8934-145B0A154A21}" type="presParOf" srcId="{0DB95A50-BD0A-4078-A152-5DC94B0A227F}" destId="{42D8D49B-7A82-4EF4-B926-1B837CCB4A06}" srcOrd="2" destOrd="0" presId="urn:microsoft.com/office/officeart/2005/8/layout/hierarchy4"/>
-    <dgm:cxn modelId="{6B7AA93A-4605-4127-8754-7C82063C9A9C}" type="presParOf" srcId="{42D8D49B-7A82-4EF4-B926-1B837CCB4A06}" destId="{8732BDAF-D958-4CD1-8D7C-F67DA86FB3EE}" srcOrd="0" destOrd="0" presId="urn:microsoft.com/office/officeart/2005/8/layout/hierarchy4"/>
-    <dgm:cxn modelId="{2A3E873D-957E-4F3B-B031-9E8118A657B6}" type="presParOf" srcId="{42D8D49B-7A82-4EF4-B926-1B837CCB4A06}" destId="{C50EDF8A-3F7D-4972-B757-22E10BC977D2}" srcOrd="1" destOrd="0" presId="urn:microsoft.com/office/officeart/2005/8/layout/hierarchy4"/>
-    <dgm:cxn modelId="{0F4F47C9-3062-4CB1-B83B-3D12827D1D7C}" type="presParOf" srcId="{42D8D49B-7A82-4EF4-B926-1B837CCB4A06}" destId="{CACDE823-82F9-486C-B7E3-E1F4DD8698AC}" srcOrd="2" destOrd="0" presId="urn:microsoft.com/office/officeart/2005/8/layout/hierarchy4"/>
-    <dgm:cxn modelId="{9F5AD8AB-250E-4241-98AC-D59AA2B120D9}" type="presParOf" srcId="{CACDE823-82F9-486C-B7E3-E1F4DD8698AC}" destId="{EC8B9CDC-2C1E-431D-8C11-E3BB81AB0413}" srcOrd="0" destOrd="0" presId="urn:microsoft.com/office/officeart/2005/8/layout/hierarchy4"/>
-    <dgm:cxn modelId="{16A27703-C21C-4E49-B368-9587E0096711}" type="presParOf" srcId="{EC8B9CDC-2C1E-431D-8C11-E3BB81AB0413}" destId="{F68458BD-150E-44E6-9067-79050103B8CB}" srcOrd="0" destOrd="0" presId="urn:microsoft.com/office/officeart/2005/8/layout/hierarchy4"/>
-    <dgm:cxn modelId="{8ECFF4E4-E181-4AE8-8C6D-F995A1F0811E}" type="presParOf" srcId="{EC8B9CDC-2C1E-431D-8C11-E3BB81AB0413}" destId="{E8C55989-76CF-4F01-96BF-8BD0ECEA2FD4}" srcOrd="1" destOrd="0" presId="urn:microsoft.com/office/officeart/2005/8/layout/hierarchy4"/>
-    <dgm:cxn modelId="{CE72D0BC-8E23-46D0-9AEB-D6513AD546EF}" type="presParOf" srcId="{CACDE823-82F9-486C-B7E3-E1F4DD8698AC}" destId="{DC0F64BC-CCED-4103-A0DC-03FB63F7A6B1}" srcOrd="1" destOrd="0" presId="urn:microsoft.com/office/officeart/2005/8/layout/hierarchy4"/>
-    <dgm:cxn modelId="{D5216630-3F9A-4508-8753-5B31B0BFEFBC}" type="presParOf" srcId="{CACDE823-82F9-486C-B7E3-E1F4DD8698AC}" destId="{94984111-2FC6-4FE4-9C1D-F5B3232D0054}" srcOrd="2" destOrd="0" presId="urn:microsoft.com/office/officeart/2005/8/layout/hierarchy4"/>
-    <dgm:cxn modelId="{ED4C6392-A661-4E12-86A2-26DE9773619A}" type="presParOf" srcId="{94984111-2FC6-4FE4-9C1D-F5B3232D0054}" destId="{9F55F352-269E-426D-B496-2585D3DC2701}" srcOrd="0" destOrd="0" presId="urn:microsoft.com/office/officeart/2005/8/layout/hierarchy4"/>
-    <dgm:cxn modelId="{E493FFA0-3ACF-4726-B623-51B368DF0793}" type="presParOf" srcId="{94984111-2FC6-4FE4-9C1D-F5B3232D0054}" destId="{07B98DF0-E7DD-4725-A37A-18FD46EE89B8}" srcOrd="1" destOrd="0" presId="urn:microsoft.com/office/officeart/2005/8/layout/hierarchy4"/>
-    <dgm:cxn modelId="{9232AB67-83AF-43B8-9BD4-FCEE37B0B12B}" type="presParOf" srcId="{CACDE823-82F9-486C-B7E3-E1F4DD8698AC}" destId="{31CA0535-6209-46BB-B671-959C63A8EF41}" srcOrd="3" destOrd="0" presId="urn:microsoft.com/office/officeart/2005/8/layout/hierarchy4"/>
-    <dgm:cxn modelId="{7E78F1CF-53D0-493E-82ED-EBBD7D47E576}" type="presParOf" srcId="{CACDE823-82F9-486C-B7E3-E1F4DD8698AC}" destId="{FE3E9F80-D0B0-4208-BCD4-D0C06CFD0E3A}" srcOrd="4" destOrd="0" presId="urn:microsoft.com/office/officeart/2005/8/layout/hierarchy4"/>
-    <dgm:cxn modelId="{C9DB0505-C782-405D-9ED6-CF676603AE2B}" type="presParOf" srcId="{FE3E9F80-D0B0-4208-BCD4-D0C06CFD0E3A}" destId="{93B9D165-45EE-49DE-B711-8C7728655F3F}" srcOrd="0" destOrd="0" presId="urn:microsoft.com/office/officeart/2005/8/layout/hierarchy4"/>
-    <dgm:cxn modelId="{C123397A-28EA-4044-AF84-E9C5D05EF863}" type="presParOf" srcId="{FE3E9F80-D0B0-4208-BCD4-D0C06CFD0E3A}" destId="{FB2D1753-F7A7-4B49-BABA-A6FF87150507}" srcOrd="1" destOrd="0" presId="urn:microsoft.com/office/officeart/2005/8/layout/hierarchy4"/>
-    <dgm:cxn modelId="{A40C3327-8545-4E64-8395-3540E5119603}" type="presParOf" srcId="{FE3E9F80-D0B0-4208-BCD4-D0C06CFD0E3A}" destId="{6B758014-3010-41C7-BBF5-E1DBA58106F7}" srcOrd="2" destOrd="0" presId="urn:microsoft.com/office/officeart/2005/8/layout/hierarchy4"/>
-    <dgm:cxn modelId="{DC2E03F6-1194-4AE7-BD1B-512A01235960}" type="presParOf" srcId="{6B758014-3010-41C7-BBF5-E1DBA58106F7}" destId="{8EA7047B-2CDA-4482-ACF0-6F97E8496E0F}" srcOrd="0" destOrd="0" presId="urn:microsoft.com/office/officeart/2005/8/layout/hierarchy4"/>
-    <dgm:cxn modelId="{AD26AE7D-4728-4FAA-94AD-560082C9AFEA}" type="presParOf" srcId="{8EA7047B-2CDA-4482-ACF0-6F97E8496E0F}" destId="{64163F0C-6137-4F5F-8FBA-F49EB42C859C}" srcOrd="0" destOrd="0" presId="urn:microsoft.com/office/officeart/2005/8/layout/hierarchy4"/>
-    <dgm:cxn modelId="{31B5BE25-41E1-43FA-B337-FA3D48CEBA3B}" type="presParOf" srcId="{8EA7047B-2CDA-4482-ACF0-6F97E8496E0F}" destId="{7D43AF1C-D9F2-4172-89E5-0ACC3FEF01E4}" srcOrd="1" destOrd="0" presId="urn:microsoft.com/office/officeart/2005/8/layout/hierarchy4"/>
-    <dgm:cxn modelId="{FD3B7234-C5D1-43B3-8CC5-222E82E23D4B}" type="presParOf" srcId="{6B758014-3010-41C7-BBF5-E1DBA58106F7}" destId="{668C65D4-AF20-47EC-B27F-C8CE8B7D30B3}" srcOrd="1" destOrd="0" presId="urn:microsoft.com/office/officeart/2005/8/layout/hierarchy4"/>
-    <dgm:cxn modelId="{B2E37397-42D3-492E-BE74-53E1ECA1641C}" type="presParOf" srcId="{6B758014-3010-41C7-BBF5-E1DBA58106F7}" destId="{248FED67-9B80-4F9C-B771-8E5F05EFA949}" srcOrd="2" destOrd="0" presId="urn:microsoft.com/office/officeart/2005/8/layout/hierarchy4"/>
-    <dgm:cxn modelId="{4DAC4214-0707-4B87-828C-D6247CC61D1B}" type="presParOf" srcId="{248FED67-9B80-4F9C-B771-8E5F05EFA949}" destId="{A2AAC64F-2015-48FE-B293-A2723DB08E61}" srcOrd="0" destOrd="0" presId="urn:microsoft.com/office/officeart/2005/8/layout/hierarchy4"/>
-    <dgm:cxn modelId="{2FC3D8EF-09A8-46CC-8F1C-F7D9320A4B8E}" type="presParOf" srcId="{248FED67-9B80-4F9C-B771-8E5F05EFA949}" destId="{2CA6E1BF-9E8E-4E61-B95F-CEB538336F04}" srcOrd="1" destOrd="0" presId="urn:microsoft.com/office/officeart/2005/8/layout/hierarchy4"/>
+    <dgm:cxn modelId="{171A74B2-146B-4265-A548-BE64E1B78EB1}" type="presParOf" srcId="{0DB95A50-BD0A-4078-A152-5DC94B0A227F}" destId="{538022D5-B845-422C-99DB-B6E6799B91C6}" srcOrd="2" destOrd="0" presId="urn:microsoft.com/office/officeart/2005/8/layout/hierarchy4"/>
+    <dgm:cxn modelId="{2D0C9138-CC75-47D5-A722-C34E308F95E9}" type="presParOf" srcId="{538022D5-B845-422C-99DB-B6E6799B91C6}" destId="{CEF31959-EB1A-464F-AAED-77CE2FBBE3D4}" srcOrd="0" destOrd="0" presId="urn:microsoft.com/office/officeart/2005/8/layout/hierarchy4"/>
+    <dgm:cxn modelId="{964CD777-6729-4B37-AA4A-2F5024FBACB9}" type="presParOf" srcId="{538022D5-B845-422C-99DB-B6E6799B91C6}" destId="{4616722D-B6A1-40B9-BD70-B3D9CF315C05}" srcOrd="1" destOrd="0" presId="urn:microsoft.com/office/officeart/2005/8/layout/hierarchy4"/>
+    <dgm:cxn modelId="{F86534A3-713A-42CB-8ECB-C7D49F7AF864}" type="presParOf" srcId="{538022D5-B845-422C-99DB-B6E6799B91C6}" destId="{80037ED7-25C2-47A6-85BC-E1AA7A0D91EF}" srcOrd="2" destOrd="0" presId="urn:microsoft.com/office/officeart/2005/8/layout/hierarchy4"/>
+    <dgm:cxn modelId="{B6F29F72-6EA8-4710-98F8-96A840FEBD4E}" type="presParOf" srcId="{80037ED7-25C2-47A6-85BC-E1AA7A0D91EF}" destId="{3C1B6A7B-8B08-4429-94EA-3FE815041A85}" srcOrd="0" destOrd="0" presId="urn:microsoft.com/office/officeart/2005/8/layout/hierarchy4"/>
+    <dgm:cxn modelId="{7AF7A3FA-A931-4C25-893C-F3071777E7C3}" type="presParOf" srcId="{3C1B6A7B-8B08-4429-94EA-3FE815041A85}" destId="{68C45A7D-D5BA-40DE-95A9-6C08AB6AD80A}" srcOrd="0" destOrd="0" presId="urn:microsoft.com/office/officeart/2005/8/layout/hierarchy4"/>
+    <dgm:cxn modelId="{F2C31273-F4BD-48B5-AE49-A96783486D8A}" type="presParOf" srcId="{3C1B6A7B-8B08-4429-94EA-3FE815041A85}" destId="{71C093A3-055F-4B8D-8EE5-E5BD32EC7265}" srcOrd="1" destOrd="0" presId="urn:microsoft.com/office/officeart/2005/8/layout/hierarchy4"/>
+    <dgm:cxn modelId="{89B3B329-BF06-4EB0-8EFD-EE991118B153}" type="presParOf" srcId="{0DB95A50-BD0A-4078-A152-5DC94B0A227F}" destId="{59186C7A-F6EB-4273-AD41-6F00824818BE}" srcOrd="3" destOrd="0" presId="urn:microsoft.com/office/officeart/2005/8/layout/hierarchy4"/>
+    <dgm:cxn modelId="{4DEC23C2-6967-4219-8E96-F495C03EABED}" type="presParOf" srcId="{0DB95A50-BD0A-4078-A152-5DC94B0A227F}" destId="{34850040-AF9E-4543-9036-D2B8896CA1AA}" srcOrd="4" destOrd="0" presId="urn:microsoft.com/office/officeart/2005/8/layout/hierarchy4"/>
+    <dgm:cxn modelId="{8356A230-6B0E-4C32-A79F-F956E76E5FE7}" type="presParOf" srcId="{34850040-AF9E-4543-9036-D2B8896CA1AA}" destId="{856B0D5E-2EA6-47A9-8486-67D8A1D64032}" srcOrd="0" destOrd="0" presId="urn:microsoft.com/office/officeart/2005/8/layout/hierarchy4"/>
+    <dgm:cxn modelId="{4C3BCDEA-D25F-48D1-937D-0A739F2485CE}" type="presParOf" srcId="{34850040-AF9E-4543-9036-D2B8896CA1AA}" destId="{CFCC4ED1-1FA0-4F99-BD6D-4BC1E00C53B4}" srcOrd="1" destOrd="0" presId="urn:microsoft.com/office/officeart/2005/8/layout/hierarchy4"/>
+    <dgm:cxn modelId="{6392E6DF-B90C-4162-A160-47C9D769C40C}" type="presParOf" srcId="{34850040-AF9E-4543-9036-D2B8896CA1AA}" destId="{D6392B25-2417-49F0-835A-601143B2ABF0}" srcOrd="2" destOrd="0" presId="urn:microsoft.com/office/officeart/2005/8/layout/hierarchy4"/>
+    <dgm:cxn modelId="{B9B45698-C3C3-4C57-9B97-750E25FCD331}" type="presParOf" srcId="{D6392B25-2417-49F0-835A-601143B2ABF0}" destId="{EC8B9CDC-2C1E-431D-8C11-E3BB81AB0413}" srcOrd="0" destOrd="0" presId="urn:microsoft.com/office/officeart/2005/8/layout/hierarchy4"/>
+    <dgm:cxn modelId="{1270A4C9-983B-442F-8F09-36D51D0FCE9A}" type="presParOf" srcId="{EC8B9CDC-2C1E-431D-8C11-E3BB81AB0413}" destId="{F68458BD-150E-44E6-9067-79050103B8CB}" srcOrd="0" destOrd="0" presId="urn:microsoft.com/office/officeart/2005/8/layout/hierarchy4"/>
+    <dgm:cxn modelId="{0151AC03-31F1-4415-8476-D3F5DE0CEFD5}" type="presParOf" srcId="{EC8B9CDC-2C1E-431D-8C11-E3BB81AB0413}" destId="{E8C55989-76CF-4F01-96BF-8BD0ECEA2FD4}" srcOrd="1" destOrd="0" presId="urn:microsoft.com/office/officeart/2005/8/layout/hierarchy4"/>
+    <dgm:cxn modelId="{ACB56F31-83E0-4B44-B27C-7A21AECCC101}" type="presParOf" srcId="{D6392B25-2417-49F0-835A-601143B2ABF0}" destId="{DC0F64BC-CCED-4103-A0DC-03FB63F7A6B1}" srcOrd="1" destOrd="0" presId="urn:microsoft.com/office/officeart/2005/8/layout/hierarchy4"/>
+    <dgm:cxn modelId="{6C4A3D7E-1F85-4C62-834B-0FB352B0B74E}" type="presParOf" srcId="{D6392B25-2417-49F0-835A-601143B2ABF0}" destId="{94984111-2FC6-4FE4-9C1D-F5B3232D0054}" srcOrd="2" destOrd="0" presId="urn:microsoft.com/office/officeart/2005/8/layout/hierarchy4"/>
+    <dgm:cxn modelId="{E4F450F3-AED6-4458-BA1C-5D7C4ADD74A1}" type="presParOf" srcId="{94984111-2FC6-4FE4-9C1D-F5B3232D0054}" destId="{9F55F352-269E-426D-B496-2585D3DC2701}" srcOrd="0" destOrd="0" presId="urn:microsoft.com/office/officeart/2005/8/layout/hierarchy4"/>
+    <dgm:cxn modelId="{6EDF95DD-3983-420E-A436-064DE5087A5C}" type="presParOf" srcId="{94984111-2FC6-4FE4-9C1D-F5B3232D0054}" destId="{07B98DF0-E7DD-4725-A37A-18FD46EE89B8}" srcOrd="1" destOrd="0" presId="urn:microsoft.com/office/officeart/2005/8/layout/hierarchy4"/>
+    <dgm:cxn modelId="{65A8D882-3B9C-4670-B8CD-C3FFCF37105C}" type="presParOf" srcId="{D6392B25-2417-49F0-835A-601143B2ABF0}" destId="{31CA0535-6209-46BB-B671-959C63A8EF41}" srcOrd="3" destOrd="0" presId="urn:microsoft.com/office/officeart/2005/8/layout/hierarchy4"/>
+    <dgm:cxn modelId="{10FC7427-2AB1-45AB-B04C-87D1959A2C3E}" type="presParOf" srcId="{D6392B25-2417-49F0-835A-601143B2ABF0}" destId="{FE3E9F80-D0B0-4208-BCD4-D0C06CFD0E3A}" srcOrd="4" destOrd="0" presId="urn:microsoft.com/office/officeart/2005/8/layout/hierarchy4"/>
+    <dgm:cxn modelId="{E54EA4E4-4C65-4E4B-8543-F29BE1C056EB}" type="presParOf" srcId="{FE3E9F80-D0B0-4208-BCD4-D0C06CFD0E3A}" destId="{93B9D165-45EE-49DE-B711-8C7728655F3F}" srcOrd="0" destOrd="0" presId="urn:microsoft.com/office/officeart/2005/8/layout/hierarchy4"/>
+    <dgm:cxn modelId="{70D48F1E-8510-4F58-BC03-9EF64F37C1A8}" type="presParOf" srcId="{FE3E9F80-D0B0-4208-BCD4-D0C06CFD0E3A}" destId="{FB2D1753-F7A7-4B49-BABA-A6FF87150507}" srcOrd="1" destOrd="0" presId="urn:microsoft.com/office/officeart/2005/8/layout/hierarchy4"/>
+    <dgm:cxn modelId="{E3919C0A-D700-45B8-9C20-894B92211254}" type="presParOf" srcId="{FE3E9F80-D0B0-4208-BCD4-D0C06CFD0E3A}" destId="{6B758014-3010-41C7-BBF5-E1DBA58106F7}" srcOrd="2" destOrd="0" presId="urn:microsoft.com/office/officeart/2005/8/layout/hierarchy4"/>
+    <dgm:cxn modelId="{D0404316-50FD-46BB-B8E5-7BC0B7111B9A}" type="presParOf" srcId="{6B758014-3010-41C7-BBF5-E1DBA58106F7}" destId="{8EA7047B-2CDA-4482-ACF0-6F97E8496E0F}" srcOrd="0" destOrd="0" presId="urn:microsoft.com/office/officeart/2005/8/layout/hierarchy4"/>
+    <dgm:cxn modelId="{9177EECF-D72F-4C8C-BC95-54E248D20F8E}" type="presParOf" srcId="{8EA7047B-2CDA-4482-ACF0-6F97E8496E0F}" destId="{64163F0C-6137-4F5F-8FBA-F49EB42C859C}" srcOrd="0" destOrd="0" presId="urn:microsoft.com/office/officeart/2005/8/layout/hierarchy4"/>
+    <dgm:cxn modelId="{EAA7665C-F72B-4E20-BEF2-799D15D60B54}" type="presParOf" srcId="{8EA7047B-2CDA-4482-ACF0-6F97E8496E0F}" destId="{7D43AF1C-D9F2-4172-89E5-0ACC3FEF01E4}" srcOrd="1" destOrd="0" presId="urn:microsoft.com/office/officeart/2005/8/layout/hierarchy4"/>
+    <dgm:cxn modelId="{68313744-8172-448B-AF33-79C491E10197}" type="presParOf" srcId="{6B758014-3010-41C7-BBF5-E1DBA58106F7}" destId="{668C65D4-AF20-47EC-B27F-C8CE8B7D30B3}" srcOrd="1" destOrd="0" presId="urn:microsoft.com/office/officeart/2005/8/layout/hierarchy4"/>
+    <dgm:cxn modelId="{F92A1075-A79E-42F7-A723-92B28B21F7E0}" type="presParOf" srcId="{6B758014-3010-41C7-BBF5-E1DBA58106F7}" destId="{248FED67-9B80-4F9C-B771-8E5F05EFA949}" srcOrd="2" destOrd="0" presId="urn:microsoft.com/office/officeart/2005/8/layout/hierarchy4"/>
+    <dgm:cxn modelId="{506D5AC8-F8C9-4B8B-83E9-362A81229DF6}" type="presParOf" srcId="{248FED67-9B80-4F9C-B771-8E5F05EFA949}" destId="{A2AAC64F-2015-48FE-B293-A2723DB08E61}" srcOrd="0" destOrd="0" presId="urn:microsoft.com/office/officeart/2005/8/layout/hierarchy4"/>
+    <dgm:cxn modelId="{656218F1-57EF-4592-A3D8-11C16133FF5A}" type="presParOf" srcId="{248FED67-9B80-4F9C-B771-8E5F05EFA949}" destId="{2CA6E1BF-9E8E-4E61-B95F-CEB538336F04}" srcOrd="1" destOrd="0" presId="urn:microsoft.com/office/officeart/2005/8/layout/hierarchy4"/>
     <dgm:cxn modelId="{ABD47FD0-BB6C-4B34-B26F-A574114489E0}" type="presParOf" srcId="{F6685F4B-0FBB-4D4E-855E-85F98362080D}" destId="{A7D82563-10D6-4CB6-945F-569A3C760482}" srcOrd="3" destOrd="0" presId="urn:microsoft.com/office/officeart/2005/8/layout/hierarchy4"/>
     <dgm:cxn modelId="{79E10D4F-0D91-4C6A-84D3-EC8CF2083598}" type="presParOf" srcId="{F6685F4B-0FBB-4D4E-855E-85F98362080D}" destId="{13C6ABE6-329A-4597-9F05-B338FDD2679B}" srcOrd="4" destOrd="0" presId="urn:microsoft.com/office/officeart/2005/8/layout/hierarchy4"/>
     <dgm:cxn modelId="{B46F25CB-0C0E-4E1C-A270-22F6D515ACD1}" type="presParOf" srcId="{13C6ABE6-329A-4597-9F05-B338FDD2679B}" destId="{840D6405-DD4E-42D2-B9DC-845ADB07767F}" srcOrd="0" destOrd="0" presId="urn:microsoft.com/office/officeart/2005/8/layout/hierarchy4"/>
@@ -1677,8 +1806,8 @@
       </dsp:nvSpPr>
       <dsp:spPr>
         <a:xfrm>
-          <a:off x="1909" y="2382"/>
-          <a:ext cx="12021003" cy="1026343"/>
+          <a:off x="1266" y="2382"/>
+          <a:ext cx="12022290" cy="1026343"/>
         </a:xfrm>
         <a:prstGeom prst="roundRect">
           <a:avLst>
@@ -1774,8 +1903,8 @@
         </a:p>
       </dsp:txBody>
       <dsp:txXfrm>
-        <a:off x="31970" y="32443"/>
-        <a:ext cx="11960881" cy="966221"/>
+        <a:off x="31327" y="32443"/>
+        <a:ext cx="11962168" cy="966221"/>
       </dsp:txXfrm>
     </dsp:sp>
     <dsp:sp modelId="{CFEC70A1-9D1F-4C3E-AEDF-C9CEB5F259E2}">
@@ -1785,332 +1914,8 @@
       </dsp:nvSpPr>
       <dsp:spPr>
         <a:xfrm>
-          <a:off x="1909" y="1151534"/>
-          <a:ext cx="1652826" cy="1026343"/>
-        </a:xfrm>
-        <a:prstGeom prst="roundRect">
-          <a:avLst>
-            <a:gd name="adj" fmla="val 10000"/>
-          </a:avLst>
-        </a:prstGeom>
-        <a:gradFill rotWithShape="0">
-          <a:gsLst>
-            <a:gs pos="0">
-              <a:schemeClr val="accent1">
-                <a:hueOff val="0"/>
-                <a:satOff val="0"/>
-                <a:lumOff val="0"/>
-                <a:alphaOff val="0"/>
-                <a:tint val="70000"/>
-                <a:satMod val="100000"/>
-                <a:lumMod val="110000"/>
-              </a:schemeClr>
-            </a:gs>
-            <a:gs pos="50000">
-              <a:schemeClr val="accent1">
-                <a:hueOff val="0"/>
-                <a:satOff val="0"/>
-                <a:lumOff val="0"/>
-                <a:alphaOff val="0"/>
-                <a:tint val="75000"/>
-                <a:satMod val="101000"/>
-                <a:lumMod val="105000"/>
-              </a:schemeClr>
-            </a:gs>
-            <a:gs pos="100000">
-              <a:schemeClr val="accent1">
-                <a:hueOff val="0"/>
-                <a:satOff val="0"/>
-                <a:lumOff val="0"/>
-                <a:alphaOff val="0"/>
-                <a:tint val="82000"/>
-                <a:satMod val="104000"/>
-                <a:lumMod val="105000"/>
-              </a:schemeClr>
-            </a:gs>
-          </a:gsLst>
-          <a:lin ang="2700000" scaled="0"/>
-        </a:gradFill>
-        <a:ln>
-          <a:noFill/>
-        </a:ln>
-        <a:effectLst/>
-        <a:scene3d>
-          <a:camera prst="orthographicFront"/>
-          <a:lightRig rig="flat" dir="t"/>
-        </a:scene3d>
-        <a:sp3d prstMaterial="dkEdge">
-          <a:bevelT w="8200" h="38100"/>
-        </a:sp3d>
-      </dsp:spPr>
-      <dsp:style>
-        <a:lnRef idx="0">
-          <a:scrgbClr r="0" g="0" b="0"/>
-        </a:lnRef>
-        <a:fillRef idx="2">
-          <a:scrgbClr r="0" g="0" b="0"/>
-        </a:fillRef>
-        <a:effectRef idx="1">
-          <a:scrgbClr r="0" g="0" b="0"/>
-        </a:effectRef>
-        <a:fontRef idx="minor">
-          <a:schemeClr val="dk1"/>
-        </a:fontRef>
-      </dsp:style>
-      <dsp:txBody>
-        <a:bodyPr spcFirstLastPara="0" vert="horz" wrap="square" lIns="76200" tIns="76200" rIns="76200" bIns="76200" numCol="1" spcCol="1270" anchor="ctr" anchorCtr="0">
-          <a:noAutofit/>
-        </a:bodyPr>
-        <a:lstStyle/>
-        <a:p>
-          <a:pPr marL="0" lvl="0" indent="0" algn="ctr" defTabSz="889000">
-            <a:lnSpc>
-              <a:spcPct val="90000"/>
-            </a:lnSpc>
-            <a:spcBef>
-              <a:spcPct val="0"/>
-            </a:spcBef>
-            <a:spcAft>
-              <a:spcPct val="35000"/>
-            </a:spcAft>
-            <a:buNone/>
-          </a:pPr>
-          <a:r>
-            <a:rPr lang="en-US" sz="2000" kern="1200" dirty="0"/>
-            <a:t>navbar &gt; always here</a:t>
-          </a:r>
-        </a:p>
-      </dsp:txBody>
-      <dsp:txXfrm>
-        <a:off x="31970" y="1181595"/>
-        <a:ext cx="1592704" cy="966221"/>
-      </dsp:txXfrm>
-    </dsp:sp>
-    <dsp:sp modelId="{301C9628-7A5F-4523-9C47-779B72BF189A}">
-      <dsp:nvSpPr>
-        <dsp:cNvPr id="0" name=""/>
-        <dsp:cNvSpPr/>
-      </dsp:nvSpPr>
-      <dsp:spPr>
-        <a:xfrm>
-          <a:off x="1793573" y="1151534"/>
-          <a:ext cx="8437676" cy="1026343"/>
-        </a:xfrm>
-        <a:prstGeom prst="roundRect">
-          <a:avLst>
-            <a:gd name="adj" fmla="val 10000"/>
-          </a:avLst>
-        </a:prstGeom>
-        <a:gradFill rotWithShape="0">
-          <a:gsLst>
-            <a:gs pos="0">
-              <a:schemeClr val="accent1">
-                <a:hueOff val="0"/>
-                <a:satOff val="0"/>
-                <a:lumOff val="0"/>
-                <a:alphaOff val="0"/>
-                <a:tint val="70000"/>
-                <a:satMod val="100000"/>
-                <a:lumMod val="110000"/>
-              </a:schemeClr>
-            </a:gs>
-            <a:gs pos="50000">
-              <a:schemeClr val="accent1">
-                <a:hueOff val="0"/>
-                <a:satOff val="0"/>
-                <a:lumOff val="0"/>
-                <a:alphaOff val="0"/>
-                <a:tint val="75000"/>
-                <a:satMod val="101000"/>
-                <a:lumMod val="105000"/>
-              </a:schemeClr>
-            </a:gs>
-            <a:gs pos="100000">
-              <a:schemeClr val="accent1">
-                <a:hueOff val="0"/>
-                <a:satOff val="0"/>
-                <a:lumOff val="0"/>
-                <a:alphaOff val="0"/>
-                <a:tint val="82000"/>
-                <a:satMod val="104000"/>
-                <a:lumMod val="105000"/>
-              </a:schemeClr>
-            </a:gs>
-          </a:gsLst>
-          <a:lin ang="2700000" scaled="0"/>
-        </a:gradFill>
-        <a:ln>
-          <a:noFill/>
-        </a:ln>
-        <a:effectLst/>
-        <a:scene3d>
-          <a:camera prst="orthographicFront"/>
-          <a:lightRig rig="flat" dir="t"/>
-        </a:scene3d>
-        <a:sp3d prstMaterial="dkEdge">
-          <a:bevelT w="8200" h="38100"/>
-        </a:sp3d>
-      </dsp:spPr>
-      <dsp:style>
-        <a:lnRef idx="0">
-          <a:scrgbClr r="0" g="0" b="0"/>
-        </a:lnRef>
-        <a:fillRef idx="2">
-          <a:scrgbClr r="0" g="0" b="0"/>
-        </a:fillRef>
-        <a:effectRef idx="1">
-          <a:scrgbClr r="0" g="0" b="0"/>
-        </a:effectRef>
-        <a:fontRef idx="minor">
-          <a:schemeClr val="dk1"/>
-        </a:fontRef>
-      </dsp:style>
-      <dsp:txBody>
-        <a:bodyPr spcFirstLastPara="0" vert="horz" wrap="square" lIns="76200" tIns="76200" rIns="76200" bIns="76200" numCol="1" spcCol="1270" anchor="ctr" anchorCtr="0">
-          <a:noAutofit/>
-        </a:bodyPr>
-        <a:lstStyle/>
-        <a:p>
-          <a:pPr marL="0" lvl="0" indent="0" algn="ctr" defTabSz="889000">
-            <a:lnSpc>
-              <a:spcPct val="90000"/>
-            </a:lnSpc>
-            <a:spcBef>
-              <a:spcPct val="0"/>
-            </a:spcBef>
-            <a:spcAft>
-              <a:spcPct val="35000"/>
-            </a:spcAft>
-            <a:buNone/>
-          </a:pPr>
-          <a:r>
-            <a:rPr lang="en-US" sz="2000" kern="1200" dirty="0"/>
-            <a:t>router-outlet &gt; changed components</a:t>
-          </a:r>
-        </a:p>
-      </dsp:txBody>
-      <dsp:txXfrm>
-        <a:off x="1823634" y="1181595"/>
-        <a:ext cx="8377554" cy="966221"/>
-      </dsp:txXfrm>
-    </dsp:sp>
-    <dsp:sp modelId="{ADC00EEF-F890-47C7-A55B-6CD73345D4E5}">
-      <dsp:nvSpPr>
-        <dsp:cNvPr id="0" name=""/>
-        <dsp:cNvSpPr/>
-      </dsp:nvSpPr>
-      <dsp:spPr>
-        <a:xfrm>
-          <a:off x="1793573" y="2300686"/>
-          <a:ext cx="1652826" cy="1026343"/>
-        </a:xfrm>
-        <a:prstGeom prst="roundRect">
-          <a:avLst>
-            <a:gd name="adj" fmla="val 10000"/>
-          </a:avLst>
-        </a:prstGeom>
-        <a:gradFill rotWithShape="0">
-          <a:gsLst>
-            <a:gs pos="0">
-              <a:schemeClr val="accent1">
-                <a:hueOff val="0"/>
-                <a:satOff val="0"/>
-                <a:lumOff val="0"/>
-                <a:alphaOff val="0"/>
-                <a:tint val="70000"/>
-                <a:satMod val="100000"/>
-                <a:lumMod val="110000"/>
-              </a:schemeClr>
-            </a:gs>
-            <a:gs pos="50000">
-              <a:schemeClr val="accent1">
-                <a:hueOff val="0"/>
-                <a:satOff val="0"/>
-                <a:lumOff val="0"/>
-                <a:alphaOff val="0"/>
-                <a:tint val="75000"/>
-                <a:satMod val="101000"/>
-                <a:lumMod val="105000"/>
-              </a:schemeClr>
-            </a:gs>
-            <a:gs pos="100000">
-              <a:schemeClr val="accent1">
-                <a:hueOff val="0"/>
-                <a:satOff val="0"/>
-                <a:lumOff val="0"/>
-                <a:alphaOff val="0"/>
-                <a:tint val="82000"/>
-                <a:satMod val="104000"/>
-                <a:lumMod val="105000"/>
-              </a:schemeClr>
-            </a:gs>
-          </a:gsLst>
-          <a:lin ang="2700000" scaled="0"/>
-        </a:gradFill>
-        <a:ln>
-          <a:noFill/>
-        </a:ln>
-        <a:effectLst/>
-        <a:scene3d>
-          <a:camera prst="orthographicFront"/>
-          <a:lightRig rig="flat" dir="t"/>
-        </a:scene3d>
-        <a:sp3d prstMaterial="dkEdge">
-          <a:bevelT w="8200" h="38100"/>
-        </a:sp3d>
-      </dsp:spPr>
-      <dsp:style>
-        <a:lnRef idx="0">
-          <a:scrgbClr r="0" g="0" b="0"/>
-        </a:lnRef>
-        <a:fillRef idx="2">
-          <a:scrgbClr r="0" g="0" b="0"/>
-        </a:fillRef>
-        <a:effectRef idx="1">
-          <a:scrgbClr r="0" g="0" b="0"/>
-        </a:effectRef>
-        <a:fontRef idx="minor">
-          <a:schemeClr val="dk1"/>
-        </a:fontRef>
-      </dsp:style>
-      <dsp:txBody>
-        <a:bodyPr spcFirstLastPara="0" vert="horz" wrap="square" lIns="76200" tIns="76200" rIns="76200" bIns="76200" numCol="1" spcCol="1270" anchor="ctr" anchorCtr="0">
-          <a:noAutofit/>
-        </a:bodyPr>
-        <a:lstStyle/>
-        <a:p>
-          <a:pPr marL="0" lvl="0" indent="0" algn="ctr" defTabSz="889000">
-            <a:lnSpc>
-              <a:spcPct val="90000"/>
-            </a:lnSpc>
-            <a:spcBef>
-              <a:spcPct val="0"/>
-            </a:spcBef>
-            <a:spcAft>
-              <a:spcPct val="35000"/>
-            </a:spcAft>
-            <a:buNone/>
-          </a:pPr>
-          <a:r>
-            <a:rPr lang="en-US" sz="2000" kern="1200" dirty="0"/>
-            <a:t>home</a:t>
-          </a:r>
-        </a:p>
-      </dsp:txBody>
-      <dsp:txXfrm>
-        <a:off x="1823634" y="2330747"/>
-        <a:ext cx="1592704" cy="966221"/>
-      </dsp:txXfrm>
-    </dsp:sp>
-    <dsp:sp modelId="{F677967E-DDE1-4E87-A0D8-1EDA580199D9}">
-      <dsp:nvSpPr>
-        <dsp:cNvPr id="0" name=""/>
-        <dsp:cNvSpPr/>
-      </dsp:nvSpPr>
-      <dsp:spPr>
-        <a:xfrm>
-          <a:off x="1793573" y="3449838"/>
-          <a:ext cx="1652826" cy="1026343"/>
+          <a:off x="1266" y="1151534"/>
+          <a:ext cx="1445855" cy="1026343"/>
         </a:xfrm>
         <a:prstGeom prst="roundRect">
           <a:avLst>
@@ -2201,132 +2006,24 @@
           </a:pPr>
           <a:r>
             <a:rPr lang="en-US" sz="1900" kern="1200" dirty="0"/>
-            <a:t>blocks to show data</a:t>
+            <a:t>navbar &gt; always here</a:t>
           </a:r>
         </a:p>
       </dsp:txBody>
       <dsp:txXfrm>
-        <a:off x="1823634" y="3479899"/>
-        <a:ext cx="1592704" cy="966221"/>
+        <a:off x="31327" y="1181595"/>
+        <a:ext cx="1385733" cy="966221"/>
       </dsp:txXfrm>
     </dsp:sp>
-    <dsp:sp modelId="{8732BDAF-D958-4CD1-8D7C-F67DA86FB3EE}">
+    <dsp:sp modelId="{301C9628-7A5F-4523-9C47-779B72BF189A}">
       <dsp:nvSpPr>
         <dsp:cNvPr id="0" name=""/>
         <dsp:cNvSpPr/>
       </dsp:nvSpPr>
       <dsp:spPr>
         <a:xfrm>
-          <a:off x="3515817" y="2300686"/>
-          <a:ext cx="6715432" cy="1026343"/>
-        </a:xfrm>
-        <a:prstGeom prst="roundRect">
-          <a:avLst>
-            <a:gd name="adj" fmla="val 10000"/>
-          </a:avLst>
-        </a:prstGeom>
-        <a:gradFill rotWithShape="0">
-          <a:gsLst>
-            <a:gs pos="0">
-              <a:schemeClr val="accent1">
-                <a:hueOff val="0"/>
-                <a:satOff val="0"/>
-                <a:lumOff val="0"/>
-                <a:alphaOff val="0"/>
-                <a:tint val="70000"/>
-                <a:satMod val="100000"/>
-                <a:lumMod val="110000"/>
-              </a:schemeClr>
-            </a:gs>
-            <a:gs pos="50000">
-              <a:schemeClr val="accent1">
-                <a:hueOff val="0"/>
-                <a:satOff val="0"/>
-                <a:lumOff val="0"/>
-                <a:alphaOff val="0"/>
-                <a:tint val="75000"/>
-                <a:satMod val="101000"/>
-                <a:lumMod val="105000"/>
-              </a:schemeClr>
-            </a:gs>
-            <a:gs pos="100000">
-              <a:schemeClr val="accent1">
-                <a:hueOff val="0"/>
-                <a:satOff val="0"/>
-                <a:lumOff val="0"/>
-                <a:alphaOff val="0"/>
-                <a:tint val="82000"/>
-                <a:satMod val="104000"/>
-                <a:lumMod val="105000"/>
-              </a:schemeClr>
-            </a:gs>
-          </a:gsLst>
-          <a:lin ang="2700000" scaled="0"/>
-        </a:gradFill>
-        <a:ln>
-          <a:noFill/>
-        </a:ln>
-        <a:effectLst/>
-        <a:scene3d>
-          <a:camera prst="orthographicFront"/>
-          <a:lightRig rig="flat" dir="t"/>
-        </a:scene3d>
-        <a:sp3d prstMaterial="dkEdge">
-          <a:bevelT w="8200" h="38100"/>
-        </a:sp3d>
-      </dsp:spPr>
-      <dsp:style>
-        <a:lnRef idx="0">
-          <a:scrgbClr r="0" g="0" b="0"/>
-        </a:lnRef>
-        <a:fillRef idx="2">
-          <a:scrgbClr r="0" g="0" b="0"/>
-        </a:fillRef>
-        <a:effectRef idx="1">
-          <a:scrgbClr r="0" g="0" b="0"/>
-        </a:effectRef>
-        <a:fontRef idx="minor">
-          <a:schemeClr val="dk1"/>
-        </a:fontRef>
-      </dsp:style>
-      <dsp:txBody>
-        <a:bodyPr spcFirstLastPara="0" vert="horz" wrap="square" lIns="76200" tIns="76200" rIns="76200" bIns="76200" numCol="1" spcCol="1270" anchor="ctr" anchorCtr="0">
-          <a:noAutofit/>
-        </a:bodyPr>
-        <a:lstStyle/>
-        <a:p>
-          <a:pPr marL="0" lvl="0" indent="0" algn="ctr" defTabSz="889000">
-            <a:lnSpc>
-              <a:spcPct val="90000"/>
-            </a:lnSpc>
-            <a:spcBef>
-              <a:spcPct val="0"/>
-            </a:spcBef>
-            <a:spcAft>
-              <a:spcPct val="35000"/>
-            </a:spcAft>
-            <a:buNone/>
-          </a:pPr>
-          <a:r>
-            <a:rPr lang="en-US" sz="2000" kern="1200" dirty="0"/>
-            <a:t>users</a:t>
-          </a:r>
-        </a:p>
-      </dsp:txBody>
-      <dsp:txXfrm>
-        <a:off x="3545878" y="2330747"/>
-        <a:ext cx="6655310" cy="966221"/>
-      </dsp:txXfrm>
-    </dsp:sp>
-    <dsp:sp modelId="{F68458BD-150E-44E6-9067-79050103B8CB}">
-      <dsp:nvSpPr>
-        <dsp:cNvPr id="0" name=""/>
-        <dsp:cNvSpPr/>
-      </dsp:nvSpPr>
-      <dsp:spPr>
-        <a:xfrm>
-          <a:off x="3515817" y="3449838"/>
-          <a:ext cx="1652826" cy="1026343"/>
+          <a:off x="1568573" y="1151534"/>
+          <a:ext cx="8887675" cy="1026343"/>
         </a:xfrm>
         <a:prstGeom prst="roundRect">
           <a:avLst>
@@ -2417,24 +2114,24 @@
           </a:pPr>
           <a:r>
             <a:rPr lang="en-US" sz="1900" kern="1200" dirty="0"/>
-            <a:t>users table</a:t>
+            <a:t>router-outlet &gt; changed components</a:t>
           </a:r>
         </a:p>
       </dsp:txBody>
       <dsp:txXfrm>
-        <a:off x="3545878" y="3479899"/>
-        <a:ext cx="1592704" cy="966221"/>
+        <a:off x="1598634" y="1181595"/>
+        <a:ext cx="8827553" cy="966221"/>
       </dsp:txXfrm>
     </dsp:sp>
-    <dsp:sp modelId="{9F55F352-269E-426D-B496-2585D3DC2701}">
+    <dsp:sp modelId="{ADC00EEF-F890-47C7-A55B-6CD73345D4E5}">
       <dsp:nvSpPr>
         <dsp:cNvPr id="0" name=""/>
         <dsp:cNvSpPr/>
       </dsp:nvSpPr>
       <dsp:spPr>
         <a:xfrm>
-          <a:off x="5203353" y="3449838"/>
-          <a:ext cx="1652826" cy="1026343"/>
+          <a:off x="1568573" y="2300686"/>
+          <a:ext cx="1445855" cy="1026343"/>
         </a:xfrm>
         <a:prstGeom prst="roundRect">
           <a:avLst>
@@ -2525,24 +2222,132 @@
           </a:pPr>
           <a:r>
             <a:rPr lang="en-US" sz="1900" kern="1200" dirty="0"/>
-            <a:t>graph shows growth of users by time</a:t>
+            <a:t>home</a:t>
           </a:r>
         </a:p>
       </dsp:txBody>
       <dsp:txXfrm>
-        <a:off x="5233414" y="3479899"/>
-        <a:ext cx="1592704" cy="966221"/>
+        <a:off x="1598634" y="2330747"/>
+        <a:ext cx="1385733" cy="966221"/>
       </dsp:txXfrm>
     </dsp:sp>
-    <dsp:sp modelId="{93B9D165-45EE-49DE-B711-8C7728655F3F}">
+    <dsp:sp modelId="{F677967E-DDE1-4E87-A0D8-1EDA580199D9}">
       <dsp:nvSpPr>
         <dsp:cNvPr id="0" name=""/>
         <dsp:cNvSpPr/>
       </dsp:nvSpPr>
       <dsp:spPr>
         <a:xfrm>
-          <a:off x="6890888" y="3449838"/>
-          <a:ext cx="3340361" cy="1026343"/>
+          <a:off x="1568573" y="3449838"/>
+          <a:ext cx="1445855" cy="1026343"/>
+        </a:xfrm>
+        <a:prstGeom prst="roundRect">
+          <a:avLst>
+            <a:gd name="adj" fmla="val 10000"/>
+          </a:avLst>
+        </a:prstGeom>
+        <a:gradFill rotWithShape="0">
+          <a:gsLst>
+            <a:gs pos="0">
+              <a:schemeClr val="accent1">
+                <a:hueOff val="0"/>
+                <a:satOff val="0"/>
+                <a:lumOff val="0"/>
+                <a:alphaOff val="0"/>
+                <a:tint val="70000"/>
+                <a:satMod val="100000"/>
+                <a:lumMod val="110000"/>
+              </a:schemeClr>
+            </a:gs>
+            <a:gs pos="50000">
+              <a:schemeClr val="accent1">
+                <a:hueOff val="0"/>
+                <a:satOff val="0"/>
+                <a:lumOff val="0"/>
+                <a:alphaOff val="0"/>
+                <a:tint val="75000"/>
+                <a:satMod val="101000"/>
+                <a:lumMod val="105000"/>
+              </a:schemeClr>
+            </a:gs>
+            <a:gs pos="100000">
+              <a:schemeClr val="accent1">
+                <a:hueOff val="0"/>
+                <a:satOff val="0"/>
+                <a:lumOff val="0"/>
+                <a:alphaOff val="0"/>
+                <a:tint val="82000"/>
+                <a:satMod val="104000"/>
+                <a:lumMod val="105000"/>
+              </a:schemeClr>
+            </a:gs>
+          </a:gsLst>
+          <a:lin ang="2700000" scaled="0"/>
+        </a:gradFill>
+        <a:ln>
+          <a:noFill/>
+        </a:ln>
+        <a:effectLst/>
+        <a:scene3d>
+          <a:camera prst="orthographicFront"/>
+          <a:lightRig rig="flat" dir="t"/>
+        </a:scene3d>
+        <a:sp3d prstMaterial="dkEdge">
+          <a:bevelT w="8200" h="38100"/>
+        </a:sp3d>
+      </dsp:spPr>
+      <dsp:style>
+        <a:lnRef idx="0">
+          <a:scrgbClr r="0" g="0" b="0"/>
+        </a:lnRef>
+        <a:fillRef idx="2">
+          <a:scrgbClr r="0" g="0" b="0"/>
+        </a:fillRef>
+        <a:effectRef idx="1">
+          <a:scrgbClr r="0" g="0" b="0"/>
+        </a:effectRef>
+        <a:fontRef idx="minor">
+          <a:schemeClr val="dk1"/>
+        </a:fontRef>
+      </dsp:style>
+      <dsp:txBody>
+        <a:bodyPr spcFirstLastPara="0" vert="horz" wrap="square" lIns="68580" tIns="68580" rIns="68580" bIns="68580" numCol="1" spcCol="1270" anchor="ctr" anchorCtr="0">
+          <a:noAutofit/>
+        </a:bodyPr>
+        <a:lstStyle/>
+        <a:p>
+          <a:pPr marL="0" lvl="0" indent="0" algn="ctr" defTabSz="800100">
+            <a:lnSpc>
+              <a:spcPct val="90000"/>
+            </a:lnSpc>
+            <a:spcBef>
+              <a:spcPct val="0"/>
+            </a:spcBef>
+            <a:spcAft>
+              <a:spcPct val="35000"/>
+            </a:spcAft>
+            <a:buNone/>
+          </a:pPr>
+          <a:r>
+            <a:rPr lang="en-US" sz="1800" kern="1200" dirty="0"/>
+            <a:t>blocks to show data</a:t>
+          </a:r>
+        </a:p>
+      </dsp:txBody>
+      <dsp:txXfrm>
+        <a:off x="1598634" y="3479899"/>
+        <a:ext cx="1385733" cy="966221"/>
+      </dsp:txXfrm>
+    </dsp:sp>
+    <dsp:sp modelId="{CEF31959-EB1A-464F-AAED-77CE2FBBE3D4}">
+      <dsp:nvSpPr>
+        <dsp:cNvPr id="0" name=""/>
+        <dsp:cNvSpPr/>
+      </dsp:nvSpPr>
+      <dsp:spPr>
+        <a:xfrm>
+          <a:off x="3075155" y="2300686"/>
+          <a:ext cx="1445855" cy="1026343"/>
         </a:xfrm>
         <a:prstGeom prst="roundRect">
           <a:avLst>
@@ -2633,13 +2438,554 @@
           </a:pPr>
           <a:r>
             <a:rPr lang="en-US" sz="1900" kern="1200" dirty="0"/>
+            <a:t>Feedbacks</a:t>
+          </a:r>
+        </a:p>
+      </dsp:txBody>
+      <dsp:txXfrm>
+        <a:off x="3105216" y="2330747"/>
+        <a:ext cx="1385733" cy="966221"/>
+      </dsp:txXfrm>
+    </dsp:sp>
+    <dsp:sp modelId="{68C45A7D-D5BA-40DE-95A9-6C08AB6AD80A}">
+      <dsp:nvSpPr>
+        <dsp:cNvPr id="0" name=""/>
+        <dsp:cNvSpPr/>
+      </dsp:nvSpPr>
+      <dsp:spPr>
+        <a:xfrm>
+          <a:off x="3075155" y="3449838"/>
+          <a:ext cx="1445855" cy="1026343"/>
+        </a:xfrm>
+        <a:prstGeom prst="roundRect">
+          <a:avLst>
+            <a:gd name="adj" fmla="val 10000"/>
+          </a:avLst>
+        </a:prstGeom>
+        <a:gradFill rotWithShape="0">
+          <a:gsLst>
+            <a:gs pos="0">
+              <a:schemeClr val="accent1">
+                <a:hueOff val="0"/>
+                <a:satOff val="0"/>
+                <a:lumOff val="0"/>
+                <a:alphaOff val="0"/>
+                <a:tint val="70000"/>
+                <a:satMod val="100000"/>
+                <a:lumMod val="110000"/>
+              </a:schemeClr>
+            </a:gs>
+            <a:gs pos="50000">
+              <a:schemeClr val="accent1">
+                <a:hueOff val="0"/>
+                <a:satOff val="0"/>
+                <a:lumOff val="0"/>
+                <a:alphaOff val="0"/>
+                <a:tint val="75000"/>
+                <a:satMod val="101000"/>
+                <a:lumMod val="105000"/>
+              </a:schemeClr>
+            </a:gs>
+            <a:gs pos="100000">
+              <a:schemeClr val="accent1">
+                <a:hueOff val="0"/>
+                <a:satOff val="0"/>
+                <a:lumOff val="0"/>
+                <a:alphaOff val="0"/>
+                <a:tint val="82000"/>
+                <a:satMod val="104000"/>
+                <a:lumMod val="105000"/>
+              </a:schemeClr>
+            </a:gs>
+          </a:gsLst>
+          <a:lin ang="2700000" scaled="0"/>
+        </a:gradFill>
+        <a:ln>
+          <a:noFill/>
+        </a:ln>
+        <a:effectLst/>
+        <a:scene3d>
+          <a:camera prst="orthographicFront"/>
+          <a:lightRig rig="flat" dir="t"/>
+        </a:scene3d>
+        <a:sp3d prstMaterial="dkEdge">
+          <a:bevelT w="8200" h="38100"/>
+        </a:sp3d>
+      </dsp:spPr>
+      <dsp:style>
+        <a:lnRef idx="0">
+          <a:scrgbClr r="0" g="0" b="0"/>
+        </a:lnRef>
+        <a:fillRef idx="2">
+          <a:scrgbClr r="0" g="0" b="0"/>
+        </a:fillRef>
+        <a:effectRef idx="1">
+          <a:scrgbClr r="0" g="0" b="0"/>
+        </a:effectRef>
+        <a:fontRef idx="minor">
+          <a:schemeClr val="dk1"/>
+        </a:fontRef>
+      </dsp:style>
+      <dsp:txBody>
+        <a:bodyPr spcFirstLastPara="0" vert="horz" wrap="square" lIns="68580" tIns="68580" rIns="68580" bIns="68580" numCol="1" spcCol="1270" anchor="ctr" anchorCtr="0">
+          <a:noAutofit/>
+        </a:bodyPr>
+        <a:lstStyle/>
+        <a:p>
+          <a:pPr marL="0" lvl="0" indent="0" algn="ctr" defTabSz="800100">
+            <a:lnSpc>
+              <a:spcPct val="90000"/>
+            </a:lnSpc>
+            <a:spcBef>
+              <a:spcPct val="0"/>
+            </a:spcBef>
+            <a:spcAft>
+              <a:spcPct val="35000"/>
+            </a:spcAft>
+            <a:buNone/>
+          </a:pPr>
+          <a:r>
+            <a:rPr lang="en-US" sz="1800" kern="1200" dirty="0"/>
+            <a:t>Feedback table</a:t>
+          </a:r>
+        </a:p>
+      </dsp:txBody>
+      <dsp:txXfrm>
+        <a:off x="3105216" y="3479899"/>
+        <a:ext cx="1385733" cy="966221"/>
+      </dsp:txXfrm>
+    </dsp:sp>
+    <dsp:sp modelId="{856B0D5E-2EA6-47A9-8486-67D8A1D64032}">
+      <dsp:nvSpPr>
+        <dsp:cNvPr id="0" name=""/>
+        <dsp:cNvSpPr/>
+      </dsp:nvSpPr>
+      <dsp:spPr>
+        <a:xfrm>
+          <a:off x="4581737" y="2300686"/>
+          <a:ext cx="5874512" cy="1026343"/>
+        </a:xfrm>
+        <a:prstGeom prst="roundRect">
+          <a:avLst>
+            <a:gd name="adj" fmla="val 10000"/>
+          </a:avLst>
+        </a:prstGeom>
+        <a:gradFill rotWithShape="0">
+          <a:gsLst>
+            <a:gs pos="0">
+              <a:schemeClr val="accent1">
+                <a:hueOff val="0"/>
+                <a:satOff val="0"/>
+                <a:lumOff val="0"/>
+                <a:alphaOff val="0"/>
+                <a:tint val="70000"/>
+                <a:satMod val="100000"/>
+                <a:lumMod val="110000"/>
+              </a:schemeClr>
+            </a:gs>
+            <a:gs pos="50000">
+              <a:schemeClr val="accent1">
+                <a:hueOff val="0"/>
+                <a:satOff val="0"/>
+                <a:lumOff val="0"/>
+                <a:alphaOff val="0"/>
+                <a:tint val="75000"/>
+                <a:satMod val="101000"/>
+                <a:lumMod val="105000"/>
+              </a:schemeClr>
+            </a:gs>
+            <a:gs pos="100000">
+              <a:schemeClr val="accent1">
+                <a:hueOff val="0"/>
+                <a:satOff val="0"/>
+                <a:lumOff val="0"/>
+                <a:alphaOff val="0"/>
+                <a:tint val="82000"/>
+                <a:satMod val="104000"/>
+                <a:lumMod val="105000"/>
+              </a:schemeClr>
+            </a:gs>
+          </a:gsLst>
+          <a:lin ang="2700000" scaled="0"/>
+        </a:gradFill>
+        <a:ln>
+          <a:noFill/>
+        </a:ln>
+        <a:effectLst/>
+        <a:scene3d>
+          <a:camera prst="orthographicFront"/>
+          <a:lightRig rig="flat" dir="t"/>
+        </a:scene3d>
+        <a:sp3d prstMaterial="dkEdge">
+          <a:bevelT w="8200" h="38100"/>
+        </a:sp3d>
+      </dsp:spPr>
+      <dsp:style>
+        <a:lnRef idx="0">
+          <a:scrgbClr r="0" g="0" b="0"/>
+        </a:lnRef>
+        <a:fillRef idx="2">
+          <a:scrgbClr r="0" g="0" b="0"/>
+        </a:fillRef>
+        <a:effectRef idx="1">
+          <a:scrgbClr r="0" g="0" b="0"/>
+        </a:effectRef>
+        <a:fontRef idx="minor">
+          <a:schemeClr val="dk1"/>
+        </a:fontRef>
+      </dsp:style>
+      <dsp:txBody>
+        <a:bodyPr spcFirstLastPara="0" vert="horz" wrap="square" lIns="72390" tIns="72390" rIns="72390" bIns="72390" numCol="1" spcCol="1270" anchor="ctr" anchorCtr="0">
+          <a:noAutofit/>
+        </a:bodyPr>
+        <a:lstStyle/>
+        <a:p>
+          <a:pPr marL="0" lvl="0" indent="0" algn="ctr" defTabSz="844550">
+            <a:lnSpc>
+              <a:spcPct val="90000"/>
+            </a:lnSpc>
+            <a:spcBef>
+              <a:spcPct val="0"/>
+            </a:spcBef>
+            <a:spcAft>
+              <a:spcPct val="35000"/>
+            </a:spcAft>
+            <a:buNone/>
+          </a:pPr>
+          <a:r>
+            <a:rPr lang="en-US" sz="1900" kern="1200"/>
+            <a:t>users</a:t>
+          </a:r>
+          <a:endParaRPr lang="en-US" sz="1900" kern="1200" dirty="0"/>
+        </a:p>
+      </dsp:txBody>
+      <dsp:txXfrm>
+        <a:off x="4611798" y="2330747"/>
+        <a:ext cx="5814390" cy="966221"/>
+      </dsp:txXfrm>
+    </dsp:sp>
+    <dsp:sp modelId="{F68458BD-150E-44E6-9067-79050103B8CB}">
+      <dsp:nvSpPr>
+        <dsp:cNvPr id="0" name=""/>
+        <dsp:cNvSpPr/>
+      </dsp:nvSpPr>
+      <dsp:spPr>
+        <a:xfrm>
+          <a:off x="4581737" y="3449838"/>
+          <a:ext cx="1445855" cy="1026343"/>
+        </a:xfrm>
+        <a:prstGeom prst="roundRect">
+          <a:avLst>
+            <a:gd name="adj" fmla="val 10000"/>
+          </a:avLst>
+        </a:prstGeom>
+        <a:gradFill rotWithShape="0">
+          <a:gsLst>
+            <a:gs pos="0">
+              <a:schemeClr val="accent1">
+                <a:hueOff val="0"/>
+                <a:satOff val="0"/>
+                <a:lumOff val="0"/>
+                <a:alphaOff val="0"/>
+                <a:tint val="70000"/>
+                <a:satMod val="100000"/>
+                <a:lumMod val="110000"/>
+              </a:schemeClr>
+            </a:gs>
+            <a:gs pos="50000">
+              <a:schemeClr val="accent1">
+                <a:hueOff val="0"/>
+                <a:satOff val="0"/>
+                <a:lumOff val="0"/>
+                <a:alphaOff val="0"/>
+                <a:tint val="75000"/>
+                <a:satMod val="101000"/>
+                <a:lumMod val="105000"/>
+              </a:schemeClr>
+            </a:gs>
+            <a:gs pos="100000">
+              <a:schemeClr val="accent1">
+                <a:hueOff val="0"/>
+                <a:satOff val="0"/>
+                <a:lumOff val="0"/>
+                <a:alphaOff val="0"/>
+                <a:tint val="82000"/>
+                <a:satMod val="104000"/>
+                <a:lumMod val="105000"/>
+              </a:schemeClr>
+            </a:gs>
+          </a:gsLst>
+          <a:lin ang="2700000" scaled="0"/>
+        </a:gradFill>
+        <a:ln>
+          <a:noFill/>
+        </a:ln>
+        <a:effectLst/>
+        <a:scene3d>
+          <a:camera prst="orthographicFront"/>
+          <a:lightRig rig="flat" dir="t"/>
+        </a:scene3d>
+        <a:sp3d prstMaterial="dkEdge">
+          <a:bevelT w="8200" h="38100"/>
+        </a:sp3d>
+      </dsp:spPr>
+      <dsp:style>
+        <a:lnRef idx="0">
+          <a:scrgbClr r="0" g="0" b="0"/>
+        </a:lnRef>
+        <a:fillRef idx="2">
+          <a:scrgbClr r="0" g="0" b="0"/>
+        </a:fillRef>
+        <a:effectRef idx="1">
+          <a:scrgbClr r="0" g="0" b="0"/>
+        </a:effectRef>
+        <a:fontRef idx="minor">
+          <a:schemeClr val="dk1"/>
+        </a:fontRef>
+      </dsp:style>
+      <dsp:txBody>
+        <a:bodyPr spcFirstLastPara="0" vert="horz" wrap="square" lIns="68580" tIns="68580" rIns="68580" bIns="68580" numCol="1" spcCol="1270" anchor="ctr" anchorCtr="0">
+          <a:noAutofit/>
+        </a:bodyPr>
+        <a:lstStyle/>
+        <a:p>
+          <a:pPr marL="0" lvl="0" indent="0" algn="ctr" defTabSz="800100">
+            <a:lnSpc>
+              <a:spcPct val="90000"/>
+            </a:lnSpc>
+            <a:spcBef>
+              <a:spcPct val="0"/>
+            </a:spcBef>
+            <a:spcAft>
+              <a:spcPct val="35000"/>
+            </a:spcAft>
+            <a:buNone/>
+          </a:pPr>
+          <a:r>
+            <a:rPr lang="en-US" sz="1800" kern="1200" dirty="0"/>
+            <a:t>users table</a:t>
+          </a:r>
+        </a:p>
+      </dsp:txBody>
+      <dsp:txXfrm>
+        <a:off x="4611798" y="3479899"/>
+        <a:ext cx="1385733" cy="966221"/>
+      </dsp:txXfrm>
+    </dsp:sp>
+    <dsp:sp modelId="{9F55F352-269E-426D-B496-2585D3DC2701}">
+      <dsp:nvSpPr>
+        <dsp:cNvPr id="0" name=""/>
+        <dsp:cNvSpPr/>
+      </dsp:nvSpPr>
+      <dsp:spPr>
+        <a:xfrm>
+          <a:off x="6057955" y="3449838"/>
+          <a:ext cx="1445855" cy="1026343"/>
+        </a:xfrm>
+        <a:prstGeom prst="roundRect">
+          <a:avLst>
+            <a:gd name="adj" fmla="val 10000"/>
+          </a:avLst>
+        </a:prstGeom>
+        <a:gradFill rotWithShape="0">
+          <a:gsLst>
+            <a:gs pos="0">
+              <a:schemeClr val="accent1">
+                <a:hueOff val="0"/>
+                <a:satOff val="0"/>
+                <a:lumOff val="0"/>
+                <a:alphaOff val="0"/>
+                <a:tint val="70000"/>
+                <a:satMod val="100000"/>
+                <a:lumMod val="110000"/>
+              </a:schemeClr>
+            </a:gs>
+            <a:gs pos="50000">
+              <a:schemeClr val="accent1">
+                <a:hueOff val="0"/>
+                <a:satOff val="0"/>
+                <a:lumOff val="0"/>
+                <a:alphaOff val="0"/>
+                <a:tint val="75000"/>
+                <a:satMod val="101000"/>
+                <a:lumMod val="105000"/>
+              </a:schemeClr>
+            </a:gs>
+            <a:gs pos="100000">
+              <a:schemeClr val="accent1">
+                <a:hueOff val="0"/>
+                <a:satOff val="0"/>
+                <a:lumOff val="0"/>
+                <a:alphaOff val="0"/>
+                <a:tint val="82000"/>
+                <a:satMod val="104000"/>
+                <a:lumMod val="105000"/>
+              </a:schemeClr>
+            </a:gs>
+          </a:gsLst>
+          <a:lin ang="2700000" scaled="0"/>
+        </a:gradFill>
+        <a:ln>
+          <a:noFill/>
+        </a:ln>
+        <a:effectLst/>
+        <a:scene3d>
+          <a:camera prst="orthographicFront"/>
+          <a:lightRig rig="flat" dir="t"/>
+        </a:scene3d>
+        <a:sp3d prstMaterial="dkEdge">
+          <a:bevelT w="8200" h="38100"/>
+        </a:sp3d>
+      </dsp:spPr>
+      <dsp:style>
+        <a:lnRef idx="0">
+          <a:scrgbClr r="0" g="0" b="0"/>
+        </a:lnRef>
+        <a:fillRef idx="2">
+          <a:scrgbClr r="0" g="0" b="0"/>
+        </a:fillRef>
+        <a:effectRef idx="1">
+          <a:scrgbClr r="0" g="0" b="0"/>
+        </a:effectRef>
+        <a:fontRef idx="minor">
+          <a:schemeClr val="dk1"/>
+        </a:fontRef>
+      </dsp:style>
+      <dsp:txBody>
+        <a:bodyPr spcFirstLastPara="0" vert="horz" wrap="square" lIns="68580" tIns="68580" rIns="68580" bIns="68580" numCol="1" spcCol="1270" anchor="ctr" anchorCtr="0">
+          <a:noAutofit/>
+        </a:bodyPr>
+        <a:lstStyle/>
+        <a:p>
+          <a:pPr marL="0" lvl="0" indent="0" algn="ctr" defTabSz="800100">
+            <a:lnSpc>
+              <a:spcPct val="90000"/>
+            </a:lnSpc>
+            <a:spcBef>
+              <a:spcPct val="0"/>
+            </a:spcBef>
+            <a:spcAft>
+              <a:spcPct val="35000"/>
+            </a:spcAft>
+            <a:buNone/>
+          </a:pPr>
+          <a:r>
+            <a:rPr lang="en-US" sz="1800" kern="1200" dirty="0"/>
+            <a:t>graph shows growth of users by time</a:t>
+          </a:r>
+        </a:p>
+      </dsp:txBody>
+      <dsp:txXfrm>
+        <a:off x="6088016" y="3479899"/>
+        <a:ext cx="1385733" cy="966221"/>
+      </dsp:txXfrm>
+    </dsp:sp>
+    <dsp:sp modelId="{93B9D165-45EE-49DE-B711-8C7728655F3F}">
+      <dsp:nvSpPr>
+        <dsp:cNvPr id="0" name=""/>
+        <dsp:cNvSpPr/>
+      </dsp:nvSpPr>
+      <dsp:spPr>
+        <a:xfrm>
+          <a:off x="7534174" y="3449838"/>
+          <a:ext cx="2922074" cy="1026343"/>
+        </a:xfrm>
+        <a:prstGeom prst="roundRect">
+          <a:avLst>
+            <a:gd name="adj" fmla="val 10000"/>
+          </a:avLst>
+        </a:prstGeom>
+        <a:gradFill rotWithShape="0">
+          <a:gsLst>
+            <a:gs pos="0">
+              <a:schemeClr val="accent1">
+                <a:hueOff val="0"/>
+                <a:satOff val="0"/>
+                <a:lumOff val="0"/>
+                <a:alphaOff val="0"/>
+                <a:tint val="70000"/>
+                <a:satMod val="100000"/>
+                <a:lumMod val="110000"/>
+              </a:schemeClr>
+            </a:gs>
+            <a:gs pos="50000">
+              <a:schemeClr val="accent1">
+                <a:hueOff val="0"/>
+                <a:satOff val="0"/>
+                <a:lumOff val="0"/>
+                <a:alphaOff val="0"/>
+                <a:tint val="75000"/>
+                <a:satMod val="101000"/>
+                <a:lumMod val="105000"/>
+              </a:schemeClr>
+            </a:gs>
+            <a:gs pos="100000">
+              <a:schemeClr val="accent1">
+                <a:hueOff val="0"/>
+                <a:satOff val="0"/>
+                <a:lumOff val="0"/>
+                <a:alphaOff val="0"/>
+                <a:tint val="82000"/>
+                <a:satMod val="104000"/>
+                <a:lumMod val="105000"/>
+              </a:schemeClr>
+            </a:gs>
+          </a:gsLst>
+          <a:lin ang="2700000" scaled="0"/>
+        </a:gradFill>
+        <a:ln>
+          <a:noFill/>
+        </a:ln>
+        <a:effectLst/>
+        <a:scene3d>
+          <a:camera prst="orthographicFront"/>
+          <a:lightRig rig="flat" dir="t"/>
+        </a:scene3d>
+        <a:sp3d prstMaterial="dkEdge">
+          <a:bevelT w="8200" h="38100"/>
+        </a:sp3d>
+      </dsp:spPr>
+      <dsp:style>
+        <a:lnRef idx="0">
+          <a:scrgbClr r="0" g="0" b="0"/>
+        </a:lnRef>
+        <a:fillRef idx="2">
+          <a:scrgbClr r="0" g="0" b="0"/>
+        </a:fillRef>
+        <a:effectRef idx="1">
+          <a:scrgbClr r="0" g="0" b="0"/>
+        </a:effectRef>
+        <a:fontRef idx="minor">
+          <a:schemeClr val="dk1"/>
+        </a:fontRef>
+      </dsp:style>
+      <dsp:txBody>
+        <a:bodyPr spcFirstLastPara="0" vert="horz" wrap="square" lIns="68580" tIns="68580" rIns="68580" bIns="68580" numCol="1" spcCol="1270" anchor="ctr" anchorCtr="0">
+          <a:noAutofit/>
+        </a:bodyPr>
+        <a:lstStyle/>
+        <a:p>
+          <a:pPr marL="0" lvl="0" indent="0" algn="ctr" defTabSz="800100">
+            <a:lnSpc>
+              <a:spcPct val="90000"/>
+            </a:lnSpc>
+            <a:spcBef>
+              <a:spcPct val="0"/>
+            </a:spcBef>
+            <a:spcAft>
+              <a:spcPct val="35000"/>
+            </a:spcAft>
+            <a:buNone/>
+          </a:pPr>
+          <a:r>
+            <a:rPr lang="en-US" sz="1800" kern="1200" dirty="0"/>
             <a:t>user page(folder not component)</a:t>
           </a:r>
         </a:p>
       </dsp:txBody>
       <dsp:txXfrm>
-        <a:off x="6920949" y="3479899"/>
-        <a:ext cx="3280239" cy="966221"/>
+        <a:off x="7564235" y="3479899"/>
+        <a:ext cx="2861952" cy="966221"/>
       </dsp:txXfrm>
     </dsp:sp>
     <dsp:sp modelId="{64163F0C-6137-4F5F-8FBA-F49EB42C859C}">
@@ -2649,8 +2995,224 @@
       </dsp:nvSpPr>
       <dsp:spPr>
         <a:xfrm>
-          <a:off x="6890888" y="4598990"/>
-          <a:ext cx="1652826" cy="1026343"/>
+          <a:off x="7534174" y="4598990"/>
+          <a:ext cx="1445855" cy="1026343"/>
+        </a:xfrm>
+        <a:prstGeom prst="roundRect">
+          <a:avLst>
+            <a:gd name="adj" fmla="val 10000"/>
+          </a:avLst>
+        </a:prstGeom>
+        <a:gradFill rotWithShape="0">
+          <a:gsLst>
+            <a:gs pos="0">
+              <a:schemeClr val="accent1">
+                <a:hueOff val="0"/>
+                <a:satOff val="0"/>
+                <a:lumOff val="0"/>
+                <a:alphaOff val="0"/>
+                <a:tint val="70000"/>
+                <a:satMod val="100000"/>
+                <a:lumMod val="110000"/>
+              </a:schemeClr>
+            </a:gs>
+            <a:gs pos="50000">
+              <a:schemeClr val="accent1">
+                <a:hueOff val="0"/>
+                <a:satOff val="0"/>
+                <a:lumOff val="0"/>
+                <a:alphaOff val="0"/>
+                <a:tint val="75000"/>
+                <a:satMod val="101000"/>
+                <a:lumMod val="105000"/>
+              </a:schemeClr>
+            </a:gs>
+            <a:gs pos="100000">
+              <a:schemeClr val="accent1">
+                <a:hueOff val="0"/>
+                <a:satOff val="0"/>
+                <a:lumOff val="0"/>
+                <a:alphaOff val="0"/>
+                <a:tint val="82000"/>
+                <a:satMod val="104000"/>
+                <a:lumMod val="105000"/>
+              </a:schemeClr>
+            </a:gs>
+          </a:gsLst>
+          <a:lin ang="2700000" scaled="0"/>
+        </a:gradFill>
+        <a:ln>
+          <a:noFill/>
+        </a:ln>
+        <a:effectLst/>
+        <a:scene3d>
+          <a:camera prst="orthographicFront"/>
+          <a:lightRig rig="flat" dir="t"/>
+        </a:scene3d>
+        <a:sp3d prstMaterial="dkEdge">
+          <a:bevelT w="8200" h="38100"/>
+        </a:sp3d>
+      </dsp:spPr>
+      <dsp:style>
+        <a:lnRef idx="0">
+          <a:scrgbClr r="0" g="0" b="0"/>
+        </a:lnRef>
+        <a:fillRef idx="2">
+          <a:scrgbClr r="0" g="0" b="0"/>
+        </a:fillRef>
+        <a:effectRef idx="1">
+          <a:scrgbClr r="0" g="0" b="0"/>
+        </a:effectRef>
+        <a:fontRef idx="minor">
+          <a:schemeClr val="dk1"/>
+        </a:fontRef>
+      </dsp:style>
+      <dsp:txBody>
+        <a:bodyPr spcFirstLastPara="0" vert="horz" wrap="square" lIns="68580" tIns="68580" rIns="68580" bIns="68580" numCol="1" spcCol="1270" anchor="ctr" anchorCtr="0">
+          <a:noAutofit/>
+        </a:bodyPr>
+        <a:lstStyle/>
+        <a:p>
+          <a:pPr marL="0" lvl="0" indent="0" algn="ctr" defTabSz="800100">
+            <a:lnSpc>
+              <a:spcPct val="90000"/>
+            </a:lnSpc>
+            <a:spcBef>
+              <a:spcPct val="0"/>
+            </a:spcBef>
+            <a:spcAft>
+              <a:spcPct val="35000"/>
+            </a:spcAft>
+            <a:buNone/>
+          </a:pPr>
+          <a:r>
+            <a:rPr lang="en-US" sz="1800" kern="1200" dirty="0"/>
+            <a:t>user data</a:t>
+          </a:r>
+        </a:p>
+      </dsp:txBody>
+      <dsp:txXfrm>
+        <a:off x="7564235" y="4629051"/>
+        <a:ext cx="1385733" cy="966221"/>
+      </dsp:txXfrm>
+    </dsp:sp>
+    <dsp:sp modelId="{A2AAC64F-2015-48FE-B293-A2723DB08E61}">
+      <dsp:nvSpPr>
+        <dsp:cNvPr id="0" name=""/>
+        <dsp:cNvSpPr/>
+      </dsp:nvSpPr>
+      <dsp:spPr>
+        <a:xfrm>
+          <a:off x="9010393" y="4598990"/>
+          <a:ext cx="1445855" cy="1026343"/>
+        </a:xfrm>
+        <a:prstGeom prst="roundRect">
+          <a:avLst>
+            <a:gd name="adj" fmla="val 10000"/>
+          </a:avLst>
+        </a:prstGeom>
+        <a:gradFill rotWithShape="0">
+          <a:gsLst>
+            <a:gs pos="0">
+              <a:schemeClr val="accent1">
+                <a:hueOff val="0"/>
+                <a:satOff val="0"/>
+                <a:lumOff val="0"/>
+                <a:alphaOff val="0"/>
+                <a:tint val="70000"/>
+                <a:satMod val="100000"/>
+                <a:lumMod val="110000"/>
+              </a:schemeClr>
+            </a:gs>
+            <a:gs pos="50000">
+              <a:schemeClr val="accent1">
+                <a:hueOff val="0"/>
+                <a:satOff val="0"/>
+                <a:lumOff val="0"/>
+                <a:alphaOff val="0"/>
+                <a:tint val="75000"/>
+                <a:satMod val="101000"/>
+                <a:lumMod val="105000"/>
+              </a:schemeClr>
+            </a:gs>
+            <a:gs pos="100000">
+              <a:schemeClr val="accent1">
+                <a:hueOff val="0"/>
+                <a:satOff val="0"/>
+                <a:lumOff val="0"/>
+                <a:alphaOff val="0"/>
+                <a:tint val="82000"/>
+                <a:satMod val="104000"/>
+                <a:lumMod val="105000"/>
+              </a:schemeClr>
+            </a:gs>
+          </a:gsLst>
+          <a:lin ang="2700000" scaled="0"/>
+        </a:gradFill>
+        <a:ln>
+          <a:noFill/>
+        </a:ln>
+        <a:effectLst/>
+        <a:scene3d>
+          <a:camera prst="orthographicFront"/>
+          <a:lightRig rig="flat" dir="t"/>
+        </a:scene3d>
+        <a:sp3d prstMaterial="dkEdge">
+          <a:bevelT w="8200" h="38100"/>
+        </a:sp3d>
+      </dsp:spPr>
+      <dsp:style>
+        <a:lnRef idx="0">
+          <a:scrgbClr r="0" g="0" b="0"/>
+        </a:lnRef>
+        <a:fillRef idx="2">
+          <a:scrgbClr r="0" g="0" b="0"/>
+        </a:fillRef>
+        <a:effectRef idx="1">
+          <a:scrgbClr r="0" g="0" b="0"/>
+        </a:effectRef>
+        <a:fontRef idx="minor">
+          <a:schemeClr val="dk1"/>
+        </a:fontRef>
+      </dsp:style>
+      <dsp:txBody>
+        <a:bodyPr spcFirstLastPara="0" vert="horz" wrap="square" lIns="68580" tIns="68580" rIns="68580" bIns="68580" numCol="1" spcCol="1270" anchor="ctr" anchorCtr="0">
+          <a:noAutofit/>
+        </a:bodyPr>
+        <a:lstStyle/>
+        <a:p>
+          <a:pPr marL="0" lvl="0" indent="0" algn="ctr" defTabSz="800100">
+            <a:lnSpc>
+              <a:spcPct val="90000"/>
+            </a:lnSpc>
+            <a:spcBef>
+              <a:spcPct val="0"/>
+            </a:spcBef>
+            <a:spcAft>
+              <a:spcPct val="35000"/>
+            </a:spcAft>
+            <a:buNone/>
+          </a:pPr>
+          <a:r>
+            <a:rPr lang="en-US" sz="1800" kern="1200" dirty="0"/>
+            <a:t>edit user data</a:t>
+          </a:r>
+        </a:p>
+      </dsp:txBody>
+      <dsp:txXfrm>
+        <a:off x="9040454" y="4629051"/>
+        <a:ext cx="1385733" cy="966221"/>
+      </dsp:txXfrm>
+    </dsp:sp>
+    <dsp:sp modelId="{840D6405-DD4E-42D2-B9DC-845ADB07767F}">
+      <dsp:nvSpPr>
+        <dsp:cNvPr id="0" name=""/>
+        <dsp:cNvSpPr/>
+      </dsp:nvSpPr>
+      <dsp:spPr>
+        <a:xfrm>
+          <a:off x="10577701" y="1151534"/>
+          <a:ext cx="1445855" cy="1026343"/>
         </a:xfrm>
         <a:prstGeom prst="roundRect">
           <a:avLst>
@@ -2741,229 +3303,13 @@
           </a:pPr>
           <a:r>
             <a:rPr lang="en-US" sz="1900" kern="1200" dirty="0"/>
-            <a:t>user data</a:t>
-          </a:r>
-        </a:p>
-      </dsp:txBody>
-      <dsp:txXfrm>
-        <a:off x="6920949" y="4629051"/>
-        <a:ext cx="1592704" cy="966221"/>
-      </dsp:txXfrm>
-    </dsp:sp>
-    <dsp:sp modelId="{A2AAC64F-2015-48FE-B293-A2723DB08E61}">
-      <dsp:nvSpPr>
-        <dsp:cNvPr id="0" name=""/>
-        <dsp:cNvSpPr/>
-      </dsp:nvSpPr>
-      <dsp:spPr>
-        <a:xfrm>
-          <a:off x="8578423" y="4598990"/>
-          <a:ext cx="1652826" cy="1026343"/>
-        </a:xfrm>
-        <a:prstGeom prst="roundRect">
-          <a:avLst>
-            <a:gd name="adj" fmla="val 10000"/>
-          </a:avLst>
-        </a:prstGeom>
-        <a:gradFill rotWithShape="0">
-          <a:gsLst>
-            <a:gs pos="0">
-              <a:schemeClr val="accent1">
-                <a:hueOff val="0"/>
-                <a:satOff val="0"/>
-                <a:lumOff val="0"/>
-                <a:alphaOff val="0"/>
-                <a:tint val="70000"/>
-                <a:satMod val="100000"/>
-                <a:lumMod val="110000"/>
-              </a:schemeClr>
-            </a:gs>
-            <a:gs pos="50000">
-              <a:schemeClr val="accent1">
-                <a:hueOff val="0"/>
-                <a:satOff val="0"/>
-                <a:lumOff val="0"/>
-                <a:alphaOff val="0"/>
-                <a:tint val="75000"/>
-                <a:satMod val="101000"/>
-                <a:lumMod val="105000"/>
-              </a:schemeClr>
-            </a:gs>
-            <a:gs pos="100000">
-              <a:schemeClr val="accent1">
-                <a:hueOff val="0"/>
-                <a:satOff val="0"/>
-                <a:lumOff val="0"/>
-                <a:alphaOff val="0"/>
-                <a:tint val="82000"/>
-                <a:satMod val="104000"/>
-                <a:lumMod val="105000"/>
-              </a:schemeClr>
-            </a:gs>
-          </a:gsLst>
-          <a:lin ang="2700000" scaled="0"/>
-        </a:gradFill>
-        <a:ln>
-          <a:noFill/>
-        </a:ln>
-        <a:effectLst/>
-        <a:scene3d>
-          <a:camera prst="orthographicFront"/>
-          <a:lightRig rig="flat" dir="t"/>
-        </a:scene3d>
-        <a:sp3d prstMaterial="dkEdge">
-          <a:bevelT w="8200" h="38100"/>
-        </a:sp3d>
-      </dsp:spPr>
-      <dsp:style>
-        <a:lnRef idx="0">
-          <a:scrgbClr r="0" g="0" b="0"/>
-        </a:lnRef>
-        <a:fillRef idx="2">
-          <a:scrgbClr r="0" g="0" b="0"/>
-        </a:fillRef>
-        <a:effectRef idx="1">
-          <a:scrgbClr r="0" g="0" b="0"/>
-        </a:effectRef>
-        <a:fontRef idx="minor">
-          <a:schemeClr val="dk1"/>
-        </a:fontRef>
-      </dsp:style>
-      <dsp:txBody>
-        <a:bodyPr spcFirstLastPara="0" vert="horz" wrap="square" lIns="72390" tIns="72390" rIns="72390" bIns="72390" numCol="1" spcCol="1270" anchor="ctr" anchorCtr="0">
-          <a:noAutofit/>
-        </a:bodyPr>
-        <a:lstStyle/>
-        <a:p>
-          <a:pPr marL="0" lvl="0" indent="0" algn="ctr" defTabSz="844550">
-            <a:lnSpc>
-              <a:spcPct val="90000"/>
-            </a:lnSpc>
-            <a:spcBef>
-              <a:spcPct val="0"/>
-            </a:spcBef>
-            <a:spcAft>
-              <a:spcPct val="35000"/>
-            </a:spcAft>
-            <a:buNone/>
-          </a:pPr>
-          <a:r>
-            <a:rPr lang="en-US" sz="1900" kern="1200" dirty="0"/>
-            <a:t>edit user data</a:t>
-          </a:r>
-        </a:p>
-      </dsp:txBody>
-      <dsp:txXfrm>
-        <a:off x="8608484" y="4629051"/>
-        <a:ext cx="1592704" cy="966221"/>
-      </dsp:txXfrm>
-    </dsp:sp>
-    <dsp:sp modelId="{840D6405-DD4E-42D2-B9DC-845ADB07767F}">
-      <dsp:nvSpPr>
-        <dsp:cNvPr id="0" name=""/>
-        <dsp:cNvSpPr/>
-      </dsp:nvSpPr>
-      <dsp:spPr>
-        <a:xfrm>
-          <a:off x="10370087" y="1151534"/>
-          <a:ext cx="1652826" cy="1026343"/>
-        </a:xfrm>
-        <a:prstGeom prst="roundRect">
-          <a:avLst>
-            <a:gd name="adj" fmla="val 10000"/>
-          </a:avLst>
-        </a:prstGeom>
-        <a:gradFill rotWithShape="0">
-          <a:gsLst>
-            <a:gs pos="0">
-              <a:schemeClr val="accent1">
-                <a:hueOff val="0"/>
-                <a:satOff val="0"/>
-                <a:lumOff val="0"/>
-                <a:alphaOff val="0"/>
-                <a:tint val="70000"/>
-                <a:satMod val="100000"/>
-                <a:lumMod val="110000"/>
-              </a:schemeClr>
-            </a:gs>
-            <a:gs pos="50000">
-              <a:schemeClr val="accent1">
-                <a:hueOff val="0"/>
-                <a:satOff val="0"/>
-                <a:lumOff val="0"/>
-                <a:alphaOff val="0"/>
-                <a:tint val="75000"/>
-                <a:satMod val="101000"/>
-                <a:lumMod val="105000"/>
-              </a:schemeClr>
-            </a:gs>
-            <a:gs pos="100000">
-              <a:schemeClr val="accent1">
-                <a:hueOff val="0"/>
-                <a:satOff val="0"/>
-                <a:lumOff val="0"/>
-                <a:alphaOff val="0"/>
-                <a:tint val="82000"/>
-                <a:satMod val="104000"/>
-                <a:lumMod val="105000"/>
-              </a:schemeClr>
-            </a:gs>
-          </a:gsLst>
-          <a:lin ang="2700000" scaled="0"/>
-        </a:gradFill>
-        <a:ln>
-          <a:noFill/>
-        </a:ln>
-        <a:effectLst/>
-        <a:scene3d>
-          <a:camera prst="orthographicFront"/>
-          <a:lightRig rig="flat" dir="t"/>
-        </a:scene3d>
-        <a:sp3d prstMaterial="dkEdge">
-          <a:bevelT w="8200" h="38100"/>
-        </a:sp3d>
-      </dsp:spPr>
-      <dsp:style>
-        <a:lnRef idx="0">
-          <a:scrgbClr r="0" g="0" b="0"/>
-        </a:lnRef>
-        <a:fillRef idx="2">
-          <a:scrgbClr r="0" g="0" b="0"/>
-        </a:fillRef>
-        <a:effectRef idx="1">
-          <a:scrgbClr r="0" g="0" b="0"/>
-        </a:effectRef>
-        <a:fontRef idx="minor">
-          <a:schemeClr val="dk1"/>
-        </a:fontRef>
-      </dsp:style>
-      <dsp:txBody>
-        <a:bodyPr spcFirstLastPara="0" vert="horz" wrap="square" lIns="76200" tIns="76200" rIns="76200" bIns="76200" numCol="1" spcCol="1270" anchor="ctr" anchorCtr="0">
-          <a:noAutofit/>
-        </a:bodyPr>
-        <a:lstStyle/>
-        <a:p>
-          <a:pPr marL="0" lvl="0" indent="0" algn="ctr" defTabSz="889000">
-            <a:lnSpc>
-              <a:spcPct val="90000"/>
-            </a:lnSpc>
-            <a:spcBef>
-              <a:spcPct val="0"/>
-            </a:spcBef>
-            <a:spcAft>
-              <a:spcPct val="35000"/>
-            </a:spcAft>
-            <a:buNone/>
-          </a:pPr>
-          <a:r>
-            <a:rPr lang="en-US" sz="2000" kern="1200" dirty="0"/>
             <a:t>side-menu ul &gt; always here</a:t>
           </a:r>
         </a:p>
       </dsp:txBody>
       <dsp:txXfrm>
-        <a:off x="10400148" y="1181595"/>
-        <a:ext cx="1592704" cy="966221"/>
+        <a:off x="10607762" y="1181595"/>
+        <a:ext cx="1385733" cy="966221"/>
       </dsp:txXfrm>
     </dsp:sp>
   </dsp:spTree>
@@ -4752,7 +5098,7 @@
           <a:p>
             <a:fld id="{2F89BF03-DAF2-46FE-A32D-CE3ED500C0FE}" type="datetimeFigureOut">
               <a:rPr lang="en-US" smtClean="0"/>
-              <a:t>5/2/2020</a:t>
+              <a:t>5/6/2020</a:t>
             </a:fld>
             <a:endParaRPr lang="en-US"/>
           </a:p>
@@ -4942,7 +5288,7 @@
           <a:p>
             <a:fld id="{2F89BF03-DAF2-46FE-A32D-CE3ED500C0FE}" type="datetimeFigureOut">
               <a:rPr lang="en-US" smtClean="0"/>
-              <a:t>5/2/2020</a:t>
+              <a:t>5/6/2020</a:t>
             </a:fld>
             <a:endParaRPr lang="en-US"/>
           </a:p>
@@ -5122,7 +5468,7 @@
           <a:p>
             <a:fld id="{2F89BF03-DAF2-46FE-A32D-CE3ED500C0FE}" type="datetimeFigureOut">
               <a:rPr lang="en-US" smtClean="0"/>
-              <a:t>5/2/2020</a:t>
+              <a:t>5/6/2020</a:t>
             </a:fld>
             <a:endParaRPr lang="en-US"/>
           </a:p>
@@ -5292,7 +5638,7 @@
           <a:p>
             <a:fld id="{2F89BF03-DAF2-46FE-A32D-CE3ED500C0FE}" type="datetimeFigureOut">
               <a:rPr lang="en-US" smtClean="0"/>
-              <a:t>5/2/2020</a:t>
+              <a:t>5/6/2020</a:t>
             </a:fld>
             <a:endParaRPr lang="en-US"/>
           </a:p>
@@ -5548,7 +5894,7 @@
           <a:p>
             <a:fld id="{2F89BF03-DAF2-46FE-A32D-CE3ED500C0FE}" type="datetimeFigureOut">
               <a:rPr lang="en-US" smtClean="0"/>
-              <a:t>5/2/2020</a:t>
+              <a:t>5/6/2020</a:t>
             </a:fld>
             <a:endParaRPr lang="en-US"/>
           </a:p>
@@ -5836,7 +6182,7 @@
           <a:p>
             <a:fld id="{2F89BF03-DAF2-46FE-A32D-CE3ED500C0FE}" type="datetimeFigureOut">
               <a:rPr lang="en-US" smtClean="0"/>
-              <a:t>5/2/2020</a:t>
+              <a:t>5/6/2020</a:t>
             </a:fld>
             <a:endParaRPr lang="en-US"/>
           </a:p>
@@ -6274,7 +6620,7 @@
           <a:p>
             <a:fld id="{2F89BF03-DAF2-46FE-A32D-CE3ED500C0FE}" type="datetimeFigureOut">
               <a:rPr lang="en-US" smtClean="0"/>
-              <a:t>5/2/2020</a:t>
+              <a:t>5/6/2020</a:t>
             </a:fld>
             <a:endParaRPr lang="en-US"/>
           </a:p>
@@ -6392,7 +6738,7 @@
           <a:p>
             <a:fld id="{2F89BF03-DAF2-46FE-A32D-CE3ED500C0FE}" type="datetimeFigureOut">
               <a:rPr lang="en-US" smtClean="0"/>
-              <a:t>5/2/2020</a:t>
+              <a:t>5/6/2020</a:t>
             </a:fld>
             <a:endParaRPr lang="en-US"/>
           </a:p>
@@ -6487,7 +6833,7 @@
           <a:p>
             <a:fld id="{2F89BF03-DAF2-46FE-A32D-CE3ED500C0FE}" type="datetimeFigureOut">
               <a:rPr lang="en-US" smtClean="0"/>
-              <a:t>5/2/2020</a:t>
+              <a:t>5/6/2020</a:t>
             </a:fld>
             <a:endParaRPr lang="en-US"/>
           </a:p>
@@ -6843,7 +7189,7 @@
           <a:p>
             <a:fld id="{2F89BF03-DAF2-46FE-A32D-CE3ED500C0FE}" type="datetimeFigureOut">
               <a:rPr lang="en-US" smtClean="0"/>
-              <a:t>5/2/2020</a:t>
+              <a:t>5/6/2020</a:t>
             </a:fld>
             <a:endParaRPr lang="en-US"/>
           </a:p>
@@ -7159,7 +7505,7 @@
           <a:p>
             <a:fld id="{2F89BF03-DAF2-46FE-A32D-CE3ED500C0FE}" type="datetimeFigureOut">
               <a:rPr lang="en-US" smtClean="0"/>
-              <a:t>5/2/2020</a:t>
+              <a:t>5/6/2020</a:t>
             </a:fld>
             <a:endParaRPr lang="en-US"/>
           </a:p>
@@ -7392,7 +7738,7 @@
           <a:p>
             <a:fld id="{2F89BF03-DAF2-46FE-A32D-CE3ED500C0FE}" type="datetimeFigureOut">
               <a:rPr lang="en-US" smtClean="0"/>
-              <a:t>5/2/2020</a:t>
+              <a:t>5/6/2020</a:t>
             </a:fld>
             <a:endParaRPr lang="en-US"/>
           </a:p>
@@ -7841,7 +8187,7 @@
           <p:nvPr>
             <p:extLst>
               <p:ext uri="{D42A27DB-BD31-4B8C-83A1-F6EECF244321}">
-                <p14:modId xmlns:p14="http://schemas.microsoft.com/office/powerpoint/2010/main" val="3993020065"/>
+                <p14:modId xmlns:p14="http://schemas.microsoft.com/office/powerpoint/2010/main" val="2341009603"/>
               </p:ext>
             </p:extLst>
           </p:nvPr>
@@ -8273,7 +8619,7 @@
         </p:nvSpPr>
         <p:spPr>
           <a:xfrm>
-            <a:off x="3241962" y="3530880"/>
+            <a:off x="1862049" y="3429000"/>
             <a:ext cx="224443" cy="191193"/>
           </a:xfrm>
           <a:prstGeom prst="rect">
@@ -8325,7 +8671,7 @@
         </p:nvSpPr>
         <p:spPr>
           <a:xfrm>
-            <a:off x="1404851" y="2226423"/>
+            <a:off x="1163782" y="2226423"/>
             <a:ext cx="224443" cy="191193"/>
           </a:xfrm>
           <a:prstGeom prst="rect">
@@ -8387,6 +8733,60 @@
           </a:prstGeom>
           <a:solidFill>
             <a:srgbClr val="FFFF00"/>
+          </a:solidFill>
+          <a:ln>
+            <a:noFill/>
+          </a:ln>
+        </p:spPr>
+        <p:style>
+          <a:lnRef idx="2">
+            <a:schemeClr val="accent4">
+              <a:shade val="50000"/>
+            </a:schemeClr>
+          </a:lnRef>
+          <a:fillRef idx="1">
+            <a:schemeClr val="accent4"/>
+          </a:fillRef>
+          <a:effectRef idx="0">
+            <a:schemeClr val="accent4"/>
+          </a:effectRef>
+          <a:fontRef idx="minor">
+            <a:schemeClr val="lt1"/>
+          </a:fontRef>
+        </p:style>
+        <p:txBody>
+          <a:bodyPr rtlCol="0" anchor="ctr"/>
+          <a:lstStyle/>
+          <a:p>
+            <a:pPr algn="ctr"/>
+            <a:endParaRPr lang="en-US"/>
+          </a:p>
+        </p:txBody>
+      </p:sp>
+      <p:sp>
+        <p:nvSpPr>
+          <p:cNvPr id="17" name="Rectangle 16">
+            <a:extLst>
+              <a:ext uri="{FF2B5EF4-FFF2-40B4-BE49-F238E27FC236}">
+                <a16:creationId xmlns:a16="http://schemas.microsoft.com/office/drawing/2014/main" id="{1ECA3010-DDEE-4119-80F5-16B508785D81}"/>
+              </a:ext>
+            </a:extLst>
+          </p:cNvPr>
+          <p:cNvSpPr/>
+          <p:nvPr/>
+        </p:nvSpPr>
+        <p:spPr>
+          <a:xfrm>
+            <a:off x="4321232" y="3333403"/>
+            <a:ext cx="224443" cy="191193"/>
+          </a:xfrm>
+          <a:prstGeom prst="rect">
+            <a:avLst/>
+          </a:prstGeom>
+          <a:solidFill>
+            <a:schemeClr val="accent3">
+              <a:lumMod val="50000"/>
+            </a:schemeClr>
           </a:solidFill>
           <a:ln>
             <a:noFill/>

</xml_diff>

<commit_message>
initializing map in canvas
</commit_message>
<xml_diff>
--- a/project-structure.pptx
+++ b/project-structure.pptx
@@ -1378,6 +1378,42 @@
         </a:p>
       </dgm:t>
     </dgm:pt>
+    <dgm:pt modelId="{120AAC6B-398D-4FD5-B81A-94050A41EF8F}">
+      <dgm:prSet/>
+      <dgm:spPr/>
+      <dgm:t>
+        <a:bodyPr/>
+        <a:lstStyle/>
+        <a:p>
+          <a:r>
+            <a:rPr lang="en-US" dirty="0"/>
+            <a:t>Map &gt; will be used in many components</a:t>
+          </a:r>
+        </a:p>
+      </dgm:t>
+    </dgm:pt>
+    <dgm:pt modelId="{A5A57A32-7B82-4868-B934-1D67DCF37700}" type="parTrans" cxnId="{8D5D9706-6A0C-4EF3-AEB0-6F97B1FA0619}">
+      <dgm:prSet/>
+      <dgm:spPr/>
+      <dgm:t>
+        <a:bodyPr/>
+        <a:lstStyle/>
+        <a:p>
+          <a:endParaRPr lang="en-US"/>
+        </a:p>
+      </dgm:t>
+    </dgm:pt>
+    <dgm:pt modelId="{36310CA9-15AE-481C-B539-58E1435D3922}" type="sibTrans" cxnId="{8D5D9706-6A0C-4EF3-AEB0-6F97B1FA0619}">
+      <dgm:prSet/>
+      <dgm:spPr/>
+      <dgm:t>
+        <a:bodyPr/>
+        <a:lstStyle/>
+        <a:p>
+          <a:endParaRPr lang="en-US"/>
+        </a:p>
+      </dgm:t>
+    </dgm:pt>
     <dgm:pt modelId="{8E1838F7-9884-4167-92C7-C70C925801C0}" type="pres">
       <dgm:prSet presAssocID="{E78328A7-4938-4CC9-A464-7899E68A5898}" presName="Name0" presStyleCnt="0">
         <dgm:presLayoutVars>
@@ -1415,7 +1451,7 @@
       <dgm:spPr/>
     </dgm:pt>
     <dgm:pt modelId="{CFEC70A1-9D1F-4C3E-AEDF-C9CEB5F259E2}" type="pres">
-      <dgm:prSet presAssocID="{17642F8E-DF10-4577-8362-8E38BCB4B1A0}" presName="txTwo" presStyleLbl="node2" presStyleIdx="0" presStyleCnt="3">
+      <dgm:prSet presAssocID="{17642F8E-DF10-4577-8362-8E38BCB4B1A0}" presName="txTwo" presStyleLbl="node2" presStyleIdx="0" presStyleCnt="4">
         <dgm:presLayoutVars>
           <dgm:chPref val="3"/>
         </dgm:presLayoutVars>
@@ -1435,7 +1471,7 @@
       <dgm:spPr/>
     </dgm:pt>
     <dgm:pt modelId="{301C9628-7A5F-4523-9C47-779B72BF189A}" type="pres">
-      <dgm:prSet presAssocID="{A9FEA221-04AA-4F86-9B32-B5A166BCBE14}" presName="txTwo" presStyleLbl="node2" presStyleIdx="1" presStyleCnt="3">
+      <dgm:prSet presAssocID="{A9FEA221-04AA-4F86-9B32-B5A166BCBE14}" presName="txTwo" presStyleLbl="node2" presStyleIdx="1" presStyleCnt="4">
         <dgm:presLayoutVars>
           <dgm:chPref val="3"/>
         </dgm:presLayoutVars>
@@ -1683,7 +1719,7 @@
       <dgm:spPr/>
     </dgm:pt>
     <dgm:pt modelId="{840D6405-DD4E-42D2-B9DC-845ADB07767F}" type="pres">
-      <dgm:prSet presAssocID="{F79BFE92-1C09-4A0C-9592-B3EFED862B36}" presName="txTwo" presStyleLbl="node2" presStyleIdx="2" presStyleCnt="3">
+      <dgm:prSet presAssocID="{F79BFE92-1C09-4A0C-9592-B3EFED862B36}" presName="txTwo" presStyleLbl="node2" presStyleIdx="2" presStyleCnt="4">
         <dgm:presLayoutVars>
           <dgm:chPref val="3"/>
         </dgm:presLayoutVars>
@@ -1692,6 +1728,26 @@
     </dgm:pt>
     <dgm:pt modelId="{58D9A29D-3A3F-4ADD-BD64-837296E12E93}" type="pres">
       <dgm:prSet presAssocID="{F79BFE92-1C09-4A0C-9592-B3EFED862B36}" presName="horzTwo" presStyleCnt="0"/>
+      <dgm:spPr/>
+    </dgm:pt>
+    <dgm:pt modelId="{247C889C-3751-4D8C-A5CB-3AE0395DBC1D}" type="pres">
+      <dgm:prSet presAssocID="{65A6F9C7-A079-4020-9FBA-5EA1F423D28C}" presName="sibSpaceTwo" presStyleCnt="0"/>
+      <dgm:spPr/>
+    </dgm:pt>
+    <dgm:pt modelId="{77BA2A1D-7ADA-4B1F-BC88-A016241503C8}" type="pres">
+      <dgm:prSet presAssocID="{120AAC6B-398D-4FD5-B81A-94050A41EF8F}" presName="vertTwo" presStyleCnt="0"/>
+      <dgm:spPr/>
+    </dgm:pt>
+    <dgm:pt modelId="{DFC3654B-F5D7-484F-A30A-0F54F4F189B0}" type="pres">
+      <dgm:prSet presAssocID="{120AAC6B-398D-4FD5-B81A-94050A41EF8F}" presName="txTwo" presStyleLbl="node2" presStyleIdx="3" presStyleCnt="4">
+        <dgm:presLayoutVars>
+          <dgm:chPref val="3"/>
+        </dgm:presLayoutVars>
+      </dgm:prSet>
+      <dgm:spPr/>
+    </dgm:pt>
+    <dgm:pt modelId="{0F8D9F91-A1FD-4CBE-BDB2-B2467AA9EB1E}" type="pres">
+      <dgm:prSet presAssocID="{120AAC6B-398D-4FD5-B81A-94050A41EF8F}" presName="horzTwo" presStyleCnt="0"/>
       <dgm:spPr/>
     </dgm:pt>
   </dgm:ptLst>
@@ -1699,6 +1755,7 @@
     <dgm:cxn modelId="{FED8DC00-E55C-46BC-889C-95A55881DB6E}" type="presOf" srcId="{C08DD0C6-E2A2-45D8-8041-8667DB6B7AA9}" destId="{64163F0C-6137-4F5F-8FBA-F49EB42C859C}" srcOrd="0" destOrd="0" presId="urn:microsoft.com/office/officeart/2005/8/layout/hierarchy4"/>
     <dgm:cxn modelId="{BD75F300-EAF5-4299-8098-27DD9AAAC2BA}" type="presOf" srcId="{E78328A7-4938-4CC9-A464-7899E68A5898}" destId="{8E1838F7-9884-4167-92C7-C70C925801C0}" srcOrd="0" destOrd="0" presId="urn:microsoft.com/office/officeart/2005/8/layout/hierarchy4"/>
     <dgm:cxn modelId="{52383703-9B16-48CD-94FA-67D50674C292}" type="presOf" srcId="{5C5A51BA-9AFA-48E5-930D-FE49595EBD43}" destId="{7FADA4DD-D2ED-4350-A003-15AE1F62DD4E}" srcOrd="0" destOrd="0" presId="urn:microsoft.com/office/officeart/2005/8/layout/hierarchy4"/>
+    <dgm:cxn modelId="{8D5D9706-6A0C-4EF3-AEB0-6F97B1FA0619}" srcId="{5C5A51BA-9AFA-48E5-930D-FE49595EBD43}" destId="{120AAC6B-398D-4FD5-B81A-94050A41EF8F}" srcOrd="3" destOrd="0" parTransId="{A5A57A32-7B82-4868-B934-1D67DCF37700}" sibTransId="{36310CA9-15AE-481C-B539-58E1435D3922}"/>
     <dgm:cxn modelId="{A520450C-C41F-4279-90ED-1A6ACC71ABA1}" type="presOf" srcId="{71C607A5-4B2C-4F6E-8A20-9A8AA7D7F42F}" destId="{F68458BD-150E-44E6-9067-79050103B8CB}" srcOrd="0" destOrd="0" presId="urn:microsoft.com/office/officeart/2005/8/layout/hierarchy4"/>
     <dgm:cxn modelId="{B991C714-1E3A-45D1-809D-EB58F1CC175C}" srcId="{5C5A51BA-9AFA-48E5-930D-FE49595EBD43}" destId="{A9FEA221-04AA-4F86-9B32-B5A166BCBE14}" srcOrd="1" destOrd="0" parTransId="{84AAB8B5-0212-444C-927D-C74298C6E755}" sibTransId="{509156E0-4C91-4E39-8368-B3D50FA899C4}"/>
     <dgm:cxn modelId="{CA28E11D-8FC0-4CEE-A01D-C34744CE6D22}" type="presOf" srcId="{F79BFE92-1C09-4A0C-9592-B3EFED862B36}" destId="{840D6405-DD4E-42D2-B9DC-845ADB07767F}" srcOrd="0" destOrd="0" presId="urn:microsoft.com/office/officeart/2005/8/layout/hierarchy4"/>
@@ -1717,6 +1774,7 @@
     <dgm:cxn modelId="{213107B3-3116-44DB-A7D5-445BFA3B0A3E}" srcId="{5C5A51BA-9AFA-48E5-930D-FE49595EBD43}" destId="{17642F8E-DF10-4577-8362-8E38BCB4B1A0}" srcOrd="0" destOrd="0" parTransId="{9B9FF4FF-7B99-4344-A602-94300297B509}" sibTransId="{71B63D7B-6DA9-4527-B1C3-6987F16F726C}"/>
     <dgm:cxn modelId="{D60329BC-BAD7-4391-9889-565F5C1FE6CE}" type="presOf" srcId="{17642F8E-DF10-4577-8362-8E38BCB4B1A0}" destId="{CFEC70A1-9D1F-4C3E-AEDF-C9CEB5F259E2}" srcOrd="0" destOrd="0" presId="urn:microsoft.com/office/officeart/2005/8/layout/hierarchy4"/>
     <dgm:cxn modelId="{FBD6CABC-E91D-42A2-A881-CC762A7EC68D}" srcId="{E78328A7-4938-4CC9-A464-7899E68A5898}" destId="{5C5A51BA-9AFA-48E5-930D-FE49595EBD43}" srcOrd="0" destOrd="0" parTransId="{AF2D7D40-6F16-4486-BF90-89679E725549}" sibTransId="{FAC7EE12-725E-4073-AC8B-41000C4D6F18}"/>
+    <dgm:cxn modelId="{630707BE-F12C-45D5-88C5-04492C9AFB09}" type="presOf" srcId="{120AAC6B-398D-4FD5-B81A-94050A41EF8F}" destId="{DFC3654B-F5D7-484F-A30A-0F54F4F189B0}" srcOrd="0" destOrd="0" presId="urn:microsoft.com/office/officeart/2005/8/layout/hierarchy4"/>
     <dgm:cxn modelId="{4C5016C1-C44E-4E84-9A24-82270DECC947}" type="presOf" srcId="{4C04E527-9B99-4A38-9F7F-F9E5037E78AA}" destId="{9F55F352-269E-426D-B496-2585D3DC2701}" srcOrd="0" destOrd="0" presId="urn:microsoft.com/office/officeart/2005/8/layout/hierarchy4"/>
     <dgm:cxn modelId="{EBC02CD4-88F5-496F-92F8-72E078692A21}" type="presOf" srcId="{1E028449-BDFB-489E-BBBA-ABB3D943F322}" destId="{ADC00EEF-F890-47C7-A55B-6CD73345D4E5}" srcOrd="0" destOrd="0" presId="urn:microsoft.com/office/officeart/2005/8/layout/hierarchy4"/>
     <dgm:cxn modelId="{D03945D8-54A0-4A9F-AF68-D8A1DBB4F085}" type="presOf" srcId="{4AFA2315-F472-4AB7-A58E-25207B18F4F0}" destId="{856B0D5E-2EA6-47A9-8486-67D8A1D64032}" srcOrd="0" destOrd="0" presId="urn:microsoft.com/office/officeart/2005/8/layout/hierarchy4"/>
@@ -1780,6 +1838,10 @@
     <dgm:cxn modelId="{79E10D4F-0D91-4C6A-84D3-EC8CF2083598}" type="presParOf" srcId="{F6685F4B-0FBB-4D4E-855E-85F98362080D}" destId="{13C6ABE6-329A-4597-9F05-B338FDD2679B}" srcOrd="4" destOrd="0" presId="urn:microsoft.com/office/officeart/2005/8/layout/hierarchy4"/>
     <dgm:cxn modelId="{B46F25CB-0C0E-4E1C-A270-22F6D515ACD1}" type="presParOf" srcId="{13C6ABE6-329A-4597-9F05-B338FDD2679B}" destId="{840D6405-DD4E-42D2-B9DC-845ADB07767F}" srcOrd="0" destOrd="0" presId="urn:microsoft.com/office/officeart/2005/8/layout/hierarchy4"/>
     <dgm:cxn modelId="{A5BC9074-190E-4005-A95A-F8E2AB4BE1D8}" type="presParOf" srcId="{13C6ABE6-329A-4597-9F05-B338FDD2679B}" destId="{58D9A29D-3A3F-4ADD-BD64-837296E12E93}" srcOrd="1" destOrd="0" presId="urn:microsoft.com/office/officeart/2005/8/layout/hierarchy4"/>
+    <dgm:cxn modelId="{32005FA7-C69C-4575-815B-E2ADB12DD883}" type="presParOf" srcId="{F6685F4B-0FBB-4D4E-855E-85F98362080D}" destId="{247C889C-3751-4D8C-A5CB-3AE0395DBC1D}" srcOrd="5" destOrd="0" presId="urn:microsoft.com/office/officeart/2005/8/layout/hierarchy4"/>
+    <dgm:cxn modelId="{D6BDAA72-12D0-4652-9CB9-2F67FF87FAAA}" type="presParOf" srcId="{F6685F4B-0FBB-4D4E-855E-85F98362080D}" destId="{77BA2A1D-7ADA-4B1F-BC88-A016241503C8}" srcOrd="6" destOrd="0" presId="urn:microsoft.com/office/officeart/2005/8/layout/hierarchy4"/>
+    <dgm:cxn modelId="{DE9C30B9-494D-49CB-9391-A8E0ECE89A6B}" type="presParOf" srcId="{77BA2A1D-7ADA-4B1F-BC88-A016241503C8}" destId="{DFC3654B-F5D7-484F-A30A-0F54F4F189B0}" srcOrd="0" destOrd="0" presId="urn:microsoft.com/office/officeart/2005/8/layout/hierarchy4"/>
+    <dgm:cxn modelId="{E94152B3-E1C8-4B0B-954F-86FDE57D7769}" type="presParOf" srcId="{77BA2A1D-7ADA-4B1F-BC88-A016241503C8}" destId="{0F8D9F91-A1FD-4CBE-BDB2-B2467AA9EB1E}" srcOrd="1" destOrd="0" presId="urn:microsoft.com/office/officeart/2005/8/layout/hierarchy4"/>
   </dgm:cxnLst>
   <dgm:bg/>
   <dgm:whole/>
@@ -1806,8 +1868,8 @@
       </dsp:nvSpPr>
       <dsp:spPr>
         <a:xfrm>
-          <a:off x="1266" y="2382"/>
-          <a:ext cx="12022290" cy="1026343"/>
+          <a:off x="4015" y="2382"/>
+          <a:ext cx="12016792" cy="1026343"/>
         </a:xfrm>
         <a:prstGeom prst="roundRect">
           <a:avLst>
@@ -1903,8 +1965,8 @@
         </a:p>
       </dsp:txBody>
       <dsp:txXfrm>
-        <a:off x="31327" y="32443"/>
-        <a:ext cx="11962168" cy="966221"/>
+        <a:off x="34076" y="32443"/>
+        <a:ext cx="11956670" cy="966221"/>
       </dsp:txXfrm>
     </dsp:sp>
     <dsp:sp modelId="{CFEC70A1-9D1F-4C3E-AEDF-C9CEB5F259E2}">
@@ -1914,8 +1976,8 @@
       </dsp:nvSpPr>
       <dsp:spPr>
         <a:xfrm>
-          <a:off x="1266" y="1151534"/>
-          <a:ext cx="1445855" cy="1026343"/>
+          <a:off x="4015" y="1151534"/>
+          <a:ext cx="1278518" cy="1026343"/>
         </a:xfrm>
         <a:prstGeom prst="roundRect">
           <a:avLst>
@@ -1987,12 +2049,12 @@
         </a:fontRef>
       </dsp:style>
       <dsp:txBody>
-        <a:bodyPr spcFirstLastPara="0" vert="horz" wrap="square" lIns="72390" tIns="72390" rIns="72390" bIns="72390" numCol="1" spcCol="1270" anchor="ctr" anchorCtr="0">
+        <a:bodyPr spcFirstLastPara="0" vert="horz" wrap="square" lIns="60960" tIns="60960" rIns="60960" bIns="60960" numCol="1" spcCol="1270" anchor="ctr" anchorCtr="0">
           <a:noAutofit/>
         </a:bodyPr>
         <a:lstStyle/>
         <a:p>
-          <a:pPr marL="0" lvl="0" indent="0" algn="ctr" defTabSz="844550">
+          <a:pPr marL="0" lvl="0" indent="0" algn="ctr" defTabSz="711200">
             <a:lnSpc>
               <a:spcPct val="90000"/>
             </a:lnSpc>
@@ -2005,14 +2067,14 @@
             <a:buNone/>
           </a:pPr>
           <a:r>
-            <a:rPr lang="en-US" sz="1900" kern="1200" dirty="0"/>
+            <a:rPr lang="en-US" sz="1600" kern="1200" dirty="0"/>
             <a:t>navbar &gt; always here</a:t>
           </a:r>
         </a:p>
       </dsp:txBody>
       <dsp:txXfrm>
-        <a:off x="31327" y="1181595"/>
-        <a:ext cx="1385733" cy="966221"/>
+        <a:off x="34076" y="1181595"/>
+        <a:ext cx="1218396" cy="966221"/>
       </dsp:txXfrm>
     </dsp:sp>
     <dsp:sp modelId="{301C9628-7A5F-4523-9C47-779B72BF189A}">
@@ -2022,8 +2084,8 @@
       </dsp:nvSpPr>
       <dsp:spPr>
         <a:xfrm>
-          <a:off x="1568573" y="1151534"/>
-          <a:ext cx="8887675" cy="1026343"/>
+          <a:off x="1389929" y="1151534"/>
+          <a:ext cx="7859051" cy="1026343"/>
         </a:xfrm>
         <a:prstGeom prst="roundRect">
           <a:avLst>
@@ -2095,12 +2157,12 @@
         </a:fontRef>
       </dsp:style>
       <dsp:txBody>
-        <a:bodyPr spcFirstLastPara="0" vert="horz" wrap="square" lIns="72390" tIns="72390" rIns="72390" bIns="72390" numCol="1" spcCol="1270" anchor="ctr" anchorCtr="0">
+        <a:bodyPr spcFirstLastPara="0" vert="horz" wrap="square" lIns="60960" tIns="60960" rIns="60960" bIns="60960" numCol="1" spcCol="1270" anchor="ctr" anchorCtr="0">
           <a:noAutofit/>
         </a:bodyPr>
         <a:lstStyle/>
         <a:p>
-          <a:pPr marL="0" lvl="0" indent="0" algn="ctr" defTabSz="844550">
+          <a:pPr marL="0" lvl="0" indent="0" algn="ctr" defTabSz="711200">
             <a:lnSpc>
               <a:spcPct val="90000"/>
             </a:lnSpc>
@@ -2113,14 +2175,14 @@
             <a:buNone/>
           </a:pPr>
           <a:r>
-            <a:rPr lang="en-US" sz="1900" kern="1200" dirty="0"/>
+            <a:rPr lang="en-US" sz="1600" kern="1200" dirty="0"/>
             <a:t>router-outlet &gt; changed components</a:t>
           </a:r>
         </a:p>
       </dsp:txBody>
       <dsp:txXfrm>
-        <a:off x="1598634" y="1181595"/>
-        <a:ext cx="8827553" cy="966221"/>
+        <a:off x="1419990" y="1181595"/>
+        <a:ext cx="7798929" cy="966221"/>
       </dsp:txXfrm>
     </dsp:sp>
     <dsp:sp modelId="{ADC00EEF-F890-47C7-A55B-6CD73345D4E5}">
@@ -2130,8 +2192,8 @@
       </dsp:nvSpPr>
       <dsp:spPr>
         <a:xfrm>
-          <a:off x="1568573" y="2300686"/>
-          <a:ext cx="1445855" cy="1026343"/>
+          <a:off x="1389929" y="2300686"/>
+          <a:ext cx="1278518" cy="1026343"/>
         </a:xfrm>
         <a:prstGeom prst="roundRect">
           <a:avLst>
@@ -2203,12 +2265,12 @@
         </a:fontRef>
       </dsp:style>
       <dsp:txBody>
-        <a:bodyPr spcFirstLastPara="0" vert="horz" wrap="square" lIns="72390" tIns="72390" rIns="72390" bIns="72390" numCol="1" spcCol="1270" anchor="ctr" anchorCtr="0">
+        <a:bodyPr spcFirstLastPara="0" vert="horz" wrap="square" lIns="60960" tIns="60960" rIns="60960" bIns="60960" numCol="1" spcCol="1270" anchor="ctr" anchorCtr="0">
           <a:noAutofit/>
         </a:bodyPr>
         <a:lstStyle/>
         <a:p>
-          <a:pPr marL="0" lvl="0" indent="0" algn="ctr" defTabSz="844550">
+          <a:pPr marL="0" lvl="0" indent="0" algn="ctr" defTabSz="711200">
             <a:lnSpc>
               <a:spcPct val="90000"/>
             </a:lnSpc>
@@ -2221,14 +2283,14 @@
             <a:buNone/>
           </a:pPr>
           <a:r>
-            <a:rPr lang="en-US" sz="1900" kern="1200" dirty="0"/>
+            <a:rPr lang="en-US" sz="1600" kern="1200" dirty="0"/>
             <a:t>home</a:t>
           </a:r>
         </a:p>
       </dsp:txBody>
       <dsp:txXfrm>
-        <a:off x="1598634" y="2330747"/>
-        <a:ext cx="1385733" cy="966221"/>
+        <a:off x="1419990" y="2330747"/>
+        <a:ext cx="1218396" cy="966221"/>
       </dsp:txXfrm>
     </dsp:sp>
     <dsp:sp modelId="{F677967E-DDE1-4E87-A0D8-1EDA580199D9}">
@@ -2238,8 +2300,8 @@
       </dsp:nvSpPr>
       <dsp:spPr>
         <a:xfrm>
-          <a:off x="1568573" y="3449838"/>
-          <a:ext cx="1445855" cy="1026343"/>
+          <a:off x="1389929" y="3449838"/>
+          <a:ext cx="1278518" cy="1026343"/>
         </a:xfrm>
         <a:prstGeom prst="roundRect">
           <a:avLst>
@@ -2311,12 +2373,12 @@
         </a:fontRef>
       </dsp:style>
       <dsp:txBody>
-        <a:bodyPr spcFirstLastPara="0" vert="horz" wrap="square" lIns="68580" tIns="68580" rIns="68580" bIns="68580" numCol="1" spcCol="1270" anchor="ctr" anchorCtr="0">
+        <a:bodyPr spcFirstLastPara="0" vert="horz" wrap="square" lIns="60960" tIns="60960" rIns="60960" bIns="60960" numCol="1" spcCol="1270" anchor="ctr" anchorCtr="0">
           <a:noAutofit/>
         </a:bodyPr>
         <a:lstStyle/>
         <a:p>
-          <a:pPr marL="0" lvl="0" indent="0" algn="ctr" defTabSz="800100">
+          <a:pPr marL="0" lvl="0" indent="0" algn="ctr" defTabSz="711200">
             <a:lnSpc>
               <a:spcPct val="90000"/>
             </a:lnSpc>
@@ -2329,14 +2391,14 @@
             <a:buNone/>
           </a:pPr>
           <a:r>
-            <a:rPr lang="en-US" sz="1800" kern="1200" dirty="0"/>
+            <a:rPr lang="en-US" sz="1600" kern="1200" dirty="0"/>
             <a:t>blocks to show data</a:t>
           </a:r>
         </a:p>
       </dsp:txBody>
       <dsp:txXfrm>
-        <a:off x="1598634" y="3479899"/>
-        <a:ext cx="1385733" cy="966221"/>
+        <a:off x="1419990" y="3479899"/>
+        <a:ext cx="1218396" cy="966221"/>
       </dsp:txXfrm>
     </dsp:sp>
     <dsp:sp modelId="{CEF31959-EB1A-464F-AAED-77CE2FBBE3D4}">
@@ -2346,8 +2408,8 @@
       </dsp:nvSpPr>
       <dsp:spPr>
         <a:xfrm>
-          <a:off x="3075155" y="2300686"/>
-          <a:ext cx="1445855" cy="1026343"/>
+          <a:off x="2722144" y="2300686"/>
+          <a:ext cx="1278518" cy="1026343"/>
         </a:xfrm>
         <a:prstGeom prst="roundRect">
           <a:avLst>
@@ -2419,12 +2481,12 @@
         </a:fontRef>
       </dsp:style>
       <dsp:txBody>
-        <a:bodyPr spcFirstLastPara="0" vert="horz" wrap="square" lIns="72390" tIns="72390" rIns="72390" bIns="72390" numCol="1" spcCol="1270" anchor="ctr" anchorCtr="0">
+        <a:bodyPr spcFirstLastPara="0" vert="horz" wrap="square" lIns="60960" tIns="60960" rIns="60960" bIns="60960" numCol="1" spcCol="1270" anchor="ctr" anchorCtr="0">
           <a:noAutofit/>
         </a:bodyPr>
         <a:lstStyle/>
         <a:p>
-          <a:pPr marL="0" lvl="0" indent="0" algn="ctr" defTabSz="844550">
+          <a:pPr marL="0" lvl="0" indent="0" algn="ctr" defTabSz="711200">
             <a:lnSpc>
               <a:spcPct val="90000"/>
             </a:lnSpc>
@@ -2437,14 +2499,14 @@
             <a:buNone/>
           </a:pPr>
           <a:r>
-            <a:rPr lang="en-US" sz="1900" kern="1200" dirty="0"/>
+            <a:rPr lang="en-US" sz="1600" kern="1200" dirty="0"/>
             <a:t>Feedbacks</a:t>
           </a:r>
         </a:p>
       </dsp:txBody>
       <dsp:txXfrm>
-        <a:off x="3105216" y="2330747"/>
-        <a:ext cx="1385733" cy="966221"/>
+        <a:off x="2752205" y="2330747"/>
+        <a:ext cx="1218396" cy="966221"/>
       </dsp:txXfrm>
     </dsp:sp>
     <dsp:sp modelId="{68C45A7D-D5BA-40DE-95A9-6C08AB6AD80A}">
@@ -2454,8 +2516,8 @@
       </dsp:nvSpPr>
       <dsp:spPr>
         <a:xfrm>
-          <a:off x="3075155" y="3449838"/>
-          <a:ext cx="1445855" cy="1026343"/>
+          <a:off x="2722144" y="3449838"/>
+          <a:ext cx="1278518" cy="1026343"/>
         </a:xfrm>
         <a:prstGeom prst="roundRect">
           <a:avLst>
@@ -2527,12 +2589,12 @@
         </a:fontRef>
       </dsp:style>
       <dsp:txBody>
-        <a:bodyPr spcFirstLastPara="0" vert="horz" wrap="square" lIns="68580" tIns="68580" rIns="68580" bIns="68580" numCol="1" spcCol="1270" anchor="ctr" anchorCtr="0">
+        <a:bodyPr spcFirstLastPara="0" vert="horz" wrap="square" lIns="60960" tIns="60960" rIns="60960" bIns="60960" numCol="1" spcCol="1270" anchor="ctr" anchorCtr="0">
           <a:noAutofit/>
         </a:bodyPr>
         <a:lstStyle/>
         <a:p>
-          <a:pPr marL="0" lvl="0" indent="0" algn="ctr" defTabSz="800100">
+          <a:pPr marL="0" lvl="0" indent="0" algn="ctr" defTabSz="711200">
             <a:lnSpc>
               <a:spcPct val="90000"/>
             </a:lnSpc>
@@ -2545,14 +2607,14 @@
             <a:buNone/>
           </a:pPr>
           <a:r>
-            <a:rPr lang="en-US" sz="1800" kern="1200" dirty="0"/>
+            <a:rPr lang="en-US" sz="1600" kern="1200" dirty="0"/>
             <a:t>Feedback table</a:t>
           </a:r>
         </a:p>
       </dsp:txBody>
       <dsp:txXfrm>
-        <a:off x="3105216" y="3479899"/>
-        <a:ext cx="1385733" cy="966221"/>
+        <a:off x="2752205" y="3479899"/>
+        <a:ext cx="1218396" cy="966221"/>
       </dsp:txXfrm>
     </dsp:sp>
     <dsp:sp modelId="{856B0D5E-2EA6-47A9-8486-67D8A1D64032}">
@@ -2562,8 +2624,8 @@
       </dsp:nvSpPr>
       <dsp:spPr>
         <a:xfrm>
-          <a:off x="4581737" y="2300686"/>
-          <a:ext cx="5874512" cy="1026343"/>
+          <a:off x="4054360" y="2300686"/>
+          <a:ext cx="5194619" cy="1026343"/>
         </a:xfrm>
         <a:prstGeom prst="roundRect">
           <a:avLst>
@@ -2635,12 +2697,12 @@
         </a:fontRef>
       </dsp:style>
       <dsp:txBody>
-        <a:bodyPr spcFirstLastPara="0" vert="horz" wrap="square" lIns="72390" tIns="72390" rIns="72390" bIns="72390" numCol="1" spcCol="1270" anchor="ctr" anchorCtr="0">
+        <a:bodyPr spcFirstLastPara="0" vert="horz" wrap="square" lIns="60960" tIns="60960" rIns="60960" bIns="60960" numCol="1" spcCol="1270" anchor="ctr" anchorCtr="0">
           <a:noAutofit/>
         </a:bodyPr>
         <a:lstStyle/>
         <a:p>
-          <a:pPr marL="0" lvl="0" indent="0" algn="ctr" defTabSz="844550">
+          <a:pPr marL="0" lvl="0" indent="0" algn="ctr" defTabSz="711200">
             <a:lnSpc>
               <a:spcPct val="90000"/>
             </a:lnSpc>
@@ -2653,15 +2715,15 @@
             <a:buNone/>
           </a:pPr>
           <a:r>
-            <a:rPr lang="en-US" sz="1900" kern="1200"/>
+            <a:rPr lang="en-US" sz="1600" kern="1200"/>
             <a:t>users</a:t>
           </a:r>
-          <a:endParaRPr lang="en-US" sz="1900" kern="1200" dirty="0"/>
+          <a:endParaRPr lang="en-US" sz="1600" kern="1200" dirty="0"/>
         </a:p>
       </dsp:txBody>
       <dsp:txXfrm>
-        <a:off x="4611798" y="2330747"/>
-        <a:ext cx="5814390" cy="966221"/>
+        <a:off x="4084421" y="2330747"/>
+        <a:ext cx="5134497" cy="966221"/>
       </dsp:txXfrm>
     </dsp:sp>
     <dsp:sp modelId="{F68458BD-150E-44E6-9067-79050103B8CB}">
@@ -2671,8 +2733,8 @@
       </dsp:nvSpPr>
       <dsp:spPr>
         <a:xfrm>
-          <a:off x="4581737" y="3449838"/>
-          <a:ext cx="1445855" cy="1026343"/>
+          <a:off x="4054360" y="3449838"/>
+          <a:ext cx="1278518" cy="1026343"/>
         </a:xfrm>
         <a:prstGeom prst="roundRect">
           <a:avLst>
@@ -2744,12 +2806,12 @@
         </a:fontRef>
       </dsp:style>
       <dsp:txBody>
-        <a:bodyPr spcFirstLastPara="0" vert="horz" wrap="square" lIns="68580" tIns="68580" rIns="68580" bIns="68580" numCol="1" spcCol="1270" anchor="ctr" anchorCtr="0">
+        <a:bodyPr spcFirstLastPara="0" vert="horz" wrap="square" lIns="60960" tIns="60960" rIns="60960" bIns="60960" numCol="1" spcCol="1270" anchor="ctr" anchorCtr="0">
           <a:noAutofit/>
         </a:bodyPr>
         <a:lstStyle/>
         <a:p>
-          <a:pPr marL="0" lvl="0" indent="0" algn="ctr" defTabSz="800100">
+          <a:pPr marL="0" lvl="0" indent="0" algn="ctr" defTabSz="711200">
             <a:lnSpc>
               <a:spcPct val="90000"/>
             </a:lnSpc>
@@ -2762,14 +2824,14 @@
             <a:buNone/>
           </a:pPr>
           <a:r>
-            <a:rPr lang="en-US" sz="1800" kern="1200" dirty="0"/>
+            <a:rPr lang="en-US" sz="1600" kern="1200" dirty="0"/>
             <a:t>users table</a:t>
           </a:r>
         </a:p>
       </dsp:txBody>
       <dsp:txXfrm>
-        <a:off x="4611798" y="3479899"/>
-        <a:ext cx="1385733" cy="966221"/>
+        <a:off x="4084421" y="3479899"/>
+        <a:ext cx="1218396" cy="966221"/>
       </dsp:txXfrm>
     </dsp:sp>
     <dsp:sp modelId="{9F55F352-269E-426D-B496-2585D3DC2701}">
@@ -2779,8 +2841,8 @@
       </dsp:nvSpPr>
       <dsp:spPr>
         <a:xfrm>
-          <a:off x="6057955" y="3449838"/>
-          <a:ext cx="1445855" cy="1026343"/>
+          <a:off x="5359727" y="3449838"/>
+          <a:ext cx="1278518" cy="1026343"/>
         </a:xfrm>
         <a:prstGeom prst="roundRect">
           <a:avLst>
@@ -2852,12 +2914,12 @@
         </a:fontRef>
       </dsp:style>
       <dsp:txBody>
-        <a:bodyPr spcFirstLastPara="0" vert="horz" wrap="square" lIns="68580" tIns="68580" rIns="68580" bIns="68580" numCol="1" spcCol="1270" anchor="ctr" anchorCtr="0">
+        <a:bodyPr spcFirstLastPara="0" vert="horz" wrap="square" lIns="60960" tIns="60960" rIns="60960" bIns="60960" numCol="1" spcCol="1270" anchor="ctr" anchorCtr="0">
           <a:noAutofit/>
         </a:bodyPr>
         <a:lstStyle/>
         <a:p>
-          <a:pPr marL="0" lvl="0" indent="0" algn="ctr" defTabSz="800100">
+          <a:pPr marL="0" lvl="0" indent="0" algn="ctr" defTabSz="711200">
             <a:lnSpc>
               <a:spcPct val="90000"/>
             </a:lnSpc>
@@ -2870,14 +2932,14 @@
             <a:buNone/>
           </a:pPr>
           <a:r>
-            <a:rPr lang="en-US" sz="1800" kern="1200" dirty="0"/>
+            <a:rPr lang="en-US" sz="1600" kern="1200" dirty="0"/>
             <a:t>graph shows growth of users by time</a:t>
           </a:r>
         </a:p>
       </dsp:txBody>
       <dsp:txXfrm>
-        <a:off x="6088016" y="3479899"/>
-        <a:ext cx="1385733" cy="966221"/>
+        <a:off x="5389788" y="3479899"/>
+        <a:ext cx="1218396" cy="966221"/>
       </dsp:txXfrm>
     </dsp:sp>
     <dsp:sp modelId="{93B9D165-45EE-49DE-B711-8C7728655F3F}">
@@ -2887,8 +2949,8 @@
       </dsp:nvSpPr>
       <dsp:spPr>
         <a:xfrm>
-          <a:off x="7534174" y="3449838"/>
-          <a:ext cx="2922074" cy="1026343"/>
+          <a:off x="6665095" y="3449838"/>
+          <a:ext cx="2583885" cy="1026343"/>
         </a:xfrm>
         <a:prstGeom prst="roundRect">
           <a:avLst>
@@ -2960,12 +3022,12 @@
         </a:fontRef>
       </dsp:style>
       <dsp:txBody>
-        <a:bodyPr spcFirstLastPara="0" vert="horz" wrap="square" lIns="68580" tIns="68580" rIns="68580" bIns="68580" numCol="1" spcCol="1270" anchor="ctr" anchorCtr="0">
+        <a:bodyPr spcFirstLastPara="0" vert="horz" wrap="square" lIns="60960" tIns="60960" rIns="60960" bIns="60960" numCol="1" spcCol="1270" anchor="ctr" anchorCtr="0">
           <a:noAutofit/>
         </a:bodyPr>
         <a:lstStyle/>
         <a:p>
-          <a:pPr marL="0" lvl="0" indent="0" algn="ctr" defTabSz="800100">
+          <a:pPr marL="0" lvl="0" indent="0" algn="ctr" defTabSz="711200">
             <a:lnSpc>
               <a:spcPct val="90000"/>
             </a:lnSpc>
@@ -2978,14 +3040,14 @@
             <a:buNone/>
           </a:pPr>
           <a:r>
-            <a:rPr lang="en-US" sz="1800" kern="1200" dirty="0"/>
+            <a:rPr lang="en-US" sz="1600" kern="1200" dirty="0"/>
             <a:t>user page(folder not component)</a:t>
           </a:r>
         </a:p>
       </dsp:txBody>
       <dsp:txXfrm>
-        <a:off x="7564235" y="3479899"/>
-        <a:ext cx="2861952" cy="966221"/>
+        <a:off x="6695156" y="3479899"/>
+        <a:ext cx="2523763" cy="966221"/>
       </dsp:txXfrm>
     </dsp:sp>
     <dsp:sp modelId="{64163F0C-6137-4F5F-8FBA-F49EB42C859C}">
@@ -2995,8 +3057,8 @@
       </dsp:nvSpPr>
       <dsp:spPr>
         <a:xfrm>
-          <a:off x="7534174" y="4598990"/>
-          <a:ext cx="1445855" cy="1026343"/>
+          <a:off x="6665095" y="4598990"/>
+          <a:ext cx="1278518" cy="1026343"/>
         </a:xfrm>
         <a:prstGeom prst="roundRect">
           <a:avLst>
@@ -3068,12 +3130,12 @@
         </a:fontRef>
       </dsp:style>
       <dsp:txBody>
-        <a:bodyPr spcFirstLastPara="0" vert="horz" wrap="square" lIns="68580" tIns="68580" rIns="68580" bIns="68580" numCol="1" spcCol="1270" anchor="ctr" anchorCtr="0">
+        <a:bodyPr spcFirstLastPara="0" vert="horz" wrap="square" lIns="60960" tIns="60960" rIns="60960" bIns="60960" numCol="1" spcCol="1270" anchor="ctr" anchorCtr="0">
           <a:noAutofit/>
         </a:bodyPr>
         <a:lstStyle/>
         <a:p>
-          <a:pPr marL="0" lvl="0" indent="0" algn="ctr" defTabSz="800100">
+          <a:pPr marL="0" lvl="0" indent="0" algn="ctr" defTabSz="711200">
             <a:lnSpc>
               <a:spcPct val="90000"/>
             </a:lnSpc>
@@ -3086,14 +3148,14 @@
             <a:buNone/>
           </a:pPr>
           <a:r>
-            <a:rPr lang="en-US" sz="1800" kern="1200" dirty="0"/>
+            <a:rPr lang="en-US" sz="1600" kern="1200" dirty="0"/>
             <a:t>user data</a:t>
           </a:r>
         </a:p>
       </dsp:txBody>
       <dsp:txXfrm>
-        <a:off x="7564235" y="4629051"/>
-        <a:ext cx="1385733" cy="966221"/>
+        <a:off x="6695156" y="4629051"/>
+        <a:ext cx="1218396" cy="966221"/>
       </dsp:txXfrm>
     </dsp:sp>
     <dsp:sp modelId="{A2AAC64F-2015-48FE-B293-A2723DB08E61}">
@@ -3103,8 +3165,8 @@
       </dsp:nvSpPr>
       <dsp:spPr>
         <a:xfrm>
-          <a:off x="9010393" y="4598990"/>
-          <a:ext cx="1445855" cy="1026343"/>
+          <a:off x="7970462" y="4598990"/>
+          <a:ext cx="1278518" cy="1026343"/>
         </a:xfrm>
         <a:prstGeom prst="roundRect">
           <a:avLst>
@@ -3176,12 +3238,12 @@
         </a:fontRef>
       </dsp:style>
       <dsp:txBody>
-        <a:bodyPr spcFirstLastPara="0" vert="horz" wrap="square" lIns="68580" tIns="68580" rIns="68580" bIns="68580" numCol="1" spcCol="1270" anchor="ctr" anchorCtr="0">
+        <a:bodyPr spcFirstLastPara="0" vert="horz" wrap="square" lIns="60960" tIns="60960" rIns="60960" bIns="60960" numCol="1" spcCol="1270" anchor="ctr" anchorCtr="0">
           <a:noAutofit/>
         </a:bodyPr>
         <a:lstStyle/>
         <a:p>
-          <a:pPr marL="0" lvl="0" indent="0" algn="ctr" defTabSz="800100">
+          <a:pPr marL="0" lvl="0" indent="0" algn="ctr" defTabSz="711200">
             <a:lnSpc>
               <a:spcPct val="90000"/>
             </a:lnSpc>
@@ -3194,14 +3256,14 @@
             <a:buNone/>
           </a:pPr>
           <a:r>
-            <a:rPr lang="en-US" sz="1800" kern="1200" dirty="0"/>
+            <a:rPr lang="en-US" sz="1600" kern="1200" dirty="0"/>
             <a:t>edit user data</a:t>
           </a:r>
         </a:p>
       </dsp:txBody>
       <dsp:txXfrm>
-        <a:off x="9040454" y="4629051"/>
-        <a:ext cx="1385733" cy="966221"/>
+        <a:off x="8000523" y="4629051"/>
+        <a:ext cx="1218396" cy="966221"/>
       </dsp:txXfrm>
     </dsp:sp>
     <dsp:sp modelId="{840D6405-DD4E-42D2-B9DC-845ADB07767F}">
@@ -3211,8 +3273,8 @@
       </dsp:nvSpPr>
       <dsp:spPr>
         <a:xfrm>
-          <a:off x="10577701" y="1151534"/>
-          <a:ext cx="1445855" cy="1026343"/>
+          <a:off x="9356375" y="1151534"/>
+          <a:ext cx="1278518" cy="1026343"/>
         </a:xfrm>
         <a:prstGeom prst="roundRect">
           <a:avLst>
@@ -3284,12 +3346,12 @@
         </a:fontRef>
       </dsp:style>
       <dsp:txBody>
-        <a:bodyPr spcFirstLastPara="0" vert="horz" wrap="square" lIns="72390" tIns="72390" rIns="72390" bIns="72390" numCol="1" spcCol="1270" anchor="ctr" anchorCtr="0">
+        <a:bodyPr spcFirstLastPara="0" vert="horz" wrap="square" lIns="60960" tIns="60960" rIns="60960" bIns="60960" numCol="1" spcCol="1270" anchor="ctr" anchorCtr="0">
           <a:noAutofit/>
         </a:bodyPr>
         <a:lstStyle/>
         <a:p>
-          <a:pPr marL="0" lvl="0" indent="0" algn="ctr" defTabSz="844550">
+          <a:pPr marL="0" lvl="0" indent="0" algn="ctr" defTabSz="711200">
             <a:lnSpc>
               <a:spcPct val="90000"/>
             </a:lnSpc>
@@ -3302,14 +3364,122 @@
             <a:buNone/>
           </a:pPr>
           <a:r>
-            <a:rPr lang="en-US" sz="1900" kern="1200" dirty="0"/>
+            <a:rPr lang="en-US" sz="1600" kern="1200" dirty="0"/>
             <a:t>side-menu ul &gt; always here</a:t>
           </a:r>
         </a:p>
       </dsp:txBody>
       <dsp:txXfrm>
-        <a:off x="10607762" y="1181595"/>
-        <a:ext cx="1385733" cy="966221"/>
+        <a:off x="9386436" y="1181595"/>
+        <a:ext cx="1218396" cy="966221"/>
+      </dsp:txXfrm>
+    </dsp:sp>
+    <dsp:sp modelId="{DFC3654B-F5D7-484F-A30A-0F54F4F189B0}">
+      <dsp:nvSpPr>
+        <dsp:cNvPr id="0" name=""/>
+        <dsp:cNvSpPr/>
+      </dsp:nvSpPr>
+      <dsp:spPr>
+        <a:xfrm>
+          <a:off x="10742289" y="1151534"/>
+          <a:ext cx="1278518" cy="1026343"/>
+        </a:xfrm>
+        <a:prstGeom prst="roundRect">
+          <a:avLst>
+            <a:gd name="adj" fmla="val 10000"/>
+          </a:avLst>
+        </a:prstGeom>
+        <a:gradFill rotWithShape="0">
+          <a:gsLst>
+            <a:gs pos="0">
+              <a:schemeClr val="accent1">
+                <a:hueOff val="0"/>
+                <a:satOff val="0"/>
+                <a:lumOff val="0"/>
+                <a:alphaOff val="0"/>
+                <a:tint val="70000"/>
+                <a:satMod val="100000"/>
+                <a:lumMod val="110000"/>
+              </a:schemeClr>
+            </a:gs>
+            <a:gs pos="50000">
+              <a:schemeClr val="accent1">
+                <a:hueOff val="0"/>
+                <a:satOff val="0"/>
+                <a:lumOff val="0"/>
+                <a:alphaOff val="0"/>
+                <a:tint val="75000"/>
+                <a:satMod val="101000"/>
+                <a:lumMod val="105000"/>
+              </a:schemeClr>
+            </a:gs>
+            <a:gs pos="100000">
+              <a:schemeClr val="accent1">
+                <a:hueOff val="0"/>
+                <a:satOff val="0"/>
+                <a:lumOff val="0"/>
+                <a:alphaOff val="0"/>
+                <a:tint val="82000"/>
+                <a:satMod val="104000"/>
+                <a:lumMod val="105000"/>
+              </a:schemeClr>
+            </a:gs>
+          </a:gsLst>
+          <a:lin ang="2700000" scaled="0"/>
+        </a:gradFill>
+        <a:ln>
+          <a:noFill/>
+        </a:ln>
+        <a:effectLst/>
+        <a:scene3d>
+          <a:camera prst="orthographicFront"/>
+          <a:lightRig rig="flat" dir="t"/>
+        </a:scene3d>
+        <a:sp3d prstMaterial="dkEdge">
+          <a:bevelT w="8200" h="38100"/>
+        </a:sp3d>
+      </dsp:spPr>
+      <dsp:style>
+        <a:lnRef idx="0">
+          <a:scrgbClr r="0" g="0" b="0"/>
+        </a:lnRef>
+        <a:fillRef idx="2">
+          <a:scrgbClr r="0" g="0" b="0"/>
+        </a:fillRef>
+        <a:effectRef idx="1">
+          <a:scrgbClr r="0" g="0" b="0"/>
+        </a:effectRef>
+        <a:fontRef idx="minor">
+          <a:schemeClr val="dk1"/>
+        </a:fontRef>
+      </dsp:style>
+      <dsp:txBody>
+        <a:bodyPr spcFirstLastPara="0" vert="horz" wrap="square" lIns="60960" tIns="60960" rIns="60960" bIns="60960" numCol="1" spcCol="1270" anchor="ctr" anchorCtr="0">
+          <a:noAutofit/>
+        </a:bodyPr>
+        <a:lstStyle/>
+        <a:p>
+          <a:pPr marL="0" lvl="0" indent="0" algn="ctr" defTabSz="711200">
+            <a:lnSpc>
+              <a:spcPct val="90000"/>
+            </a:lnSpc>
+            <a:spcBef>
+              <a:spcPct val="0"/>
+            </a:spcBef>
+            <a:spcAft>
+              <a:spcPct val="35000"/>
+            </a:spcAft>
+            <a:buNone/>
+          </a:pPr>
+          <a:r>
+            <a:rPr lang="en-US" sz="1600" kern="1200" dirty="0"/>
+            <a:t>Map &gt; will be used in many components</a:t>
+          </a:r>
+        </a:p>
+      </dsp:txBody>
+      <dsp:txXfrm>
+        <a:off x="10772350" y="1181595"/>
+        <a:ext cx="1218396" cy="966221"/>
       </dsp:txXfrm>
     </dsp:sp>
   </dsp:spTree>
@@ -5098,7 +5268,7 @@
           <a:p>
             <a:fld id="{2F89BF03-DAF2-46FE-A32D-CE3ED500C0FE}" type="datetimeFigureOut">
               <a:rPr lang="en-US" smtClean="0"/>
-              <a:t>5/6/2020</a:t>
+              <a:t>5/7/2020</a:t>
             </a:fld>
             <a:endParaRPr lang="en-US"/>
           </a:p>
@@ -5288,7 +5458,7 @@
           <a:p>
             <a:fld id="{2F89BF03-DAF2-46FE-A32D-CE3ED500C0FE}" type="datetimeFigureOut">
               <a:rPr lang="en-US" smtClean="0"/>
-              <a:t>5/6/2020</a:t>
+              <a:t>5/7/2020</a:t>
             </a:fld>
             <a:endParaRPr lang="en-US"/>
           </a:p>
@@ -5468,7 +5638,7 @@
           <a:p>
             <a:fld id="{2F89BF03-DAF2-46FE-A32D-CE3ED500C0FE}" type="datetimeFigureOut">
               <a:rPr lang="en-US" smtClean="0"/>
-              <a:t>5/6/2020</a:t>
+              <a:t>5/7/2020</a:t>
             </a:fld>
             <a:endParaRPr lang="en-US"/>
           </a:p>
@@ -5638,7 +5808,7 @@
           <a:p>
             <a:fld id="{2F89BF03-DAF2-46FE-A32D-CE3ED500C0FE}" type="datetimeFigureOut">
               <a:rPr lang="en-US" smtClean="0"/>
-              <a:t>5/6/2020</a:t>
+              <a:t>5/7/2020</a:t>
             </a:fld>
             <a:endParaRPr lang="en-US"/>
           </a:p>
@@ -5894,7 +6064,7 @@
           <a:p>
             <a:fld id="{2F89BF03-DAF2-46FE-A32D-CE3ED500C0FE}" type="datetimeFigureOut">
               <a:rPr lang="en-US" smtClean="0"/>
-              <a:t>5/6/2020</a:t>
+              <a:t>5/7/2020</a:t>
             </a:fld>
             <a:endParaRPr lang="en-US"/>
           </a:p>
@@ -6182,7 +6352,7 @@
           <a:p>
             <a:fld id="{2F89BF03-DAF2-46FE-A32D-CE3ED500C0FE}" type="datetimeFigureOut">
               <a:rPr lang="en-US" smtClean="0"/>
-              <a:t>5/6/2020</a:t>
+              <a:t>5/7/2020</a:t>
             </a:fld>
             <a:endParaRPr lang="en-US"/>
           </a:p>
@@ -6620,7 +6790,7 @@
           <a:p>
             <a:fld id="{2F89BF03-DAF2-46FE-A32D-CE3ED500C0FE}" type="datetimeFigureOut">
               <a:rPr lang="en-US" smtClean="0"/>
-              <a:t>5/6/2020</a:t>
+              <a:t>5/7/2020</a:t>
             </a:fld>
             <a:endParaRPr lang="en-US"/>
           </a:p>
@@ -6738,7 +6908,7 @@
           <a:p>
             <a:fld id="{2F89BF03-DAF2-46FE-A32D-CE3ED500C0FE}" type="datetimeFigureOut">
               <a:rPr lang="en-US" smtClean="0"/>
-              <a:t>5/6/2020</a:t>
+              <a:t>5/7/2020</a:t>
             </a:fld>
             <a:endParaRPr lang="en-US"/>
           </a:p>
@@ -6833,7 +7003,7 @@
           <a:p>
             <a:fld id="{2F89BF03-DAF2-46FE-A32D-CE3ED500C0FE}" type="datetimeFigureOut">
               <a:rPr lang="en-US" smtClean="0"/>
-              <a:t>5/6/2020</a:t>
+              <a:t>5/7/2020</a:t>
             </a:fld>
             <a:endParaRPr lang="en-US"/>
           </a:p>
@@ -7189,7 +7359,7 @@
           <a:p>
             <a:fld id="{2F89BF03-DAF2-46FE-A32D-CE3ED500C0FE}" type="datetimeFigureOut">
               <a:rPr lang="en-US" smtClean="0"/>
-              <a:t>5/6/2020</a:t>
+              <a:t>5/7/2020</a:t>
             </a:fld>
             <a:endParaRPr lang="en-US"/>
           </a:p>
@@ -7505,7 +7675,7 @@
           <a:p>
             <a:fld id="{2F89BF03-DAF2-46FE-A32D-CE3ED500C0FE}" type="datetimeFigureOut">
               <a:rPr lang="en-US" smtClean="0"/>
-              <a:t>5/6/2020</a:t>
+              <a:t>5/7/2020</a:t>
             </a:fld>
             <a:endParaRPr lang="en-US"/>
           </a:p>
@@ -7738,7 +7908,7 @@
           <a:p>
             <a:fld id="{2F89BF03-DAF2-46FE-A32D-CE3ED500C0FE}" type="datetimeFigureOut">
               <a:rPr lang="en-US" smtClean="0"/>
-              <a:t>5/6/2020</a:t>
+              <a:t>5/7/2020</a:t>
             </a:fld>
             <a:endParaRPr lang="en-US"/>
           </a:p>
@@ -8187,7 +8357,7 @@
           <p:nvPr>
             <p:extLst>
               <p:ext uri="{D42A27DB-BD31-4B8C-83A1-F6EECF244321}">
-                <p14:modId xmlns:p14="http://schemas.microsoft.com/office/powerpoint/2010/main" val="2341009603"/>
+                <p14:modId xmlns:p14="http://schemas.microsoft.com/office/powerpoint/2010/main" val="3454080540"/>
               </p:ext>
             </p:extLst>
           </p:nvPr>
@@ -8565,7 +8735,7 @@
         </p:nvSpPr>
         <p:spPr>
           <a:xfrm>
-            <a:off x="9353741" y="3715788"/>
+            <a:off x="8808054" y="3528751"/>
             <a:ext cx="224443" cy="191193"/>
           </a:xfrm>
           <a:prstGeom prst="rect">
@@ -8725,7 +8895,7 @@
         </p:nvSpPr>
         <p:spPr>
           <a:xfrm>
-            <a:off x="11759737" y="2226423"/>
+            <a:off x="10255490" y="2226423"/>
             <a:ext cx="224443" cy="191193"/>
           </a:xfrm>
           <a:prstGeom prst="rect">
@@ -8777,7 +8947,61 @@
         </p:nvSpPr>
         <p:spPr>
           <a:xfrm>
-            <a:off x="4321232" y="3333403"/>
+            <a:off x="3628966" y="3524596"/>
+            <a:ext cx="224443" cy="191193"/>
+          </a:xfrm>
+          <a:prstGeom prst="rect">
+            <a:avLst/>
+          </a:prstGeom>
+          <a:solidFill>
+            <a:schemeClr val="accent3">
+              <a:lumMod val="50000"/>
+            </a:schemeClr>
+          </a:solidFill>
+          <a:ln>
+            <a:noFill/>
+          </a:ln>
+        </p:spPr>
+        <p:style>
+          <a:lnRef idx="2">
+            <a:schemeClr val="accent4">
+              <a:shade val="50000"/>
+            </a:schemeClr>
+          </a:lnRef>
+          <a:fillRef idx="1">
+            <a:schemeClr val="accent4"/>
+          </a:fillRef>
+          <a:effectRef idx="0">
+            <a:schemeClr val="accent4"/>
+          </a:effectRef>
+          <a:fontRef idx="minor">
+            <a:schemeClr val="lt1"/>
+          </a:fontRef>
+        </p:style>
+        <p:txBody>
+          <a:bodyPr rtlCol="0" anchor="ctr"/>
+          <a:lstStyle/>
+          <a:p>
+            <a:pPr algn="ctr"/>
+            <a:endParaRPr lang="en-US"/>
+          </a:p>
+        </p:txBody>
+      </p:sp>
+      <p:sp>
+        <p:nvSpPr>
+          <p:cNvPr id="18" name="Rectangle 17">
+            <a:extLst>
+              <a:ext uri="{FF2B5EF4-FFF2-40B4-BE49-F238E27FC236}">
+                <a16:creationId xmlns:a16="http://schemas.microsoft.com/office/drawing/2014/main" id="{13FF587A-C3D7-417D-8FA8-7F93837615DA}"/>
+              </a:ext>
+            </a:extLst>
+          </p:cNvPr>
+          <p:cNvSpPr/>
+          <p:nvPr/>
+        </p:nvSpPr>
+        <p:spPr>
+          <a:xfrm>
+            <a:off x="11745034" y="2235486"/>
             <a:ext cx="224443" cy="191193"/>
           </a:xfrm>
           <a:prstGeom prst="rect">

</xml_diff>

<commit_message>
changes to menu names
</commit_message>
<xml_diff>
--- a/project-structure.pptx
+++ b/project-structure.pptx
@@ -6,6 +6,7 @@
   </p:sldMasterIdLst>
   <p:sldIdLst>
     <p:sldId id="256" r:id="rId2"/>
+    <p:sldId id="257" r:id="rId3"/>
   </p:sldIdLst>
   <p:sldSz cx="12192000" cy="6858000"/>
   <p:notesSz cx="6858000" cy="9144000"/>
@@ -859,6 +860,881 @@
 </dgm:colorsDef>
 </file>
 
+<file path=ppt/diagrams/colors2.xml><?xml version="1.0" encoding="utf-8"?>
+<dgm:colorsDef xmlns:dgm="http://schemas.openxmlformats.org/drawingml/2006/diagram" xmlns:a="http://schemas.openxmlformats.org/drawingml/2006/main" uniqueId="urn:microsoft.com/office/officeart/2005/8/colors/accent3_3">
+  <dgm:title val=""/>
+  <dgm:desc val=""/>
+  <dgm:catLst>
+    <dgm:cat type="accent3" pri="11300"/>
+  </dgm:catLst>
+  <dgm:styleLbl name="node0">
+    <dgm:fillClrLst meth="repeat">
+      <a:schemeClr val="accent3">
+        <a:shade val="80000"/>
+      </a:schemeClr>
+    </dgm:fillClrLst>
+    <dgm:linClrLst meth="repeat">
+      <a:schemeClr val="lt1"/>
+    </dgm:linClrLst>
+    <dgm:effectClrLst/>
+    <dgm:txLinClrLst/>
+    <dgm:txFillClrLst/>
+    <dgm:txEffectClrLst/>
+  </dgm:styleLbl>
+  <dgm:styleLbl name="node1">
+    <dgm:fillClrLst>
+      <a:schemeClr val="accent3">
+        <a:shade val="80000"/>
+      </a:schemeClr>
+      <a:schemeClr val="accent3">
+        <a:tint val="70000"/>
+      </a:schemeClr>
+    </dgm:fillClrLst>
+    <dgm:linClrLst meth="repeat">
+      <a:schemeClr val="lt1"/>
+    </dgm:linClrLst>
+    <dgm:effectClrLst/>
+    <dgm:txLinClrLst/>
+    <dgm:txFillClrLst/>
+    <dgm:txEffectClrLst/>
+  </dgm:styleLbl>
+  <dgm:styleLbl name="alignNode1">
+    <dgm:fillClrLst>
+      <a:schemeClr val="accent3">
+        <a:shade val="80000"/>
+      </a:schemeClr>
+      <a:schemeClr val="accent3">
+        <a:tint val="70000"/>
+      </a:schemeClr>
+    </dgm:fillClrLst>
+    <dgm:linClrLst>
+      <a:schemeClr val="accent3">
+        <a:shade val="80000"/>
+      </a:schemeClr>
+      <a:schemeClr val="accent3">
+        <a:tint val="70000"/>
+      </a:schemeClr>
+    </dgm:linClrLst>
+    <dgm:effectClrLst/>
+    <dgm:txLinClrLst/>
+    <dgm:txFillClrLst/>
+    <dgm:txEffectClrLst/>
+  </dgm:styleLbl>
+  <dgm:styleLbl name="lnNode1">
+    <dgm:fillClrLst>
+      <a:schemeClr val="accent3">
+        <a:shade val="80000"/>
+      </a:schemeClr>
+      <a:schemeClr val="accent3">
+        <a:tint val="70000"/>
+      </a:schemeClr>
+    </dgm:fillClrLst>
+    <dgm:linClrLst meth="repeat">
+      <a:schemeClr val="lt1"/>
+    </dgm:linClrLst>
+    <dgm:effectClrLst/>
+    <dgm:txLinClrLst/>
+    <dgm:txFillClrLst/>
+    <dgm:txEffectClrLst/>
+  </dgm:styleLbl>
+  <dgm:styleLbl name="vennNode1">
+    <dgm:fillClrLst>
+      <a:schemeClr val="accent3">
+        <a:shade val="80000"/>
+        <a:alpha val="50000"/>
+      </a:schemeClr>
+      <a:schemeClr val="accent3">
+        <a:tint val="70000"/>
+        <a:alpha val="50000"/>
+      </a:schemeClr>
+    </dgm:fillClrLst>
+    <dgm:linClrLst meth="repeat">
+      <a:schemeClr val="lt1"/>
+    </dgm:linClrLst>
+    <dgm:effectClrLst/>
+    <dgm:txLinClrLst/>
+    <dgm:txFillClrLst/>
+    <dgm:txEffectClrLst/>
+  </dgm:styleLbl>
+  <dgm:styleLbl name="node2">
+    <dgm:fillClrLst>
+      <a:schemeClr val="accent3">
+        <a:tint val="99000"/>
+      </a:schemeClr>
+    </dgm:fillClrLst>
+    <dgm:linClrLst meth="repeat">
+      <a:schemeClr val="lt1"/>
+    </dgm:linClrLst>
+    <dgm:effectClrLst/>
+    <dgm:txLinClrLst/>
+    <dgm:txFillClrLst/>
+    <dgm:txEffectClrLst/>
+  </dgm:styleLbl>
+  <dgm:styleLbl name="node3">
+    <dgm:fillClrLst>
+      <a:schemeClr val="accent3">
+        <a:tint val="80000"/>
+      </a:schemeClr>
+    </dgm:fillClrLst>
+    <dgm:linClrLst meth="repeat">
+      <a:schemeClr val="lt1"/>
+    </dgm:linClrLst>
+    <dgm:effectClrLst/>
+    <dgm:txLinClrLst/>
+    <dgm:txFillClrLst/>
+    <dgm:txEffectClrLst/>
+  </dgm:styleLbl>
+  <dgm:styleLbl name="node4">
+    <dgm:fillClrLst>
+      <a:schemeClr val="accent3">
+        <a:tint val="70000"/>
+      </a:schemeClr>
+    </dgm:fillClrLst>
+    <dgm:linClrLst meth="repeat">
+      <a:schemeClr val="lt1"/>
+    </dgm:linClrLst>
+    <dgm:effectClrLst/>
+    <dgm:txLinClrLst/>
+    <dgm:txFillClrLst/>
+    <dgm:txEffectClrLst/>
+  </dgm:styleLbl>
+  <dgm:styleLbl name="fgImgPlace1">
+    <dgm:fillClrLst>
+      <a:schemeClr val="accent3">
+        <a:tint val="50000"/>
+      </a:schemeClr>
+      <a:schemeClr val="accent3">
+        <a:tint val="20000"/>
+      </a:schemeClr>
+    </dgm:fillClrLst>
+    <dgm:linClrLst meth="repeat">
+      <a:schemeClr val="lt1"/>
+    </dgm:linClrLst>
+    <dgm:effectClrLst/>
+    <dgm:txLinClrLst/>
+    <dgm:txFillClrLst meth="repeat">
+      <a:schemeClr val="lt1"/>
+    </dgm:txFillClrLst>
+    <dgm:txEffectClrLst/>
+  </dgm:styleLbl>
+  <dgm:styleLbl name="alignImgPlace1">
+    <dgm:fillClrLst>
+      <a:schemeClr val="accent3">
+        <a:tint val="50000"/>
+      </a:schemeClr>
+      <a:schemeClr val="accent3">
+        <a:tint val="20000"/>
+      </a:schemeClr>
+    </dgm:fillClrLst>
+    <dgm:linClrLst meth="repeat">
+      <a:schemeClr val="lt1"/>
+    </dgm:linClrLst>
+    <dgm:effectClrLst/>
+    <dgm:txLinClrLst/>
+    <dgm:txFillClrLst meth="repeat">
+      <a:schemeClr val="lt1"/>
+    </dgm:txFillClrLst>
+    <dgm:txEffectClrLst/>
+  </dgm:styleLbl>
+  <dgm:styleLbl name="bgImgPlace1">
+    <dgm:fillClrLst>
+      <a:schemeClr val="accent3">
+        <a:tint val="50000"/>
+      </a:schemeClr>
+      <a:schemeClr val="accent3">
+        <a:tint val="20000"/>
+      </a:schemeClr>
+    </dgm:fillClrLst>
+    <dgm:linClrLst meth="repeat">
+      <a:schemeClr val="lt1"/>
+    </dgm:linClrLst>
+    <dgm:effectClrLst/>
+    <dgm:txLinClrLst/>
+    <dgm:txFillClrLst meth="repeat">
+      <a:schemeClr val="lt1"/>
+    </dgm:txFillClrLst>
+    <dgm:txEffectClrLst/>
+  </dgm:styleLbl>
+  <dgm:styleLbl name="sibTrans2D1">
+    <dgm:fillClrLst>
+      <a:schemeClr val="accent3">
+        <a:shade val="90000"/>
+      </a:schemeClr>
+      <a:schemeClr val="accent3">
+        <a:tint val="70000"/>
+      </a:schemeClr>
+    </dgm:fillClrLst>
+    <dgm:linClrLst>
+      <a:schemeClr val="accent3">
+        <a:shade val="90000"/>
+      </a:schemeClr>
+      <a:schemeClr val="accent3">
+        <a:tint val="70000"/>
+      </a:schemeClr>
+    </dgm:linClrLst>
+    <dgm:effectClrLst/>
+    <dgm:txLinClrLst/>
+    <dgm:txFillClrLst/>
+    <dgm:txEffectClrLst/>
+  </dgm:styleLbl>
+  <dgm:styleLbl name="fgSibTrans2D1">
+    <dgm:fillClrLst>
+      <a:schemeClr val="accent3">
+        <a:shade val="90000"/>
+      </a:schemeClr>
+      <a:schemeClr val="accent3">
+        <a:tint val="70000"/>
+      </a:schemeClr>
+    </dgm:fillClrLst>
+    <dgm:linClrLst>
+      <a:schemeClr val="accent3">
+        <a:shade val="90000"/>
+      </a:schemeClr>
+      <a:schemeClr val="accent3">
+        <a:tint val="70000"/>
+      </a:schemeClr>
+    </dgm:linClrLst>
+    <dgm:effectClrLst/>
+    <dgm:txLinClrLst/>
+    <dgm:txFillClrLst meth="repeat">
+      <a:schemeClr val="lt1"/>
+    </dgm:txFillClrLst>
+    <dgm:txEffectClrLst/>
+  </dgm:styleLbl>
+  <dgm:styleLbl name="bgSibTrans2D1">
+    <dgm:fillClrLst>
+      <a:schemeClr val="accent3">
+        <a:shade val="90000"/>
+      </a:schemeClr>
+      <a:schemeClr val="accent3">
+        <a:tint val="70000"/>
+      </a:schemeClr>
+    </dgm:fillClrLst>
+    <dgm:linClrLst>
+      <a:schemeClr val="accent3">
+        <a:shade val="90000"/>
+      </a:schemeClr>
+      <a:schemeClr val="accent3">
+        <a:tint val="70000"/>
+      </a:schemeClr>
+    </dgm:linClrLst>
+    <dgm:effectClrLst/>
+    <dgm:txLinClrLst/>
+    <dgm:txFillClrLst meth="repeat">
+      <a:schemeClr val="lt1"/>
+    </dgm:txFillClrLst>
+    <dgm:txEffectClrLst/>
+  </dgm:styleLbl>
+  <dgm:styleLbl name="sibTrans1D1">
+    <dgm:fillClrLst>
+      <a:schemeClr val="accent3">
+        <a:shade val="90000"/>
+      </a:schemeClr>
+      <a:schemeClr val="accent3">
+        <a:tint val="70000"/>
+      </a:schemeClr>
+    </dgm:fillClrLst>
+    <dgm:linClrLst>
+      <a:schemeClr val="accent3">
+        <a:shade val="90000"/>
+      </a:schemeClr>
+      <a:schemeClr val="accent3">
+        <a:tint val="70000"/>
+      </a:schemeClr>
+    </dgm:linClrLst>
+    <dgm:effectClrLst/>
+    <dgm:txLinClrLst/>
+    <dgm:txFillClrLst meth="repeat">
+      <a:schemeClr val="tx1"/>
+    </dgm:txFillClrLst>
+    <dgm:txEffectClrLst/>
+  </dgm:styleLbl>
+  <dgm:styleLbl name="callout">
+    <dgm:fillClrLst meth="repeat">
+      <a:schemeClr val="accent3"/>
+    </dgm:fillClrLst>
+    <dgm:linClrLst meth="repeat">
+      <a:schemeClr val="accent3"/>
+    </dgm:linClrLst>
+    <dgm:effectClrLst/>
+    <dgm:txLinClrLst/>
+    <dgm:txFillClrLst meth="repeat">
+      <a:schemeClr val="tx1"/>
+    </dgm:txFillClrLst>
+    <dgm:txEffectClrLst/>
+  </dgm:styleLbl>
+  <dgm:styleLbl name="asst0">
+    <dgm:fillClrLst meth="repeat">
+      <a:schemeClr val="accent3">
+        <a:shade val="80000"/>
+      </a:schemeClr>
+    </dgm:fillClrLst>
+    <dgm:linClrLst meth="repeat">
+      <a:schemeClr val="lt1"/>
+    </dgm:linClrLst>
+    <dgm:effectClrLst/>
+    <dgm:txLinClrLst/>
+    <dgm:txFillClrLst/>
+    <dgm:txEffectClrLst/>
+  </dgm:styleLbl>
+  <dgm:styleLbl name="asst1">
+    <dgm:fillClrLst meth="repeat">
+      <a:schemeClr val="accent3">
+        <a:shade val="80000"/>
+      </a:schemeClr>
+    </dgm:fillClrLst>
+    <dgm:linClrLst meth="repeat">
+      <a:schemeClr val="lt1"/>
+    </dgm:linClrLst>
+    <dgm:effectClrLst/>
+    <dgm:txLinClrLst/>
+    <dgm:txFillClrLst/>
+    <dgm:txEffectClrLst/>
+  </dgm:styleLbl>
+  <dgm:styleLbl name="asst2">
+    <dgm:fillClrLst>
+      <a:schemeClr val="accent3">
+        <a:tint val="99000"/>
+      </a:schemeClr>
+    </dgm:fillClrLst>
+    <dgm:linClrLst meth="repeat">
+      <a:schemeClr val="lt1"/>
+    </dgm:linClrLst>
+    <dgm:effectClrLst/>
+    <dgm:txLinClrLst/>
+    <dgm:txFillClrLst/>
+    <dgm:txEffectClrLst/>
+  </dgm:styleLbl>
+  <dgm:styleLbl name="asst3">
+    <dgm:fillClrLst>
+      <a:schemeClr val="accent3">
+        <a:tint val="80000"/>
+      </a:schemeClr>
+    </dgm:fillClrLst>
+    <dgm:linClrLst meth="repeat">
+      <a:schemeClr val="lt1"/>
+    </dgm:linClrLst>
+    <dgm:effectClrLst/>
+    <dgm:txLinClrLst/>
+    <dgm:txFillClrLst/>
+    <dgm:txEffectClrLst/>
+  </dgm:styleLbl>
+  <dgm:styleLbl name="asst4">
+    <dgm:fillClrLst>
+      <a:schemeClr val="accent3">
+        <a:tint val="70000"/>
+      </a:schemeClr>
+    </dgm:fillClrLst>
+    <dgm:linClrLst meth="repeat">
+      <a:schemeClr val="lt1"/>
+    </dgm:linClrLst>
+    <dgm:effectClrLst/>
+    <dgm:txLinClrLst/>
+    <dgm:txFillClrLst/>
+    <dgm:txEffectClrLst/>
+  </dgm:styleLbl>
+  <dgm:styleLbl name="parChTrans2D1">
+    <dgm:fillClrLst meth="repeat">
+      <a:schemeClr val="accent3">
+        <a:tint val="60000"/>
+      </a:schemeClr>
+    </dgm:fillClrLst>
+    <dgm:linClrLst meth="repeat">
+      <a:schemeClr val="accent3">
+        <a:tint val="60000"/>
+      </a:schemeClr>
+    </dgm:linClrLst>
+    <dgm:effectClrLst/>
+    <dgm:txLinClrLst/>
+    <dgm:txFillClrLst meth="repeat">
+      <a:schemeClr val="lt1"/>
+    </dgm:txFillClrLst>
+    <dgm:txEffectClrLst/>
+  </dgm:styleLbl>
+  <dgm:styleLbl name="parChTrans2D2">
+    <dgm:fillClrLst meth="repeat">
+      <a:schemeClr val="accent3">
+        <a:tint val="90000"/>
+      </a:schemeClr>
+    </dgm:fillClrLst>
+    <dgm:linClrLst meth="repeat">
+      <a:schemeClr val="accent3">
+        <a:tint val="90000"/>
+      </a:schemeClr>
+    </dgm:linClrLst>
+    <dgm:effectClrLst/>
+    <dgm:txLinClrLst/>
+    <dgm:txFillClrLst/>
+    <dgm:txEffectClrLst/>
+  </dgm:styleLbl>
+  <dgm:styleLbl name="parChTrans2D3">
+    <dgm:fillClrLst meth="repeat">
+      <a:schemeClr val="accent3">
+        <a:tint val="70000"/>
+      </a:schemeClr>
+    </dgm:fillClrLst>
+    <dgm:linClrLst meth="repeat">
+      <a:schemeClr val="accent3">
+        <a:tint val="70000"/>
+      </a:schemeClr>
+    </dgm:linClrLst>
+    <dgm:effectClrLst/>
+    <dgm:txLinClrLst/>
+    <dgm:txFillClrLst/>
+    <dgm:txEffectClrLst/>
+  </dgm:styleLbl>
+  <dgm:styleLbl name="parChTrans2D4">
+    <dgm:fillClrLst meth="repeat">
+      <a:schemeClr val="accent3">
+        <a:tint val="50000"/>
+      </a:schemeClr>
+    </dgm:fillClrLst>
+    <dgm:linClrLst meth="repeat">
+      <a:schemeClr val="accent3">
+        <a:tint val="50000"/>
+      </a:schemeClr>
+    </dgm:linClrLst>
+    <dgm:effectClrLst/>
+    <dgm:txLinClrLst/>
+    <dgm:txFillClrLst meth="repeat">
+      <a:schemeClr val="lt1"/>
+    </dgm:txFillClrLst>
+    <dgm:txEffectClrLst/>
+  </dgm:styleLbl>
+  <dgm:styleLbl name="parChTrans1D1">
+    <dgm:fillClrLst meth="repeat">
+      <a:schemeClr val="accent3">
+        <a:shade val="80000"/>
+      </a:schemeClr>
+    </dgm:fillClrLst>
+    <dgm:linClrLst meth="repeat">
+      <a:schemeClr val="accent3">
+        <a:shade val="80000"/>
+      </a:schemeClr>
+    </dgm:linClrLst>
+    <dgm:effectClrLst/>
+    <dgm:txLinClrLst/>
+    <dgm:txFillClrLst meth="repeat">
+      <a:schemeClr val="tx1"/>
+    </dgm:txFillClrLst>
+    <dgm:txEffectClrLst/>
+  </dgm:styleLbl>
+  <dgm:styleLbl name="parChTrans1D2">
+    <dgm:fillClrLst meth="repeat">
+      <a:schemeClr val="accent3">
+        <a:tint val="99000"/>
+      </a:schemeClr>
+    </dgm:fillClrLst>
+    <dgm:linClrLst meth="repeat">
+      <a:schemeClr val="accent3">
+        <a:tint val="99000"/>
+      </a:schemeClr>
+    </dgm:linClrLst>
+    <dgm:effectClrLst/>
+    <dgm:txLinClrLst/>
+    <dgm:txFillClrLst meth="repeat">
+      <a:schemeClr val="tx1"/>
+    </dgm:txFillClrLst>
+    <dgm:txEffectClrLst/>
+  </dgm:styleLbl>
+  <dgm:styleLbl name="parChTrans1D3">
+    <dgm:fillClrLst meth="repeat">
+      <a:schemeClr val="accent3">
+        <a:tint val="80000"/>
+      </a:schemeClr>
+    </dgm:fillClrLst>
+    <dgm:linClrLst meth="repeat">
+      <a:schemeClr val="accent3">
+        <a:tint val="80000"/>
+      </a:schemeClr>
+    </dgm:linClrLst>
+    <dgm:effectClrLst/>
+    <dgm:txLinClrLst/>
+    <dgm:txFillClrLst meth="repeat">
+      <a:schemeClr val="tx1"/>
+    </dgm:txFillClrLst>
+    <dgm:txEffectClrLst/>
+  </dgm:styleLbl>
+  <dgm:styleLbl name="parChTrans1D4">
+    <dgm:fillClrLst meth="repeat">
+      <a:schemeClr val="accent3">
+        <a:tint val="70000"/>
+      </a:schemeClr>
+    </dgm:fillClrLst>
+    <dgm:linClrLst meth="repeat">
+      <a:schemeClr val="accent3">
+        <a:tint val="70000"/>
+      </a:schemeClr>
+    </dgm:linClrLst>
+    <dgm:effectClrLst/>
+    <dgm:txLinClrLst/>
+    <dgm:txFillClrLst meth="repeat">
+      <a:schemeClr val="tx1"/>
+    </dgm:txFillClrLst>
+    <dgm:txEffectClrLst/>
+  </dgm:styleLbl>
+  <dgm:styleLbl name="fgAcc1">
+    <dgm:fillClrLst meth="repeat">
+      <a:schemeClr val="lt1">
+        <a:alpha val="90000"/>
+      </a:schemeClr>
+    </dgm:fillClrLst>
+    <dgm:linClrLst>
+      <a:schemeClr val="accent3">
+        <a:shade val="80000"/>
+      </a:schemeClr>
+      <a:schemeClr val="accent3">
+        <a:tint val="70000"/>
+      </a:schemeClr>
+    </dgm:linClrLst>
+    <dgm:effectClrLst/>
+    <dgm:txLinClrLst/>
+    <dgm:txFillClrLst meth="repeat">
+      <a:schemeClr val="dk1"/>
+    </dgm:txFillClrLst>
+    <dgm:txEffectClrLst/>
+  </dgm:styleLbl>
+  <dgm:styleLbl name="conFgAcc1">
+    <dgm:fillClrLst meth="repeat">
+      <a:schemeClr val="lt1">
+        <a:alpha val="90000"/>
+      </a:schemeClr>
+    </dgm:fillClrLst>
+    <dgm:linClrLst>
+      <a:schemeClr val="accent3">
+        <a:shade val="80000"/>
+      </a:schemeClr>
+      <a:schemeClr val="accent3">
+        <a:tint val="70000"/>
+      </a:schemeClr>
+    </dgm:linClrLst>
+    <dgm:effectClrLst/>
+    <dgm:txLinClrLst/>
+    <dgm:txFillClrLst meth="repeat">
+      <a:schemeClr val="dk1"/>
+    </dgm:txFillClrLst>
+    <dgm:txEffectClrLst/>
+  </dgm:styleLbl>
+  <dgm:styleLbl name="alignAcc1">
+    <dgm:fillClrLst meth="repeat">
+      <a:schemeClr val="lt1">
+        <a:alpha val="90000"/>
+      </a:schemeClr>
+    </dgm:fillClrLst>
+    <dgm:linClrLst>
+      <a:schemeClr val="accent3">
+        <a:shade val="80000"/>
+      </a:schemeClr>
+      <a:schemeClr val="accent3">
+        <a:tint val="70000"/>
+      </a:schemeClr>
+    </dgm:linClrLst>
+    <dgm:effectClrLst/>
+    <dgm:txLinClrLst/>
+    <dgm:txFillClrLst meth="repeat">
+      <a:schemeClr val="dk1"/>
+    </dgm:txFillClrLst>
+    <dgm:txEffectClrLst/>
+  </dgm:styleLbl>
+  <dgm:styleLbl name="trAlignAcc1">
+    <dgm:fillClrLst meth="repeat">
+      <a:schemeClr val="lt1">
+        <a:alpha val="40000"/>
+      </a:schemeClr>
+    </dgm:fillClrLst>
+    <dgm:linClrLst meth="repeat">
+      <a:schemeClr val="accent3"/>
+    </dgm:linClrLst>
+    <dgm:effectClrLst/>
+    <dgm:txLinClrLst/>
+    <dgm:txFillClrLst meth="repeat">
+      <a:schemeClr val="dk1"/>
+    </dgm:txFillClrLst>
+    <dgm:txEffectClrLst/>
+  </dgm:styleLbl>
+  <dgm:styleLbl name="bgAcc1">
+    <dgm:fillClrLst meth="repeat">
+      <a:schemeClr val="lt1">
+        <a:alpha val="90000"/>
+      </a:schemeClr>
+    </dgm:fillClrLst>
+    <dgm:linClrLst>
+      <a:schemeClr val="accent3">
+        <a:shade val="80000"/>
+      </a:schemeClr>
+      <a:schemeClr val="accent3">
+        <a:tint val="70000"/>
+      </a:schemeClr>
+    </dgm:linClrLst>
+    <dgm:effectClrLst/>
+    <dgm:txLinClrLst/>
+    <dgm:txFillClrLst meth="repeat">
+      <a:schemeClr val="dk1"/>
+    </dgm:txFillClrLst>
+    <dgm:txEffectClrLst/>
+  </dgm:styleLbl>
+  <dgm:styleLbl name="solidFgAcc1">
+    <dgm:fillClrLst meth="repeat">
+      <a:schemeClr val="lt1"/>
+    </dgm:fillClrLst>
+    <dgm:linClrLst>
+      <a:schemeClr val="accent3">
+        <a:shade val="80000"/>
+      </a:schemeClr>
+      <a:schemeClr val="accent3">
+        <a:tint val="70000"/>
+      </a:schemeClr>
+    </dgm:linClrLst>
+    <dgm:effectClrLst/>
+    <dgm:txLinClrLst/>
+    <dgm:txFillClrLst meth="repeat">
+      <a:schemeClr val="dk1"/>
+    </dgm:txFillClrLst>
+    <dgm:txEffectClrLst/>
+  </dgm:styleLbl>
+  <dgm:styleLbl name="solidAlignAcc1">
+    <dgm:fillClrLst meth="repeat">
+      <a:schemeClr val="lt1"/>
+    </dgm:fillClrLst>
+    <dgm:linClrLst meth="repeat">
+      <a:schemeClr val="accent3"/>
+    </dgm:linClrLst>
+    <dgm:effectClrLst/>
+    <dgm:txLinClrLst/>
+    <dgm:txFillClrLst meth="repeat">
+      <a:schemeClr val="dk1"/>
+    </dgm:txFillClrLst>
+    <dgm:txEffectClrLst/>
+  </dgm:styleLbl>
+  <dgm:styleLbl name="solidBgAcc1">
+    <dgm:fillClrLst meth="repeat">
+      <a:schemeClr val="lt1"/>
+    </dgm:fillClrLst>
+    <dgm:linClrLst meth="repeat">
+      <a:schemeClr val="accent3"/>
+    </dgm:linClrLst>
+    <dgm:effectClrLst/>
+    <dgm:txLinClrLst/>
+    <dgm:txFillClrLst meth="repeat">
+      <a:schemeClr val="dk1"/>
+    </dgm:txFillClrLst>
+    <dgm:txEffectClrLst/>
+  </dgm:styleLbl>
+  <dgm:styleLbl name="fgAccFollowNode1">
+    <dgm:fillClrLst meth="repeat">
+      <a:schemeClr val="accent3">
+        <a:alpha val="90000"/>
+        <a:tint val="40000"/>
+      </a:schemeClr>
+    </dgm:fillClrLst>
+    <dgm:linClrLst meth="repeat">
+      <a:schemeClr val="accent3">
+        <a:alpha val="90000"/>
+        <a:tint val="40000"/>
+      </a:schemeClr>
+    </dgm:linClrLst>
+    <dgm:effectClrLst/>
+    <dgm:txLinClrLst/>
+    <dgm:txFillClrLst meth="repeat">
+      <a:schemeClr val="dk1"/>
+    </dgm:txFillClrLst>
+    <dgm:txEffectClrLst/>
+  </dgm:styleLbl>
+  <dgm:styleLbl name="alignAccFollowNode1">
+    <dgm:fillClrLst meth="repeat">
+      <a:schemeClr val="accent3">
+        <a:alpha val="90000"/>
+        <a:tint val="40000"/>
+      </a:schemeClr>
+    </dgm:fillClrLst>
+    <dgm:linClrLst meth="repeat">
+      <a:schemeClr val="accent3">
+        <a:alpha val="90000"/>
+        <a:tint val="40000"/>
+      </a:schemeClr>
+    </dgm:linClrLst>
+    <dgm:effectClrLst/>
+    <dgm:txLinClrLst/>
+    <dgm:txFillClrLst meth="repeat">
+      <a:schemeClr val="dk1"/>
+    </dgm:txFillClrLst>
+    <dgm:txEffectClrLst/>
+  </dgm:styleLbl>
+  <dgm:styleLbl name="bgAccFollowNode1">
+    <dgm:fillClrLst meth="repeat">
+      <a:schemeClr val="accent3">
+        <a:alpha val="90000"/>
+        <a:tint val="40000"/>
+      </a:schemeClr>
+    </dgm:fillClrLst>
+    <dgm:linClrLst meth="repeat">
+      <a:schemeClr val="lt1"/>
+    </dgm:linClrLst>
+    <dgm:effectClrLst/>
+    <dgm:txLinClrLst/>
+    <dgm:txFillClrLst meth="repeat">
+      <a:schemeClr val="dk1"/>
+    </dgm:txFillClrLst>
+    <dgm:txEffectClrLst/>
+  </dgm:styleLbl>
+  <dgm:styleLbl name="fgAcc0">
+    <dgm:fillClrLst meth="repeat">
+      <a:schemeClr val="lt1">
+        <a:alpha val="90000"/>
+      </a:schemeClr>
+    </dgm:fillClrLst>
+    <dgm:linClrLst meth="repeat">
+      <a:schemeClr val="accent3">
+        <a:shade val="80000"/>
+      </a:schemeClr>
+    </dgm:linClrLst>
+    <dgm:effectClrLst/>
+    <dgm:txLinClrLst/>
+    <dgm:txFillClrLst meth="repeat">
+      <a:schemeClr val="dk1"/>
+    </dgm:txFillClrLst>
+    <dgm:txEffectClrLst/>
+  </dgm:styleLbl>
+  <dgm:styleLbl name="fgAcc2">
+    <dgm:fillClrLst meth="repeat">
+      <a:schemeClr val="lt1">
+        <a:alpha val="90000"/>
+      </a:schemeClr>
+    </dgm:fillClrLst>
+    <dgm:linClrLst meth="repeat">
+      <a:schemeClr val="accent3">
+        <a:tint val="99000"/>
+      </a:schemeClr>
+    </dgm:linClrLst>
+    <dgm:effectClrLst/>
+    <dgm:txLinClrLst/>
+    <dgm:txFillClrLst meth="repeat">
+      <a:schemeClr val="dk1"/>
+    </dgm:txFillClrLst>
+    <dgm:txEffectClrLst/>
+  </dgm:styleLbl>
+  <dgm:styleLbl name="fgAcc3">
+    <dgm:fillClrLst meth="repeat">
+      <a:schemeClr val="lt1">
+        <a:alpha val="90000"/>
+      </a:schemeClr>
+    </dgm:fillClrLst>
+    <dgm:linClrLst meth="repeat">
+      <a:schemeClr val="accent3">
+        <a:tint val="80000"/>
+      </a:schemeClr>
+    </dgm:linClrLst>
+    <dgm:effectClrLst/>
+    <dgm:txLinClrLst/>
+    <dgm:txFillClrLst meth="repeat">
+      <a:schemeClr val="dk1"/>
+    </dgm:txFillClrLst>
+    <dgm:txEffectClrLst/>
+  </dgm:styleLbl>
+  <dgm:styleLbl name="fgAcc4">
+    <dgm:fillClrLst meth="repeat">
+      <a:schemeClr val="lt1">
+        <a:alpha val="90000"/>
+      </a:schemeClr>
+    </dgm:fillClrLst>
+    <dgm:linClrLst meth="repeat">
+      <a:schemeClr val="accent3">
+        <a:tint val="70000"/>
+      </a:schemeClr>
+    </dgm:linClrLst>
+    <dgm:effectClrLst/>
+    <dgm:txLinClrLst/>
+    <dgm:txFillClrLst meth="repeat">
+      <a:schemeClr val="dk1"/>
+    </dgm:txFillClrLst>
+    <dgm:txEffectClrLst/>
+  </dgm:styleLbl>
+  <dgm:styleLbl name="bgShp">
+    <dgm:fillClrLst meth="repeat">
+      <a:schemeClr val="accent3">
+        <a:tint val="40000"/>
+      </a:schemeClr>
+    </dgm:fillClrLst>
+    <dgm:linClrLst meth="repeat">
+      <a:schemeClr val="dk1"/>
+    </dgm:linClrLst>
+    <dgm:effectClrLst/>
+    <dgm:txLinClrLst/>
+    <dgm:txFillClrLst meth="repeat">
+      <a:schemeClr val="dk1"/>
+    </dgm:txFillClrLst>
+    <dgm:txEffectClrLst/>
+  </dgm:styleLbl>
+  <dgm:styleLbl name="dkBgShp">
+    <dgm:fillClrLst meth="repeat">
+      <a:schemeClr val="accent3">
+        <a:shade val="90000"/>
+      </a:schemeClr>
+    </dgm:fillClrLst>
+    <dgm:linClrLst meth="repeat">
+      <a:schemeClr val="dk1"/>
+    </dgm:linClrLst>
+    <dgm:effectClrLst/>
+    <dgm:txLinClrLst/>
+    <dgm:txFillClrLst meth="repeat">
+      <a:schemeClr val="lt1"/>
+    </dgm:txFillClrLst>
+    <dgm:txEffectClrLst/>
+  </dgm:styleLbl>
+  <dgm:styleLbl name="trBgShp">
+    <dgm:fillClrLst meth="repeat">
+      <a:schemeClr val="accent3">
+        <a:tint val="50000"/>
+        <a:alpha val="40000"/>
+      </a:schemeClr>
+    </dgm:fillClrLst>
+    <dgm:linClrLst meth="repeat">
+      <a:schemeClr val="accent3"/>
+    </dgm:linClrLst>
+    <dgm:effectClrLst/>
+    <dgm:txLinClrLst/>
+    <dgm:txFillClrLst meth="repeat">
+      <a:schemeClr val="lt1"/>
+    </dgm:txFillClrLst>
+    <dgm:txEffectClrLst/>
+  </dgm:styleLbl>
+  <dgm:styleLbl name="fgShp">
+    <dgm:fillClrLst meth="repeat">
+      <a:schemeClr val="accent3">
+        <a:tint val="40000"/>
+      </a:schemeClr>
+    </dgm:fillClrLst>
+    <dgm:linClrLst meth="repeat">
+      <a:schemeClr val="lt1"/>
+    </dgm:linClrLst>
+    <dgm:effectClrLst/>
+    <dgm:txLinClrLst/>
+    <dgm:txFillClrLst meth="repeat">
+      <a:schemeClr val="dk1"/>
+    </dgm:txFillClrLst>
+    <dgm:txEffectClrLst/>
+  </dgm:styleLbl>
+  <dgm:styleLbl name="revTx">
+    <dgm:fillClrLst meth="repeat">
+      <a:schemeClr val="lt1">
+        <a:alpha val="0"/>
+      </a:schemeClr>
+    </dgm:fillClrLst>
+    <dgm:linClrLst meth="repeat">
+      <a:schemeClr val="dk1">
+        <a:alpha val="0"/>
+      </a:schemeClr>
+    </dgm:linClrLst>
+    <dgm:effectClrLst/>
+    <dgm:txLinClrLst/>
+    <dgm:txFillClrLst meth="repeat">
+      <a:schemeClr val="tx1"/>
+    </dgm:txFillClrLst>
+    <dgm:txEffectClrLst/>
+  </dgm:styleLbl>
+</dgm:colorsDef>
+</file>
+
 <file path=ppt/diagrams/data1.xml><?xml version="1.0" encoding="utf-8"?>
 <dgm:dataModel xmlns:dgm="http://schemas.openxmlformats.org/drawingml/2006/diagram" xmlns:a="http://schemas.openxmlformats.org/drawingml/2006/main">
   <dgm:ptLst>
@@ -1842,6 +2718,456 @@
     <dgm:cxn modelId="{D6BDAA72-12D0-4652-9CB9-2F67FF87FAAA}" type="presParOf" srcId="{F6685F4B-0FBB-4D4E-855E-85F98362080D}" destId="{77BA2A1D-7ADA-4B1F-BC88-A016241503C8}" srcOrd="6" destOrd="0" presId="urn:microsoft.com/office/officeart/2005/8/layout/hierarchy4"/>
     <dgm:cxn modelId="{DE9C30B9-494D-49CB-9391-A8E0ECE89A6B}" type="presParOf" srcId="{77BA2A1D-7ADA-4B1F-BC88-A016241503C8}" destId="{DFC3654B-F5D7-484F-A30A-0F54F4F189B0}" srcOrd="0" destOrd="0" presId="urn:microsoft.com/office/officeart/2005/8/layout/hierarchy4"/>
     <dgm:cxn modelId="{E94152B3-E1C8-4B0B-954F-86FDE57D7769}" type="presParOf" srcId="{77BA2A1D-7ADA-4B1F-BC88-A016241503C8}" destId="{0F8D9F91-A1FD-4CBE-BDB2-B2467AA9EB1E}" srcOrd="1" destOrd="0" presId="urn:microsoft.com/office/officeart/2005/8/layout/hierarchy4"/>
+  </dgm:cxnLst>
+  <dgm:bg/>
+  <dgm:whole/>
+  <dgm:extLst>
+    <a:ext uri="http://schemas.microsoft.com/office/drawing/2008/diagram">
+      <dsp:dataModelExt xmlns:dsp="http://schemas.microsoft.com/office/drawing/2008/diagram" relId="rId6" minVer="http://schemas.openxmlformats.org/drawingml/2006/diagram"/>
+    </a:ext>
+  </dgm:extLst>
+</dgm:dataModel>
+</file>
+
+<file path=ppt/diagrams/data2.xml><?xml version="1.0" encoding="utf-8"?>
+<dgm:dataModel xmlns:dgm="http://schemas.openxmlformats.org/drawingml/2006/diagram" xmlns:a="http://schemas.openxmlformats.org/drawingml/2006/main">
+  <dgm:ptLst>
+    <dgm:pt modelId="{DCD81C6E-1185-4903-8655-EC5B0A177171}" type="doc">
+      <dgm:prSet loTypeId="urn:microsoft.com/office/officeart/2005/8/layout/orgChart1" loCatId="hierarchy" qsTypeId="urn:microsoft.com/office/officeart/2005/8/quickstyle/simple1" qsCatId="simple" csTypeId="urn:microsoft.com/office/officeart/2005/8/colors/accent3_3" csCatId="accent3" phldr="1"/>
+      <dgm:spPr/>
+      <dgm:t>
+        <a:bodyPr/>
+        <a:lstStyle/>
+        <a:p>
+          <a:endParaRPr lang="en-US"/>
+        </a:p>
+      </dgm:t>
+    </dgm:pt>
+    <dgm:pt modelId="{B5443DFF-FCFF-47B7-97BA-3B86635FE613}">
+      <dgm:prSet phldrT="[Text]"/>
+      <dgm:spPr/>
+      <dgm:t>
+        <a:bodyPr/>
+        <a:lstStyle/>
+        <a:p>
+          <a:r>
+            <a:rPr lang="en-US" dirty="0"/>
+            <a:t>Home</a:t>
+          </a:r>
+        </a:p>
+      </dgm:t>
+    </dgm:pt>
+    <dgm:pt modelId="{F7FA7AC4-B44B-408F-BBDF-9D4226142D3D}" type="parTrans" cxnId="{39BAD2F8-A049-49CC-B3A2-D680B2804C37}">
+      <dgm:prSet/>
+      <dgm:spPr/>
+      <dgm:t>
+        <a:bodyPr/>
+        <a:lstStyle/>
+        <a:p>
+          <a:endParaRPr lang="en-US"/>
+        </a:p>
+      </dgm:t>
+    </dgm:pt>
+    <dgm:pt modelId="{2F3A3A48-8954-4057-8316-3AF4A66B0038}" type="sibTrans" cxnId="{39BAD2F8-A049-49CC-B3A2-D680B2804C37}">
+      <dgm:prSet/>
+      <dgm:spPr/>
+      <dgm:t>
+        <a:bodyPr/>
+        <a:lstStyle/>
+        <a:p>
+          <a:endParaRPr lang="en-US"/>
+        </a:p>
+      </dgm:t>
+    </dgm:pt>
+    <dgm:pt modelId="{7B0695EA-4684-48A8-9CFA-82D1BB2F2578}">
+      <dgm:prSet phldrT="[Text]"/>
+      <dgm:spPr/>
+      <dgm:t>
+        <a:bodyPr/>
+        <a:lstStyle/>
+        <a:p>
+          <a:r>
+            <a:rPr lang="en-US" dirty="0"/>
+            <a:t>Users</a:t>
+          </a:r>
+        </a:p>
+      </dgm:t>
+    </dgm:pt>
+    <dgm:pt modelId="{30E4D73B-C062-4677-869A-3F5C002D7D08}" type="parTrans" cxnId="{5E448775-B93F-4A5C-9C50-B19EF36FFD63}">
+      <dgm:prSet/>
+      <dgm:spPr/>
+      <dgm:t>
+        <a:bodyPr/>
+        <a:lstStyle/>
+        <a:p>
+          <a:endParaRPr lang="en-US"/>
+        </a:p>
+      </dgm:t>
+    </dgm:pt>
+    <dgm:pt modelId="{1B9F3746-AF67-4736-9719-42A01A407A58}" type="sibTrans" cxnId="{5E448775-B93F-4A5C-9C50-B19EF36FFD63}">
+      <dgm:prSet/>
+      <dgm:spPr/>
+      <dgm:t>
+        <a:bodyPr/>
+        <a:lstStyle/>
+        <a:p>
+          <a:endParaRPr lang="en-US"/>
+        </a:p>
+      </dgm:t>
+    </dgm:pt>
+    <dgm:pt modelId="{88F70AE8-C1D4-47CB-AC37-3DB95D0600D7}">
+      <dgm:prSet phldrT="[Text]"/>
+      <dgm:spPr/>
+      <dgm:t>
+        <a:bodyPr/>
+        <a:lstStyle/>
+        <a:p>
+          <a:r>
+            <a:rPr lang="en-US" dirty="0"/>
+            <a:t>Partners</a:t>
+          </a:r>
+        </a:p>
+      </dgm:t>
+    </dgm:pt>
+    <dgm:pt modelId="{D7EB4893-B0CC-4312-9430-134C1DA434F4}" type="parTrans" cxnId="{B6241B87-77C3-4367-83AB-3BF70ABE868C}">
+      <dgm:prSet/>
+      <dgm:spPr/>
+      <dgm:t>
+        <a:bodyPr/>
+        <a:lstStyle/>
+        <a:p>
+          <a:endParaRPr lang="en-US"/>
+        </a:p>
+      </dgm:t>
+    </dgm:pt>
+    <dgm:pt modelId="{807D13F2-E147-4BB3-899B-730264E815F5}" type="sibTrans" cxnId="{B6241B87-77C3-4367-83AB-3BF70ABE868C}">
+      <dgm:prSet/>
+      <dgm:spPr/>
+      <dgm:t>
+        <a:bodyPr/>
+        <a:lstStyle/>
+        <a:p>
+          <a:endParaRPr lang="en-US"/>
+        </a:p>
+      </dgm:t>
+    </dgm:pt>
+    <dgm:pt modelId="{DEFF0D6A-ACA0-46D5-98A8-54E6D1440A2A}">
+      <dgm:prSet phldrT="[Text]"/>
+      <dgm:spPr/>
+      <dgm:t>
+        <a:bodyPr/>
+        <a:lstStyle/>
+        <a:p>
+          <a:r>
+            <a:rPr lang="en-US" dirty="0"/>
+            <a:t>Issues</a:t>
+          </a:r>
+        </a:p>
+      </dgm:t>
+    </dgm:pt>
+    <dgm:pt modelId="{8646BFAA-61F8-43BC-BE8B-6DFA241CCD69}" type="parTrans" cxnId="{E1AC3BDC-4973-4CC3-AE78-E9BC0B002B65}">
+      <dgm:prSet/>
+      <dgm:spPr/>
+      <dgm:t>
+        <a:bodyPr/>
+        <a:lstStyle/>
+        <a:p>
+          <a:endParaRPr lang="en-US"/>
+        </a:p>
+      </dgm:t>
+    </dgm:pt>
+    <dgm:pt modelId="{8BE35F8C-2018-4893-B24A-6DC356D7EA2B}" type="sibTrans" cxnId="{E1AC3BDC-4973-4CC3-AE78-E9BC0B002B65}">
+      <dgm:prSet/>
+      <dgm:spPr/>
+      <dgm:t>
+        <a:bodyPr/>
+        <a:lstStyle/>
+        <a:p>
+          <a:endParaRPr lang="en-US"/>
+        </a:p>
+      </dgm:t>
+    </dgm:pt>
+    <dgm:pt modelId="{A8DEE811-E703-415D-8E02-E8CECF1E7985}">
+      <dgm:prSet phldrT="[Text]"/>
+      <dgm:spPr/>
+      <dgm:t>
+        <a:bodyPr/>
+        <a:lstStyle/>
+        <a:p>
+          <a:r>
+            <a:rPr lang="en-US" dirty="0"/>
+            <a:t>Cars</a:t>
+          </a:r>
+        </a:p>
+      </dgm:t>
+    </dgm:pt>
+    <dgm:pt modelId="{5E8F3A34-8052-4B48-9219-16AC64A8CD15}" type="parTrans" cxnId="{433048A1-788F-461A-81E1-BB66E5EC6A69}">
+      <dgm:prSet/>
+      <dgm:spPr/>
+      <dgm:t>
+        <a:bodyPr/>
+        <a:lstStyle/>
+        <a:p>
+          <a:endParaRPr lang="en-US"/>
+        </a:p>
+      </dgm:t>
+    </dgm:pt>
+    <dgm:pt modelId="{69F1079C-9AD3-402F-BDEA-5B287C1E0862}" type="sibTrans" cxnId="{433048A1-788F-461A-81E1-BB66E5EC6A69}">
+      <dgm:prSet/>
+      <dgm:spPr/>
+      <dgm:t>
+        <a:bodyPr/>
+        <a:lstStyle/>
+        <a:p>
+          <a:endParaRPr lang="en-US"/>
+        </a:p>
+      </dgm:t>
+    </dgm:pt>
+    <dgm:pt modelId="{73D8074F-C168-484B-8144-9A588D0F5E31}" type="pres">
+      <dgm:prSet presAssocID="{DCD81C6E-1185-4903-8655-EC5B0A177171}" presName="hierChild1" presStyleCnt="0">
+        <dgm:presLayoutVars>
+          <dgm:orgChart val="1"/>
+          <dgm:chPref val="1"/>
+          <dgm:dir/>
+          <dgm:animOne val="branch"/>
+          <dgm:animLvl val="lvl"/>
+          <dgm:resizeHandles/>
+        </dgm:presLayoutVars>
+      </dgm:prSet>
+      <dgm:spPr/>
+    </dgm:pt>
+    <dgm:pt modelId="{84D47627-71BF-402C-B911-6C18C76CF9C7}" type="pres">
+      <dgm:prSet presAssocID="{B5443DFF-FCFF-47B7-97BA-3B86635FE613}" presName="hierRoot1" presStyleCnt="0">
+        <dgm:presLayoutVars>
+          <dgm:hierBranch val="init"/>
+        </dgm:presLayoutVars>
+      </dgm:prSet>
+      <dgm:spPr/>
+    </dgm:pt>
+    <dgm:pt modelId="{C967FC75-A21C-4B12-B737-38B66B23637A}" type="pres">
+      <dgm:prSet presAssocID="{B5443DFF-FCFF-47B7-97BA-3B86635FE613}" presName="rootComposite1" presStyleCnt="0"/>
+      <dgm:spPr/>
+    </dgm:pt>
+    <dgm:pt modelId="{9EE62C30-B84D-4BBB-A10D-67E37AA81DB4}" type="pres">
+      <dgm:prSet presAssocID="{B5443DFF-FCFF-47B7-97BA-3B86635FE613}" presName="rootText1" presStyleLbl="node0" presStyleIdx="0" presStyleCnt="1">
+        <dgm:presLayoutVars>
+          <dgm:chPref val="3"/>
+        </dgm:presLayoutVars>
+      </dgm:prSet>
+      <dgm:spPr/>
+    </dgm:pt>
+    <dgm:pt modelId="{27D23135-7494-422F-A59B-0BDA4874D9E6}" type="pres">
+      <dgm:prSet presAssocID="{B5443DFF-FCFF-47B7-97BA-3B86635FE613}" presName="rootConnector1" presStyleLbl="node1" presStyleIdx="0" presStyleCnt="0"/>
+      <dgm:spPr/>
+    </dgm:pt>
+    <dgm:pt modelId="{4E74A310-4231-47B1-906E-20BE1995BC20}" type="pres">
+      <dgm:prSet presAssocID="{B5443DFF-FCFF-47B7-97BA-3B86635FE613}" presName="hierChild2" presStyleCnt="0"/>
+      <dgm:spPr/>
+    </dgm:pt>
+    <dgm:pt modelId="{41762737-566B-4F7B-8725-0A05E87281E2}" type="pres">
+      <dgm:prSet presAssocID="{30E4D73B-C062-4677-869A-3F5C002D7D08}" presName="Name37" presStyleLbl="parChTrans1D2" presStyleIdx="0" presStyleCnt="4"/>
+      <dgm:spPr/>
+    </dgm:pt>
+    <dgm:pt modelId="{4508E828-3781-4C84-BC9E-E7EAF1F499A6}" type="pres">
+      <dgm:prSet presAssocID="{7B0695EA-4684-48A8-9CFA-82D1BB2F2578}" presName="hierRoot2" presStyleCnt="0">
+        <dgm:presLayoutVars>
+          <dgm:hierBranch val="init"/>
+        </dgm:presLayoutVars>
+      </dgm:prSet>
+      <dgm:spPr/>
+    </dgm:pt>
+    <dgm:pt modelId="{D62FD4B8-9FB9-493A-A92F-88378E71699E}" type="pres">
+      <dgm:prSet presAssocID="{7B0695EA-4684-48A8-9CFA-82D1BB2F2578}" presName="rootComposite" presStyleCnt="0"/>
+      <dgm:spPr/>
+    </dgm:pt>
+    <dgm:pt modelId="{E62573F9-3493-4ADE-8DFB-4A2584C645B3}" type="pres">
+      <dgm:prSet presAssocID="{7B0695EA-4684-48A8-9CFA-82D1BB2F2578}" presName="rootText" presStyleLbl="node2" presStyleIdx="0" presStyleCnt="4">
+        <dgm:presLayoutVars>
+          <dgm:chPref val="3"/>
+        </dgm:presLayoutVars>
+      </dgm:prSet>
+      <dgm:spPr/>
+    </dgm:pt>
+    <dgm:pt modelId="{FB11E7F6-B9CC-4158-A711-FABDDB376B7B}" type="pres">
+      <dgm:prSet presAssocID="{7B0695EA-4684-48A8-9CFA-82D1BB2F2578}" presName="rootConnector" presStyleLbl="node2" presStyleIdx="0" presStyleCnt="4"/>
+      <dgm:spPr/>
+    </dgm:pt>
+    <dgm:pt modelId="{4EA71C84-D4D1-4184-BE6C-CFBB279BDA0C}" type="pres">
+      <dgm:prSet presAssocID="{7B0695EA-4684-48A8-9CFA-82D1BB2F2578}" presName="hierChild4" presStyleCnt="0"/>
+      <dgm:spPr/>
+    </dgm:pt>
+    <dgm:pt modelId="{95F904A2-CBEF-4411-AF74-07031D660619}" type="pres">
+      <dgm:prSet presAssocID="{7B0695EA-4684-48A8-9CFA-82D1BB2F2578}" presName="hierChild5" presStyleCnt="0"/>
+      <dgm:spPr/>
+    </dgm:pt>
+    <dgm:pt modelId="{C0F08C6E-F9EC-4107-B91C-047EF1774D79}" type="pres">
+      <dgm:prSet presAssocID="{5E8F3A34-8052-4B48-9219-16AC64A8CD15}" presName="Name37" presStyleLbl="parChTrans1D2" presStyleIdx="1" presStyleCnt="4"/>
+      <dgm:spPr/>
+    </dgm:pt>
+    <dgm:pt modelId="{F6CE01C2-1208-4A7D-A157-F7A5C1220557}" type="pres">
+      <dgm:prSet presAssocID="{A8DEE811-E703-415D-8E02-E8CECF1E7985}" presName="hierRoot2" presStyleCnt="0">
+        <dgm:presLayoutVars>
+          <dgm:hierBranch val="init"/>
+        </dgm:presLayoutVars>
+      </dgm:prSet>
+      <dgm:spPr/>
+    </dgm:pt>
+    <dgm:pt modelId="{7D52B089-D279-4BE8-AF48-A37F6BD94604}" type="pres">
+      <dgm:prSet presAssocID="{A8DEE811-E703-415D-8E02-E8CECF1E7985}" presName="rootComposite" presStyleCnt="0"/>
+      <dgm:spPr/>
+    </dgm:pt>
+    <dgm:pt modelId="{D979A5D4-BA28-4146-B2CF-6CB37BB43928}" type="pres">
+      <dgm:prSet presAssocID="{A8DEE811-E703-415D-8E02-E8CECF1E7985}" presName="rootText" presStyleLbl="node2" presStyleIdx="1" presStyleCnt="4">
+        <dgm:presLayoutVars>
+          <dgm:chPref val="3"/>
+        </dgm:presLayoutVars>
+      </dgm:prSet>
+      <dgm:spPr/>
+    </dgm:pt>
+    <dgm:pt modelId="{CB0FF2BC-FE97-4A7C-BF10-6FBC946C5665}" type="pres">
+      <dgm:prSet presAssocID="{A8DEE811-E703-415D-8E02-E8CECF1E7985}" presName="rootConnector" presStyleLbl="node2" presStyleIdx="1" presStyleCnt="4"/>
+      <dgm:spPr/>
+    </dgm:pt>
+    <dgm:pt modelId="{BD24C14D-DD1C-475C-91CC-EA184077D0C7}" type="pres">
+      <dgm:prSet presAssocID="{A8DEE811-E703-415D-8E02-E8CECF1E7985}" presName="hierChild4" presStyleCnt="0"/>
+      <dgm:spPr/>
+    </dgm:pt>
+    <dgm:pt modelId="{6B0DE3BE-5CA7-4F39-A47D-9168882BDD0B}" type="pres">
+      <dgm:prSet presAssocID="{A8DEE811-E703-415D-8E02-E8CECF1E7985}" presName="hierChild5" presStyleCnt="0"/>
+      <dgm:spPr/>
+    </dgm:pt>
+    <dgm:pt modelId="{E7F75F33-9142-41C9-BC19-DC78C59D8FF4}" type="pres">
+      <dgm:prSet presAssocID="{D7EB4893-B0CC-4312-9430-134C1DA434F4}" presName="Name37" presStyleLbl="parChTrans1D2" presStyleIdx="2" presStyleCnt="4"/>
+      <dgm:spPr/>
+    </dgm:pt>
+    <dgm:pt modelId="{67A58F02-F94D-4A9C-ABAF-9D1B38984D96}" type="pres">
+      <dgm:prSet presAssocID="{88F70AE8-C1D4-47CB-AC37-3DB95D0600D7}" presName="hierRoot2" presStyleCnt="0">
+        <dgm:presLayoutVars>
+          <dgm:hierBranch val="init"/>
+        </dgm:presLayoutVars>
+      </dgm:prSet>
+      <dgm:spPr/>
+    </dgm:pt>
+    <dgm:pt modelId="{CD949F2B-B0CA-4031-BFF3-7736D8EB7FE1}" type="pres">
+      <dgm:prSet presAssocID="{88F70AE8-C1D4-47CB-AC37-3DB95D0600D7}" presName="rootComposite" presStyleCnt="0"/>
+      <dgm:spPr/>
+    </dgm:pt>
+    <dgm:pt modelId="{16462F1F-F996-4C8B-86FD-54BCC2C3DB53}" type="pres">
+      <dgm:prSet presAssocID="{88F70AE8-C1D4-47CB-AC37-3DB95D0600D7}" presName="rootText" presStyleLbl="node2" presStyleIdx="2" presStyleCnt="4">
+        <dgm:presLayoutVars>
+          <dgm:chPref val="3"/>
+        </dgm:presLayoutVars>
+      </dgm:prSet>
+      <dgm:spPr/>
+    </dgm:pt>
+    <dgm:pt modelId="{186937DB-4351-4FFD-9508-12CB0A2F4DFF}" type="pres">
+      <dgm:prSet presAssocID="{88F70AE8-C1D4-47CB-AC37-3DB95D0600D7}" presName="rootConnector" presStyleLbl="node2" presStyleIdx="2" presStyleCnt="4"/>
+      <dgm:spPr/>
+    </dgm:pt>
+    <dgm:pt modelId="{CD729900-6220-48D2-941B-56936137604B}" type="pres">
+      <dgm:prSet presAssocID="{88F70AE8-C1D4-47CB-AC37-3DB95D0600D7}" presName="hierChild4" presStyleCnt="0"/>
+      <dgm:spPr/>
+    </dgm:pt>
+    <dgm:pt modelId="{2D78C08C-D4DE-4328-9790-09666E3D2142}" type="pres">
+      <dgm:prSet presAssocID="{88F70AE8-C1D4-47CB-AC37-3DB95D0600D7}" presName="hierChild5" presStyleCnt="0"/>
+      <dgm:spPr/>
+    </dgm:pt>
+    <dgm:pt modelId="{389C70C0-CE70-4168-94CF-338A692C34A5}" type="pres">
+      <dgm:prSet presAssocID="{8646BFAA-61F8-43BC-BE8B-6DFA241CCD69}" presName="Name37" presStyleLbl="parChTrans1D2" presStyleIdx="3" presStyleCnt="4"/>
+      <dgm:spPr/>
+    </dgm:pt>
+    <dgm:pt modelId="{EF238441-3B34-4645-AE33-22B405FEE0BF}" type="pres">
+      <dgm:prSet presAssocID="{DEFF0D6A-ACA0-46D5-98A8-54E6D1440A2A}" presName="hierRoot2" presStyleCnt="0">
+        <dgm:presLayoutVars>
+          <dgm:hierBranch val="init"/>
+        </dgm:presLayoutVars>
+      </dgm:prSet>
+      <dgm:spPr/>
+    </dgm:pt>
+    <dgm:pt modelId="{02E73974-4798-4726-BD26-8895E76DE721}" type="pres">
+      <dgm:prSet presAssocID="{DEFF0D6A-ACA0-46D5-98A8-54E6D1440A2A}" presName="rootComposite" presStyleCnt="0"/>
+      <dgm:spPr/>
+    </dgm:pt>
+    <dgm:pt modelId="{6D7E2EB5-1DD0-4FB3-ADCF-64A769F68D2E}" type="pres">
+      <dgm:prSet presAssocID="{DEFF0D6A-ACA0-46D5-98A8-54E6D1440A2A}" presName="rootText" presStyleLbl="node2" presStyleIdx="3" presStyleCnt="4">
+        <dgm:presLayoutVars>
+          <dgm:chPref val="3"/>
+        </dgm:presLayoutVars>
+      </dgm:prSet>
+      <dgm:spPr/>
+    </dgm:pt>
+    <dgm:pt modelId="{2971685A-BBB4-4AB3-BB74-8803B4100BA9}" type="pres">
+      <dgm:prSet presAssocID="{DEFF0D6A-ACA0-46D5-98A8-54E6D1440A2A}" presName="rootConnector" presStyleLbl="node2" presStyleIdx="3" presStyleCnt="4"/>
+      <dgm:spPr/>
+    </dgm:pt>
+    <dgm:pt modelId="{1DAD8C14-6864-418A-82B7-5AD219674FF6}" type="pres">
+      <dgm:prSet presAssocID="{DEFF0D6A-ACA0-46D5-98A8-54E6D1440A2A}" presName="hierChild4" presStyleCnt="0"/>
+      <dgm:spPr/>
+    </dgm:pt>
+    <dgm:pt modelId="{033D9172-4B93-4B74-90BD-B8369400A524}" type="pres">
+      <dgm:prSet presAssocID="{DEFF0D6A-ACA0-46D5-98A8-54E6D1440A2A}" presName="hierChild5" presStyleCnt="0"/>
+      <dgm:spPr/>
+    </dgm:pt>
+    <dgm:pt modelId="{A1D6EB8E-F67D-4ED2-9009-919A82977A78}" type="pres">
+      <dgm:prSet presAssocID="{B5443DFF-FCFF-47B7-97BA-3B86635FE613}" presName="hierChild3" presStyleCnt="0"/>
+      <dgm:spPr/>
+    </dgm:pt>
+  </dgm:ptLst>
+  <dgm:cxnLst>
+    <dgm:cxn modelId="{3EC83630-B40B-4D20-B4F2-1C0F202EEC15}" type="presOf" srcId="{A8DEE811-E703-415D-8E02-E8CECF1E7985}" destId="{D979A5D4-BA28-4146-B2CF-6CB37BB43928}" srcOrd="0" destOrd="0" presId="urn:microsoft.com/office/officeart/2005/8/layout/orgChart1"/>
+    <dgm:cxn modelId="{3D25A330-73A0-44BB-8F98-0C86B76DE101}" type="presOf" srcId="{30E4D73B-C062-4677-869A-3F5C002D7D08}" destId="{41762737-566B-4F7B-8725-0A05E87281E2}" srcOrd="0" destOrd="0" presId="urn:microsoft.com/office/officeart/2005/8/layout/orgChart1"/>
+    <dgm:cxn modelId="{09817938-042C-47BA-8F43-DA23F2F252B3}" type="presOf" srcId="{DEFF0D6A-ACA0-46D5-98A8-54E6D1440A2A}" destId="{6D7E2EB5-1DD0-4FB3-ADCF-64A769F68D2E}" srcOrd="0" destOrd="0" presId="urn:microsoft.com/office/officeart/2005/8/layout/orgChart1"/>
+    <dgm:cxn modelId="{1FA34041-02CE-4DE8-8752-A97347D851FD}" type="presOf" srcId="{A8DEE811-E703-415D-8E02-E8CECF1E7985}" destId="{CB0FF2BC-FE97-4A7C-BF10-6FBC946C5665}" srcOrd="1" destOrd="0" presId="urn:microsoft.com/office/officeart/2005/8/layout/orgChart1"/>
+    <dgm:cxn modelId="{97D0C541-B9E0-4AB0-A246-7CF1E8EF964F}" type="presOf" srcId="{8646BFAA-61F8-43BC-BE8B-6DFA241CCD69}" destId="{389C70C0-CE70-4168-94CF-338A692C34A5}" srcOrd="0" destOrd="0" presId="urn:microsoft.com/office/officeart/2005/8/layout/orgChart1"/>
+    <dgm:cxn modelId="{40CB756A-C443-484E-B1EE-D99AF6F5B765}" type="presOf" srcId="{B5443DFF-FCFF-47B7-97BA-3B86635FE613}" destId="{27D23135-7494-422F-A59B-0BDA4874D9E6}" srcOrd="1" destOrd="0" presId="urn:microsoft.com/office/officeart/2005/8/layout/orgChart1"/>
+    <dgm:cxn modelId="{5E448775-B93F-4A5C-9C50-B19EF36FFD63}" srcId="{B5443DFF-FCFF-47B7-97BA-3B86635FE613}" destId="{7B0695EA-4684-48A8-9CFA-82D1BB2F2578}" srcOrd="0" destOrd="0" parTransId="{30E4D73B-C062-4677-869A-3F5C002D7D08}" sibTransId="{1B9F3746-AF67-4736-9719-42A01A407A58}"/>
+    <dgm:cxn modelId="{6F3A5977-2E36-4A2F-A5D0-7EA4A0DC3242}" type="presOf" srcId="{D7EB4893-B0CC-4312-9430-134C1DA434F4}" destId="{E7F75F33-9142-41C9-BC19-DC78C59D8FF4}" srcOrd="0" destOrd="0" presId="urn:microsoft.com/office/officeart/2005/8/layout/orgChart1"/>
+    <dgm:cxn modelId="{B78E9184-4A95-49C1-8F38-C06578C08443}" type="presOf" srcId="{7B0695EA-4684-48A8-9CFA-82D1BB2F2578}" destId="{FB11E7F6-B9CC-4158-A711-FABDDB376B7B}" srcOrd="1" destOrd="0" presId="urn:microsoft.com/office/officeart/2005/8/layout/orgChart1"/>
+    <dgm:cxn modelId="{B6241B87-77C3-4367-83AB-3BF70ABE868C}" srcId="{B5443DFF-FCFF-47B7-97BA-3B86635FE613}" destId="{88F70AE8-C1D4-47CB-AC37-3DB95D0600D7}" srcOrd="2" destOrd="0" parTransId="{D7EB4893-B0CC-4312-9430-134C1DA434F4}" sibTransId="{807D13F2-E147-4BB3-899B-730264E815F5}"/>
+    <dgm:cxn modelId="{0B612098-3B65-4CC4-865B-B5241DC96254}" type="presOf" srcId="{88F70AE8-C1D4-47CB-AC37-3DB95D0600D7}" destId="{16462F1F-F996-4C8B-86FD-54BCC2C3DB53}" srcOrd="0" destOrd="0" presId="urn:microsoft.com/office/officeart/2005/8/layout/orgChart1"/>
+    <dgm:cxn modelId="{B9BA6599-5B71-4ECD-B8DF-C8725DCF53BC}" type="presOf" srcId="{DCD81C6E-1185-4903-8655-EC5B0A177171}" destId="{73D8074F-C168-484B-8144-9A588D0F5E31}" srcOrd="0" destOrd="0" presId="urn:microsoft.com/office/officeart/2005/8/layout/orgChart1"/>
+    <dgm:cxn modelId="{433048A1-788F-461A-81E1-BB66E5EC6A69}" srcId="{B5443DFF-FCFF-47B7-97BA-3B86635FE613}" destId="{A8DEE811-E703-415D-8E02-E8CECF1E7985}" srcOrd="1" destOrd="0" parTransId="{5E8F3A34-8052-4B48-9219-16AC64A8CD15}" sibTransId="{69F1079C-9AD3-402F-BDEA-5B287C1E0862}"/>
+    <dgm:cxn modelId="{F5B77BA3-5DB1-47F6-9C77-2C86B46D0D0B}" type="presOf" srcId="{88F70AE8-C1D4-47CB-AC37-3DB95D0600D7}" destId="{186937DB-4351-4FFD-9508-12CB0A2F4DFF}" srcOrd="1" destOrd="0" presId="urn:microsoft.com/office/officeart/2005/8/layout/orgChart1"/>
+    <dgm:cxn modelId="{E1AC3BDC-4973-4CC3-AE78-E9BC0B002B65}" srcId="{B5443DFF-FCFF-47B7-97BA-3B86635FE613}" destId="{DEFF0D6A-ACA0-46D5-98A8-54E6D1440A2A}" srcOrd="3" destOrd="0" parTransId="{8646BFAA-61F8-43BC-BE8B-6DFA241CCD69}" sibTransId="{8BE35F8C-2018-4893-B24A-6DC356D7EA2B}"/>
+    <dgm:cxn modelId="{FD9588DF-8D4C-4AC3-9EBB-41BBB0A92054}" type="presOf" srcId="{7B0695EA-4684-48A8-9CFA-82D1BB2F2578}" destId="{E62573F9-3493-4ADE-8DFB-4A2584C645B3}" srcOrd="0" destOrd="0" presId="urn:microsoft.com/office/officeart/2005/8/layout/orgChart1"/>
+    <dgm:cxn modelId="{CFD9F6E0-4CDF-4C9F-8DB9-97290801BB07}" type="presOf" srcId="{5E8F3A34-8052-4B48-9219-16AC64A8CD15}" destId="{C0F08C6E-F9EC-4107-B91C-047EF1774D79}" srcOrd="0" destOrd="0" presId="urn:microsoft.com/office/officeart/2005/8/layout/orgChart1"/>
+    <dgm:cxn modelId="{F2F164E2-E3E1-4402-9B48-BC8D5B619633}" type="presOf" srcId="{B5443DFF-FCFF-47B7-97BA-3B86635FE613}" destId="{9EE62C30-B84D-4BBB-A10D-67E37AA81DB4}" srcOrd="0" destOrd="0" presId="urn:microsoft.com/office/officeart/2005/8/layout/orgChart1"/>
+    <dgm:cxn modelId="{D2119AE7-D460-4C03-94F6-76A8AD110B2D}" type="presOf" srcId="{DEFF0D6A-ACA0-46D5-98A8-54E6D1440A2A}" destId="{2971685A-BBB4-4AB3-BB74-8803B4100BA9}" srcOrd="1" destOrd="0" presId="urn:microsoft.com/office/officeart/2005/8/layout/orgChart1"/>
+    <dgm:cxn modelId="{39BAD2F8-A049-49CC-B3A2-D680B2804C37}" srcId="{DCD81C6E-1185-4903-8655-EC5B0A177171}" destId="{B5443DFF-FCFF-47B7-97BA-3B86635FE613}" srcOrd="0" destOrd="0" parTransId="{F7FA7AC4-B44B-408F-BBDF-9D4226142D3D}" sibTransId="{2F3A3A48-8954-4057-8316-3AF4A66B0038}"/>
+    <dgm:cxn modelId="{3F254B5C-1823-41BB-977B-345F7E024E59}" type="presParOf" srcId="{73D8074F-C168-484B-8144-9A588D0F5E31}" destId="{84D47627-71BF-402C-B911-6C18C76CF9C7}" srcOrd="0" destOrd="0" presId="urn:microsoft.com/office/officeart/2005/8/layout/orgChart1"/>
+    <dgm:cxn modelId="{A74589DA-9D4A-40D6-8EDD-512CBF67AE15}" type="presParOf" srcId="{84D47627-71BF-402C-B911-6C18C76CF9C7}" destId="{C967FC75-A21C-4B12-B737-38B66B23637A}" srcOrd="0" destOrd="0" presId="urn:microsoft.com/office/officeart/2005/8/layout/orgChart1"/>
+    <dgm:cxn modelId="{66660659-C7C0-4E20-AFFC-EDA1F179B48C}" type="presParOf" srcId="{C967FC75-A21C-4B12-B737-38B66B23637A}" destId="{9EE62C30-B84D-4BBB-A10D-67E37AA81DB4}" srcOrd="0" destOrd="0" presId="urn:microsoft.com/office/officeart/2005/8/layout/orgChart1"/>
+    <dgm:cxn modelId="{65DDFFE5-187E-4AB7-A6E7-EF80C975A0DC}" type="presParOf" srcId="{C967FC75-A21C-4B12-B737-38B66B23637A}" destId="{27D23135-7494-422F-A59B-0BDA4874D9E6}" srcOrd="1" destOrd="0" presId="urn:microsoft.com/office/officeart/2005/8/layout/orgChart1"/>
+    <dgm:cxn modelId="{302D35DD-C89D-49BF-B449-81C0E6D53585}" type="presParOf" srcId="{84D47627-71BF-402C-B911-6C18C76CF9C7}" destId="{4E74A310-4231-47B1-906E-20BE1995BC20}" srcOrd="1" destOrd="0" presId="urn:microsoft.com/office/officeart/2005/8/layout/orgChart1"/>
+    <dgm:cxn modelId="{3782F0E0-EDFC-492F-8DD1-15FD1932A66E}" type="presParOf" srcId="{4E74A310-4231-47B1-906E-20BE1995BC20}" destId="{41762737-566B-4F7B-8725-0A05E87281E2}" srcOrd="0" destOrd="0" presId="urn:microsoft.com/office/officeart/2005/8/layout/orgChart1"/>
+    <dgm:cxn modelId="{5C187228-2AF0-4FAB-B59E-679AC4C491A0}" type="presParOf" srcId="{4E74A310-4231-47B1-906E-20BE1995BC20}" destId="{4508E828-3781-4C84-BC9E-E7EAF1F499A6}" srcOrd="1" destOrd="0" presId="urn:microsoft.com/office/officeart/2005/8/layout/orgChart1"/>
+    <dgm:cxn modelId="{DB5B735D-27DD-4020-9A77-2DBC94CAC465}" type="presParOf" srcId="{4508E828-3781-4C84-BC9E-E7EAF1F499A6}" destId="{D62FD4B8-9FB9-493A-A92F-88378E71699E}" srcOrd="0" destOrd="0" presId="urn:microsoft.com/office/officeart/2005/8/layout/orgChart1"/>
+    <dgm:cxn modelId="{DE98C27C-B67A-4A5B-8929-ABD3881ECC31}" type="presParOf" srcId="{D62FD4B8-9FB9-493A-A92F-88378E71699E}" destId="{E62573F9-3493-4ADE-8DFB-4A2584C645B3}" srcOrd="0" destOrd="0" presId="urn:microsoft.com/office/officeart/2005/8/layout/orgChart1"/>
+    <dgm:cxn modelId="{F8014431-5866-44A0-823F-B514F599A9D3}" type="presParOf" srcId="{D62FD4B8-9FB9-493A-A92F-88378E71699E}" destId="{FB11E7F6-B9CC-4158-A711-FABDDB376B7B}" srcOrd="1" destOrd="0" presId="urn:microsoft.com/office/officeart/2005/8/layout/orgChart1"/>
+    <dgm:cxn modelId="{4BFA9A48-A9EF-4C88-A7A5-0778B9847F90}" type="presParOf" srcId="{4508E828-3781-4C84-BC9E-E7EAF1F499A6}" destId="{4EA71C84-D4D1-4184-BE6C-CFBB279BDA0C}" srcOrd="1" destOrd="0" presId="urn:microsoft.com/office/officeart/2005/8/layout/orgChart1"/>
+    <dgm:cxn modelId="{2DECAE1D-06ED-46EC-953A-932BD5841D52}" type="presParOf" srcId="{4508E828-3781-4C84-BC9E-E7EAF1F499A6}" destId="{95F904A2-CBEF-4411-AF74-07031D660619}" srcOrd="2" destOrd="0" presId="urn:microsoft.com/office/officeart/2005/8/layout/orgChart1"/>
+    <dgm:cxn modelId="{6940EB3B-4D51-4EA1-AFD2-55F4F2021D68}" type="presParOf" srcId="{4E74A310-4231-47B1-906E-20BE1995BC20}" destId="{C0F08C6E-F9EC-4107-B91C-047EF1774D79}" srcOrd="2" destOrd="0" presId="urn:microsoft.com/office/officeart/2005/8/layout/orgChart1"/>
+    <dgm:cxn modelId="{91CC3569-8D58-4F94-AE18-1FCA9CC87363}" type="presParOf" srcId="{4E74A310-4231-47B1-906E-20BE1995BC20}" destId="{F6CE01C2-1208-4A7D-A157-F7A5C1220557}" srcOrd="3" destOrd="0" presId="urn:microsoft.com/office/officeart/2005/8/layout/orgChart1"/>
+    <dgm:cxn modelId="{C455309B-C147-4631-848C-EDEDA1FBAECE}" type="presParOf" srcId="{F6CE01C2-1208-4A7D-A157-F7A5C1220557}" destId="{7D52B089-D279-4BE8-AF48-A37F6BD94604}" srcOrd="0" destOrd="0" presId="urn:microsoft.com/office/officeart/2005/8/layout/orgChart1"/>
+    <dgm:cxn modelId="{29F98EF3-DE09-46E3-ADAC-29265F9E3702}" type="presParOf" srcId="{7D52B089-D279-4BE8-AF48-A37F6BD94604}" destId="{D979A5D4-BA28-4146-B2CF-6CB37BB43928}" srcOrd="0" destOrd="0" presId="urn:microsoft.com/office/officeart/2005/8/layout/orgChart1"/>
+    <dgm:cxn modelId="{D9F27B84-25D7-45A9-91FB-D92CD399B8AD}" type="presParOf" srcId="{7D52B089-D279-4BE8-AF48-A37F6BD94604}" destId="{CB0FF2BC-FE97-4A7C-BF10-6FBC946C5665}" srcOrd="1" destOrd="0" presId="urn:microsoft.com/office/officeart/2005/8/layout/orgChart1"/>
+    <dgm:cxn modelId="{93E6C03D-E917-4CC8-BAFD-D4ED1E9E0FD3}" type="presParOf" srcId="{F6CE01C2-1208-4A7D-A157-F7A5C1220557}" destId="{BD24C14D-DD1C-475C-91CC-EA184077D0C7}" srcOrd="1" destOrd="0" presId="urn:microsoft.com/office/officeart/2005/8/layout/orgChart1"/>
+    <dgm:cxn modelId="{ADB02BAA-2420-4DA2-B480-F1973DA64F11}" type="presParOf" srcId="{F6CE01C2-1208-4A7D-A157-F7A5C1220557}" destId="{6B0DE3BE-5CA7-4F39-A47D-9168882BDD0B}" srcOrd="2" destOrd="0" presId="urn:microsoft.com/office/officeart/2005/8/layout/orgChart1"/>
+    <dgm:cxn modelId="{3A7BE56C-0B71-49D0-8911-4D3AAD92C4E7}" type="presParOf" srcId="{4E74A310-4231-47B1-906E-20BE1995BC20}" destId="{E7F75F33-9142-41C9-BC19-DC78C59D8FF4}" srcOrd="4" destOrd="0" presId="urn:microsoft.com/office/officeart/2005/8/layout/orgChart1"/>
+    <dgm:cxn modelId="{78988AAB-1C27-4954-B124-02ABD5C1E58E}" type="presParOf" srcId="{4E74A310-4231-47B1-906E-20BE1995BC20}" destId="{67A58F02-F94D-4A9C-ABAF-9D1B38984D96}" srcOrd="5" destOrd="0" presId="urn:microsoft.com/office/officeart/2005/8/layout/orgChart1"/>
+    <dgm:cxn modelId="{F95C8216-3FC4-40A2-89EF-6981E303C5FA}" type="presParOf" srcId="{67A58F02-F94D-4A9C-ABAF-9D1B38984D96}" destId="{CD949F2B-B0CA-4031-BFF3-7736D8EB7FE1}" srcOrd="0" destOrd="0" presId="urn:microsoft.com/office/officeart/2005/8/layout/orgChart1"/>
+    <dgm:cxn modelId="{3BBD0648-15D3-4E18-80C6-81A15D6F6C3B}" type="presParOf" srcId="{CD949F2B-B0CA-4031-BFF3-7736D8EB7FE1}" destId="{16462F1F-F996-4C8B-86FD-54BCC2C3DB53}" srcOrd="0" destOrd="0" presId="urn:microsoft.com/office/officeart/2005/8/layout/orgChart1"/>
+    <dgm:cxn modelId="{43824D58-57BF-4D4D-BD6D-67B40F5A0B1D}" type="presParOf" srcId="{CD949F2B-B0CA-4031-BFF3-7736D8EB7FE1}" destId="{186937DB-4351-4FFD-9508-12CB0A2F4DFF}" srcOrd="1" destOrd="0" presId="urn:microsoft.com/office/officeart/2005/8/layout/orgChart1"/>
+    <dgm:cxn modelId="{E30EC6AD-AC9C-436A-AE76-04630C0F9FF7}" type="presParOf" srcId="{67A58F02-F94D-4A9C-ABAF-9D1B38984D96}" destId="{CD729900-6220-48D2-941B-56936137604B}" srcOrd="1" destOrd="0" presId="urn:microsoft.com/office/officeart/2005/8/layout/orgChart1"/>
+    <dgm:cxn modelId="{F3991474-24EA-45F3-9D32-9C3336EAEE16}" type="presParOf" srcId="{67A58F02-F94D-4A9C-ABAF-9D1B38984D96}" destId="{2D78C08C-D4DE-4328-9790-09666E3D2142}" srcOrd="2" destOrd="0" presId="urn:microsoft.com/office/officeart/2005/8/layout/orgChart1"/>
+    <dgm:cxn modelId="{8ECF34C1-D507-4F67-B79F-A07784DED9C3}" type="presParOf" srcId="{4E74A310-4231-47B1-906E-20BE1995BC20}" destId="{389C70C0-CE70-4168-94CF-338A692C34A5}" srcOrd="6" destOrd="0" presId="urn:microsoft.com/office/officeart/2005/8/layout/orgChart1"/>
+    <dgm:cxn modelId="{C074BD1F-D942-4C1E-87E9-3A2353EA9951}" type="presParOf" srcId="{4E74A310-4231-47B1-906E-20BE1995BC20}" destId="{EF238441-3B34-4645-AE33-22B405FEE0BF}" srcOrd="7" destOrd="0" presId="urn:microsoft.com/office/officeart/2005/8/layout/orgChart1"/>
+    <dgm:cxn modelId="{7CCBEAF1-2391-4A75-9899-1BA8FDEBA2BE}" type="presParOf" srcId="{EF238441-3B34-4645-AE33-22B405FEE0BF}" destId="{02E73974-4798-4726-BD26-8895E76DE721}" srcOrd="0" destOrd="0" presId="urn:microsoft.com/office/officeart/2005/8/layout/orgChart1"/>
+    <dgm:cxn modelId="{9A81C48C-3E39-40CA-A273-AC1F850C57AF}" type="presParOf" srcId="{02E73974-4798-4726-BD26-8895E76DE721}" destId="{6D7E2EB5-1DD0-4FB3-ADCF-64A769F68D2E}" srcOrd="0" destOrd="0" presId="urn:microsoft.com/office/officeart/2005/8/layout/orgChart1"/>
+    <dgm:cxn modelId="{49201BC7-0A4F-4C4E-B1CC-9D02F5656FC6}" type="presParOf" srcId="{02E73974-4798-4726-BD26-8895E76DE721}" destId="{2971685A-BBB4-4AB3-BB74-8803B4100BA9}" srcOrd="1" destOrd="0" presId="urn:microsoft.com/office/officeart/2005/8/layout/orgChart1"/>
+    <dgm:cxn modelId="{2A623A23-AE6F-4F77-B1F9-0DD0A5C660C5}" type="presParOf" srcId="{EF238441-3B34-4645-AE33-22B405FEE0BF}" destId="{1DAD8C14-6864-418A-82B7-5AD219674FF6}" srcOrd="1" destOrd="0" presId="urn:microsoft.com/office/officeart/2005/8/layout/orgChart1"/>
+    <dgm:cxn modelId="{B452CE18-C5C7-44E5-84DF-AD978DF985E5}" type="presParOf" srcId="{EF238441-3B34-4645-AE33-22B405FEE0BF}" destId="{033D9172-4B93-4B74-90BD-B8369400A524}" srcOrd="2" destOrd="0" presId="urn:microsoft.com/office/officeart/2005/8/layout/orgChart1"/>
+    <dgm:cxn modelId="{B08ECDC0-3CDD-41AF-BA76-427681112150}" type="presParOf" srcId="{84D47627-71BF-402C-B911-6C18C76CF9C7}" destId="{A1D6EB8E-F67D-4ED2-9009-919A82977A78}" srcOrd="2" destOrd="0" presId="urn:microsoft.com/office/officeart/2005/8/layout/orgChart1"/>
   </dgm:cxnLst>
   <dgm:bg/>
   <dgm:whole/>
@@ -3486,6 +4812,652 @@
 </dsp:drawing>
 </file>
 
+<file path=ppt/diagrams/drawing2.xml><?xml version="1.0" encoding="utf-8"?>
+<dsp:drawing xmlns:dgm="http://schemas.openxmlformats.org/drawingml/2006/diagram" xmlns:dsp="http://schemas.microsoft.com/office/drawing/2008/diagram" xmlns:a="http://schemas.openxmlformats.org/drawingml/2006/main">
+  <dsp:spTree>
+    <dsp:nvGrpSpPr>
+      <dsp:cNvPr id="0" name=""/>
+      <dsp:cNvGrpSpPr/>
+    </dsp:nvGrpSpPr>
+    <dsp:grpSpPr/>
+    <dsp:sp modelId="{389C70C0-CE70-4168-94CF-338A692C34A5}">
+      <dsp:nvSpPr>
+        <dsp:cNvPr id="0" name=""/>
+        <dsp:cNvSpPr/>
+      </dsp:nvSpPr>
+      <dsp:spPr>
+        <a:xfrm>
+          <a:off x="4064000" y="2525195"/>
+          <a:ext cx="3182949" cy="368275"/>
+        </a:xfrm>
+        <a:custGeom>
+          <a:avLst/>
+          <a:gdLst/>
+          <a:ahLst/>
+          <a:cxnLst/>
+          <a:rect l="0" t="0" r="0" b="0"/>
+          <a:pathLst>
+            <a:path>
+              <a:moveTo>
+                <a:pt x="0" y="0"/>
+              </a:moveTo>
+              <a:lnTo>
+                <a:pt x="0" y="184137"/>
+              </a:lnTo>
+              <a:lnTo>
+                <a:pt x="3182949" y="184137"/>
+              </a:lnTo>
+              <a:lnTo>
+                <a:pt x="3182949" y="368275"/>
+              </a:lnTo>
+            </a:path>
+          </a:pathLst>
+        </a:custGeom>
+        <a:noFill/>
+        <a:ln w="12700" cap="flat" cmpd="sng" algn="ctr">
+          <a:solidFill>
+            <a:schemeClr val="accent3">
+              <a:tint val="99000"/>
+              <a:hueOff val="0"/>
+              <a:satOff val="0"/>
+              <a:lumOff val="0"/>
+              <a:alphaOff val="0"/>
+            </a:schemeClr>
+          </a:solidFill>
+          <a:prstDash val="solid"/>
+        </a:ln>
+        <a:effectLst/>
+      </dsp:spPr>
+      <dsp:style>
+        <a:lnRef idx="2">
+          <a:scrgbClr r="0" g="0" b="0"/>
+        </a:lnRef>
+        <a:fillRef idx="0">
+          <a:scrgbClr r="0" g="0" b="0"/>
+        </a:fillRef>
+        <a:effectRef idx="0">
+          <a:scrgbClr r="0" g="0" b="0"/>
+        </a:effectRef>
+        <a:fontRef idx="minor"/>
+      </dsp:style>
+    </dsp:sp>
+    <dsp:sp modelId="{E7F75F33-9142-41C9-BC19-DC78C59D8FF4}">
+      <dsp:nvSpPr>
+        <dsp:cNvPr id="0" name=""/>
+        <dsp:cNvSpPr/>
+      </dsp:nvSpPr>
+      <dsp:spPr>
+        <a:xfrm>
+          <a:off x="4064000" y="2525195"/>
+          <a:ext cx="1060983" cy="368275"/>
+        </a:xfrm>
+        <a:custGeom>
+          <a:avLst/>
+          <a:gdLst/>
+          <a:ahLst/>
+          <a:cxnLst/>
+          <a:rect l="0" t="0" r="0" b="0"/>
+          <a:pathLst>
+            <a:path>
+              <a:moveTo>
+                <a:pt x="0" y="0"/>
+              </a:moveTo>
+              <a:lnTo>
+                <a:pt x="0" y="184137"/>
+              </a:lnTo>
+              <a:lnTo>
+                <a:pt x="1060983" y="184137"/>
+              </a:lnTo>
+              <a:lnTo>
+                <a:pt x="1060983" y="368275"/>
+              </a:lnTo>
+            </a:path>
+          </a:pathLst>
+        </a:custGeom>
+        <a:noFill/>
+        <a:ln w="12700" cap="flat" cmpd="sng" algn="ctr">
+          <a:solidFill>
+            <a:schemeClr val="accent3">
+              <a:tint val="99000"/>
+              <a:hueOff val="0"/>
+              <a:satOff val="0"/>
+              <a:lumOff val="0"/>
+              <a:alphaOff val="0"/>
+            </a:schemeClr>
+          </a:solidFill>
+          <a:prstDash val="solid"/>
+        </a:ln>
+        <a:effectLst/>
+      </dsp:spPr>
+      <dsp:style>
+        <a:lnRef idx="2">
+          <a:scrgbClr r="0" g="0" b="0"/>
+        </a:lnRef>
+        <a:fillRef idx="0">
+          <a:scrgbClr r="0" g="0" b="0"/>
+        </a:fillRef>
+        <a:effectRef idx="0">
+          <a:scrgbClr r="0" g="0" b="0"/>
+        </a:effectRef>
+        <a:fontRef idx="minor"/>
+      </dsp:style>
+    </dsp:sp>
+    <dsp:sp modelId="{C0F08C6E-F9EC-4107-B91C-047EF1774D79}">
+      <dsp:nvSpPr>
+        <dsp:cNvPr id="0" name=""/>
+        <dsp:cNvSpPr/>
+      </dsp:nvSpPr>
+      <dsp:spPr>
+        <a:xfrm>
+          <a:off x="3003016" y="2525195"/>
+          <a:ext cx="1060983" cy="368275"/>
+        </a:xfrm>
+        <a:custGeom>
+          <a:avLst/>
+          <a:gdLst/>
+          <a:ahLst/>
+          <a:cxnLst/>
+          <a:rect l="0" t="0" r="0" b="0"/>
+          <a:pathLst>
+            <a:path>
+              <a:moveTo>
+                <a:pt x="1060983" y="0"/>
+              </a:moveTo>
+              <a:lnTo>
+                <a:pt x="1060983" y="184137"/>
+              </a:lnTo>
+              <a:lnTo>
+                <a:pt x="0" y="184137"/>
+              </a:lnTo>
+              <a:lnTo>
+                <a:pt x="0" y="368275"/>
+              </a:lnTo>
+            </a:path>
+          </a:pathLst>
+        </a:custGeom>
+        <a:noFill/>
+        <a:ln w="12700" cap="flat" cmpd="sng" algn="ctr">
+          <a:solidFill>
+            <a:schemeClr val="accent3">
+              <a:tint val="99000"/>
+              <a:hueOff val="0"/>
+              <a:satOff val="0"/>
+              <a:lumOff val="0"/>
+              <a:alphaOff val="0"/>
+            </a:schemeClr>
+          </a:solidFill>
+          <a:prstDash val="solid"/>
+        </a:ln>
+        <a:effectLst/>
+      </dsp:spPr>
+      <dsp:style>
+        <a:lnRef idx="2">
+          <a:scrgbClr r="0" g="0" b="0"/>
+        </a:lnRef>
+        <a:fillRef idx="0">
+          <a:scrgbClr r="0" g="0" b="0"/>
+        </a:fillRef>
+        <a:effectRef idx="0">
+          <a:scrgbClr r="0" g="0" b="0"/>
+        </a:effectRef>
+        <a:fontRef idx="minor"/>
+      </dsp:style>
+    </dsp:sp>
+    <dsp:sp modelId="{41762737-566B-4F7B-8725-0A05E87281E2}">
+      <dsp:nvSpPr>
+        <dsp:cNvPr id="0" name=""/>
+        <dsp:cNvSpPr/>
+      </dsp:nvSpPr>
+      <dsp:spPr>
+        <a:xfrm>
+          <a:off x="881050" y="2525195"/>
+          <a:ext cx="3182949" cy="368275"/>
+        </a:xfrm>
+        <a:custGeom>
+          <a:avLst/>
+          <a:gdLst/>
+          <a:ahLst/>
+          <a:cxnLst/>
+          <a:rect l="0" t="0" r="0" b="0"/>
+          <a:pathLst>
+            <a:path>
+              <a:moveTo>
+                <a:pt x="3182949" y="0"/>
+              </a:moveTo>
+              <a:lnTo>
+                <a:pt x="3182949" y="184137"/>
+              </a:lnTo>
+              <a:lnTo>
+                <a:pt x="0" y="184137"/>
+              </a:lnTo>
+              <a:lnTo>
+                <a:pt x="0" y="368275"/>
+              </a:lnTo>
+            </a:path>
+          </a:pathLst>
+        </a:custGeom>
+        <a:noFill/>
+        <a:ln w="12700" cap="flat" cmpd="sng" algn="ctr">
+          <a:solidFill>
+            <a:schemeClr val="accent3">
+              <a:tint val="99000"/>
+              <a:hueOff val="0"/>
+              <a:satOff val="0"/>
+              <a:lumOff val="0"/>
+              <a:alphaOff val="0"/>
+            </a:schemeClr>
+          </a:solidFill>
+          <a:prstDash val="solid"/>
+        </a:ln>
+        <a:effectLst/>
+      </dsp:spPr>
+      <dsp:style>
+        <a:lnRef idx="2">
+          <a:scrgbClr r="0" g="0" b="0"/>
+        </a:lnRef>
+        <a:fillRef idx="0">
+          <a:scrgbClr r="0" g="0" b="0"/>
+        </a:fillRef>
+        <a:effectRef idx="0">
+          <a:scrgbClr r="0" g="0" b="0"/>
+        </a:effectRef>
+        <a:fontRef idx="minor"/>
+      </dsp:style>
+    </dsp:sp>
+    <dsp:sp modelId="{9EE62C30-B84D-4BBB-A10D-67E37AA81DB4}">
+      <dsp:nvSpPr>
+        <dsp:cNvPr id="0" name=""/>
+        <dsp:cNvSpPr/>
+      </dsp:nvSpPr>
+      <dsp:spPr>
+        <a:xfrm>
+          <a:off x="3187154" y="1648350"/>
+          <a:ext cx="1753691" cy="876845"/>
+        </a:xfrm>
+        <a:prstGeom prst="rect">
+          <a:avLst/>
+        </a:prstGeom>
+        <a:solidFill>
+          <a:schemeClr val="accent3">
+            <a:shade val="80000"/>
+            <a:hueOff val="0"/>
+            <a:satOff val="0"/>
+            <a:lumOff val="0"/>
+            <a:alphaOff val="0"/>
+          </a:schemeClr>
+        </a:solidFill>
+        <a:ln w="12700" cap="flat" cmpd="sng" algn="ctr">
+          <a:solidFill>
+            <a:schemeClr val="lt1">
+              <a:hueOff val="0"/>
+              <a:satOff val="0"/>
+              <a:lumOff val="0"/>
+              <a:alphaOff val="0"/>
+            </a:schemeClr>
+          </a:solidFill>
+          <a:prstDash val="solid"/>
+        </a:ln>
+        <a:effectLst/>
+      </dsp:spPr>
+      <dsp:style>
+        <a:lnRef idx="2">
+          <a:scrgbClr r="0" g="0" b="0"/>
+        </a:lnRef>
+        <a:fillRef idx="1">
+          <a:scrgbClr r="0" g="0" b="0"/>
+        </a:fillRef>
+        <a:effectRef idx="0">
+          <a:scrgbClr r="0" g="0" b="0"/>
+        </a:effectRef>
+        <a:fontRef idx="minor">
+          <a:schemeClr val="lt1"/>
+        </a:fontRef>
+      </dsp:style>
+      <dsp:txBody>
+        <a:bodyPr spcFirstLastPara="0" vert="horz" wrap="square" lIns="24765" tIns="24765" rIns="24765" bIns="24765" numCol="1" spcCol="1270" anchor="ctr" anchorCtr="0">
+          <a:noAutofit/>
+        </a:bodyPr>
+        <a:lstStyle/>
+        <a:p>
+          <a:pPr marL="0" lvl="0" indent="0" algn="ctr" defTabSz="1733550">
+            <a:lnSpc>
+              <a:spcPct val="90000"/>
+            </a:lnSpc>
+            <a:spcBef>
+              <a:spcPct val="0"/>
+            </a:spcBef>
+            <a:spcAft>
+              <a:spcPct val="35000"/>
+            </a:spcAft>
+            <a:buNone/>
+          </a:pPr>
+          <a:r>
+            <a:rPr lang="en-US" sz="3900" kern="1200" dirty="0"/>
+            <a:t>Home</a:t>
+          </a:r>
+        </a:p>
+      </dsp:txBody>
+      <dsp:txXfrm>
+        <a:off x="3187154" y="1648350"/>
+        <a:ext cx="1753691" cy="876845"/>
+      </dsp:txXfrm>
+    </dsp:sp>
+    <dsp:sp modelId="{E62573F9-3493-4ADE-8DFB-4A2584C645B3}">
+      <dsp:nvSpPr>
+        <dsp:cNvPr id="0" name=""/>
+        <dsp:cNvSpPr/>
+      </dsp:nvSpPr>
+      <dsp:spPr>
+        <a:xfrm>
+          <a:off x="4204" y="2893471"/>
+          <a:ext cx="1753691" cy="876845"/>
+        </a:xfrm>
+        <a:prstGeom prst="rect">
+          <a:avLst/>
+        </a:prstGeom>
+        <a:solidFill>
+          <a:schemeClr val="accent3">
+            <a:tint val="99000"/>
+            <a:hueOff val="0"/>
+            <a:satOff val="0"/>
+            <a:lumOff val="0"/>
+            <a:alphaOff val="0"/>
+          </a:schemeClr>
+        </a:solidFill>
+        <a:ln w="12700" cap="flat" cmpd="sng" algn="ctr">
+          <a:solidFill>
+            <a:schemeClr val="lt1">
+              <a:hueOff val="0"/>
+              <a:satOff val="0"/>
+              <a:lumOff val="0"/>
+              <a:alphaOff val="0"/>
+            </a:schemeClr>
+          </a:solidFill>
+          <a:prstDash val="solid"/>
+        </a:ln>
+        <a:effectLst/>
+      </dsp:spPr>
+      <dsp:style>
+        <a:lnRef idx="2">
+          <a:scrgbClr r="0" g="0" b="0"/>
+        </a:lnRef>
+        <a:fillRef idx="1">
+          <a:scrgbClr r="0" g="0" b="0"/>
+        </a:fillRef>
+        <a:effectRef idx="0">
+          <a:scrgbClr r="0" g="0" b="0"/>
+        </a:effectRef>
+        <a:fontRef idx="minor">
+          <a:schemeClr val="lt1"/>
+        </a:fontRef>
+      </dsp:style>
+      <dsp:txBody>
+        <a:bodyPr spcFirstLastPara="0" vert="horz" wrap="square" lIns="24765" tIns="24765" rIns="24765" bIns="24765" numCol="1" spcCol="1270" anchor="ctr" anchorCtr="0">
+          <a:noAutofit/>
+        </a:bodyPr>
+        <a:lstStyle/>
+        <a:p>
+          <a:pPr marL="0" lvl="0" indent="0" algn="ctr" defTabSz="1733550">
+            <a:lnSpc>
+              <a:spcPct val="90000"/>
+            </a:lnSpc>
+            <a:spcBef>
+              <a:spcPct val="0"/>
+            </a:spcBef>
+            <a:spcAft>
+              <a:spcPct val="35000"/>
+            </a:spcAft>
+            <a:buNone/>
+          </a:pPr>
+          <a:r>
+            <a:rPr lang="en-US" sz="3900" kern="1200" dirty="0"/>
+            <a:t>Users</a:t>
+          </a:r>
+        </a:p>
+      </dsp:txBody>
+      <dsp:txXfrm>
+        <a:off x="4204" y="2893471"/>
+        <a:ext cx="1753691" cy="876845"/>
+      </dsp:txXfrm>
+    </dsp:sp>
+    <dsp:sp modelId="{D979A5D4-BA28-4146-B2CF-6CB37BB43928}">
+      <dsp:nvSpPr>
+        <dsp:cNvPr id="0" name=""/>
+        <dsp:cNvSpPr/>
+      </dsp:nvSpPr>
+      <dsp:spPr>
+        <a:xfrm>
+          <a:off x="2126170" y="2893471"/>
+          <a:ext cx="1753691" cy="876845"/>
+        </a:xfrm>
+        <a:prstGeom prst="rect">
+          <a:avLst/>
+        </a:prstGeom>
+        <a:solidFill>
+          <a:schemeClr val="accent3">
+            <a:tint val="99000"/>
+            <a:hueOff val="0"/>
+            <a:satOff val="0"/>
+            <a:lumOff val="0"/>
+            <a:alphaOff val="0"/>
+          </a:schemeClr>
+        </a:solidFill>
+        <a:ln w="12700" cap="flat" cmpd="sng" algn="ctr">
+          <a:solidFill>
+            <a:schemeClr val="lt1">
+              <a:hueOff val="0"/>
+              <a:satOff val="0"/>
+              <a:lumOff val="0"/>
+              <a:alphaOff val="0"/>
+            </a:schemeClr>
+          </a:solidFill>
+          <a:prstDash val="solid"/>
+        </a:ln>
+        <a:effectLst/>
+      </dsp:spPr>
+      <dsp:style>
+        <a:lnRef idx="2">
+          <a:scrgbClr r="0" g="0" b="0"/>
+        </a:lnRef>
+        <a:fillRef idx="1">
+          <a:scrgbClr r="0" g="0" b="0"/>
+        </a:fillRef>
+        <a:effectRef idx="0">
+          <a:scrgbClr r="0" g="0" b="0"/>
+        </a:effectRef>
+        <a:fontRef idx="minor">
+          <a:schemeClr val="lt1"/>
+        </a:fontRef>
+      </dsp:style>
+      <dsp:txBody>
+        <a:bodyPr spcFirstLastPara="0" vert="horz" wrap="square" lIns="24765" tIns="24765" rIns="24765" bIns="24765" numCol="1" spcCol="1270" anchor="ctr" anchorCtr="0">
+          <a:noAutofit/>
+        </a:bodyPr>
+        <a:lstStyle/>
+        <a:p>
+          <a:pPr marL="0" lvl="0" indent="0" algn="ctr" defTabSz="1733550">
+            <a:lnSpc>
+              <a:spcPct val="90000"/>
+            </a:lnSpc>
+            <a:spcBef>
+              <a:spcPct val="0"/>
+            </a:spcBef>
+            <a:spcAft>
+              <a:spcPct val="35000"/>
+            </a:spcAft>
+            <a:buNone/>
+          </a:pPr>
+          <a:r>
+            <a:rPr lang="en-US" sz="3900" kern="1200" dirty="0"/>
+            <a:t>Cars</a:t>
+          </a:r>
+        </a:p>
+      </dsp:txBody>
+      <dsp:txXfrm>
+        <a:off x="2126170" y="2893471"/>
+        <a:ext cx="1753691" cy="876845"/>
+      </dsp:txXfrm>
+    </dsp:sp>
+    <dsp:sp modelId="{16462F1F-F996-4C8B-86FD-54BCC2C3DB53}">
+      <dsp:nvSpPr>
+        <dsp:cNvPr id="0" name=""/>
+        <dsp:cNvSpPr/>
+      </dsp:nvSpPr>
+      <dsp:spPr>
+        <a:xfrm>
+          <a:off x="4248137" y="2893471"/>
+          <a:ext cx="1753691" cy="876845"/>
+        </a:xfrm>
+        <a:prstGeom prst="rect">
+          <a:avLst/>
+        </a:prstGeom>
+        <a:solidFill>
+          <a:schemeClr val="accent3">
+            <a:tint val="99000"/>
+            <a:hueOff val="0"/>
+            <a:satOff val="0"/>
+            <a:lumOff val="0"/>
+            <a:alphaOff val="0"/>
+          </a:schemeClr>
+        </a:solidFill>
+        <a:ln w="12700" cap="flat" cmpd="sng" algn="ctr">
+          <a:solidFill>
+            <a:schemeClr val="lt1">
+              <a:hueOff val="0"/>
+              <a:satOff val="0"/>
+              <a:lumOff val="0"/>
+              <a:alphaOff val="0"/>
+            </a:schemeClr>
+          </a:solidFill>
+          <a:prstDash val="solid"/>
+        </a:ln>
+        <a:effectLst/>
+      </dsp:spPr>
+      <dsp:style>
+        <a:lnRef idx="2">
+          <a:scrgbClr r="0" g="0" b="0"/>
+        </a:lnRef>
+        <a:fillRef idx="1">
+          <a:scrgbClr r="0" g="0" b="0"/>
+        </a:fillRef>
+        <a:effectRef idx="0">
+          <a:scrgbClr r="0" g="0" b="0"/>
+        </a:effectRef>
+        <a:fontRef idx="minor">
+          <a:schemeClr val="lt1"/>
+        </a:fontRef>
+      </dsp:style>
+      <dsp:txBody>
+        <a:bodyPr spcFirstLastPara="0" vert="horz" wrap="square" lIns="24765" tIns="24765" rIns="24765" bIns="24765" numCol="1" spcCol="1270" anchor="ctr" anchorCtr="0">
+          <a:noAutofit/>
+        </a:bodyPr>
+        <a:lstStyle/>
+        <a:p>
+          <a:pPr marL="0" lvl="0" indent="0" algn="ctr" defTabSz="1733550">
+            <a:lnSpc>
+              <a:spcPct val="90000"/>
+            </a:lnSpc>
+            <a:spcBef>
+              <a:spcPct val="0"/>
+            </a:spcBef>
+            <a:spcAft>
+              <a:spcPct val="35000"/>
+            </a:spcAft>
+            <a:buNone/>
+          </a:pPr>
+          <a:r>
+            <a:rPr lang="en-US" sz="3900" kern="1200" dirty="0"/>
+            <a:t>Partners</a:t>
+          </a:r>
+        </a:p>
+      </dsp:txBody>
+      <dsp:txXfrm>
+        <a:off x="4248137" y="2893471"/>
+        <a:ext cx="1753691" cy="876845"/>
+      </dsp:txXfrm>
+    </dsp:sp>
+    <dsp:sp modelId="{6D7E2EB5-1DD0-4FB3-ADCF-64A769F68D2E}">
+      <dsp:nvSpPr>
+        <dsp:cNvPr id="0" name=""/>
+        <dsp:cNvSpPr/>
+      </dsp:nvSpPr>
+      <dsp:spPr>
+        <a:xfrm>
+          <a:off x="6370104" y="2893471"/>
+          <a:ext cx="1753691" cy="876845"/>
+        </a:xfrm>
+        <a:prstGeom prst="rect">
+          <a:avLst/>
+        </a:prstGeom>
+        <a:solidFill>
+          <a:schemeClr val="accent3">
+            <a:tint val="99000"/>
+            <a:hueOff val="0"/>
+            <a:satOff val="0"/>
+            <a:lumOff val="0"/>
+            <a:alphaOff val="0"/>
+          </a:schemeClr>
+        </a:solidFill>
+        <a:ln w="12700" cap="flat" cmpd="sng" algn="ctr">
+          <a:solidFill>
+            <a:schemeClr val="lt1">
+              <a:hueOff val="0"/>
+              <a:satOff val="0"/>
+              <a:lumOff val="0"/>
+              <a:alphaOff val="0"/>
+            </a:schemeClr>
+          </a:solidFill>
+          <a:prstDash val="solid"/>
+        </a:ln>
+        <a:effectLst/>
+      </dsp:spPr>
+      <dsp:style>
+        <a:lnRef idx="2">
+          <a:scrgbClr r="0" g="0" b="0"/>
+        </a:lnRef>
+        <a:fillRef idx="1">
+          <a:scrgbClr r="0" g="0" b="0"/>
+        </a:fillRef>
+        <a:effectRef idx="0">
+          <a:scrgbClr r="0" g="0" b="0"/>
+        </a:effectRef>
+        <a:fontRef idx="minor">
+          <a:schemeClr val="lt1"/>
+        </a:fontRef>
+      </dsp:style>
+      <dsp:txBody>
+        <a:bodyPr spcFirstLastPara="0" vert="horz" wrap="square" lIns="24765" tIns="24765" rIns="24765" bIns="24765" numCol="1" spcCol="1270" anchor="ctr" anchorCtr="0">
+          <a:noAutofit/>
+        </a:bodyPr>
+        <a:lstStyle/>
+        <a:p>
+          <a:pPr marL="0" lvl="0" indent="0" algn="ctr" defTabSz="1733550">
+            <a:lnSpc>
+              <a:spcPct val="90000"/>
+            </a:lnSpc>
+            <a:spcBef>
+              <a:spcPct val="0"/>
+            </a:spcBef>
+            <a:spcAft>
+              <a:spcPct val="35000"/>
+            </a:spcAft>
+            <a:buNone/>
+          </a:pPr>
+          <a:r>
+            <a:rPr lang="en-US" sz="3900" kern="1200" dirty="0"/>
+            <a:t>Issues</a:t>
+          </a:r>
+        </a:p>
+      </dsp:txBody>
+      <dsp:txXfrm>
+        <a:off x="6370104" y="2893471"/>
+        <a:ext cx="1753691" cy="876845"/>
+      </dsp:txXfrm>
+    </dsp:sp>
+  </dsp:spTree>
+</dsp:drawing>
+</file>
+
 <file path=ppt/diagrams/layout1.xml><?xml version="1.0" encoding="utf-8"?>
 <dgm:layoutDef xmlns:dgm="http://schemas.openxmlformats.org/drawingml/2006/diagram" xmlns:a="http://schemas.openxmlformats.org/drawingml/2006/main" uniqueId="urn:microsoft.com/office/officeart/2005/8/layout/hierarchy4">
   <dgm:title val=""/>
@@ -4008,6 +5980,1152 @@
 </dgm:layoutDef>
 </file>
 
+<file path=ppt/diagrams/layout2.xml><?xml version="1.0" encoding="utf-8"?>
+<dgm:layoutDef xmlns:dgm="http://schemas.openxmlformats.org/drawingml/2006/diagram" xmlns:a="http://schemas.openxmlformats.org/drawingml/2006/main" uniqueId="urn:microsoft.com/office/officeart/2005/8/layout/orgChart1">
+  <dgm:title val=""/>
+  <dgm:desc val=""/>
+  <dgm:catLst>
+    <dgm:cat type="hierarchy" pri="1000"/>
+    <dgm:cat type="convert" pri="6000"/>
+  </dgm:catLst>
+  <dgm:sampData>
+    <dgm:dataModel>
+      <dgm:ptLst>
+        <dgm:pt modelId="0" type="doc"/>
+        <dgm:pt modelId="1">
+          <dgm:prSet phldr="1"/>
+        </dgm:pt>
+        <dgm:pt modelId="2" type="asst">
+          <dgm:prSet phldr="1"/>
+        </dgm:pt>
+        <dgm:pt modelId="3">
+          <dgm:prSet phldr="1"/>
+        </dgm:pt>
+        <dgm:pt modelId="4">
+          <dgm:prSet phldr="1"/>
+        </dgm:pt>
+        <dgm:pt modelId="5">
+          <dgm:prSet phldr="1"/>
+        </dgm:pt>
+      </dgm:ptLst>
+      <dgm:cxnLst>
+        <dgm:cxn modelId="5" srcId="0" destId="1" srcOrd="0" destOrd="0"/>
+        <dgm:cxn modelId="6" srcId="1" destId="2" srcOrd="0" destOrd="0"/>
+        <dgm:cxn modelId="7" srcId="1" destId="3" srcOrd="1" destOrd="0"/>
+        <dgm:cxn modelId="8" srcId="1" destId="4" srcOrd="2" destOrd="0"/>
+        <dgm:cxn modelId="9" srcId="1" destId="5" srcOrd="3" destOrd="0"/>
+      </dgm:cxnLst>
+      <dgm:bg/>
+      <dgm:whole/>
+    </dgm:dataModel>
+  </dgm:sampData>
+  <dgm:styleData>
+    <dgm:dataModel>
+      <dgm:ptLst>
+        <dgm:pt modelId="0" type="doc"/>
+        <dgm:pt modelId="1"/>
+        <dgm:pt modelId="12"/>
+        <dgm:pt modelId="13"/>
+      </dgm:ptLst>
+      <dgm:cxnLst>
+        <dgm:cxn modelId="2" srcId="0" destId="1" srcOrd="0" destOrd="0"/>
+        <dgm:cxn modelId="16" srcId="1" destId="12" srcOrd="1" destOrd="0"/>
+        <dgm:cxn modelId="17" srcId="1" destId="13" srcOrd="2" destOrd="0"/>
+      </dgm:cxnLst>
+      <dgm:bg/>
+      <dgm:whole/>
+    </dgm:dataModel>
+  </dgm:styleData>
+  <dgm:clrData>
+    <dgm:dataModel>
+      <dgm:ptLst>
+        <dgm:pt modelId="0" type="doc"/>
+        <dgm:pt modelId="1"/>
+        <dgm:pt modelId="11" type="asst"/>
+        <dgm:pt modelId="12"/>
+        <dgm:pt modelId="13"/>
+        <dgm:pt modelId="14"/>
+      </dgm:ptLst>
+      <dgm:cxnLst>
+        <dgm:cxn modelId="2" srcId="0" destId="1" srcOrd="0" destOrd="0"/>
+        <dgm:cxn modelId="15" srcId="1" destId="11" srcOrd="0" destOrd="0"/>
+        <dgm:cxn modelId="16" srcId="1" destId="12" srcOrd="1" destOrd="0"/>
+        <dgm:cxn modelId="17" srcId="1" destId="13" srcOrd="2" destOrd="0"/>
+        <dgm:cxn modelId="18" srcId="1" destId="14" srcOrd="2" destOrd="0"/>
+      </dgm:cxnLst>
+      <dgm:bg/>
+      <dgm:whole/>
+    </dgm:dataModel>
+  </dgm:clrData>
+  <dgm:layoutNode name="hierChild1">
+    <dgm:varLst>
+      <dgm:orgChart val="1"/>
+      <dgm:chPref val="1"/>
+      <dgm:dir/>
+      <dgm:animOne val="branch"/>
+      <dgm:animLvl val="lvl"/>
+      <dgm:resizeHandles/>
+    </dgm:varLst>
+    <dgm:choose name="Name0">
+      <dgm:if name="Name1" func="var" arg="dir" op="equ" val="norm">
+        <dgm:alg type="hierChild">
+          <dgm:param type="linDir" val="fromL"/>
+        </dgm:alg>
+      </dgm:if>
+      <dgm:else name="Name2">
+        <dgm:alg type="hierChild">
+          <dgm:param type="linDir" val="fromR"/>
+        </dgm:alg>
+      </dgm:else>
+    </dgm:choose>
+    <dgm:shape xmlns:r="http://schemas.openxmlformats.org/officeDocument/2006/relationships" r:blip="">
+      <dgm:adjLst/>
+    </dgm:shape>
+    <dgm:presOf/>
+    <dgm:constrLst>
+      <dgm:constr type="w" for="des" forName="rootComposite1" refType="w" fact="10"/>
+      <dgm:constr type="h" for="des" forName="rootComposite1" refType="w" refFor="des" refForName="rootComposite1" fact="0.5"/>
+      <dgm:constr type="w" for="des" forName="rootComposite" refType="w" fact="10"/>
+      <dgm:constr type="h" for="des" forName="rootComposite" refType="w" refFor="des" refForName="rootComposite1" fact="0.5"/>
+      <dgm:constr type="w" for="des" forName="rootComposite3" refType="w" fact="10"/>
+      <dgm:constr type="h" for="des" forName="rootComposite3" refType="w" refFor="des" refForName="rootComposite1" fact="0.5"/>
+      <dgm:constr type="primFontSz" for="des" ptType="node" op="equ"/>
+      <dgm:constr type="sp" for="des" op="equ"/>
+      <dgm:constr type="sp" for="des" forName="hierRoot1" refType="w" refFor="des" refForName="rootComposite1" fact="0.21"/>
+      <dgm:constr type="sp" for="des" forName="hierRoot2" refType="sp" refFor="des" refForName="hierRoot1"/>
+      <dgm:constr type="sp" for="des" forName="hierRoot3" refType="sp" refFor="des" refForName="hierRoot1"/>
+      <dgm:constr type="sibSp" refType="w" refFor="des" refForName="rootComposite1" fact="0.21"/>
+      <dgm:constr type="sibSp" for="des" forName="hierChild2" refType="sibSp"/>
+      <dgm:constr type="sibSp" for="des" forName="hierChild3" refType="sibSp"/>
+      <dgm:constr type="sibSp" for="des" forName="hierChild4" refType="sibSp"/>
+      <dgm:constr type="sibSp" for="des" forName="hierChild5" refType="sibSp"/>
+      <dgm:constr type="sibSp" for="des" forName="hierChild6" refType="sibSp"/>
+      <dgm:constr type="sibSp" for="des" forName="hierChild7" refType="sibSp"/>
+      <dgm:constr type="secSibSp" refType="w" refFor="des" refForName="rootComposite1" fact="0.21"/>
+      <dgm:constr type="secSibSp" for="des" forName="hierChild2" refType="secSibSp"/>
+      <dgm:constr type="secSibSp" for="des" forName="hierChild3" refType="secSibSp"/>
+      <dgm:constr type="secSibSp" for="des" forName="hierChild4" refType="secSibSp"/>
+      <dgm:constr type="secSibSp" for="des" forName="hierChild5" refType="secSibSp"/>
+      <dgm:constr type="secSibSp" for="des" forName="hierChild6" refType="secSibSp"/>
+      <dgm:constr type="secSibSp" for="des" forName="hierChild7" refType="secSibSp"/>
+    </dgm:constrLst>
+    <dgm:ruleLst/>
+    <dgm:forEach name="Name3" axis="ch">
+      <dgm:forEach name="Name4" axis="self" ptType="node">
+        <dgm:layoutNode name="hierRoot1">
+          <dgm:varLst>
+            <dgm:hierBranch val="init"/>
+          </dgm:varLst>
+          <dgm:choose name="Name5">
+            <dgm:if name="Name6" func="var" arg="hierBranch" op="equ" val="l">
+              <dgm:choose name="Name7">
+                <dgm:if name="Name8" axis="ch" ptType="asst" func="cnt" op="gte" val="1">
+                  <dgm:alg type="hierRoot">
+                    <dgm:param type="hierAlign" val="tR"/>
+                  </dgm:alg>
+                  <dgm:constrLst>
+                    <dgm:constr type="alignOff" val="0.65"/>
+                  </dgm:constrLst>
+                </dgm:if>
+                <dgm:else name="Name9">
+                  <dgm:alg type="hierRoot">
+                    <dgm:param type="hierAlign" val="tR"/>
+                  </dgm:alg>
+                  <dgm:constrLst>
+                    <dgm:constr type="alignOff" val="0.25"/>
+                  </dgm:constrLst>
+                </dgm:else>
+              </dgm:choose>
+            </dgm:if>
+            <dgm:if name="Name10" func="var" arg="hierBranch" op="equ" val="r">
+              <dgm:choose name="Name11">
+                <dgm:if name="Name12" axis="ch" ptType="asst" func="cnt" op="gte" val="1">
+                  <dgm:alg type="hierRoot">
+                    <dgm:param type="hierAlign" val="tL"/>
+                  </dgm:alg>
+                  <dgm:constrLst>
+                    <dgm:constr type="alignOff" val="0.65"/>
+                  </dgm:constrLst>
+                </dgm:if>
+                <dgm:else name="Name13">
+                  <dgm:alg type="hierRoot">
+                    <dgm:param type="hierAlign" val="tL"/>
+                  </dgm:alg>
+                  <dgm:constrLst>
+                    <dgm:constr type="alignOff" val="0.25"/>
+                  </dgm:constrLst>
+                </dgm:else>
+              </dgm:choose>
+            </dgm:if>
+            <dgm:if name="Name14" func="var" arg="hierBranch" op="equ" val="hang">
+              <dgm:alg type="hierRoot"/>
+              <dgm:constrLst>
+                <dgm:constr type="alignOff" val="0.65"/>
+              </dgm:constrLst>
+            </dgm:if>
+            <dgm:else name="Name15">
+              <dgm:alg type="hierRoot"/>
+              <dgm:constrLst>
+                <dgm:constr type="alignOff"/>
+                <dgm:constr type="bendDist" for="des" ptType="parTrans" refType="sp" fact="0.5"/>
+              </dgm:constrLst>
+            </dgm:else>
+          </dgm:choose>
+          <dgm:shape xmlns:r="http://schemas.openxmlformats.org/officeDocument/2006/relationships" r:blip="">
+            <dgm:adjLst/>
+          </dgm:shape>
+          <dgm:presOf/>
+          <dgm:ruleLst/>
+          <dgm:layoutNode name="rootComposite1">
+            <dgm:alg type="composite"/>
+            <dgm:shape xmlns:r="http://schemas.openxmlformats.org/officeDocument/2006/relationships" r:blip="">
+              <dgm:adjLst/>
+            </dgm:shape>
+            <dgm:presOf axis="self" ptType="node" cnt="1"/>
+            <dgm:choose name="Name16">
+              <dgm:if name="Name17" func="var" arg="hierBranch" op="equ" val="init">
+                <dgm:constrLst>
+                  <dgm:constr type="l" for="ch" forName="rootText1"/>
+                  <dgm:constr type="t" for="ch" forName="rootText1"/>
+                  <dgm:constr type="w" for="ch" forName="rootText1" refType="w"/>
+                  <dgm:constr type="h" for="ch" forName="rootText1" refType="h"/>
+                  <dgm:constr type="l" for="ch" forName="rootConnector1"/>
+                  <dgm:constr type="t" for="ch" forName="rootConnector1"/>
+                  <dgm:constr type="w" for="ch" forName="rootConnector1" refType="w" refFor="ch" refForName="rootText1" fact="0.2"/>
+                  <dgm:constr type="h" for="ch" forName="rootConnector1" refType="h" refFor="ch" refForName="rootText1"/>
+                </dgm:constrLst>
+              </dgm:if>
+              <dgm:if name="Name18" func="var" arg="hierBranch" op="equ" val="l">
+                <dgm:constrLst>
+                  <dgm:constr type="l" for="ch" forName="rootText1"/>
+                  <dgm:constr type="t" for="ch" forName="rootText1"/>
+                  <dgm:constr type="w" for="ch" forName="rootText1" refType="w"/>
+                  <dgm:constr type="h" for="ch" forName="rootText1" refType="h"/>
+                  <dgm:constr type="r" for="ch" forName="rootConnector1" refType="w"/>
+                  <dgm:constr type="t" for="ch" forName="rootConnector1"/>
+                  <dgm:constr type="w" for="ch" forName="rootConnector1" refType="w" refFor="ch" refForName="rootText1" fact="0.2"/>
+                  <dgm:constr type="h" for="ch" forName="rootConnector1" refType="h" refFor="ch" refForName="rootText1"/>
+                </dgm:constrLst>
+              </dgm:if>
+              <dgm:if name="Name19" func="var" arg="hierBranch" op="equ" val="r">
+                <dgm:constrLst>
+                  <dgm:constr type="l" for="ch" forName="rootText1"/>
+                  <dgm:constr type="t" for="ch" forName="rootText1"/>
+                  <dgm:constr type="w" for="ch" forName="rootText1" refType="w"/>
+                  <dgm:constr type="h" for="ch" forName="rootText1" refType="h"/>
+                  <dgm:constr type="l" for="ch" forName="rootConnector1"/>
+                  <dgm:constr type="t" for="ch" forName="rootConnector1"/>
+                  <dgm:constr type="w" for="ch" forName="rootConnector1" refType="w" refFor="ch" refForName="rootText1" fact="0.2"/>
+                  <dgm:constr type="h" for="ch" forName="rootConnector1" refType="h" refFor="ch" refForName="rootText1"/>
+                </dgm:constrLst>
+              </dgm:if>
+              <dgm:else name="Name20">
+                <dgm:constrLst>
+                  <dgm:constr type="l" for="ch" forName="rootText1"/>
+                  <dgm:constr type="t" for="ch" forName="rootText1"/>
+                  <dgm:constr type="w" for="ch" forName="rootText1" refType="w"/>
+                  <dgm:constr type="h" for="ch" forName="rootText1" refType="h"/>
+                  <dgm:constr type="r" for="ch" forName="rootConnector1" refType="w"/>
+                  <dgm:constr type="t" for="ch" forName="rootConnector1"/>
+                  <dgm:constr type="w" for="ch" forName="rootConnector1" refType="w" refFor="ch" refForName="rootText1" fact="0.2"/>
+                  <dgm:constr type="h" for="ch" forName="rootConnector1" refType="h" refFor="ch" refForName="rootText1"/>
+                </dgm:constrLst>
+              </dgm:else>
+            </dgm:choose>
+            <dgm:ruleLst/>
+            <dgm:layoutNode name="rootText1" styleLbl="node0">
+              <dgm:varLst>
+                <dgm:chPref val="3"/>
+              </dgm:varLst>
+              <dgm:alg type="tx"/>
+              <dgm:shape xmlns:r="http://schemas.openxmlformats.org/officeDocument/2006/relationships" type="rect" r:blip="">
+                <dgm:adjLst/>
+              </dgm:shape>
+              <dgm:presOf axis="self" ptType="node" cnt="1"/>
+              <dgm:constrLst>
+                <dgm:constr type="primFontSz" val="65"/>
+                <dgm:constr type="lMarg" refType="primFontSz" fact="0.05"/>
+                <dgm:constr type="rMarg" refType="primFontSz" fact="0.05"/>
+                <dgm:constr type="tMarg" refType="primFontSz" fact="0.05"/>
+                <dgm:constr type="bMarg" refType="primFontSz" fact="0.05"/>
+              </dgm:constrLst>
+              <dgm:ruleLst>
+                <dgm:rule type="primFontSz" val="5" fact="NaN" max="NaN"/>
+              </dgm:ruleLst>
+            </dgm:layoutNode>
+            <dgm:layoutNode name="rootConnector1" moveWith="rootText1">
+              <dgm:alg type="sp"/>
+              <dgm:shape xmlns:r="http://schemas.openxmlformats.org/officeDocument/2006/relationships" type="rect" r:blip="" hideGeom="1">
+                <dgm:adjLst/>
+              </dgm:shape>
+              <dgm:presOf axis="self" ptType="node" cnt="1"/>
+              <dgm:constrLst/>
+              <dgm:ruleLst/>
+            </dgm:layoutNode>
+          </dgm:layoutNode>
+          <dgm:layoutNode name="hierChild2">
+            <dgm:choose name="Name21">
+              <dgm:if name="Name22" func="var" arg="hierBranch" op="equ" val="l">
+                <dgm:alg type="hierChild">
+                  <dgm:param type="chAlign" val="r"/>
+                  <dgm:param type="linDir" val="fromT"/>
+                </dgm:alg>
+              </dgm:if>
+              <dgm:if name="Name23" func="var" arg="hierBranch" op="equ" val="r">
+                <dgm:alg type="hierChild">
+                  <dgm:param type="chAlign" val="l"/>
+                  <dgm:param type="linDir" val="fromT"/>
+                </dgm:alg>
+              </dgm:if>
+              <dgm:if name="Name24" func="var" arg="hierBranch" op="equ" val="hang">
+                <dgm:choose name="Name25">
+                  <dgm:if name="Name26" func="var" arg="dir" op="equ" val="norm">
+                    <dgm:alg type="hierChild">
+                      <dgm:param type="chAlign" val="l"/>
+                      <dgm:param type="linDir" val="fromL"/>
+                      <dgm:param type="secChAlign" val="t"/>
+                      <dgm:param type="secLinDir" val="fromT"/>
+                    </dgm:alg>
+                  </dgm:if>
+                  <dgm:else name="Name27">
+                    <dgm:alg type="hierChild">
+                      <dgm:param type="chAlign" val="l"/>
+                      <dgm:param type="linDir" val="fromR"/>
+                      <dgm:param type="secChAlign" val="t"/>
+                      <dgm:param type="secLinDir" val="fromT"/>
+                    </dgm:alg>
+                  </dgm:else>
+                </dgm:choose>
+              </dgm:if>
+              <dgm:else name="Name28">
+                <dgm:choose name="Name29">
+                  <dgm:if name="Name30" func="var" arg="dir" op="equ" val="norm">
+                    <dgm:alg type="hierChild"/>
+                  </dgm:if>
+                  <dgm:else name="Name31">
+                    <dgm:alg type="hierChild">
+                      <dgm:param type="linDir" val="fromR"/>
+                    </dgm:alg>
+                  </dgm:else>
+                </dgm:choose>
+              </dgm:else>
+            </dgm:choose>
+            <dgm:shape xmlns:r="http://schemas.openxmlformats.org/officeDocument/2006/relationships" r:blip="">
+              <dgm:adjLst/>
+            </dgm:shape>
+            <dgm:presOf/>
+            <dgm:constrLst/>
+            <dgm:ruleLst/>
+            <dgm:forEach name="rep2a" axis="ch" ptType="nonAsst">
+              <dgm:forEach name="Name32" axis="precedSib" ptType="parTrans" st="-1" cnt="1">
+                <dgm:choose name="Name33">
+                  <dgm:if name="Name34" func="var" arg="hierBranch" op="equ" val="std">
+                    <dgm:layoutNode name="Name35">
+                      <dgm:alg type="conn">
+                        <dgm:param type="connRout" val="bend"/>
+                        <dgm:param type="dim" val="1D"/>
+                        <dgm:param type="endSty" val="noArr"/>
+                        <dgm:param type="begPts" val="bCtr"/>
+                        <dgm:param type="endPts" val="tCtr"/>
+                        <dgm:param type="bendPt" val="end"/>
+                      </dgm:alg>
+                      <dgm:shape xmlns:r="http://schemas.openxmlformats.org/officeDocument/2006/relationships" type="conn" r:blip="" zOrderOff="-99999">
+                        <dgm:adjLst/>
+                      </dgm:shape>
+                      <dgm:presOf axis="self"/>
+                      <dgm:constrLst>
+                        <dgm:constr type="begPad"/>
+                        <dgm:constr type="endPad"/>
+                      </dgm:constrLst>
+                      <dgm:ruleLst/>
+                    </dgm:layoutNode>
+                  </dgm:if>
+                  <dgm:if name="Name36" func="var" arg="hierBranch" op="equ" val="init">
+                    <dgm:layoutNode name="Name37">
+                      <dgm:choose name="Name38">
+                        <dgm:if name="Name39" axis="self" func="depth" op="lte" val="2">
+                          <dgm:alg type="conn">
+                            <dgm:param type="connRout" val="bend"/>
+                            <dgm:param type="dim" val="1D"/>
+                            <dgm:param type="endSty" val="noArr"/>
+                            <dgm:param type="begPts" val="bCtr"/>
+                            <dgm:param type="endPts" val="tCtr"/>
+                            <dgm:param type="bendPt" val="end"/>
+                          </dgm:alg>
+                        </dgm:if>
+                        <dgm:else name="Name40">
+                          <dgm:choose name="Name41">
+                            <dgm:if name="Name42" axis="par des" func="maxDepth" op="lte" val="1">
+                              <dgm:choose name="Name43">
+                                <dgm:if name="Name44" axis="par ch" ptType="node asst" func="cnt" op="gte" val="1">
+                                  <dgm:alg type="conn">
+                                    <dgm:param type="connRout" val="bend"/>
+                                    <dgm:param type="dim" val="1D"/>
+                                    <dgm:param type="endSty" val="noArr"/>
+                                    <dgm:param type="begPts" val="bCtr"/>
+                                    <dgm:param type="endPts" val="midL midR"/>
+                                  </dgm:alg>
+                                </dgm:if>
+                                <dgm:else name="Name45">
+                                  <dgm:alg type="conn">
+                                    <dgm:param type="connRout" val="bend"/>
+                                    <dgm:param type="dim" val="1D"/>
+                                    <dgm:param type="endSty" val="noArr"/>
+                                    <dgm:param type="begPts" val="bCtr"/>
+                                    <dgm:param type="endPts" val="midL midR"/>
+                                    <dgm:param type="srcNode" val="rootConnector"/>
+                                  </dgm:alg>
+                                </dgm:else>
+                              </dgm:choose>
+                            </dgm:if>
+                            <dgm:else name="Name46">
+                              <dgm:alg type="conn">
+                                <dgm:param type="connRout" val="bend"/>
+                                <dgm:param type="dim" val="1D"/>
+                                <dgm:param type="endSty" val="noArr"/>
+                                <dgm:param type="begPts" val="bCtr"/>
+                                <dgm:param type="endPts" val="tCtr"/>
+                                <dgm:param type="bendPt" val="end"/>
+                              </dgm:alg>
+                            </dgm:else>
+                          </dgm:choose>
+                        </dgm:else>
+                      </dgm:choose>
+                      <dgm:shape xmlns:r="http://schemas.openxmlformats.org/officeDocument/2006/relationships" type="conn" r:blip="" zOrderOff="-99999">
+                        <dgm:adjLst/>
+                      </dgm:shape>
+                      <dgm:presOf axis="self"/>
+                      <dgm:constrLst>
+                        <dgm:constr type="begPad"/>
+                        <dgm:constr type="endPad"/>
+                      </dgm:constrLst>
+                      <dgm:ruleLst/>
+                    </dgm:layoutNode>
+                  </dgm:if>
+                  <dgm:if name="Name47" func="var" arg="hierBranch" op="equ" val="hang">
+                    <dgm:layoutNode name="Name48">
+                      <dgm:alg type="conn">
+                        <dgm:param type="connRout" val="bend"/>
+                        <dgm:param type="dim" val="1D"/>
+                        <dgm:param type="endSty" val="noArr"/>
+                        <dgm:param type="begPts" val="bCtr"/>
+                        <dgm:param type="endPts" val="midL midR"/>
+                      </dgm:alg>
+                      <dgm:shape xmlns:r="http://schemas.openxmlformats.org/officeDocument/2006/relationships" type="conn" r:blip="" zOrderOff="-99999">
+                        <dgm:adjLst/>
+                      </dgm:shape>
+                      <dgm:presOf axis="self"/>
+                      <dgm:constrLst>
+                        <dgm:constr type="begPad"/>
+                        <dgm:constr type="endPad"/>
+                      </dgm:constrLst>
+                      <dgm:ruleLst/>
+                    </dgm:layoutNode>
+                  </dgm:if>
+                  <dgm:else name="Name49">
+                    <dgm:layoutNode name="Name50">
+                      <dgm:choose name="Name51">
+                        <dgm:if name="Name52" axis="self" func="depth" op="lte" val="2">
+                          <dgm:choose name="Name53">
+                            <dgm:if name="Name54" axis="par ch" ptType="node asst" func="cnt" op="gte" val="1">
+                              <dgm:alg type="conn">
+                                <dgm:param type="connRout" val="bend"/>
+                                <dgm:param type="dim" val="1D"/>
+                                <dgm:param type="endSty" val="noArr"/>
+                                <dgm:param type="begPts" val="bCtr"/>
+                                <dgm:param type="endPts" val="midL midR"/>
+                              </dgm:alg>
+                            </dgm:if>
+                            <dgm:else name="Name55">
+                              <dgm:alg type="conn">
+                                <dgm:param type="connRout" val="bend"/>
+                                <dgm:param type="dim" val="1D"/>
+                                <dgm:param type="endSty" val="noArr"/>
+                                <dgm:param type="begPts" val="bCtr"/>
+                                <dgm:param type="endPts" val="midL midR"/>
+                                <dgm:param type="srcNode" val="rootConnector1"/>
+                              </dgm:alg>
+                            </dgm:else>
+                          </dgm:choose>
+                        </dgm:if>
+                        <dgm:else name="Name56">
+                          <dgm:choose name="Name57">
+                            <dgm:if name="Name58" axis="par ch" ptType="node asst" func="cnt" op="gte" val="1">
+                              <dgm:alg type="conn">
+                                <dgm:param type="connRout" val="bend"/>
+                                <dgm:param type="dim" val="1D"/>
+                                <dgm:param type="endSty" val="noArr"/>
+                                <dgm:param type="begPts" val="bCtr"/>
+                                <dgm:param type="endPts" val="midL midR"/>
+                              </dgm:alg>
+                            </dgm:if>
+                            <dgm:else name="Name59">
+                              <dgm:alg type="conn">
+                                <dgm:param type="connRout" val="bend"/>
+                                <dgm:param type="dim" val="1D"/>
+                                <dgm:param type="endSty" val="noArr"/>
+                                <dgm:param type="begPts" val="bCtr"/>
+                                <dgm:param type="endPts" val="midL midR"/>
+                                <dgm:param type="srcNode" val="rootConnector"/>
+                              </dgm:alg>
+                            </dgm:else>
+                          </dgm:choose>
+                        </dgm:else>
+                      </dgm:choose>
+                      <dgm:shape xmlns:r="http://schemas.openxmlformats.org/officeDocument/2006/relationships" type="conn" r:blip="" zOrderOff="-99999">
+                        <dgm:adjLst/>
+                      </dgm:shape>
+                      <dgm:presOf axis="self"/>
+                      <dgm:constrLst>
+                        <dgm:constr type="begPad"/>
+                        <dgm:constr type="endPad"/>
+                      </dgm:constrLst>
+                      <dgm:ruleLst/>
+                    </dgm:layoutNode>
+                  </dgm:else>
+                </dgm:choose>
+              </dgm:forEach>
+              <dgm:layoutNode name="hierRoot2">
+                <dgm:varLst>
+                  <dgm:hierBranch val="init"/>
+                </dgm:varLst>
+                <dgm:choose name="Name60">
+                  <dgm:if name="Name61" func="var" arg="hierBranch" op="equ" val="l">
+                    <dgm:choose name="Name62">
+                      <dgm:if name="Name63" axis="ch" ptType="asst" func="cnt" op="gte" val="1">
+                        <dgm:alg type="hierRoot">
+                          <dgm:param type="hierAlign" val="tR"/>
+                        </dgm:alg>
+                        <dgm:shape xmlns:r="http://schemas.openxmlformats.org/officeDocument/2006/relationships" r:blip="">
+                          <dgm:adjLst/>
+                        </dgm:shape>
+                        <dgm:presOf/>
+                        <dgm:constrLst>
+                          <dgm:constr type="alignOff" val="0.65"/>
+                        </dgm:constrLst>
+                      </dgm:if>
+                      <dgm:else name="Name64">
+                        <dgm:alg type="hierRoot">
+                          <dgm:param type="hierAlign" val="tR"/>
+                        </dgm:alg>
+                        <dgm:shape xmlns:r="http://schemas.openxmlformats.org/officeDocument/2006/relationships" r:blip="">
+                          <dgm:adjLst/>
+                        </dgm:shape>
+                        <dgm:presOf/>
+                        <dgm:constrLst>
+                          <dgm:constr type="alignOff" val="0.25"/>
+                        </dgm:constrLst>
+                      </dgm:else>
+                    </dgm:choose>
+                  </dgm:if>
+                  <dgm:if name="Name65" func="var" arg="hierBranch" op="equ" val="r">
+                    <dgm:choose name="Name66">
+                      <dgm:if name="Name67" axis="ch" ptType="asst" func="cnt" op="gte" val="1">
+                        <dgm:alg type="hierRoot">
+                          <dgm:param type="hierAlign" val="tL"/>
+                        </dgm:alg>
+                        <dgm:shape xmlns:r="http://schemas.openxmlformats.org/officeDocument/2006/relationships" r:blip="">
+                          <dgm:adjLst/>
+                        </dgm:shape>
+                        <dgm:presOf/>
+                        <dgm:constrLst>
+                          <dgm:constr type="alignOff" val="0.65"/>
+                        </dgm:constrLst>
+                      </dgm:if>
+                      <dgm:else name="Name68">
+                        <dgm:alg type="hierRoot">
+                          <dgm:param type="hierAlign" val="tL"/>
+                        </dgm:alg>
+                        <dgm:shape xmlns:r="http://schemas.openxmlformats.org/officeDocument/2006/relationships" r:blip="">
+                          <dgm:adjLst/>
+                        </dgm:shape>
+                        <dgm:presOf/>
+                        <dgm:constrLst>
+                          <dgm:constr type="alignOff" val="0.25"/>
+                        </dgm:constrLst>
+                      </dgm:else>
+                    </dgm:choose>
+                  </dgm:if>
+                  <dgm:if name="Name69" func="var" arg="hierBranch" op="equ" val="std">
+                    <dgm:alg type="hierRoot"/>
+                    <dgm:shape xmlns:r="http://schemas.openxmlformats.org/officeDocument/2006/relationships" r:blip="">
+                      <dgm:adjLst/>
+                    </dgm:shape>
+                    <dgm:presOf/>
+                    <dgm:constrLst>
+                      <dgm:constr type="alignOff"/>
+                      <dgm:constr type="bendDist" for="des" ptType="parTrans" refType="sp" fact="0.5"/>
+                    </dgm:constrLst>
+                  </dgm:if>
+                  <dgm:if name="Name70" func="var" arg="hierBranch" op="equ" val="init">
+                    <dgm:choose name="Name71">
+                      <dgm:if name="Name72" axis="des" func="maxDepth" op="lte" val="1">
+                        <dgm:choose name="Name73">
+                          <dgm:if name="Name74" axis="ch" ptType="asst" func="cnt" op="gte" val="1">
+                            <dgm:alg type="hierRoot">
+                              <dgm:param type="hierAlign" val="tL"/>
+                            </dgm:alg>
+                            <dgm:shape xmlns:r="http://schemas.openxmlformats.org/officeDocument/2006/relationships" r:blip="">
+                              <dgm:adjLst/>
+                            </dgm:shape>
+                            <dgm:presOf/>
+                            <dgm:constrLst>
+                              <dgm:constr type="alignOff" val="0.65"/>
+                            </dgm:constrLst>
+                          </dgm:if>
+                          <dgm:else name="Name75">
+                            <dgm:alg type="hierRoot">
+                              <dgm:param type="hierAlign" val="tL"/>
+                            </dgm:alg>
+                            <dgm:shape xmlns:r="http://schemas.openxmlformats.org/officeDocument/2006/relationships" r:blip="">
+                              <dgm:adjLst/>
+                            </dgm:shape>
+                            <dgm:presOf/>
+                            <dgm:constrLst>
+                              <dgm:constr type="alignOff" val="0.25"/>
+                            </dgm:constrLst>
+                          </dgm:else>
+                        </dgm:choose>
+                      </dgm:if>
+                      <dgm:else name="Name76">
+                        <dgm:alg type="hierRoot"/>
+                        <dgm:shape xmlns:r="http://schemas.openxmlformats.org/officeDocument/2006/relationships" r:blip="">
+                          <dgm:adjLst/>
+                        </dgm:shape>
+                        <dgm:presOf/>
+                        <dgm:constrLst>
+                          <dgm:constr type="alignOff"/>
+                          <dgm:constr type="bendDist" for="des" ptType="parTrans" refType="sp" fact="0.5"/>
+                        </dgm:constrLst>
+                      </dgm:else>
+                    </dgm:choose>
+                  </dgm:if>
+                  <dgm:else name="Name77">
+                    <dgm:alg type="hierRoot"/>
+                    <dgm:shape xmlns:r="http://schemas.openxmlformats.org/officeDocument/2006/relationships" r:blip="">
+                      <dgm:adjLst/>
+                    </dgm:shape>
+                    <dgm:presOf/>
+                    <dgm:constrLst>
+                      <dgm:constr type="alignOff" val="0.65"/>
+                    </dgm:constrLst>
+                  </dgm:else>
+                </dgm:choose>
+                <dgm:ruleLst/>
+                <dgm:layoutNode name="rootComposite">
+                  <dgm:alg type="composite"/>
+                  <dgm:shape xmlns:r="http://schemas.openxmlformats.org/officeDocument/2006/relationships" r:blip="">
+                    <dgm:adjLst/>
+                  </dgm:shape>
+                  <dgm:presOf axis="self" ptType="node" cnt="1"/>
+                  <dgm:choose name="Name78">
+                    <dgm:if name="Name79" func="var" arg="hierBranch" op="equ" val="init">
+                      <dgm:constrLst>
+                        <dgm:constr type="l" for="ch" forName="rootText"/>
+                        <dgm:constr type="t" for="ch" forName="rootText"/>
+                        <dgm:constr type="w" for="ch" forName="rootText" refType="w"/>
+                        <dgm:constr type="h" for="ch" forName="rootText" refType="h"/>
+                        <dgm:constr type="l" for="ch" forName="rootConnector"/>
+                        <dgm:constr type="t" for="ch" forName="rootConnector"/>
+                        <dgm:constr type="w" for="ch" forName="rootConnector" refType="w" refFor="ch" refForName="rootText" fact="0.2"/>
+                        <dgm:constr type="h" for="ch" forName="rootConnector" refType="h" refFor="ch" refForName="rootText"/>
+                      </dgm:constrLst>
+                    </dgm:if>
+                    <dgm:if name="Name80" func="var" arg="hierBranch" op="equ" val="l">
+                      <dgm:constrLst>
+                        <dgm:constr type="l" for="ch" forName="rootText"/>
+                        <dgm:constr type="t" for="ch" forName="rootText"/>
+                        <dgm:constr type="w" for="ch" forName="rootText" refType="w"/>
+                        <dgm:constr type="h" for="ch" forName="rootText" refType="h"/>
+                        <dgm:constr type="r" for="ch" forName="rootConnector" refType="w"/>
+                        <dgm:constr type="t" for="ch" forName="rootConnector"/>
+                        <dgm:constr type="w" for="ch" forName="rootConnector" refType="w" refFor="ch" refForName="rootText" fact="0.2"/>
+                        <dgm:constr type="h" for="ch" forName="rootConnector" refType="h" refFor="ch" refForName="rootText"/>
+                      </dgm:constrLst>
+                    </dgm:if>
+                    <dgm:if name="Name81" func="var" arg="hierBranch" op="equ" val="r">
+                      <dgm:constrLst>
+                        <dgm:constr type="l" for="ch" forName="rootText"/>
+                        <dgm:constr type="t" for="ch" forName="rootText"/>
+                        <dgm:constr type="w" for="ch" forName="rootText" refType="w"/>
+                        <dgm:constr type="h" for="ch" forName="rootText" refType="h"/>
+                        <dgm:constr type="l" for="ch" forName="rootConnector"/>
+                        <dgm:constr type="t" for="ch" forName="rootConnector"/>
+                        <dgm:constr type="w" for="ch" forName="rootConnector" refType="w" refFor="ch" refForName="rootText" fact="0.2"/>
+                        <dgm:constr type="h" for="ch" forName="rootConnector" refType="h" refFor="ch" refForName="rootText"/>
+                      </dgm:constrLst>
+                    </dgm:if>
+                    <dgm:else name="Name82">
+                      <dgm:constrLst>
+                        <dgm:constr type="l" for="ch" forName="rootText"/>
+                        <dgm:constr type="t" for="ch" forName="rootText"/>
+                        <dgm:constr type="w" for="ch" forName="rootText" refType="w"/>
+                        <dgm:constr type="h" for="ch" forName="rootText" refType="h"/>
+                        <dgm:constr type="r" for="ch" forName="rootConnector" refType="w"/>
+                        <dgm:constr type="t" for="ch" forName="rootConnector"/>
+                        <dgm:constr type="w" for="ch" forName="rootConnector" refType="w" refFor="ch" refForName="rootText" fact="0.2"/>
+                        <dgm:constr type="h" for="ch" forName="rootConnector" refType="h" refFor="ch" refForName="rootText"/>
+                      </dgm:constrLst>
+                    </dgm:else>
+                  </dgm:choose>
+                  <dgm:ruleLst/>
+                  <dgm:layoutNode name="rootText">
+                    <dgm:varLst>
+                      <dgm:chPref val="3"/>
+                    </dgm:varLst>
+                    <dgm:alg type="tx"/>
+                    <dgm:shape xmlns:r="http://schemas.openxmlformats.org/officeDocument/2006/relationships" type="rect" r:blip="">
+                      <dgm:adjLst/>
+                    </dgm:shape>
+                    <dgm:presOf axis="self" ptType="node" cnt="1"/>
+                    <dgm:constrLst>
+                      <dgm:constr type="primFontSz" val="65"/>
+                      <dgm:constr type="lMarg" refType="primFontSz" fact="0.05"/>
+                      <dgm:constr type="rMarg" refType="primFontSz" fact="0.05"/>
+                      <dgm:constr type="tMarg" refType="primFontSz" fact="0.05"/>
+                      <dgm:constr type="bMarg" refType="primFontSz" fact="0.05"/>
+                    </dgm:constrLst>
+                    <dgm:ruleLst>
+                      <dgm:rule type="primFontSz" val="5" fact="NaN" max="NaN"/>
+                    </dgm:ruleLst>
+                  </dgm:layoutNode>
+                  <dgm:layoutNode name="rootConnector" moveWith="rootText">
+                    <dgm:alg type="sp"/>
+                    <dgm:shape xmlns:r="http://schemas.openxmlformats.org/officeDocument/2006/relationships" type="rect" r:blip="" hideGeom="1">
+                      <dgm:adjLst/>
+                    </dgm:shape>
+                    <dgm:presOf axis="self" ptType="node" cnt="1"/>
+                    <dgm:constrLst/>
+                    <dgm:ruleLst/>
+                  </dgm:layoutNode>
+                </dgm:layoutNode>
+                <dgm:layoutNode name="hierChild4">
+                  <dgm:choose name="Name83">
+                    <dgm:if name="Name84" func="var" arg="hierBranch" op="equ" val="l">
+                      <dgm:alg type="hierChild">
+                        <dgm:param type="chAlign" val="r"/>
+                        <dgm:param type="linDir" val="fromT"/>
+                      </dgm:alg>
+                    </dgm:if>
+                    <dgm:if name="Name85" func="var" arg="hierBranch" op="equ" val="r">
+                      <dgm:alg type="hierChild">
+                        <dgm:param type="chAlign" val="l"/>
+                        <dgm:param type="linDir" val="fromT"/>
+                      </dgm:alg>
+                    </dgm:if>
+                    <dgm:if name="Name86" func="var" arg="hierBranch" op="equ" val="hang">
+                      <dgm:choose name="Name87">
+                        <dgm:if name="Name88" func="var" arg="dir" op="equ" val="norm">
+                          <dgm:alg type="hierChild">
+                            <dgm:param type="chAlign" val="l"/>
+                            <dgm:param type="linDir" val="fromL"/>
+                            <dgm:param type="secChAlign" val="t"/>
+                            <dgm:param type="secLinDir" val="fromT"/>
+                          </dgm:alg>
+                        </dgm:if>
+                        <dgm:else name="Name89">
+                          <dgm:alg type="hierChild">
+                            <dgm:param type="chAlign" val="l"/>
+                            <dgm:param type="linDir" val="fromR"/>
+                            <dgm:param type="secChAlign" val="t"/>
+                            <dgm:param type="secLinDir" val="fromT"/>
+                          </dgm:alg>
+                        </dgm:else>
+                      </dgm:choose>
+                    </dgm:if>
+                    <dgm:if name="Name90" func="var" arg="hierBranch" op="equ" val="std">
+                      <dgm:choose name="Name91">
+                        <dgm:if name="Name92" func="var" arg="dir" op="equ" val="norm">
+                          <dgm:alg type="hierChild"/>
+                        </dgm:if>
+                        <dgm:else name="Name93">
+                          <dgm:alg type="hierChild">
+                            <dgm:param type="linDir" val="fromR"/>
+                          </dgm:alg>
+                        </dgm:else>
+                      </dgm:choose>
+                    </dgm:if>
+                    <dgm:if name="Name94" func="var" arg="hierBranch" op="equ" val="init">
+                      <dgm:choose name="Name95">
+                        <dgm:if name="Name96" axis="des" func="maxDepth" op="lte" val="1">
+                          <dgm:alg type="hierChild">
+                            <dgm:param type="chAlign" val="l"/>
+                            <dgm:param type="linDir" val="fromT"/>
+                          </dgm:alg>
+                        </dgm:if>
+                        <dgm:else name="Name97">
+                          <dgm:choose name="Name98">
+                            <dgm:if name="Name99" func="var" arg="dir" op="equ" val="norm">
+                              <dgm:alg type="hierChild"/>
+                            </dgm:if>
+                            <dgm:else name="Name100">
+                              <dgm:alg type="hierChild">
+                                <dgm:param type="linDir" val="fromR"/>
+                              </dgm:alg>
+                            </dgm:else>
+                          </dgm:choose>
+                        </dgm:else>
+                      </dgm:choose>
+                    </dgm:if>
+                    <dgm:else name="Name101"/>
+                  </dgm:choose>
+                  <dgm:shape xmlns:r="http://schemas.openxmlformats.org/officeDocument/2006/relationships" r:blip="">
+                    <dgm:adjLst/>
+                  </dgm:shape>
+                  <dgm:presOf/>
+                  <dgm:constrLst/>
+                  <dgm:ruleLst/>
+                  <dgm:forEach name="Name102" ref="rep2a"/>
+                </dgm:layoutNode>
+                <dgm:layoutNode name="hierChild5">
+                  <dgm:choose name="Name103">
+                    <dgm:if name="Name104" func="var" arg="dir" op="equ" val="norm">
+                      <dgm:alg type="hierChild">
+                        <dgm:param type="chAlign" val="l"/>
+                        <dgm:param type="linDir" val="fromL"/>
+                        <dgm:param type="secChAlign" val="t"/>
+                        <dgm:param type="secLinDir" val="fromT"/>
+                      </dgm:alg>
+                    </dgm:if>
+                    <dgm:else name="Name105">
+                      <dgm:alg type="hierChild">
+                        <dgm:param type="chAlign" val="l"/>
+                        <dgm:param type="linDir" val="fromR"/>
+                        <dgm:param type="secChAlign" val="t"/>
+                        <dgm:param type="secLinDir" val="fromT"/>
+                      </dgm:alg>
+                    </dgm:else>
+                  </dgm:choose>
+                  <dgm:shape xmlns:r="http://schemas.openxmlformats.org/officeDocument/2006/relationships" r:blip="">
+                    <dgm:adjLst/>
+                  </dgm:shape>
+                  <dgm:presOf/>
+                  <dgm:constrLst/>
+                  <dgm:ruleLst/>
+                  <dgm:forEach name="Name106" ref="rep2b"/>
+                </dgm:layoutNode>
+              </dgm:layoutNode>
+            </dgm:forEach>
+          </dgm:layoutNode>
+          <dgm:layoutNode name="hierChild3">
+            <dgm:choose name="Name107">
+              <dgm:if name="Name108" func="var" arg="dir" op="equ" val="norm">
+                <dgm:alg type="hierChild">
+                  <dgm:param type="chAlign" val="l"/>
+                  <dgm:param type="linDir" val="fromL"/>
+                  <dgm:param type="secChAlign" val="t"/>
+                  <dgm:param type="secLinDir" val="fromT"/>
+                </dgm:alg>
+              </dgm:if>
+              <dgm:else name="Name109">
+                <dgm:alg type="hierChild">
+                  <dgm:param type="chAlign" val="l"/>
+                  <dgm:param type="linDir" val="fromR"/>
+                  <dgm:param type="secChAlign" val="t"/>
+                  <dgm:param type="secLinDir" val="fromT"/>
+                </dgm:alg>
+              </dgm:else>
+            </dgm:choose>
+            <dgm:shape xmlns:r="http://schemas.openxmlformats.org/officeDocument/2006/relationships" r:blip="">
+              <dgm:adjLst/>
+            </dgm:shape>
+            <dgm:presOf/>
+            <dgm:constrLst/>
+            <dgm:ruleLst/>
+            <dgm:forEach name="rep2b" axis="ch" ptType="asst">
+              <dgm:forEach name="Name110" axis="precedSib" ptType="parTrans" st="-1" cnt="1">
+                <dgm:layoutNode name="Name111">
+                  <dgm:alg type="conn">
+                    <dgm:param type="connRout" val="bend"/>
+                    <dgm:param type="dim" val="1D"/>
+                    <dgm:param type="endSty" val="noArr"/>
+                    <dgm:param type="begPts" val="bCtr"/>
+                    <dgm:param type="endPts" val="midL midR"/>
+                  </dgm:alg>
+                  <dgm:shape xmlns:r="http://schemas.openxmlformats.org/officeDocument/2006/relationships" type="conn" r:blip="" zOrderOff="-99999">
+                    <dgm:adjLst/>
+                  </dgm:shape>
+                  <dgm:presOf axis="self"/>
+                  <dgm:constrLst>
+                    <dgm:constr type="begPad"/>
+                    <dgm:constr type="endPad"/>
+                  </dgm:constrLst>
+                  <dgm:ruleLst/>
+                </dgm:layoutNode>
+              </dgm:forEach>
+              <dgm:layoutNode name="hierRoot3">
+                <dgm:varLst>
+                  <dgm:hierBranch val="init"/>
+                </dgm:varLst>
+                <dgm:choose name="Name112">
+                  <dgm:if name="Name113" func="var" arg="hierBranch" op="equ" val="l">
+                    <dgm:alg type="hierRoot">
+                      <dgm:param type="hierAlign" val="tR"/>
+                    </dgm:alg>
+                    <dgm:shape xmlns:r="http://schemas.openxmlformats.org/officeDocument/2006/relationships" r:blip="">
+                      <dgm:adjLst/>
+                    </dgm:shape>
+                    <dgm:presOf/>
+                    <dgm:constrLst>
+                      <dgm:constr type="alignOff" val="0.65"/>
+                    </dgm:constrLst>
+                  </dgm:if>
+                  <dgm:if name="Name114" func="var" arg="hierBranch" op="equ" val="r">
+                    <dgm:alg type="hierRoot">
+                      <dgm:param type="hierAlign" val="tL"/>
+                    </dgm:alg>
+                    <dgm:shape xmlns:r="http://schemas.openxmlformats.org/officeDocument/2006/relationships" r:blip="">
+                      <dgm:adjLst/>
+                    </dgm:shape>
+                    <dgm:presOf/>
+                    <dgm:constrLst>
+                      <dgm:constr type="alignOff" val="0.65"/>
+                    </dgm:constrLst>
+                  </dgm:if>
+                  <dgm:if name="Name115" func="var" arg="hierBranch" op="equ" val="hang">
+                    <dgm:alg type="hierRoot"/>
+                    <dgm:shape xmlns:r="http://schemas.openxmlformats.org/officeDocument/2006/relationships" r:blip="">
+                      <dgm:adjLst/>
+                    </dgm:shape>
+                    <dgm:presOf/>
+                    <dgm:constrLst>
+                      <dgm:constr type="alignOff" val="0.65"/>
+                    </dgm:constrLst>
+                  </dgm:if>
+                  <dgm:if name="Name116" func="var" arg="hierBranch" op="equ" val="std">
+                    <dgm:alg type="hierRoot"/>
+                    <dgm:shape xmlns:r="http://schemas.openxmlformats.org/officeDocument/2006/relationships" r:blip="">
+                      <dgm:adjLst/>
+                    </dgm:shape>
+                    <dgm:presOf/>
+                    <dgm:constrLst>
+                      <dgm:constr type="alignOff"/>
+                      <dgm:constr type="bendDist" for="des" ptType="parTrans" refType="sp" fact="0.5"/>
+                    </dgm:constrLst>
+                  </dgm:if>
+                  <dgm:if name="Name117" func="var" arg="hierBranch" op="equ" val="init">
+                    <dgm:choose name="Name118">
+                      <dgm:if name="Name119" axis="des" func="maxDepth" op="lte" val="1">
+                        <dgm:alg type="hierRoot">
+                          <dgm:param type="hierAlign" val="tL"/>
+                        </dgm:alg>
+                        <dgm:shape xmlns:r="http://schemas.openxmlformats.org/officeDocument/2006/relationships" r:blip="">
+                          <dgm:adjLst/>
+                        </dgm:shape>
+                        <dgm:presOf/>
+                        <dgm:constrLst>
+                          <dgm:constr type="alignOff" val="0.65"/>
+                        </dgm:constrLst>
+                      </dgm:if>
+                      <dgm:else name="Name120">
+                        <dgm:alg type="hierRoot"/>
+                        <dgm:shape xmlns:r="http://schemas.openxmlformats.org/officeDocument/2006/relationships" r:blip="">
+                          <dgm:adjLst/>
+                        </dgm:shape>
+                        <dgm:presOf/>
+                        <dgm:constrLst>
+                          <dgm:constr type="alignOff"/>
+                          <dgm:constr type="bendDist" for="des" ptType="parTrans" refType="sp" fact="0.5"/>
+                        </dgm:constrLst>
+                      </dgm:else>
+                    </dgm:choose>
+                  </dgm:if>
+                  <dgm:else name="Name121"/>
+                </dgm:choose>
+                <dgm:ruleLst/>
+                <dgm:layoutNode name="rootComposite3">
+                  <dgm:alg type="composite"/>
+                  <dgm:shape xmlns:r="http://schemas.openxmlformats.org/officeDocument/2006/relationships" r:blip="">
+                    <dgm:adjLst/>
+                  </dgm:shape>
+                  <dgm:presOf axis="self" ptType="node" cnt="1"/>
+                  <dgm:choose name="Name122">
+                    <dgm:if name="Name123" func="var" arg="hierBranch" op="equ" val="init">
+                      <dgm:constrLst>
+                        <dgm:constr type="l" for="ch" forName="rootText3"/>
+                        <dgm:constr type="t" for="ch" forName="rootText3"/>
+                        <dgm:constr type="w" for="ch" forName="rootText3" refType="w"/>
+                        <dgm:constr type="h" for="ch" forName="rootText3" refType="h"/>
+                        <dgm:constr type="l" for="ch" forName="rootConnector3"/>
+                        <dgm:constr type="t" for="ch" forName="rootConnector3"/>
+                        <dgm:constr type="w" for="ch" forName="rootConnector3" refType="w" refFor="ch" refForName="rootText3" fact="0.2"/>
+                        <dgm:constr type="h" for="ch" forName="rootConnector3" refType="h" refFor="ch" refForName="rootText3"/>
+                      </dgm:constrLst>
+                    </dgm:if>
+                    <dgm:if name="Name124" func="var" arg="hierBranch" op="equ" val="l">
+                      <dgm:constrLst>
+                        <dgm:constr type="l" for="ch" forName="rootText3"/>
+                        <dgm:constr type="t" for="ch" forName="rootText3"/>
+                        <dgm:constr type="w" for="ch" forName="rootText3" refType="w"/>
+                        <dgm:constr type="h" for="ch" forName="rootText3" refType="h"/>
+                        <dgm:constr type="r" for="ch" forName="rootConnector3" refType="w"/>
+                        <dgm:constr type="t" for="ch" forName="rootConnector3"/>
+                        <dgm:constr type="w" for="ch" forName="rootConnector3" refType="w" refFor="ch" refForName="rootText3" fact="0.2"/>
+                        <dgm:constr type="h" for="ch" forName="rootConnector3" refType="h" refFor="ch" refForName="rootText3"/>
+                      </dgm:constrLst>
+                    </dgm:if>
+                    <dgm:if name="Name125" func="var" arg="hierBranch" op="equ" val="r">
+                      <dgm:constrLst>
+                        <dgm:constr type="l" for="ch" forName="rootText3"/>
+                        <dgm:constr type="t" for="ch" forName="rootText3"/>
+                        <dgm:constr type="w" for="ch" forName="rootText3" refType="w"/>
+                        <dgm:constr type="h" for="ch" forName="rootText3" refType="h"/>
+                        <dgm:constr type="l" for="ch" forName="rootConnector3"/>
+                        <dgm:constr type="t" for="ch" forName="rootConnector3"/>
+                        <dgm:constr type="w" for="ch" forName="rootConnector3" refType="w" refFor="ch" refForName="rootText3" fact="0.2"/>
+                        <dgm:constr type="h" for="ch" forName="rootConnector3" refType="h" refFor="ch" refForName="rootText3"/>
+                      </dgm:constrLst>
+                    </dgm:if>
+                    <dgm:else name="Name126">
+                      <dgm:constrLst>
+                        <dgm:constr type="l" for="ch" forName="rootText3"/>
+                        <dgm:constr type="t" for="ch" forName="rootText3"/>
+                        <dgm:constr type="w" for="ch" forName="rootText3" refType="w"/>
+                        <dgm:constr type="h" for="ch" forName="rootText3" refType="h"/>
+                        <dgm:constr type="r" for="ch" forName="rootConnector3" refType="w"/>
+                        <dgm:constr type="t" for="ch" forName="rootConnector3"/>
+                        <dgm:constr type="w" for="ch" forName="rootConnector3" refType="w" refFor="ch" refForName="rootText3" fact="0.2"/>
+                        <dgm:constr type="h" for="ch" forName="rootConnector3" refType="h" refFor="ch" refForName="rootText3"/>
+                      </dgm:constrLst>
+                    </dgm:else>
+                  </dgm:choose>
+                  <dgm:ruleLst/>
+                  <dgm:layoutNode name="rootText3">
+                    <dgm:varLst>
+                      <dgm:chPref val="3"/>
+                    </dgm:varLst>
+                    <dgm:alg type="tx"/>
+                    <dgm:shape xmlns:r="http://schemas.openxmlformats.org/officeDocument/2006/relationships" type="rect" r:blip="">
+                      <dgm:adjLst/>
+                    </dgm:shape>
+                    <dgm:presOf axis="self" ptType="node" cnt="1"/>
+                    <dgm:constrLst>
+                      <dgm:constr type="primFontSz" val="65"/>
+                      <dgm:constr type="lMarg" refType="primFontSz" fact="0.05"/>
+                      <dgm:constr type="rMarg" refType="primFontSz" fact="0.05"/>
+                      <dgm:constr type="tMarg" refType="primFontSz" fact="0.05"/>
+                      <dgm:constr type="bMarg" refType="primFontSz" fact="0.05"/>
+                    </dgm:constrLst>
+                    <dgm:ruleLst>
+                      <dgm:rule type="primFontSz" val="5" fact="NaN" max="NaN"/>
+                    </dgm:ruleLst>
+                  </dgm:layoutNode>
+                  <dgm:layoutNode name="rootConnector3" moveWith="rootText1">
+                    <dgm:alg type="sp"/>
+                    <dgm:shape xmlns:r="http://schemas.openxmlformats.org/officeDocument/2006/relationships" type="rect" r:blip="" hideGeom="1">
+                      <dgm:adjLst/>
+                    </dgm:shape>
+                    <dgm:presOf axis="self" ptType="node" cnt="1"/>
+                    <dgm:constrLst/>
+                    <dgm:ruleLst/>
+                  </dgm:layoutNode>
+                </dgm:layoutNode>
+                <dgm:layoutNode name="hierChild6">
+                  <dgm:choose name="Name127">
+                    <dgm:if name="Name128" func="var" arg="hierBranch" op="equ" val="l">
+                      <dgm:alg type="hierChild">
+                        <dgm:param type="chAlign" val="r"/>
+                        <dgm:param type="linDir" val="fromT"/>
+                      </dgm:alg>
+                    </dgm:if>
+                    <dgm:if name="Name129" func="var" arg="hierBranch" op="equ" val="r">
+                      <dgm:alg type="hierChild">
+                        <dgm:param type="chAlign" val="l"/>
+                        <dgm:param type="linDir" val="fromT"/>
+                      </dgm:alg>
+                    </dgm:if>
+                    <dgm:if name="Name130" func="var" arg="hierBranch" op="equ" val="hang">
+                      <dgm:choose name="Name131">
+                        <dgm:if name="Name132" func="var" arg="dir" op="equ" val="norm">
+                          <dgm:alg type="hierChild">
+                            <dgm:param type="chAlign" val="l"/>
+                            <dgm:param type="linDir" val="fromL"/>
+                            <dgm:param type="secChAlign" val="t"/>
+                            <dgm:param type="secLinDir" val="fromT"/>
+                          </dgm:alg>
+                        </dgm:if>
+                        <dgm:else name="Name133">
+                          <dgm:alg type="hierChild">
+                            <dgm:param type="chAlign" val="l"/>
+                            <dgm:param type="linDir" val="fromR"/>
+                            <dgm:param type="secChAlign" val="t"/>
+                            <dgm:param type="secLinDir" val="fromT"/>
+                          </dgm:alg>
+                        </dgm:else>
+                      </dgm:choose>
+                    </dgm:if>
+                    <dgm:if name="Name134" func="var" arg="hierBranch" op="equ" val="std">
+                      <dgm:choose name="Name135">
+                        <dgm:if name="Name136" func="var" arg="dir" op="equ" val="norm">
+                          <dgm:alg type="hierChild"/>
+                        </dgm:if>
+                        <dgm:else name="Name137">
+                          <dgm:alg type="hierChild">
+                            <dgm:param type="linDir" val="fromR"/>
+                          </dgm:alg>
+                        </dgm:else>
+                      </dgm:choose>
+                    </dgm:if>
+                    <dgm:if name="Name138" func="var" arg="hierBranch" op="equ" val="init">
+                      <dgm:choose name="Name139">
+                        <dgm:if name="Name140" axis="des" func="maxDepth" op="lte" val="1">
+                          <dgm:alg type="hierChild">
+                            <dgm:param type="chAlign" val="l"/>
+                            <dgm:param type="linDir" val="fromT"/>
+                          </dgm:alg>
+                        </dgm:if>
+                        <dgm:else name="Name141">
+                          <dgm:alg type="hierChild"/>
+                        </dgm:else>
+                      </dgm:choose>
+                    </dgm:if>
+                    <dgm:else name="Name142"/>
+                  </dgm:choose>
+                  <dgm:shape xmlns:r="http://schemas.openxmlformats.org/officeDocument/2006/relationships" r:blip="">
+                    <dgm:adjLst/>
+                  </dgm:shape>
+                  <dgm:presOf/>
+                  <dgm:constrLst/>
+                  <dgm:ruleLst/>
+                  <dgm:forEach name="Name143" ref="rep2a"/>
+                </dgm:layoutNode>
+                <dgm:layoutNode name="hierChild7">
+                  <dgm:choose name="Name144">
+                    <dgm:if name="Name145" func="var" arg="dir" op="equ" val="norm">
+                      <dgm:alg type="hierChild">
+                        <dgm:param type="chAlign" val="l"/>
+                        <dgm:param type="linDir" val="fromL"/>
+                        <dgm:param type="secChAlign" val="t"/>
+                        <dgm:param type="secLinDir" val="fromT"/>
+                      </dgm:alg>
+                    </dgm:if>
+                    <dgm:else name="Name146">
+                      <dgm:alg type="hierChild">
+                        <dgm:param type="chAlign" val="l"/>
+                        <dgm:param type="linDir" val="fromR"/>
+                        <dgm:param type="secChAlign" val="t"/>
+                        <dgm:param type="secLinDir" val="fromT"/>
+                      </dgm:alg>
+                    </dgm:else>
+                  </dgm:choose>
+                  <dgm:shape xmlns:r="http://schemas.openxmlformats.org/officeDocument/2006/relationships" r:blip="">
+                    <dgm:adjLst/>
+                  </dgm:shape>
+                  <dgm:presOf/>
+                  <dgm:constrLst/>
+                  <dgm:ruleLst/>
+                  <dgm:forEach name="Name147" ref="rep2b"/>
+                </dgm:layoutNode>
+              </dgm:layoutNode>
+            </dgm:forEach>
+          </dgm:layoutNode>
+        </dgm:layoutNode>
+      </dgm:forEach>
+    </dgm:forEach>
+  </dgm:layoutNode>
+</dgm:layoutDef>
+</file>
+
 <file path=ppt/diagrams/quickStyle1.xml><?xml version="1.0" encoding="utf-8"?>
 <dgm:styleDef xmlns:dgm="http://schemas.openxmlformats.org/drawingml/2006/diagram" xmlns:a="http://schemas.openxmlformats.org/drawingml/2006/main" uniqueId="urn:microsoft.com/office/officeart/2005/8/quickstyle/simple3">
   <dgm:title val=""/>
@@ -5040,6 +8158,1040 @@
         <a:scrgbClr r="0" g="0" b="0"/>
       </a:fillRef>
       <a:effectRef idx="1">
+        <a:scrgbClr r="0" g="0" b="0"/>
+      </a:effectRef>
+      <a:fontRef idx="minor"/>
+    </dgm:style>
+  </dgm:styleLbl>
+  <dgm:styleLbl name="revTx">
+    <dgm:scene3d>
+      <a:camera prst="orthographicFront"/>
+      <a:lightRig rig="threePt" dir="t"/>
+    </dgm:scene3d>
+    <dgm:sp3d/>
+    <dgm:txPr/>
+    <dgm:style>
+      <a:lnRef idx="0">
+        <a:scrgbClr r="0" g="0" b="0"/>
+      </a:lnRef>
+      <a:fillRef idx="0">
+        <a:scrgbClr r="0" g="0" b="0"/>
+      </a:fillRef>
+      <a:effectRef idx="0">
+        <a:scrgbClr r="0" g="0" b="0"/>
+      </a:effectRef>
+      <a:fontRef idx="minor"/>
+    </dgm:style>
+  </dgm:styleLbl>
+</dgm:styleDef>
+</file>
+
+<file path=ppt/diagrams/quickStyle2.xml><?xml version="1.0" encoding="utf-8"?>
+<dgm:styleDef xmlns:dgm="http://schemas.openxmlformats.org/drawingml/2006/diagram" xmlns:a="http://schemas.openxmlformats.org/drawingml/2006/main" uniqueId="urn:microsoft.com/office/officeart/2005/8/quickstyle/simple1">
+  <dgm:title val=""/>
+  <dgm:desc val=""/>
+  <dgm:catLst>
+    <dgm:cat type="simple" pri="10100"/>
+  </dgm:catLst>
+  <dgm:scene3d>
+    <a:camera prst="orthographicFront"/>
+    <a:lightRig rig="threePt" dir="t"/>
+  </dgm:scene3d>
+  <dgm:styleLbl name="node0">
+    <dgm:scene3d>
+      <a:camera prst="orthographicFront"/>
+      <a:lightRig rig="threePt" dir="t"/>
+    </dgm:scene3d>
+    <dgm:sp3d/>
+    <dgm:txPr/>
+    <dgm:style>
+      <a:lnRef idx="2">
+        <a:scrgbClr r="0" g="0" b="0"/>
+      </a:lnRef>
+      <a:fillRef idx="1">
+        <a:scrgbClr r="0" g="0" b="0"/>
+      </a:fillRef>
+      <a:effectRef idx="0">
+        <a:scrgbClr r="0" g="0" b="0"/>
+      </a:effectRef>
+      <a:fontRef idx="minor">
+        <a:schemeClr val="lt1"/>
+      </a:fontRef>
+    </dgm:style>
+  </dgm:styleLbl>
+  <dgm:styleLbl name="lnNode1">
+    <dgm:scene3d>
+      <a:camera prst="orthographicFront"/>
+      <a:lightRig rig="threePt" dir="t"/>
+    </dgm:scene3d>
+    <dgm:sp3d/>
+    <dgm:txPr/>
+    <dgm:style>
+      <a:lnRef idx="2">
+        <a:scrgbClr r="0" g="0" b="0"/>
+      </a:lnRef>
+      <a:fillRef idx="1">
+        <a:scrgbClr r="0" g="0" b="0"/>
+      </a:fillRef>
+      <a:effectRef idx="0">
+        <a:scrgbClr r="0" g="0" b="0"/>
+      </a:effectRef>
+      <a:fontRef idx="minor">
+        <a:schemeClr val="lt1"/>
+      </a:fontRef>
+    </dgm:style>
+  </dgm:styleLbl>
+  <dgm:styleLbl name="vennNode1">
+    <dgm:scene3d>
+      <a:camera prst="orthographicFront"/>
+      <a:lightRig rig="threePt" dir="t"/>
+    </dgm:scene3d>
+    <dgm:sp3d/>
+    <dgm:txPr/>
+    <dgm:style>
+      <a:lnRef idx="2">
+        <a:scrgbClr r="0" g="0" b="0"/>
+      </a:lnRef>
+      <a:fillRef idx="1">
+        <a:scrgbClr r="0" g="0" b="0"/>
+      </a:fillRef>
+      <a:effectRef idx="0">
+        <a:scrgbClr r="0" g="0" b="0"/>
+      </a:effectRef>
+      <a:fontRef idx="minor">
+        <a:schemeClr val="tx1"/>
+      </a:fontRef>
+    </dgm:style>
+  </dgm:styleLbl>
+  <dgm:styleLbl name="alignNode1">
+    <dgm:scene3d>
+      <a:camera prst="orthographicFront"/>
+      <a:lightRig rig="threePt" dir="t"/>
+    </dgm:scene3d>
+    <dgm:sp3d/>
+    <dgm:txPr/>
+    <dgm:style>
+      <a:lnRef idx="2">
+        <a:scrgbClr r="0" g="0" b="0"/>
+      </a:lnRef>
+      <a:fillRef idx="1">
+        <a:scrgbClr r="0" g="0" b="0"/>
+      </a:fillRef>
+      <a:effectRef idx="0">
+        <a:scrgbClr r="0" g="0" b="0"/>
+      </a:effectRef>
+      <a:fontRef idx="minor">
+        <a:schemeClr val="lt1"/>
+      </a:fontRef>
+    </dgm:style>
+  </dgm:styleLbl>
+  <dgm:styleLbl name="node1">
+    <dgm:scene3d>
+      <a:camera prst="orthographicFront"/>
+      <a:lightRig rig="threePt" dir="t"/>
+    </dgm:scene3d>
+    <dgm:sp3d/>
+    <dgm:txPr/>
+    <dgm:style>
+      <a:lnRef idx="2">
+        <a:scrgbClr r="0" g="0" b="0"/>
+      </a:lnRef>
+      <a:fillRef idx="1">
+        <a:scrgbClr r="0" g="0" b="0"/>
+      </a:fillRef>
+      <a:effectRef idx="0">
+        <a:scrgbClr r="0" g="0" b="0"/>
+      </a:effectRef>
+      <a:fontRef idx="minor">
+        <a:schemeClr val="lt1"/>
+      </a:fontRef>
+    </dgm:style>
+  </dgm:styleLbl>
+  <dgm:styleLbl name="node2">
+    <dgm:scene3d>
+      <a:camera prst="orthographicFront"/>
+      <a:lightRig rig="threePt" dir="t"/>
+    </dgm:scene3d>
+    <dgm:sp3d/>
+    <dgm:txPr/>
+    <dgm:style>
+      <a:lnRef idx="2">
+        <a:scrgbClr r="0" g="0" b="0"/>
+      </a:lnRef>
+      <a:fillRef idx="1">
+        <a:scrgbClr r="0" g="0" b="0"/>
+      </a:fillRef>
+      <a:effectRef idx="0">
+        <a:scrgbClr r="0" g="0" b="0"/>
+      </a:effectRef>
+      <a:fontRef idx="minor">
+        <a:schemeClr val="lt1"/>
+      </a:fontRef>
+    </dgm:style>
+  </dgm:styleLbl>
+  <dgm:styleLbl name="node3">
+    <dgm:scene3d>
+      <a:camera prst="orthographicFront"/>
+      <a:lightRig rig="threePt" dir="t"/>
+    </dgm:scene3d>
+    <dgm:sp3d/>
+    <dgm:txPr/>
+    <dgm:style>
+      <a:lnRef idx="2">
+        <a:scrgbClr r="0" g="0" b="0"/>
+      </a:lnRef>
+      <a:fillRef idx="1">
+        <a:scrgbClr r="0" g="0" b="0"/>
+      </a:fillRef>
+      <a:effectRef idx="0">
+        <a:scrgbClr r="0" g="0" b="0"/>
+      </a:effectRef>
+      <a:fontRef idx="minor">
+        <a:schemeClr val="lt1"/>
+      </a:fontRef>
+    </dgm:style>
+  </dgm:styleLbl>
+  <dgm:styleLbl name="node4">
+    <dgm:scene3d>
+      <a:camera prst="orthographicFront"/>
+      <a:lightRig rig="threePt" dir="t"/>
+    </dgm:scene3d>
+    <dgm:sp3d/>
+    <dgm:txPr/>
+    <dgm:style>
+      <a:lnRef idx="2">
+        <a:scrgbClr r="0" g="0" b="0"/>
+      </a:lnRef>
+      <a:fillRef idx="1">
+        <a:scrgbClr r="0" g="0" b="0"/>
+      </a:fillRef>
+      <a:effectRef idx="0">
+        <a:scrgbClr r="0" g="0" b="0"/>
+      </a:effectRef>
+      <a:fontRef idx="minor">
+        <a:schemeClr val="lt1"/>
+      </a:fontRef>
+    </dgm:style>
+  </dgm:styleLbl>
+  <dgm:styleLbl name="fgImgPlace1">
+    <dgm:scene3d>
+      <a:camera prst="orthographicFront"/>
+      <a:lightRig rig="threePt" dir="t"/>
+    </dgm:scene3d>
+    <dgm:sp3d/>
+    <dgm:txPr/>
+    <dgm:style>
+      <a:lnRef idx="2">
+        <a:scrgbClr r="0" g="0" b="0"/>
+      </a:lnRef>
+      <a:fillRef idx="1">
+        <a:scrgbClr r="0" g="0" b="0"/>
+      </a:fillRef>
+      <a:effectRef idx="0">
+        <a:scrgbClr r="0" g="0" b="0"/>
+      </a:effectRef>
+      <a:fontRef idx="minor"/>
+    </dgm:style>
+  </dgm:styleLbl>
+  <dgm:styleLbl name="alignImgPlace1">
+    <dgm:scene3d>
+      <a:camera prst="orthographicFront"/>
+      <a:lightRig rig="threePt" dir="t"/>
+    </dgm:scene3d>
+    <dgm:sp3d/>
+    <dgm:txPr/>
+    <dgm:style>
+      <a:lnRef idx="2">
+        <a:scrgbClr r="0" g="0" b="0"/>
+      </a:lnRef>
+      <a:fillRef idx="1">
+        <a:scrgbClr r="0" g="0" b="0"/>
+      </a:fillRef>
+      <a:effectRef idx="0">
+        <a:scrgbClr r="0" g="0" b="0"/>
+      </a:effectRef>
+      <a:fontRef idx="minor"/>
+    </dgm:style>
+  </dgm:styleLbl>
+  <dgm:styleLbl name="bgImgPlace1">
+    <dgm:scene3d>
+      <a:camera prst="orthographicFront"/>
+      <a:lightRig rig="threePt" dir="t"/>
+    </dgm:scene3d>
+    <dgm:sp3d/>
+    <dgm:txPr/>
+    <dgm:style>
+      <a:lnRef idx="2">
+        <a:scrgbClr r="0" g="0" b="0"/>
+      </a:lnRef>
+      <a:fillRef idx="1">
+        <a:scrgbClr r="0" g="0" b="0"/>
+      </a:fillRef>
+      <a:effectRef idx="0">
+        <a:scrgbClr r="0" g="0" b="0"/>
+      </a:effectRef>
+      <a:fontRef idx="minor"/>
+    </dgm:style>
+  </dgm:styleLbl>
+  <dgm:styleLbl name="sibTrans2D1">
+    <dgm:scene3d>
+      <a:camera prst="orthographicFront"/>
+      <a:lightRig rig="threePt" dir="t"/>
+    </dgm:scene3d>
+    <dgm:sp3d/>
+    <dgm:txPr/>
+    <dgm:style>
+      <a:lnRef idx="0">
+        <a:scrgbClr r="0" g="0" b="0"/>
+      </a:lnRef>
+      <a:fillRef idx="1">
+        <a:scrgbClr r="0" g="0" b="0"/>
+      </a:fillRef>
+      <a:effectRef idx="0">
+        <a:scrgbClr r="0" g="0" b="0"/>
+      </a:effectRef>
+      <a:fontRef idx="minor">
+        <a:schemeClr val="lt1"/>
+      </a:fontRef>
+    </dgm:style>
+  </dgm:styleLbl>
+  <dgm:styleLbl name="fgSibTrans2D1">
+    <dgm:scene3d>
+      <a:camera prst="orthographicFront"/>
+      <a:lightRig rig="threePt" dir="t"/>
+    </dgm:scene3d>
+    <dgm:sp3d/>
+    <dgm:txPr/>
+    <dgm:style>
+      <a:lnRef idx="0">
+        <a:scrgbClr r="0" g="0" b="0"/>
+      </a:lnRef>
+      <a:fillRef idx="1">
+        <a:scrgbClr r="0" g="0" b="0"/>
+      </a:fillRef>
+      <a:effectRef idx="0">
+        <a:scrgbClr r="0" g="0" b="0"/>
+      </a:effectRef>
+      <a:fontRef idx="minor">
+        <a:schemeClr val="lt1"/>
+      </a:fontRef>
+    </dgm:style>
+  </dgm:styleLbl>
+  <dgm:styleLbl name="bgSibTrans2D1">
+    <dgm:scene3d>
+      <a:camera prst="orthographicFront"/>
+      <a:lightRig rig="threePt" dir="t"/>
+    </dgm:scene3d>
+    <dgm:sp3d/>
+    <dgm:txPr/>
+    <dgm:style>
+      <a:lnRef idx="0">
+        <a:scrgbClr r="0" g="0" b="0"/>
+      </a:lnRef>
+      <a:fillRef idx="1">
+        <a:scrgbClr r="0" g="0" b="0"/>
+      </a:fillRef>
+      <a:effectRef idx="0">
+        <a:scrgbClr r="0" g="0" b="0"/>
+      </a:effectRef>
+      <a:fontRef idx="minor">
+        <a:schemeClr val="lt1"/>
+      </a:fontRef>
+    </dgm:style>
+  </dgm:styleLbl>
+  <dgm:styleLbl name="sibTrans1D1">
+    <dgm:scene3d>
+      <a:camera prst="orthographicFront"/>
+      <a:lightRig rig="threePt" dir="t"/>
+    </dgm:scene3d>
+    <dgm:sp3d/>
+    <dgm:txPr/>
+    <dgm:style>
+      <a:lnRef idx="1">
+        <a:scrgbClr r="0" g="0" b="0"/>
+      </a:lnRef>
+      <a:fillRef idx="0">
+        <a:scrgbClr r="0" g="0" b="0"/>
+      </a:fillRef>
+      <a:effectRef idx="0">
+        <a:scrgbClr r="0" g="0" b="0"/>
+      </a:effectRef>
+      <a:fontRef idx="minor"/>
+    </dgm:style>
+  </dgm:styleLbl>
+  <dgm:styleLbl name="callout">
+    <dgm:scene3d>
+      <a:camera prst="orthographicFront"/>
+      <a:lightRig rig="threePt" dir="t"/>
+    </dgm:scene3d>
+    <dgm:sp3d/>
+    <dgm:txPr/>
+    <dgm:style>
+      <a:lnRef idx="2">
+        <a:scrgbClr r="0" g="0" b="0"/>
+      </a:lnRef>
+      <a:fillRef idx="1">
+        <a:scrgbClr r="0" g="0" b="0"/>
+      </a:fillRef>
+      <a:effectRef idx="0">
+        <a:scrgbClr r="0" g="0" b="0"/>
+      </a:effectRef>
+      <a:fontRef idx="minor"/>
+    </dgm:style>
+  </dgm:styleLbl>
+  <dgm:styleLbl name="asst0">
+    <dgm:scene3d>
+      <a:camera prst="orthographicFront"/>
+      <a:lightRig rig="threePt" dir="t"/>
+    </dgm:scene3d>
+    <dgm:sp3d/>
+    <dgm:txPr/>
+    <dgm:style>
+      <a:lnRef idx="2">
+        <a:scrgbClr r="0" g="0" b="0"/>
+      </a:lnRef>
+      <a:fillRef idx="1">
+        <a:scrgbClr r="0" g="0" b="0"/>
+      </a:fillRef>
+      <a:effectRef idx="0">
+        <a:scrgbClr r="0" g="0" b="0"/>
+      </a:effectRef>
+      <a:fontRef idx="minor">
+        <a:schemeClr val="lt1"/>
+      </a:fontRef>
+    </dgm:style>
+  </dgm:styleLbl>
+  <dgm:styleLbl name="asst1">
+    <dgm:scene3d>
+      <a:camera prst="orthographicFront"/>
+      <a:lightRig rig="threePt" dir="t"/>
+    </dgm:scene3d>
+    <dgm:sp3d/>
+    <dgm:txPr/>
+    <dgm:style>
+      <a:lnRef idx="2">
+        <a:scrgbClr r="0" g="0" b="0"/>
+      </a:lnRef>
+      <a:fillRef idx="1">
+        <a:scrgbClr r="0" g="0" b="0"/>
+      </a:fillRef>
+      <a:effectRef idx="0">
+        <a:scrgbClr r="0" g="0" b="0"/>
+      </a:effectRef>
+      <a:fontRef idx="minor">
+        <a:schemeClr val="lt1"/>
+      </a:fontRef>
+    </dgm:style>
+  </dgm:styleLbl>
+  <dgm:styleLbl name="asst2">
+    <dgm:scene3d>
+      <a:camera prst="orthographicFront"/>
+      <a:lightRig rig="threePt" dir="t"/>
+    </dgm:scene3d>
+    <dgm:sp3d/>
+    <dgm:txPr/>
+    <dgm:style>
+      <a:lnRef idx="2">
+        <a:scrgbClr r="0" g="0" b="0"/>
+      </a:lnRef>
+      <a:fillRef idx="1">
+        <a:scrgbClr r="0" g="0" b="0"/>
+      </a:fillRef>
+      <a:effectRef idx="0">
+        <a:scrgbClr r="0" g="0" b="0"/>
+      </a:effectRef>
+      <a:fontRef idx="minor">
+        <a:schemeClr val="lt1"/>
+      </a:fontRef>
+    </dgm:style>
+  </dgm:styleLbl>
+  <dgm:styleLbl name="asst3">
+    <dgm:scene3d>
+      <a:camera prst="orthographicFront"/>
+      <a:lightRig rig="threePt" dir="t"/>
+    </dgm:scene3d>
+    <dgm:sp3d/>
+    <dgm:txPr/>
+    <dgm:style>
+      <a:lnRef idx="2">
+        <a:scrgbClr r="0" g="0" b="0"/>
+      </a:lnRef>
+      <a:fillRef idx="1">
+        <a:scrgbClr r="0" g="0" b="0"/>
+      </a:fillRef>
+      <a:effectRef idx="0">
+        <a:scrgbClr r="0" g="0" b="0"/>
+      </a:effectRef>
+      <a:fontRef idx="minor">
+        <a:schemeClr val="lt1"/>
+      </a:fontRef>
+    </dgm:style>
+  </dgm:styleLbl>
+  <dgm:styleLbl name="asst4">
+    <dgm:scene3d>
+      <a:camera prst="orthographicFront"/>
+      <a:lightRig rig="threePt" dir="t"/>
+    </dgm:scene3d>
+    <dgm:sp3d/>
+    <dgm:txPr/>
+    <dgm:style>
+      <a:lnRef idx="2">
+        <a:scrgbClr r="0" g="0" b="0"/>
+      </a:lnRef>
+      <a:fillRef idx="1">
+        <a:scrgbClr r="0" g="0" b="0"/>
+      </a:fillRef>
+      <a:effectRef idx="0">
+        <a:scrgbClr r="0" g="0" b="0"/>
+      </a:effectRef>
+      <a:fontRef idx="minor">
+        <a:schemeClr val="lt1"/>
+      </a:fontRef>
+    </dgm:style>
+  </dgm:styleLbl>
+  <dgm:styleLbl name="parChTrans2D1">
+    <dgm:scene3d>
+      <a:camera prst="orthographicFront"/>
+      <a:lightRig rig="threePt" dir="t"/>
+    </dgm:scene3d>
+    <dgm:sp3d/>
+    <dgm:txPr/>
+    <dgm:style>
+      <a:lnRef idx="2">
+        <a:scrgbClr r="0" g="0" b="0"/>
+      </a:lnRef>
+      <a:fillRef idx="1">
+        <a:scrgbClr r="0" g="0" b="0"/>
+      </a:fillRef>
+      <a:effectRef idx="0">
+        <a:scrgbClr r="0" g="0" b="0"/>
+      </a:effectRef>
+      <a:fontRef idx="minor">
+        <a:schemeClr val="lt1"/>
+      </a:fontRef>
+    </dgm:style>
+  </dgm:styleLbl>
+  <dgm:styleLbl name="parChTrans2D2">
+    <dgm:scene3d>
+      <a:camera prst="orthographicFront"/>
+      <a:lightRig rig="threePt" dir="t"/>
+    </dgm:scene3d>
+    <dgm:sp3d/>
+    <dgm:txPr/>
+    <dgm:style>
+      <a:lnRef idx="2">
+        <a:scrgbClr r="0" g="0" b="0"/>
+      </a:lnRef>
+      <a:fillRef idx="1">
+        <a:scrgbClr r="0" g="0" b="0"/>
+      </a:fillRef>
+      <a:effectRef idx="0">
+        <a:scrgbClr r="0" g="0" b="0"/>
+      </a:effectRef>
+      <a:fontRef idx="minor">
+        <a:schemeClr val="lt1"/>
+      </a:fontRef>
+    </dgm:style>
+  </dgm:styleLbl>
+  <dgm:styleLbl name="parChTrans2D3">
+    <dgm:scene3d>
+      <a:camera prst="orthographicFront"/>
+      <a:lightRig rig="threePt" dir="t"/>
+    </dgm:scene3d>
+    <dgm:sp3d/>
+    <dgm:txPr/>
+    <dgm:style>
+      <a:lnRef idx="2">
+        <a:scrgbClr r="0" g="0" b="0"/>
+      </a:lnRef>
+      <a:fillRef idx="1">
+        <a:scrgbClr r="0" g="0" b="0"/>
+      </a:fillRef>
+      <a:effectRef idx="0">
+        <a:scrgbClr r="0" g="0" b="0"/>
+      </a:effectRef>
+      <a:fontRef idx="minor">
+        <a:schemeClr val="lt1"/>
+      </a:fontRef>
+    </dgm:style>
+  </dgm:styleLbl>
+  <dgm:styleLbl name="parChTrans2D4">
+    <dgm:scene3d>
+      <a:camera prst="orthographicFront"/>
+      <a:lightRig rig="threePt" dir="t"/>
+    </dgm:scene3d>
+    <dgm:sp3d/>
+    <dgm:txPr/>
+    <dgm:style>
+      <a:lnRef idx="2">
+        <a:scrgbClr r="0" g="0" b="0"/>
+      </a:lnRef>
+      <a:fillRef idx="1">
+        <a:scrgbClr r="0" g="0" b="0"/>
+      </a:fillRef>
+      <a:effectRef idx="0">
+        <a:scrgbClr r="0" g="0" b="0"/>
+      </a:effectRef>
+      <a:fontRef idx="minor">
+        <a:schemeClr val="lt1"/>
+      </a:fontRef>
+    </dgm:style>
+  </dgm:styleLbl>
+  <dgm:styleLbl name="parChTrans1D1">
+    <dgm:scene3d>
+      <a:camera prst="orthographicFront"/>
+      <a:lightRig rig="threePt" dir="t"/>
+    </dgm:scene3d>
+    <dgm:sp3d/>
+    <dgm:txPr/>
+    <dgm:style>
+      <a:lnRef idx="2">
+        <a:scrgbClr r="0" g="0" b="0"/>
+      </a:lnRef>
+      <a:fillRef idx="0">
+        <a:scrgbClr r="0" g="0" b="0"/>
+      </a:fillRef>
+      <a:effectRef idx="0">
+        <a:scrgbClr r="0" g="0" b="0"/>
+      </a:effectRef>
+      <a:fontRef idx="minor"/>
+    </dgm:style>
+  </dgm:styleLbl>
+  <dgm:styleLbl name="parChTrans1D2">
+    <dgm:scene3d>
+      <a:camera prst="orthographicFront"/>
+      <a:lightRig rig="threePt" dir="t"/>
+    </dgm:scene3d>
+    <dgm:sp3d/>
+    <dgm:txPr/>
+    <dgm:style>
+      <a:lnRef idx="2">
+        <a:scrgbClr r="0" g="0" b="0"/>
+      </a:lnRef>
+      <a:fillRef idx="0">
+        <a:scrgbClr r="0" g="0" b="0"/>
+      </a:fillRef>
+      <a:effectRef idx="0">
+        <a:scrgbClr r="0" g="0" b="0"/>
+      </a:effectRef>
+      <a:fontRef idx="minor"/>
+    </dgm:style>
+  </dgm:styleLbl>
+  <dgm:styleLbl name="parChTrans1D3">
+    <dgm:scene3d>
+      <a:camera prst="orthographicFront"/>
+      <a:lightRig rig="threePt" dir="t"/>
+    </dgm:scene3d>
+    <dgm:sp3d/>
+    <dgm:txPr/>
+    <dgm:style>
+      <a:lnRef idx="2">
+        <a:scrgbClr r="0" g="0" b="0"/>
+      </a:lnRef>
+      <a:fillRef idx="0">
+        <a:scrgbClr r="0" g="0" b="0"/>
+      </a:fillRef>
+      <a:effectRef idx="0">
+        <a:scrgbClr r="0" g="0" b="0"/>
+      </a:effectRef>
+      <a:fontRef idx="minor"/>
+    </dgm:style>
+  </dgm:styleLbl>
+  <dgm:styleLbl name="parChTrans1D4">
+    <dgm:scene3d>
+      <a:camera prst="orthographicFront"/>
+      <a:lightRig rig="threePt" dir="t"/>
+    </dgm:scene3d>
+    <dgm:sp3d/>
+    <dgm:txPr/>
+    <dgm:style>
+      <a:lnRef idx="2">
+        <a:scrgbClr r="0" g="0" b="0"/>
+      </a:lnRef>
+      <a:fillRef idx="0">
+        <a:scrgbClr r="0" g="0" b="0"/>
+      </a:fillRef>
+      <a:effectRef idx="0">
+        <a:scrgbClr r="0" g="0" b="0"/>
+      </a:effectRef>
+      <a:fontRef idx="minor"/>
+    </dgm:style>
+  </dgm:styleLbl>
+  <dgm:styleLbl name="fgAcc1">
+    <dgm:scene3d>
+      <a:camera prst="orthographicFront"/>
+      <a:lightRig rig="threePt" dir="t"/>
+    </dgm:scene3d>
+    <dgm:sp3d/>
+    <dgm:txPr/>
+    <dgm:style>
+      <a:lnRef idx="2">
+        <a:scrgbClr r="0" g="0" b="0"/>
+      </a:lnRef>
+      <a:fillRef idx="1">
+        <a:scrgbClr r="0" g="0" b="0"/>
+      </a:fillRef>
+      <a:effectRef idx="0">
+        <a:scrgbClr r="0" g="0" b="0"/>
+      </a:effectRef>
+      <a:fontRef idx="minor"/>
+    </dgm:style>
+  </dgm:styleLbl>
+  <dgm:styleLbl name="conFgAcc1">
+    <dgm:scene3d>
+      <a:camera prst="orthographicFront"/>
+      <a:lightRig rig="threePt" dir="t"/>
+    </dgm:scene3d>
+    <dgm:sp3d/>
+    <dgm:txPr/>
+    <dgm:style>
+      <a:lnRef idx="2">
+        <a:scrgbClr r="0" g="0" b="0"/>
+      </a:lnRef>
+      <a:fillRef idx="1">
+        <a:scrgbClr r="0" g="0" b="0"/>
+      </a:fillRef>
+      <a:effectRef idx="0">
+        <a:scrgbClr r="0" g="0" b="0"/>
+      </a:effectRef>
+      <a:fontRef idx="minor"/>
+    </dgm:style>
+  </dgm:styleLbl>
+  <dgm:styleLbl name="alignAcc1">
+    <dgm:scene3d>
+      <a:camera prst="orthographicFront"/>
+      <a:lightRig rig="threePt" dir="t"/>
+    </dgm:scene3d>
+    <dgm:sp3d/>
+    <dgm:txPr/>
+    <dgm:style>
+      <a:lnRef idx="2">
+        <a:scrgbClr r="0" g="0" b="0"/>
+      </a:lnRef>
+      <a:fillRef idx="1">
+        <a:scrgbClr r="0" g="0" b="0"/>
+      </a:fillRef>
+      <a:effectRef idx="0">
+        <a:scrgbClr r="0" g="0" b="0"/>
+      </a:effectRef>
+      <a:fontRef idx="minor"/>
+    </dgm:style>
+  </dgm:styleLbl>
+  <dgm:styleLbl name="trAlignAcc1">
+    <dgm:scene3d>
+      <a:camera prst="orthographicFront"/>
+      <a:lightRig rig="threePt" dir="t"/>
+    </dgm:scene3d>
+    <dgm:sp3d/>
+    <dgm:txPr/>
+    <dgm:style>
+      <a:lnRef idx="1">
+        <a:scrgbClr r="0" g="0" b="0"/>
+      </a:lnRef>
+      <a:fillRef idx="1">
+        <a:scrgbClr r="0" g="0" b="0"/>
+      </a:fillRef>
+      <a:effectRef idx="0">
+        <a:scrgbClr r="0" g="0" b="0"/>
+      </a:effectRef>
+      <a:fontRef idx="minor"/>
+    </dgm:style>
+  </dgm:styleLbl>
+  <dgm:styleLbl name="bgAcc1">
+    <dgm:scene3d>
+      <a:camera prst="orthographicFront"/>
+      <a:lightRig rig="threePt" dir="t"/>
+    </dgm:scene3d>
+    <dgm:sp3d/>
+    <dgm:txPr/>
+    <dgm:style>
+      <a:lnRef idx="2">
+        <a:scrgbClr r="0" g="0" b="0"/>
+      </a:lnRef>
+      <a:fillRef idx="1">
+        <a:scrgbClr r="0" g="0" b="0"/>
+      </a:fillRef>
+      <a:effectRef idx="0">
+        <a:scrgbClr r="0" g="0" b="0"/>
+      </a:effectRef>
+      <a:fontRef idx="minor"/>
+    </dgm:style>
+  </dgm:styleLbl>
+  <dgm:styleLbl name="solidFgAcc1">
+    <dgm:scene3d>
+      <a:camera prst="orthographicFront"/>
+      <a:lightRig rig="threePt" dir="t"/>
+    </dgm:scene3d>
+    <dgm:sp3d/>
+    <dgm:txPr/>
+    <dgm:style>
+      <a:lnRef idx="2">
+        <a:scrgbClr r="0" g="0" b="0"/>
+      </a:lnRef>
+      <a:fillRef idx="1">
+        <a:scrgbClr r="0" g="0" b="0"/>
+      </a:fillRef>
+      <a:effectRef idx="0">
+        <a:scrgbClr r="0" g="0" b="0"/>
+      </a:effectRef>
+      <a:fontRef idx="minor"/>
+    </dgm:style>
+  </dgm:styleLbl>
+  <dgm:styleLbl name="solidAlignAcc1">
+    <dgm:scene3d>
+      <a:camera prst="orthographicFront"/>
+      <a:lightRig rig="threePt" dir="t"/>
+    </dgm:scene3d>
+    <dgm:sp3d/>
+    <dgm:txPr/>
+    <dgm:style>
+      <a:lnRef idx="2">
+        <a:scrgbClr r="0" g="0" b="0"/>
+      </a:lnRef>
+      <a:fillRef idx="1">
+        <a:scrgbClr r="0" g="0" b="0"/>
+      </a:fillRef>
+      <a:effectRef idx="0">
+        <a:scrgbClr r="0" g="0" b="0"/>
+      </a:effectRef>
+      <a:fontRef idx="minor"/>
+    </dgm:style>
+  </dgm:styleLbl>
+  <dgm:styleLbl name="solidBgAcc1">
+    <dgm:scene3d>
+      <a:camera prst="orthographicFront"/>
+      <a:lightRig rig="threePt" dir="t"/>
+    </dgm:scene3d>
+    <dgm:sp3d/>
+    <dgm:txPr/>
+    <dgm:style>
+      <a:lnRef idx="2">
+        <a:scrgbClr r="0" g="0" b="0"/>
+      </a:lnRef>
+      <a:fillRef idx="1">
+        <a:scrgbClr r="0" g="0" b="0"/>
+      </a:fillRef>
+      <a:effectRef idx="0">
+        <a:scrgbClr r="0" g="0" b="0"/>
+      </a:effectRef>
+      <a:fontRef idx="minor"/>
+    </dgm:style>
+  </dgm:styleLbl>
+  <dgm:styleLbl name="fgAccFollowNode1">
+    <dgm:scene3d>
+      <a:camera prst="orthographicFront"/>
+      <a:lightRig rig="threePt" dir="t"/>
+    </dgm:scene3d>
+    <dgm:sp3d/>
+    <dgm:txPr/>
+    <dgm:style>
+      <a:lnRef idx="2">
+        <a:scrgbClr r="0" g="0" b="0"/>
+      </a:lnRef>
+      <a:fillRef idx="1">
+        <a:scrgbClr r="0" g="0" b="0"/>
+      </a:fillRef>
+      <a:effectRef idx="0">
+        <a:scrgbClr r="0" g="0" b="0"/>
+      </a:effectRef>
+      <a:fontRef idx="minor"/>
+    </dgm:style>
+  </dgm:styleLbl>
+  <dgm:styleLbl name="alignAccFollowNode1">
+    <dgm:scene3d>
+      <a:camera prst="orthographicFront"/>
+      <a:lightRig rig="threePt" dir="t"/>
+    </dgm:scene3d>
+    <dgm:sp3d/>
+    <dgm:txPr/>
+    <dgm:style>
+      <a:lnRef idx="2">
+        <a:scrgbClr r="0" g="0" b="0"/>
+      </a:lnRef>
+      <a:fillRef idx="1">
+        <a:scrgbClr r="0" g="0" b="0"/>
+      </a:fillRef>
+      <a:effectRef idx="0">
+        <a:scrgbClr r="0" g="0" b="0"/>
+      </a:effectRef>
+      <a:fontRef idx="minor"/>
+    </dgm:style>
+  </dgm:styleLbl>
+  <dgm:styleLbl name="bgAccFollowNode1">
+    <dgm:scene3d>
+      <a:camera prst="orthographicFront"/>
+      <a:lightRig rig="threePt" dir="t"/>
+    </dgm:scene3d>
+    <dgm:sp3d/>
+    <dgm:txPr/>
+    <dgm:style>
+      <a:lnRef idx="2">
+        <a:scrgbClr r="0" g="0" b="0"/>
+      </a:lnRef>
+      <a:fillRef idx="1">
+        <a:scrgbClr r="0" g="0" b="0"/>
+      </a:fillRef>
+      <a:effectRef idx="0">
+        <a:scrgbClr r="0" g="0" b="0"/>
+      </a:effectRef>
+      <a:fontRef idx="minor"/>
+    </dgm:style>
+  </dgm:styleLbl>
+  <dgm:styleLbl name="fgAcc0">
+    <dgm:scene3d>
+      <a:camera prst="orthographicFront"/>
+      <a:lightRig rig="threePt" dir="t"/>
+    </dgm:scene3d>
+    <dgm:sp3d/>
+    <dgm:txPr/>
+    <dgm:style>
+      <a:lnRef idx="2">
+        <a:scrgbClr r="0" g="0" b="0"/>
+      </a:lnRef>
+      <a:fillRef idx="1">
+        <a:scrgbClr r="0" g="0" b="0"/>
+      </a:fillRef>
+      <a:effectRef idx="0">
+        <a:scrgbClr r="0" g="0" b="0"/>
+      </a:effectRef>
+      <a:fontRef idx="minor"/>
+    </dgm:style>
+  </dgm:styleLbl>
+  <dgm:styleLbl name="fgAcc2">
+    <dgm:scene3d>
+      <a:camera prst="orthographicFront"/>
+      <a:lightRig rig="threePt" dir="t"/>
+    </dgm:scene3d>
+    <dgm:sp3d/>
+    <dgm:txPr/>
+    <dgm:style>
+      <a:lnRef idx="2">
+        <a:scrgbClr r="0" g="0" b="0"/>
+      </a:lnRef>
+      <a:fillRef idx="1">
+        <a:scrgbClr r="0" g="0" b="0"/>
+      </a:fillRef>
+      <a:effectRef idx="0">
+        <a:scrgbClr r="0" g="0" b="0"/>
+      </a:effectRef>
+      <a:fontRef idx="minor"/>
+    </dgm:style>
+  </dgm:styleLbl>
+  <dgm:styleLbl name="fgAcc3">
+    <dgm:scene3d>
+      <a:camera prst="orthographicFront"/>
+      <a:lightRig rig="threePt" dir="t"/>
+    </dgm:scene3d>
+    <dgm:sp3d/>
+    <dgm:txPr/>
+    <dgm:style>
+      <a:lnRef idx="2">
+        <a:scrgbClr r="0" g="0" b="0"/>
+      </a:lnRef>
+      <a:fillRef idx="1">
+        <a:scrgbClr r="0" g="0" b="0"/>
+      </a:fillRef>
+      <a:effectRef idx="0">
+        <a:scrgbClr r="0" g="0" b="0"/>
+      </a:effectRef>
+      <a:fontRef idx="minor"/>
+    </dgm:style>
+  </dgm:styleLbl>
+  <dgm:styleLbl name="fgAcc4">
+    <dgm:scene3d>
+      <a:camera prst="orthographicFront"/>
+      <a:lightRig rig="threePt" dir="t"/>
+    </dgm:scene3d>
+    <dgm:sp3d/>
+    <dgm:txPr/>
+    <dgm:style>
+      <a:lnRef idx="2">
+        <a:scrgbClr r="0" g="0" b="0"/>
+      </a:lnRef>
+      <a:fillRef idx="1">
+        <a:scrgbClr r="0" g="0" b="0"/>
+      </a:fillRef>
+      <a:effectRef idx="0">
+        <a:scrgbClr r="0" g="0" b="0"/>
+      </a:effectRef>
+      <a:fontRef idx="minor"/>
+    </dgm:style>
+  </dgm:styleLbl>
+  <dgm:styleLbl name="bgShp">
+    <dgm:scene3d>
+      <a:camera prst="orthographicFront"/>
+      <a:lightRig rig="threePt" dir="t"/>
+    </dgm:scene3d>
+    <dgm:sp3d/>
+    <dgm:txPr/>
+    <dgm:style>
+      <a:lnRef idx="0">
+        <a:scrgbClr r="0" g="0" b="0"/>
+      </a:lnRef>
+      <a:fillRef idx="1">
+        <a:scrgbClr r="0" g="0" b="0"/>
+      </a:fillRef>
+      <a:effectRef idx="0">
+        <a:scrgbClr r="0" g="0" b="0"/>
+      </a:effectRef>
+      <a:fontRef idx="minor"/>
+    </dgm:style>
+  </dgm:styleLbl>
+  <dgm:styleLbl name="dkBgShp">
+    <dgm:scene3d>
+      <a:camera prst="orthographicFront"/>
+      <a:lightRig rig="threePt" dir="t"/>
+    </dgm:scene3d>
+    <dgm:sp3d/>
+    <dgm:txPr/>
+    <dgm:style>
+      <a:lnRef idx="0">
+        <a:scrgbClr r="0" g="0" b="0"/>
+      </a:lnRef>
+      <a:fillRef idx="1">
+        <a:scrgbClr r="0" g="0" b="0"/>
+      </a:fillRef>
+      <a:effectRef idx="0">
+        <a:scrgbClr r="0" g="0" b="0"/>
+      </a:effectRef>
+      <a:fontRef idx="minor"/>
+    </dgm:style>
+  </dgm:styleLbl>
+  <dgm:styleLbl name="trBgShp">
+    <dgm:scene3d>
+      <a:camera prst="orthographicFront"/>
+      <a:lightRig rig="threePt" dir="t"/>
+    </dgm:scene3d>
+    <dgm:sp3d/>
+    <dgm:txPr/>
+    <dgm:style>
+      <a:lnRef idx="0">
+        <a:scrgbClr r="0" g="0" b="0"/>
+      </a:lnRef>
+      <a:fillRef idx="1">
+        <a:scrgbClr r="0" g="0" b="0"/>
+      </a:fillRef>
+      <a:effectRef idx="0">
+        <a:scrgbClr r="0" g="0" b="0"/>
+      </a:effectRef>
+      <a:fontRef idx="minor"/>
+    </dgm:style>
+  </dgm:styleLbl>
+  <dgm:styleLbl name="fgShp">
+    <dgm:scene3d>
+      <a:camera prst="orthographicFront"/>
+      <a:lightRig rig="threePt" dir="t"/>
+    </dgm:scene3d>
+    <dgm:sp3d/>
+    <dgm:txPr/>
+    <dgm:style>
+      <a:lnRef idx="2">
+        <a:scrgbClr r="0" g="0" b="0"/>
+      </a:lnRef>
+      <a:fillRef idx="1">
+        <a:scrgbClr r="0" g="0" b="0"/>
+      </a:fillRef>
+      <a:effectRef idx="0">
         <a:scrgbClr r="0" g="0" b="0"/>
       </a:effectRef>
       <a:fontRef idx="minor"/>
@@ -5268,7 +9420,7 @@
           <a:p>
             <a:fld id="{2F89BF03-DAF2-46FE-A32D-CE3ED500C0FE}" type="datetimeFigureOut">
               <a:rPr lang="en-US" smtClean="0"/>
-              <a:t>5/7/2020</a:t>
+              <a:t>6/23/2020</a:t>
             </a:fld>
             <a:endParaRPr lang="en-US"/>
           </a:p>
@@ -5458,7 +9610,7 @@
           <a:p>
             <a:fld id="{2F89BF03-DAF2-46FE-A32D-CE3ED500C0FE}" type="datetimeFigureOut">
               <a:rPr lang="en-US" smtClean="0"/>
-              <a:t>5/7/2020</a:t>
+              <a:t>6/23/2020</a:t>
             </a:fld>
             <a:endParaRPr lang="en-US"/>
           </a:p>
@@ -5638,7 +9790,7 @@
           <a:p>
             <a:fld id="{2F89BF03-DAF2-46FE-A32D-CE3ED500C0FE}" type="datetimeFigureOut">
               <a:rPr lang="en-US" smtClean="0"/>
-              <a:t>5/7/2020</a:t>
+              <a:t>6/23/2020</a:t>
             </a:fld>
             <a:endParaRPr lang="en-US"/>
           </a:p>
@@ -5808,7 +9960,7 @@
           <a:p>
             <a:fld id="{2F89BF03-DAF2-46FE-A32D-CE3ED500C0FE}" type="datetimeFigureOut">
               <a:rPr lang="en-US" smtClean="0"/>
-              <a:t>5/7/2020</a:t>
+              <a:t>6/23/2020</a:t>
             </a:fld>
             <a:endParaRPr lang="en-US"/>
           </a:p>
@@ -6064,7 +10216,7 @@
           <a:p>
             <a:fld id="{2F89BF03-DAF2-46FE-A32D-CE3ED500C0FE}" type="datetimeFigureOut">
               <a:rPr lang="en-US" smtClean="0"/>
-              <a:t>5/7/2020</a:t>
+              <a:t>6/23/2020</a:t>
             </a:fld>
             <a:endParaRPr lang="en-US"/>
           </a:p>
@@ -6352,7 +10504,7 @@
           <a:p>
             <a:fld id="{2F89BF03-DAF2-46FE-A32D-CE3ED500C0FE}" type="datetimeFigureOut">
               <a:rPr lang="en-US" smtClean="0"/>
-              <a:t>5/7/2020</a:t>
+              <a:t>6/23/2020</a:t>
             </a:fld>
             <a:endParaRPr lang="en-US"/>
           </a:p>
@@ -6790,7 +10942,7 @@
           <a:p>
             <a:fld id="{2F89BF03-DAF2-46FE-A32D-CE3ED500C0FE}" type="datetimeFigureOut">
               <a:rPr lang="en-US" smtClean="0"/>
-              <a:t>5/7/2020</a:t>
+              <a:t>6/23/2020</a:t>
             </a:fld>
             <a:endParaRPr lang="en-US"/>
           </a:p>
@@ -6908,7 +11060,7 @@
           <a:p>
             <a:fld id="{2F89BF03-DAF2-46FE-A32D-CE3ED500C0FE}" type="datetimeFigureOut">
               <a:rPr lang="en-US" smtClean="0"/>
-              <a:t>5/7/2020</a:t>
+              <a:t>6/23/2020</a:t>
             </a:fld>
             <a:endParaRPr lang="en-US"/>
           </a:p>
@@ -7003,7 +11155,7 @@
           <a:p>
             <a:fld id="{2F89BF03-DAF2-46FE-A32D-CE3ED500C0FE}" type="datetimeFigureOut">
               <a:rPr lang="en-US" smtClean="0"/>
-              <a:t>5/7/2020</a:t>
+              <a:t>6/23/2020</a:t>
             </a:fld>
             <a:endParaRPr lang="en-US"/>
           </a:p>
@@ -7359,7 +11511,7 @@
           <a:p>
             <a:fld id="{2F89BF03-DAF2-46FE-A32D-CE3ED500C0FE}" type="datetimeFigureOut">
               <a:rPr lang="en-US" smtClean="0"/>
-              <a:t>5/7/2020</a:t>
+              <a:t>6/23/2020</a:t>
             </a:fld>
             <a:endParaRPr lang="en-US"/>
           </a:p>
@@ -7675,7 +11827,7 @@
           <a:p>
             <a:fld id="{2F89BF03-DAF2-46FE-A32D-CE3ED500C0FE}" type="datetimeFigureOut">
               <a:rPr lang="en-US" smtClean="0"/>
-              <a:t>5/7/2020</a:t>
+              <a:t>6/23/2020</a:t>
             </a:fld>
             <a:endParaRPr lang="en-US"/>
           </a:p>
@@ -7908,7 +12060,7 @@
           <a:p>
             <a:fld id="{2F89BF03-DAF2-46FE-A32D-CE3ED500C0FE}" type="datetimeFigureOut">
               <a:rPr lang="en-US" smtClean="0"/>
-              <a:t>5/7/2020</a:t>
+              <a:t>6/23/2020</a:t>
             </a:fld>
             <a:endParaRPr lang="en-US"/>
           </a:p>
@@ -9054,6 +13206,64 @@
 </p:sld>
 </file>
 
+<file path=ppt/slides/slide2.xml><?xml version="1.0" encoding="utf-8"?>
+<p:sld xmlns:a="http://schemas.openxmlformats.org/drawingml/2006/main" xmlns:r="http://schemas.openxmlformats.org/officeDocument/2006/relationships" xmlns:p="http://schemas.openxmlformats.org/presentationml/2006/main">
+  <p:cSld>
+    <p:spTree>
+      <p:nvGrpSpPr>
+        <p:cNvPr id="1" name=""/>
+        <p:cNvGrpSpPr/>
+        <p:nvPr/>
+      </p:nvGrpSpPr>
+      <p:grpSpPr>
+        <a:xfrm>
+          <a:off x="0" y="0"/>
+          <a:ext cx="0" cy="0"/>
+          <a:chOff x="0" y="0"/>
+          <a:chExt cx="0" cy="0"/>
+        </a:xfrm>
+      </p:grpSpPr>
+      <p:graphicFrame>
+        <p:nvGraphicFramePr>
+          <p:cNvPr id="4" name="Diagram 3">
+            <a:extLst>
+              <a:ext uri="{FF2B5EF4-FFF2-40B4-BE49-F238E27FC236}">
+                <a16:creationId xmlns:a16="http://schemas.microsoft.com/office/drawing/2014/main" id="{566539A4-4D8B-47EF-B0E0-F99753CF1867}"/>
+              </a:ext>
+            </a:extLst>
+          </p:cNvPr>
+          <p:cNvGraphicFramePr/>
+          <p:nvPr>
+            <p:extLst>
+              <p:ext uri="{D42A27DB-BD31-4B8C-83A1-F6EECF244321}">
+                <p14:modId xmlns:p14="http://schemas.microsoft.com/office/powerpoint/2010/main" val="196206846"/>
+              </p:ext>
+            </p:extLst>
+          </p:nvPr>
+        </p:nvGraphicFramePr>
+        <p:xfrm>
+          <a:off x="2032000" y="719666"/>
+          <a:ext cx="8128000" cy="5418667"/>
+        </p:xfrm>
+        <a:graphic>
+          <a:graphicData uri="http://schemas.openxmlformats.org/drawingml/2006/diagram">
+            <dgm:relIds xmlns:dgm="http://schemas.openxmlformats.org/drawingml/2006/diagram" xmlns:r="http://schemas.openxmlformats.org/officeDocument/2006/relationships" r:dm="rId2" r:lo="rId3" r:qs="rId4" r:cs="rId5"/>
+          </a:graphicData>
+        </a:graphic>
+      </p:graphicFrame>
+    </p:spTree>
+    <p:extLst>
+      <p:ext uri="{BB962C8B-B14F-4D97-AF65-F5344CB8AC3E}">
+        <p14:creationId xmlns:p14="http://schemas.microsoft.com/office/powerpoint/2010/main" val="3826765586"/>
+      </p:ext>
+    </p:extLst>
+  </p:cSld>
+  <p:clrMapOvr>
+    <a:masterClrMapping/>
+  </p:clrMapOvr>
+</p:sld>
+</file>
+
 <file path=ppt/theme/theme1.xml><?xml version="1.0" encoding="utf-8"?>
 <a:theme xmlns:a="http://schemas.openxmlformats.org/drawingml/2006/main" name="Metropolitan">
   <a:themeElements>

</xml_diff>